<commit_message>
revisione slide architettura hardware
</commit_message>
<xml_diff>
--- a/presentazione_discussione.pptx
+++ b/presentazione_discussione.pptx
@@ -19,8 +19,8 @@
     <p:sldId id="283" r:id="rId10"/>
     <p:sldId id="284" r:id="rId11"/>
     <p:sldId id="285" r:id="rId12"/>
-    <p:sldId id="287" r:id="rId13"/>
-    <p:sldId id="286" r:id="rId14"/>
+    <p:sldId id="286" r:id="rId13"/>
+    <p:sldId id="287" r:id="rId14"/>
     <p:sldId id="288" r:id="rId15"/>
     <p:sldId id="289" r:id="rId16"/>
     <p:sldId id="290" r:id="rId17"/>
@@ -1582,6 +1582,160 @@
     <p:extLst>
       <p:ext uri="{BB962C8B-B14F-4D97-AF65-F5344CB8AC3E}">
         <p14:creationId xmlns:p14="http://schemas.microsoft.com/office/powerpoint/2010/main" val="1452794700"/>
+      </p:ext>
+    </p:extLst>
+  </p:cSld>
+  <p:clrMapOvr>
+    <a:masterClrMapping/>
+  </p:clrMapOvr>
+</p:notes>
+</file>
+
+<file path=ppt/notesSlides/notesSlide2.xml><?xml version="1.0" encoding="utf-8"?>
+<p:notes xmlns:a="http://schemas.openxmlformats.org/drawingml/2006/main" xmlns:r="http://schemas.openxmlformats.org/officeDocument/2006/relationships" xmlns:p="http://schemas.openxmlformats.org/presentationml/2006/main">
+  <p:cSld>
+    <p:spTree>
+      <p:nvGrpSpPr>
+        <p:cNvPr id="1" name=""/>
+        <p:cNvGrpSpPr/>
+        <p:nvPr/>
+      </p:nvGrpSpPr>
+      <p:grpSpPr>
+        <a:xfrm>
+          <a:off x="0" y="0"/>
+          <a:ext cx="0" cy="0"/>
+          <a:chOff x="0" y="0"/>
+          <a:chExt cx="0" cy="0"/>
+        </a:xfrm>
+      </p:grpSpPr>
+      <p:sp>
+        <p:nvSpPr>
+          <p:cNvPr id="2" name="Segnaposto immagine diapositiva 1"/>
+          <p:cNvSpPr>
+            <a:spLocks noGrp="1" noRot="1" noChangeAspect="1"/>
+          </p:cNvSpPr>
+          <p:nvPr>
+            <p:ph type="sldImg"/>
+          </p:nvPr>
+        </p:nvSpPr>
+        <p:spPr/>
+      </p:sp>
+      <p:sp>
+        <p:nvSpPr>
+          <p:cNvPr id="3" name="Segnaposto note 2"/>
+          <p:cNvSpPr>
+            <a:spLocks noGrp="1"/>
+          </p:cNvSpPr>
+          <p:nvPr>
+            <p:ph type="body" idx="1"/>
+          </p:nvPr>
+        </p:nvSpPr>
+        <p:spPr/>
+        <p:txBody>
+          <a:bodyPr/>
+          <a:lstStyle/>
+          <a:p>
+            <a:endParaRPr lang="it-IT"/>
+          </a:p>
+        </p:txBody>
+      </p:sp>
+      <p:sp>
+        <p:nvSpPr>
+          <p:cNvPr id="4" name="Segnaposto intestazione 3"/>
+          <p:cNvSpPr>
+            <a:spLocks noGrp="1"/>
+          </p:cNvSpPr>
+          <p:nvPr>
+            <p:ph type="hdr" sz="quarter" idx="10"/>
+          </p:nvPr>
+        </p:nvSpPr>
+        <p:spPr/>
+        <p:txBody>
+          <a:bodyPr/>
+          <a:lstStyle/>
+          <a:p>
+            <a:r>
+              <a:rPr lang="en-US" altLang="nl-NL" smtClean="0"/>
+              <a:t>Process synchronization</a:t>
+            </a:r>
+            <a:endParaRPr lang="en-US" altLang="nl-NL"/>
+          </a:p>
+        </p:txBody>
+      </p:sp>
+      <p:sp>
+        <p:nvSpPr>
+          <p:cNvPr id="5" name="Segnaposto data 4"/>
+          <p:cNvSpPr>
+            <a:spLocks noGrp="1"/>
+          </p:cNvSpPr>
+          <p:nvPr>
+            <p:ph type="dt" idx="11"/>
+          </p:nvPr>
+        </p:nvSpPr>
+        <p:spPr/>
+        <p:txBody>
+          <a:bodyPr/>
+          <a:lstStyle/>
+          <a:p>
+            <a:r>
+              <a:rPr lang="en-US" altLang="nl-NL" smtClean="0"/>
+              <a:t>Operating System</a:t>
+            </a:r>
+            <a:endParaRPr lang="en-US" altLang="nl-NL"/>
+          </a:p>
+        </p:txBody>
+      </p:sp>
+      <p:sp>
+        <p:nvSpPr>
+          <p:cNvPr id="6" name="Segnaposto piè di pagina 5"/>
+          <p:cNvSpPr>
+            <a:spLocks noGrp="1"/>
+          </p:cNvSpPr>
+          <p:nvPr>
+            <p:ph type="ftr" sz="quarter" idx="12"/>
+          </p:nvPr>
+        </p:nvSpPr>
+        <p:spPr/>
+        <p:txBody>
+          <a:bodyPr/>
+          <a:lstStyle/>
+          <a:p>
+            <a:r>
+              <a:rPr lang="en-US" altLang="nl-NL" smtClean="0"/>
+              <a:t>© 2005 William Fornaciari</a:t>
+            </a:r>
+            <a:endParaRPr lang="en-US" altLang="nl-NL"/>
+          </a:p>
+        </p:txBody>
+      </p:sp>
+      <p:sp>
+        <p:nvSpPr>
+          <p:cNvPr id="7" name="Segnaposto numero diapositiva 6"/>
+          <p:cNvSpPr>
+            <a:spLocks noGrp="1"/>
+          </p:cNvSpPr>
+          <p:nvPr>
+            <p:ph type="sldNum" sz="quarter" idx="13"/>
+          </p:nvPr>
+        </p:nvSpPr>
+        <p:spPr/>
+        <p:txBody>
+          <a:bodyPr/>
+          <a:lstStyle/>
+          <a:p>
+            <a:fld id="{88C0D9CF-78A8-4FBE-960E-41C6F5A4AF95}" type="slidenum">
+              <a:rPr lang="en-US" altLang="nl-NL" smtClean="0"/>
+              <a:pPr/>
+              <a:t>7</a:t>
+            </a:fld>
+            <a:endParaRPr lang="en-US" altLang="nl-NL"/>
+          </a:p>
+        </p:txBody>
+      </p:sp>
+    </p:spTree>
+    <p:extLst>
+      <p:ext uri="{BB962C8B-B14F-4D97-AF65-F5344CB8AC3E}">
+        <p14:creationId xmlns:p14="http://schemas.microsoft.com/office/powerpoint/2010/main" val="1144522535"/>
       </p:ext>
     </p:extLst>
   </p:cSld>
@@ -5274,7 +5428,7 @@
           <a:p>
             <a:r>
               <a:rPr lang="it-IT" dirty="0" smtClean="0"/>
-              <a:t>Parte digitale</a:t>
+              <a:t>Parte di conversione</a:t>
             </a:r>
             <a:endParaRPr lang="it-IT" dirty="0"/>
           </a:p>
@@ -5290,97 +5444,27 @@
             <p:ph idx="1"/>
           </p:nvPr>
         </p:nvSpPr>
-        <p:spPr/>
+        <p:spPr>
+          <a:xfrm>
+            <a:off x="609600" y="1066800"/>
+            <a:ext cx="7772400" cy="1219200"/>
+          </a:xfrm>
+        </p:spPr>
         <p:txBody>
           <a:bodyPr/>
           <a:lstStyle/>
           <a:p>
             <a:r>
+              <a:rPr lang="it-IT" sz="2400" dirty="0"/>
+              <a:t>I due mondi sono interfacciati da una scheda di conversione, equipaggiata con un DAC ed un ADC comandati dalla </a:t>
+            </a:r>
+            <a:r>
               <a:rPr lang="it-IT" sz="2400" dirty="0" smtClean="0"/>
-              <a:t>La parte digitale del sensore è costituita da una scheda di sviluppo NI </a:t>
-            </a:r>
-            <a:r>
-              <a:rPr lang="it-IT" sz="2400" dirty="0" err="1" smtClean="0"/>
-              <a:t>sbRIO</a:t>
-            </a:r>
-            <a:r>
-              <a:rPr lang="it-IT" sz="2400" dirty="0" smtClean="0"/>
-              <a:t> 9636</a:t>
-            </a:r>
-          </a:p>
-          <a:p>
-            <a:r>
-              <a:rPr lang="it-IT" sz="2400" dirty="0" smtClean="0"/>
-              <a:t>La scheda è equipaggiata con un’FPGA ed un microcontrollore</a:t>
-            </a:r>
-          </a:p>
-          <a:p>
-            <a:r>
-              <a:rPr lang="it-IT" sz="2400" dirty="0" smtClean="0"/>
-              <a:t>L’FPGA si occupa di </a:t>
-            </a:r>
-            <a:br>
-              <a:rPr lang="it-IT" sz="2400" dirty="0" smtClean="0"/>
-            </a:br>
-            <a:r>
-              <a:rPr lang="it-IT" sz="2400" dirty="0" smtClean="0"/>
-              <a:t>comandare la scheda di </a:t>
+              <a:t>parte </a:t>
             </a:r>
             <a:r>
               <a:rPr lang="it-IT" sz="2400" dirty="0"/>
-              <a:t/>
-            </a:r>
-            <a:br>
-              <a:rPr lang="it-IT" sz="2400" dirty="0"/>
-            </a:br>
-            <a:r>
-              <a:rPr lang="it-IT" sz="2400" dirty="0" smtClean="0"/>
-              <a:t>conversione, di calcolare </a:t>
-            </a:r>
-            <a:r>
-              <a:rPr lang="it-IT" sz="2400" dirty="0"/>
-              <a:t/>
-            </a:r>
-            <a:br>
-              <a:rPr lang="it-IT" sz="2400" dirty="0"/>
-            </a:br>
-            <a:r>
-              <a:rPr lang="it-IT" sz="2400" dirty="0" smtClean="0"/>
-              <a:t>l’FFT del segnale acquisito e </a:t>
-            </a:r>
-            <a:br>
-              <a:rPr lang="it-IT" sz="2400" dirty="0" smtClean="0"/>
-            </a:br>
-            <a:r>
-              <a:rPr lang="it-IT" sz="2400" dirty="0" smtClean="0"/>
-              <a:t>dell’estrazione del tono </a:t>
-            </a:r>
-            <a:br>
-              <a:rPr lang="it-IT" sz="2400" dirty="0" smtClean="0"/>
-            </a:br>
-            <a:r>
-              <a:rPr lang="it-IT" sz="2400" dirty="0" smtClean="0"/>
-              <a:t>fondamentale del segnale</a:t>
-            </a:r>
-          </a:p>
-          <a:p>
-            <a:r>
-              <a:rPr lang="it-IT" sz="2400" dirty="0" smtClean="0"/>
-              <a:t>Il microcontrollore si </a:t>
-            </a:r>
-            <a:br>
-              <a:rPr lang="it-IT" sz="2400" dirty="0" smtClean="0"/>
-            </a:br>
-            <a:r>
-              <a:rPr lang="it-IT" sz="2400" dirty="0" smtClean="0"/>
-              <a:t>occupa del calcolo del bin </a:t>
-            </a:r>
-            <a:br>
-              <a:rPr lang="it-IT" sz="2400" dirty="0" smtClean="0"/>
-            </a:br>
-            <a:r>
-              <a:rPr lang="it-IT" sz="2400" dirty="0" smtClean="0"/>
-              <a:t>interpolato e del calcolo della distanza </a:t>
+              <a:t>digitale.</a:t>
             </a:r>
             <a:endParaRPr lang="it-IT" sz="2400" dirty="0"/>
           </a:p>
@@ -5410,9 +5494,261 @@
           </a:p>
         </p:txBody>
       </p:sp>
+      <p:sp>
+        <p:nvSpPr>
+          <p:cNvPr id="5" name="Segnaposto contenuto 2"/>
+          <p:cNvSpPr txBox="1">
+            <a:spLocks/>
+          </p:cNvSpPr>
+          <p:nvPr/>
+        </p:nvSpPr>
+        <p:spPr bwMode="auto">
+          <a:xfrm>
+            <a:off x="609600" y="5510212"/>
+            <a:ext cx="7772400" cy="1014413"/>
+          </a:xfrm>
+          <a:prstGeom prst="rect">
+            <a:avLst/>
+          </a:prstGeom>
+          <a:noFill/>
+          <a:ln>
+            <a:noFill/>
+          </a:ln>
+          <a:extLst>
+            <a:ext uri="{909E8E84-426E-40DD-AFC4-6F175D3DCCD1}">
+              <a14:hiddenFill xmlns:a14="http://schemas.microsoft.com/office/drawing/2010/main">
+                <a:solidFill>
+                  <a:srgbClr val="FFFFFF"/>
+                </a:solidFill>
+              </a14:hiddenFill>
+            </a:ext>
+            <a:ext uri="{91240B29-F687-4F45-9708-019B960494DF}">
+              <a14:hiddenLine xmlns:a14="http://schemas.microsoft.com/office/drawing/2010/main" w="9525">
+                <a:solidFill>
+                  <a:srgbClr val="000000"/>
+                </a:solidFill>
+                <a:miter lim="800000"/>
+                <a:headEnd/>
+                <a:tailEnd/>
+              </a14:hiddenLine>
+            </a:ext>
+          </a:extLst>
+        </p:spPr>
+        <p:txBody>
+          <a:bodyPr vert="horz" wrap="square" lIns="91440" tIns="45720" rIns="91440" bIns="45720" numCol="1" anchor="t" anchorCtr="0" compatLnSpc="1">
+            <a:prstTxWarp prst="textNoShape">
+              <a:avLst/>
+            </a:prstTxWarp>
+          </a:bodyPr>
+          <a:lstStyle>
+            <a:lvl1pPr marL="342900" indent="-342900" algn="l" rtl="0" eaLnBrk="1" fontAlgn="base" hangingPunct="1">
+              <a:spcBef>
+                <a:spcPct val="20000"/>
+              </a:spcBef>
+              <a:spcAft>
+                <a:spcPct val="0"/>
+              </a:spcAft>
+              <a:buClr>
+                <a:srgbClr val="003366"/>
+              </a:buClr>
+              <a:buFont typeface="Times" panose="02020603050405020304" pitchFamily="18" charset="0"/>
+              <a:buChar char="•"/>
+              <a:defRPr sz="3200">
+                <a:solidFill>
+                  <a:schemeClr val="tx1"/>
+                </a:solidFill>
+                <a:latin typeface="+mn-lt"/>
+                <a:ea typeface="+mn-ea"/>
+                <a:cs typeface="+mn-cs"/>
+              </a:defRPr>
+            </a:lvl1pPr>
+            <a:lvl2pPr marL="742950" indent="-285750" algn="l" rtl="0" eaLnBrk="1" fontAlgn="base" hangingPunct="1">
+              <a:spcBef>
+                <a:spcPct val="20000"/>
+              </a:spcBef>
+              <a:spcAft>
+                <a:spcPct val="0"/>
+              </a:spcAft>
+              <a:buClr>
+                <a:srgbClr val="FF9900"/>
+              </a:buClr>
+              <a:buFont typeface="Wingdings" panose="05000000000000000000" pitchFamily="2" charset="2"/>
+              <a:buChar char="§"/>
+              <a:defRPr sz="2800">
+                <a:solidFill>
+                  <a:schemeClr val="tx1"/>
+                </a:solidFill>
+                <a:latin typeface="+mn-lt"/>
+                <a:ea typeface="+mn-ea"/>
+                <a:cs typeface="+mn-cs"/>
+              </a:defRPr>
+            </a:lvl2pPr>
+            <a:lvl3pPr marL="1143000" indent="-228600" algn="l" rtl="0" eaLnBrk="1" fontAlgn="base" hangingPunct="1">
+              <a:spcBef>
+                <a:spcPct val="20000"/>
+              </a:spcBef>
+              <a:spcAft>
+                <a:spcPct val="0"/>
+              </a:spcAft>
+              <a:buClr>
+                <a:srgbClr val="003366"/>
+              </a:buClr>
+              <a:buFont typeface="Times" panose="02020603050405020304" pitchFamily="18" charset="0"/>
+              <a:buChar char="•"/>
+              <a:defRPr sz="2400">
+                <a:solidFill>
+                  <a:schemeClr val="tx1"/>
+                </a:solidFill>
+                <a:latin typeface="+mn-lt"/>
+                <a:ea typeface="+mn-ea"/>
+                <a:cs typeface="+mn-cs"/>
+              </a:defRPr>
+            </a:lvl3pPr>
+            <a:lvl4pPr marL="1600200" indent="-228600" algn="l" rtl="0" eaLnBrk="1" fontAlgn="base" hangingPunct="1">
+              <a:spcBef>
+                <a:spcPct val="20000"/>
+              </a:spcBef>
+              <a:spcAft>
+                <a:spcPct val="0"/>
+              </a:spcAft>
+              <a:buClr>
+                <a:srgbClr val="003366"/>
+              </a:buClr>
+              <a:buChar char="–"/>
+              <a:defRPr sz="2000">
+                <a:solidFill>
+                  <a:schemeClr val="tx1"/>
+                </a:solidFill>
+                <a:latin typeface="+mn-lt"/>
+                <a:ea typeface="+mn-ea"/>
+                <a:cs typeface="+mn-cs"/>
+              </a:defRPr>
+            </a:lvl4pPr>
+            <a:lvl5pPr marL="2057400" indent="-228600" algn="l" rtl="0" eaLnBrk="1" fontAlgn="base" hangingPunct="1">
+              <a:spcBef>
+                <a:spcPct val="20000"/>
+              </a:spcBef>
+              <a:spcAft>
+                <a:spcPct val="0"/>
+              </a:spcAft>
+              <a:buChar char="»"/>
+              <a:defRPr sz="2000">
+                <a:solidFill>
+                  <a:schemeClr val="tx1"/>
+                </a:solidFill>
+                <a:latin typeface="+mn-lt"/>
+                <a:ea typeface="+mn-ea"/>
+                <a:cs typeface="+mn-cs"/>
+              </a:defRPr>
+            </a:lvl5pPr>
+            <a:lvl6pPr marL="2514600" indent="-228600" algn="l" rtl="0" eaLnBrk="1" fontAlgn="base" hangingPunct="1">
+              <a:spcBef>
+                <a:spcPct val="20000"/>
+              </a:spcBef>
+              <a:spcAft>
+                <a:spcPct val="0"/>
+              </a:spcAft>
+              <a:buChar char="»"/>
+              <a:defRPr sz="2000">
+                <a:solidFill>
+                  <a:schemeClr val="tx1"/>
+                </a:solidFill>
+                <a:latin typeface="+mn-lt"/>
+                <a:ea typeface="+mn-ea"/>
+                <a:cs typeface="+mn-cs"/>
+              </a:defRPr>
+            </a:lvl6pPr>
+            <a:lvl7pPr marL="2971800" indent="-228600" algn="l" rtl="0" eaLnBrk="1" fontAlgn="base" hangingPunct="1">
+              <a:spcBef>
+                <a:spcPct val="20000"/>
+              </a:spcBef>
+              <a:spcAft>
+                <a:spcPct val="0"/>
+              </a:spcAft>
+              <a:buChar char="»"/>
+              <a:defRPr sz="2000">
+                <a:solidFill>
+                  <a:schemeClr val="tx1"/>
+                </a:solidFill>
+                <a:latin typeface="+mn-lt"/>
+                <a:ea typeface="+mn-ea"/>
+                <a:cs typeface="+mn-cs"/>
+              </a:defRPr>
+            </a:lvl7pPr>
+            <a:lvl8pPr marL="3429000" indent="-228600" algn="l" rtl="0" eaLnBrk="1" fontAlgn="base" hangingPunct="1">
+              <a:spcBef>
+                <a:spcPct val="20000"/>
+              </a:spcBef>
+              <a:spcAft>
+                <a:spcPct val="0"/>
+              </a:spcAft>
+              <a:buChar char="»"/>
+              <a:defRPr sz="2000">
+                <a:solidFill>
+                  <a:schemeClr val="tx1"/>
+                </a:solidFill>
+                <a:latin typeface="+mn-lt"/>
+                <a:ea typeface="+mn-ea"/>
+                <a:cs typeface="+mn-cs"/>
+              </a:defRPr>
+            </a:lvl8pPr>
+            <a:lvl9pPr marL="3886200" indent="-228600" algn="l" rtl="0" eaLnBrk="1" fontAlgn="base" hangingPunct="1">
+              <a:spcBef>
+                <a:spcPct val="20000"/>
+              </a:spcBef>
+              <a:spcAft>
+                <a:spcPct val="0"/>
+              </a:spcAft>
+              <a:buChar char="»"/>
+              <a:defRPr sz="2000">
+                <a:solidFill>
+                  <a:schemeClr val="tx1"/>
+                </a:solidFill>
+                <a:latin typeface="+mn-lt"/>
+                <a:ea typeface="+mn-ea"/>
+                <a:cs typeface="+mn-cs"/>
+              </a:defRPr>
+            </a:lvl9pPr>
+          </a:lstStyle>
+          <a:p>
+            <a:r>
+              <a:rPr lang="it-IT" sz="2400" kern="0" dirty="0" smtClean="0"/>
+              <a:t>Frequenza di campionamento </a:t>
+            </a:r>
+            <a:r>
+              <a:rPr lang="it-IT" sz="2400" kern="0" dirty="0" err="1" smtClean="0"/>
+              <a:t>max</a:t>
+            </a:r>
+            <a:r>
+              <a:rPr lang="it-IT" sz="2400" kern="0" dirty="0" smtClean="0"/>
+              <a:t>: </a:t>
+            </a:r>
+            <a:r>
+              <a:rPr lang="it-IT" sz="2400" b="1" kern="0" dirty="0" smtClean="0"/>
+              <a:t>50MSa/</a:t>
+            </a:r>
+            <a:r>
+              <a:rPr lang="it-IT" sz="2400" b="1" kern="0" dirty="0" err="1" smtClean="0"/>
+              <a:t>s</a:t>
+            </a:r>
+            <a:endParaRPr lang="it-IT" sz="2400" b="1" kern="0" dirty="0" smtClean="0"/>
+          </a:p>
+          <a:p>
+            <a:r>
+              <a:rPr lang="it-IT" sz="2400" kern="0" dirty="0" smtClean="0"/>
+              <a:t>Risoluzione: </a:t>
+            </a:r>
+            <a:r>
+              <a:rPr lang="it-IT" sz="2400" b="1" kern="0" dirty="0" smtClean="0"/>
+              <a:t>12 bit</a:t>
+            </a:r>
+            <a:endParaRPr lang="it-IT" sz="2400" b="1" kern="0" dirty="0"/>
+          </a:p>
+        </p:txBody>
+      </p:sp>
       <p:pic>
         <p:nvPicPr>
-          <p:cNvPr id="5" name="Immagine 4"/>
+          <p:cNvPr id="6" name="Immagine 5"/>
           <p:cNvPicPr>
             <a:picLocks noChangeAspect="1"/>
           </p:cNvPicPr>
@@ -5432,8 +5768,8 @@
         </p:blipFill>
         <p:spPr>
           <a:xfrm>
-            <a:off x="5114477" y="2439945"/>
-            <a:ext cx="3640285" cy="3293591"/>
+            <a:off x="1196574" y="2376480"/>
+            <a:ext cx="6598451" cy="3043251"/>
           </a:xfrm>
           <a:prstGeom prst="rect">
             <a:avLst/>
@@ -5443,7 +5779,7 @@
     </p:spTree>
     <p:extLst>
       <p:ext uri="{BB962C8B-B14F-4D97-AF65-F5344CB8AC3E}">
-        <p14:creationId xmlns:p14="http://schemas.microsoft.com/office/powerpoint/2010/main" val="594836213"/>
+        <p14:creationId xmlns:p14="http://schemas.microsoft.com/office/powerpoint/2010/main" val="2372177897"/>
       </p:ext>
     </p:extLst>
   </p:cSld>
@@ -5510,7 +5846,12 @@
             <p:ph idx="1"/>
           </p:nvPr>
         </p:nvSpPr>
-        <p:spPr/>
+        <p:spPr>
+          <a:xfrm>
+            <a:off x="685800" y="1142999"/>
+            <a:ext cx="7772400" cy="5229225"/>
+          </a:xfrm>
+        </p:spPr>
         <p:txBody>
           <a:bodyPr/>
           <a:lstStyle/>
@@ -5524,7 +5865,7 @@
                   </a:schemeClr>
                 </a:solidFill>
               </a:rPr>
-              <a:t>Cos’è l’interferometria</a:t>
+              <a:t>Interferometria</a:t>
             </a:r>
           </a:p>
           <a:p>
@@ -5538,13 +5879,13 @@
                   </a:schemeClr>
                 </a:solidFill>
               </a:rPr>
-              <a:t>Interferometria tradizionale</a:t>
+              <a:t>Interferometria a self-mixing</a:t>
             </a:r>
           </a:p>
           <a:p>
             <a:pPr lvl="1"/>
             <a:r>
-              <a:rPr lang="it-IT" sz="2000" dirty="0" smtClean="0">
+              <a:rPr lang="it-IT" sz="2000" dirty="0">
                 <a:solidFill>
                   <a:schemeClr val="bg2">
                     <a:lumMod val="40000"/>
@@ -5552,12 +5893,12 @@
                   </a:schemeClr>
                 </a:solidFill>
               </a:rPr>
-              <a:t>Interferometria a self-mixing</a:t>
-            </a:r>
-          </a:p>
-          <a:p>
-            <a:r>
-              <a:rPr lang="it-IT" sz="2400" dirty="0" smtClean="0">
+              <a:t>Misura della distanza</a:t>
+            </a:r>
+          </a:p>
+          <a:p>
+            <a:r>
+              <a:rPr lang="it-IT" sz="2400" dirty="0">
                 <a:solidFill>
                   <a:schemeClr val="bg2">
                     <a:lumMod val="40000"/>
@@ -5571,7 +5912,7 @@
           <a:p>
             <a:pPr lvl="1"/>
             <a:r>
-              <a:rPr lang="it-IT" sz="2000" dirty="0" smtClean="0">
+              <a:rPr lang="it-IT" sz="2000" dirty="0">
                 <a:solidFill>
                   <a:schemeClr val="bg2">
                     <a:lumMod val="40000"/>
@@ -5585,7 +5926,7 @@
           <a:p>
             <a:pPr lvl="1"/>
             <a:r>
-              <a:rPr lang="it-IT" sz="2000" dirty="0" smtClean="0">
+              <a:rPr lang="it-IT" sz="2000" dirty="0">
                 <a:solidFill>
                   <a:schemeClr val="bg2">
                     <a:lumMod val="40000"/>
@@ -5593,13 +5934,13 @@
                   </a:schemeClr>
                 </a:solidFill>
               </a:rPr>
-              <a:t>Parte di conversione</a:t>
+              <a:t>Parte digitale</a:t>
             </a:r>
           </a:p>
           <a:p>
             <a:pPr lvl="1"/>
             <a:r>
-              <a:rPr lang="it-IT" sz="2000" dirty="0" smtClean="0">
+              <a:rPr lang="it-IT" sz="2000" dirty="0">
                 <a:solidFill>
                   <a:schemeClr val="bg2">
                     <a:lumMod val="40000"/>
@@ -5607,17 +5948,13 @@
                   </a:schemeClr>
                 </a:solidFill>
               </a:rPr>
-              <a:t>Parte digitale</a:t>
-            </a:r>
-          </a:p>
-          <a:p>
-            <a:r>
-              <a:rPr lang="it-IT" sz="2400" dirty="0" smtClean="0"/>
-              <a:t>Architettura </a:t>
-            </a:r>
+              <a:t>Parte di conversione</a:t>
+            </a:r>
+          </a:p>
+          <a:p>
             <a:r>
               <a:rPr lang="it-IT" sz="2400" dirty="0"/>
-              <a:t>software</a:t>
+              <a:t>Architettura software</a:t>
             </a:r>
           </a:p>
           <a:p>
@@ -5652,6 +5989,7 @@
               <a:rPr lang="it-IT" sz="2400" dirty="0"/>
               <a:t>Sviluppi futuri e conclusioni</a:t>
             </a:r>
+            <a:endParaRPr lang="it-IT" sz="2400" dirty="0"/>
           </a:p>
         </p:txBody>
       </p:sp>
@@ -7315,15 +7653,7 @@
             <a:pPr lvl="1"/>
             <a:r>
               <a:rPr lang="it-IT" sz="2000" dirty="0" smtClean="0"/>
-              <a:t>Interferometria </a:t>
-            </a:r>
-            <a:r>
-              <a:rPr lang="it-IT" sz="2000" dirty="0" smtClean="0"/>
-              <a:t>a </a:t>
-            </a:r>
-            <a:r>
-              <a:rPr lang="it-IT" sz="2000" dirty="0" smtClean="0"/>
-              <a:t>self-mixing</a:t>
+              <a:t>Interferometria a self-mixing</a:t>
             </a:r>
           </a:p>
           <a:p>
@@ -7332,7 +7662,6 @@
               <a:rPr lang="it-IT" sz="2000" dirty="0" smtClean="0"/>
               <a:t>Misura della distanza</a:t>
             </a:r>
-            <a:endParaRPr lang="it-IT" sz="2000" dirty="0" smtClean="0"/>
           </a:p>
           <a:p>
             <a:r>
@@ -7746,11 +8075,7 @@
             </a:r>
             <a:r>
               <a:rPr lang="it-IT" sz="2400" dirty="0"/>
-              <a:t>che si </a:t>
-            </a:r>
-            <a:r>
-              <a:rPr lang="it-IT" sz="2400" dirty="0"/>
-              <a:t>basa sulla </a:t>
+              <a:t>che si basa sulla </a:t>
             </a:r>
             <a:r>
               <a:rPr lang="it-IT" sz="2400" b="1" dirty="0"/>
@@ -7762,11 +8087,7 @@
             </a:r>
             <a:r>
               <a:rPr lang="it-IT" sz="2400" dirty="0" smtClean="0"/>
-              <a:t>stessa </a:t>
-            </a:r>
-            <a:r>
-              <a:rPr lang="it-IT" sz="2400" dirty="0" smtClean="0"/>
-              <a:t>sorgente laser</a:t>
+              <a:t>stessa sorgente laser</a:t>
             </a:r>
             <a:endParaRPr lang="it-IT" sz="2400" dirty="0"/>
           </a:p>
@@ -8853,8 +9174,8 @@
           </a:p>
         </p:txBody>
       </p:sp>
-      <mc:AlternateContent xmlns:mc="http://schemas.openxmlformats.org/markup-compatibility/2006">
-        <mc:Choice xmlns:a14="http://schemas.microsoft.com/office/drawing/2010/main" Requires="a14">
+      <mc:AlternateContent xmlns:mc="http://schemas.openxmlformats.org/markup-compatibility/2006" xmlns:a14="http://schemas.microsoft.com/office/drawing/2010/main">
+        <mc:Choice Requires="a14">
           <p:sp>
             <p:nvSpPr>
               <p:cNvPr id="5" name="Segnaposto contenuto 2"/>
@@ -8932,7 +9253,7 @@
             </p:txBody>
           </p:sp>
         </mc:Choice>
-        <mc:Fallback>
+        <mc:Fallback xmlns="">
           <p:sp>
             <p:nvSpPr>
               <p:cNvPr id="5" name="Segnaposto contenuto 2"/>
@@ -8970,8 +9291,8 @@
           </p:sp>
         </mc:Fallback>
       </mc:AlternateContent>
-      <mc:AlternateContent xmlns:mc="http://schemas.openxmlformats.org/markup-compatibility/2006">
-        <mc:Choice xmlns:a14="http://schemas.microsoft.com/office/drawing/2010/main" Requires="a14">
+      <mc:AlternateContent xmlns:mc="http://schemas.openxmlformats.org/markup-compatibility/2006" xmlns:a14="http://schemas.microsoft.com/office/drawing/2010/main">
+        <mc:Choice Requires="a14">
           <p:sp>
             <p:nvSpPr>
               <p:cNvPr id="6" name="CasellaDiTesto 5"/>
@@ -8994,6 +9315,7 @@
               </a:bodyPr>
               <a:lstStyle/>
               <a:p>
+                <a:pPr/>
                 <a14:m>
                   <m:oMathPara xmlns:m="http://schemas.openxmlformats.org/officeDocument/2006/math">
                     <m:oMathParaPr>
@@ -9125,7 +9447,7 @@
             </p:txBody>
           </p:sp>
         </mc:Choice>
-        <mc:Fallback>
+        <mc:Fallback xmlns="">
           <p:sp>
             <p:nvSpPr>
               <p:cNvPr id="6" name="CasellaDiTesto 5"/>
@@ -9571,16 +9893,21 @@
           <a:p>
             <a:pPr lvl="1"/>
             <a:r>
+              <a:rPr lang="it-IT" sz="2000" dirty="0" smtClean="0"/>
+              <a:t>Parte digitale</a:t>
+            </a:r>
+          </a:p>
+          <a:p>
+            <a:pPr lvl="1"/>
+            <a:r>
               <a:rPr lang="it-IT" sz="2000" dirty="0"/>
-              <a:t>Parte di conversione</a:t>
-            </a:r>
-          </a:p>
-          <a:p>
-            <a:pPr lvl="1"/>
-            <a:r>
-              <a:rPr lang="it-IT" sz="2000" dirty="0"/>
-              <a:t>Parte digitale</a:t>
-            </a:r>
+              <a:t>Parte di </a:t>
+            </a:r>
+            <a:r>
+              <a:rPr lang="it-IT" sz="2000" dirty="0" smtClean="0"/>
+              <a:t>conversione</a:t>
+            </a:r>
+            <a:endParaRPr lang="it-IT" sz="2000" dirty="0"/>
           </a:p>
           <a:p>
             <a:r>
@@ -9620,7 +9947,6 @@
               <a:rPr lang="it-IT" sz="2400" dirty="0"/>
               <a:t>Sviluppi futuri e conclusioni</a:t>
             </a:r>
-            <a:endParaRPr lang="it-IT" sz="2400" dirty="0"/>
           </a:p>
         </p:txBody>
       </p:sp>
@@ -9710,47 +10036,6 @@
       </p:sp>
       <p:sp>
         <p:nvSpPr>
-          <p:cNvPr id="3" name="Segnaposto contenuto 2"/>
-          <p:cNvSpPr>
-            <a:spLocks noGrp="1"/>
-          </p:cNvSpPr>
-          <p:nvPr>
-            <p:ph idx="1"/>
-          </p:nvPr>
-        </p:nvSpPr>
-        <p:spPr/>
-        <p:txBody>
-          <a:bodyPr/>
-          <a:lstStyle/>
-          <a:p>
-            <a:r>
-              <a:rPr lang="it-IT" sz="2400" dirty="0" smtClean="0"/>
-              <a:t>Lo strumento è formato da una parte analogica, sviluppata internamente al laboratorio dall’ing. Samuele Disegna, e da una parte digitale, fornita da National Instruments.</a:t>
-            </a:r>
-          </a:p>
-          <a:p>
-            <a:r>
-              <a:rPr lang="it-IT" sz="2400" dirty="0" smtClean="0"/>
-              <a:t>La parte analogica si occupa (??)</a:t>
-            </a:r>
-          </a:p>
-          <a:p>
-            <a:r>
-              <a:rPr lang="it-IT" sz="2400" dirty="0" smtClean="0"/>
-              <a:t>La parte digitale si occupa dell’elaborazione numerica del segnale acquisito</a:t>
-            </a:r>
-          </a:p>
-          <a:p>
-            <a:r>
-              <a:rPr lang="it-IT" sz="2400" dirty="0" smtClean="0"/>
-              <a:t>I due mondi sono interfacciati da una scheda di conversione, equipaggiata con un DAC ed un ADC comandati dalla scheda digitale.</a:t>
-            </a:r>
-            <a:endParaRPr lang="it-IT" sz="2400" dirty="0"/>
-          </a:p>
-        </p:txBody>
-      </p:sp>
-      <p:sp>
-        <p:nvSpPr>
           <p:cNvPr id="4" name="Segnaposto numero diapositiva 3"/>
           <p:cNvSpPr>
             <a:spLocks noGrp="1"/>
@@ -9770,6 +10055,98 @@
               <a:t>7</a:t>
             </a:fld>
             <a:endParaRPr lang="en-US" altLang="nl-NL"/>
+          </a:p>
+        </p:txBody>
+      </p:sp>
+      <p:pic>
+        <p:nvPicPr>
+          <p:cNvPr id="5" name="Immagine 4"/>
+          <p:cNvPicPr>
+            <a:picLocks noChangeAspect="1"/>
+          </p:cNvPicPr>
+          <p:nvPr/>
+        </p:nvPicPr>
+        <p:blipFill>
+          <a:blip r:embed="rId3">
+            <a:extLst>
+              <a:ext uri="{28A0092B-C50C-407E-A947-70E740481C1C}">
+                <a14:useLocalDpi xmlns:a14="http://schemas.microsoft.com/office/drawing/2010/main" val="0"/>
+              </a:ext>
+            </a:extLst>
+          </a:blip>
+          <a:stretch>
+            <a:fillRect/>
+          </a:stretch>
+        </p:blipFill>
+        <p:spPr>
+          <a:xfrm>
+            <a:off x="1016794" y="1923377"/>
+            <a:ext cx="7162800" cy="4299442"/>
+          </a:xfrm>
+          <a:prstGeom prst="rect">
+            <a:avLst/>
+          </a:prstGeom>
+        </p:spPr>
+      </p:pic>
+      <p:sp>
+        <p:nvSpPr>
+          <p:cNvPr id="6" name="CasellaDiTesto 5"/>
+          <p:cNvSpPr txBox="1"/>
+          <p:nvPr/>
+        </p:nvSpPr>
+        <p:spPr>
+          <a:xfrm>
+            <a:off x="609600" y="1092380"/>
+            <a:ext cx="7977188" cy="830997"/>
+          </a:xfrm>
+          <a:prstGeom prst="rect">
+            <a:avLst/>
+          </a:prstGeom>
+          <a:noFill/>
+        </p:spPr>
+        <p:txBody>
+          <a:bodyPr wrap="square" rtlCol="0">
+            <a:spAutoFit/>
+          </a:bodyPr>
+          <a:lstStyle/>
+          <a:p>
+            <a:pPr marL="342900" indent="-342900">
+              <a:buFont typeface="Arial" charset="0"/>
+              <a:buChar char="•"/>
+            </a:pPr>
+            <a:r>
+              <a:rPr lang="it-IT" dirty="0"/>
+              <a:t>Lo strumento è </a:t>
+            </a:r>
+            <a:r>
+              <a:rPr lang="it-IT" dirty="0" smtClean="0"/>
+              <a:t>composto </a:t>
+            </a:r>
+            <a:r>
+              <a:rPr lang="it-IT" dirty="0"/>
+              <a:t>da una </a:t>
+            </a:r>
+            <a:r>
+              <a:rPr lang="it-IT" b="1" dirty="0"/>
+              <a:t>parte </a:t>
+            </a:r>
+            <a:r>
+              <a:rPr lang="it-IT" b="1" dirty="0" smtClean="0"/>
+              <a:t>analogica</a:t>
+            </a:r>
+            <a:r>
+              <a:rPr lang="it-IT" dirty="0" smtClean="0"/>
+              <a:t> e una </a:t>
+            </a:r>
+            <a:r>
+              <a:rPr lang="it-IT" b="1" dirty="0"/>
+              <a:t>parte </a:t>
+            </a:r>
+            <a:r>
+              <a:rPr lang="it-IT" b="1" dirty="0" smtClean="0"/>
+              <a:t>digitale</a:t>
+            </a:r>
+            <a:endParaRPr lang="it-IT" dirty="0"/>
           </a:p>
         </p:txBody>
       </p:sp>
@@ -9843,15 +10220,109 @@
             <p:ph idx="1"/>
           </p:nvPr>
         </p:nvSpPr>
-        <p:spPr/>
+        <p:spPr>
+          <a:xfrm>
+            <a:off x="609600" y="1028700"/>
+            <a:ext cx="7686675" cy="5410200"/>
+          </a:xfrm>
+        </p:spPr>
         <p:txBody>
           <a:bodyPr/>
           <a:lstStyle/>
           <a:p>
             <a:r>
-              <a:rPr lang="it-IT" dirty="0" smtClean="0"/>
-              <a:t>TODO</a:t>
-            </a:r>
+              <a:rPr lang="it-IT" sz="2400" dirty="0"/>
+              <a:t>La parte analogica è costituita da una </a:t>
+            </a:r>
+            <a:r>
+              <a:rPr lang="it-IT" sz="2400" b="1" dirty="0"/>
+              <a:t>sezione ottica </a:t>
+            </a:r>
+            <a:r>
+              <a:rPr lang="it-IT" sz="2400" dirty="0"/>
+              <a:t>e una </a:t>
+            </a:r>
+            <a:r>
+              <a:rPr lang="it-IT" sz="2400" b="1" dirty="0"/>
+              <a:t>sezione </a:t>
+            </a:r>
+            <a:r>
+              <a:rPr lang="it-IT" sz="2400" b="1" dirty="0" smtClean="0"/>
+              <a:t>analogica</a:t>
+            </a:r>
+          </a:p>
+          <a:p>
+            <a:endParaRPr lang="it-IT" sz="2400" dirty="0"/>
+          </a:p>
+          <a:p>
+            <a:endParaRPr lang="it-IT" sz="2400" dirty="0" smtClean="0"/>
+          </a:p>
+          <a:p>
+            <a:endParaRPr lang="it-IT" sz="2400" dirty="0"/>
+          </a:p>
+          <a:p>
+            <a:endParaRPr lang="it-IT" sz="2400" dirty="0" smtClean="0"/>
+          </a:p>
+          <a:p>
+            <a:endParaRPr lang="it-IT" sz="2400" dirty="0"/>
+          </a:p>
+          <a:p>
+            <a:endParaRPr lang="it-IT" sz="2400" dirty="0" smtClean="0"/>
+          </a:p>
+          <a:p>
+            <a:r>
+              <a:rPr lang="it-IT" sz="2400" dirty="0" smtClean="0"/>
+              <a:t>La </a:t>
+            </a:r>
+            <a:r>
+              <a:rPr lang="it-IT" sz="2400" b="1" dirty="0"/>
+              <a:t>sezione ottica</a:t>
+            </a:r>
+            <a:r>
+              <a:rPr lang="it-IT" sz="2400" dirty="0"/>
+              <a:t> </a:t>
+            </a:r>
+            <a:r>
+              <a:rPr lang="it-IT" sz="2400" dirty="0" smtClean="0"/>
+              <a:t>comprende il package </a:t>
+            </a:r>
+            <a:r>
+              <a:rPr lang="it-IT" sz="2400" dirty="0"/>
+              <a:t>della sorgente </a:t>
+            </a:r>
+            <a:r>
+              <a:rPr lang="it-IT" sz="2400" dirty="0" smtClean="0"/>
+              <a:t>laser</a:t>
+            </a:r>
+          </a:p>
+          <a:p>
+            <a:r>
+              <a:rPr lang="it-IT" sz="2400" dirty="0" smtClean="0"/>
+              <a:t>La </a:t>
+            </a:r>
+            <a:r>
+              <a:rPr lang="it-IT" sz="2400" b="1" dirty="0"/>
+              <a:t>sezione analogica </a:t>
+            </a:r>
+            <a:r>
+              <a:rPr lang="it-IT" sz="2400" dirty="0"/>
+              <a:t>comprende </a:t>
+            </a:r>
+            <a:r>
+              <a:rPr lang="it-IT" sz="2400" dirty="0" smtClean="0"/>
+              <a:t>gli </a:t>
+            </a:r>
+            <a:r>
+              <a:rPr lang="it-IT" sz="2400" dirty="0"/>
+              <a:t>stadi di condizionamento e amplificazione del segnale </a:t>
+            </a:r>
+            <a:r>
+              <a:rPr lang="it-IT" sz="2400" dirty="0" smtClean="0"/>
+              <a:t>interferometrico </a:t>
+            </a:r>
+            <a:endParaRPr lang="it-IT" sz="2400" dirty="0"/>
+          </a:p>
+          <a:p>
             <a:endParaRPr lang="it-IT" dirty="0"/>
           </a:p>
         </p:txBody>
@@ -9880,6 +10351,66 @@
           </a:p>
         </p:txBody>
       </p:sp>
+      <p:pic>
+        <p:nvPicPr>
+          <p:cNvPr id="5" name="Immagine 4"/>
+          <p:cNvPicPr>
+            <a:picLocks noChangeAspect="1"/>
+          </p:cNvPicPr>
+          <p:nvPr/>
+        </p:nvPicPr>
+        <p:blipFill>
+          <a:blip r:embed="rId2">
+            <a:extLst>
+              <a:ext uri="{28A0092B-C50C-407E-A947-70E740481C1C}">
+                <a14:useLocalDpi xmlns:a14="http://schemas.microsoft.com/office/drawing/2010/main" val="0"/>
+              </a:ext>
+            </a:extLst>
+          </a:blip>
+          <a:stretch>
+            <a:fillRect/>
+          </a:stretch>
+        </p:blipFill>
+        <p:spPr>
+          <a:xfrm>
+            <a:off x="4452937" y="2650331"/>
+            <a:ext cx="3277932" cy="1069975"/>
+          </a:xfrm>
+          <a:prstGeom prst="rect">
+            <a:avLst/>
+          </a:prstGeom>
+        </p:spPr>
+      </p:pic>
+      <p:pic>
+        <p:nvPicPr>
+          <p:cNvPr id="6" name="Immagine 5"/>
+          <p:cNvPicPr>
+            <a:picLocks noChangeAspect="1"/>
+          </p:cNvPicPr>
+          <p:nvPr/>
+        </p:nvPicPr>
+        <p:blipFill>
+          <a:blip r:embed="rId3">
+            <a:extLst>
+              <a:ext uri="{28A0092B-C50C-407E-A947-70E740481C1C}">
+                <a14:useLocalDpi xmlns:a14="http://schemas.microsoft.com/office/drawing/2010/main" val="0"/>
+              </a:ext>
+            </a:extLst>
+          </a:blip>
+          <a:stretch>
+            <a:fillRect/>
+          </a:stretch>
+        </p:blipFill>
+        <p:spPr>
+          <a:xfrm>
+            <a:off x="984449" y="2113755"/>
+            <a:ext cx="3468488" cy="2084388"/>
+          </a:xfrm>
+          <a:prstGeom prst="rect">
+            <a:avLst/>
+          </a:prstGeom>
+        </p:spPr>
+      </p:pic>
     </p:spTree>
     <p:extLst>
       <p:ext uri="{BB962C8B-B14F-4D97-AF65-F5344CB8AC3E}">
@@ -9934,7 +10465,7 @@
           <a:p>
             <a:r>
               <a:rPr lang="it-IT" dirty="0" smtClean="0"/>
-              <a:t>Parte di conversione</a:t>
+              <a:t>Parte digitale</a:t>
             </a:r>
             <a:endParaRPr lang="it-IT" dirty="0"/>
           </a:p>
@@ -9950,16 +10481,57 @@
             <p:ph idx="1"/>
           </p:nvPr>
         </p:nvSpPr>
-        <p:spPr/>
+        <p:spPr>
+          <a:xfrm>
+            <a:off x="685800" y="979884"/>
+            <a:ext cx="7772400" cy="942975"/>
+          </a:xfrm>
+        </p:spPr>
         <p:txBody>
           <a:bodyPr/>
           <a:lstStyle/>
           <a:p>
             <a:r>
-              <a:rPr lang="it-IT" dirty="0" smtClean="0"/>
-              <a:t>TODO</a:t>
-            </a:r>
-            <a:endParaRPr lang="it-IT" dirty="0"/>
+              <a:rPr lang="it-IT" sz="2400" dirty="0" smtClean="0"/>
+              <a:t>La parte digitale </a:t>
+            </a:r>
+            <a:r>
+              <a:rPr lang="it-IT" sz="2400" dirty="0" smtClean="0"/>
+              <a:t>è </a:t>
+            </a:r>
+            <a:r>
+              <a:rPr lang="it-IT" sz="2400" dirty="0" smtClean="0"/>
+              <a:t>costituita </a:t>
+            </a:r>
+            <a:r>
+              <a:rPr lang="it-IT" sz="2400" dirty="0" smtClean="0"/>
+              <a:t>dalla scheda </a:t>
+            </a:r>
+            <a:r>
+              <a:rPr lang="it-IT" sz="2400" dirty="0" smtClean="0"/>
+              <a:t>di </a:t>
+            </a:r>
+            <a:r>
+              <a:rPr lang="it-IT" sz="2400" dirty="0" smtClean="0"/>
+              <a:t>prototipazione: </a:t>
+            </a:r>
+            <a:r>
+              <a:rPr lang="it-IT" sz="2400" b="1" dirty="0" smtClean="0"/>
+              <a:t>NI </a:t>
+            </a:r>
+            <a:r>
+              <a:rPr lang="it-IT" sz="2400" b="1" dirty="0" err="1" smtClean="0"/>
+              <a:t>sbRIO</a:t>
+            </a:r>
+            <a:r>
+              <a:rPr lang="it-IT" sz="2400" b="1" dirty="0" smtClean="0"/>
+              <a:t> </a:t>
+            </a:r>
+            <a:r>
+              <a:rPr lang="it-IT" sz="2400" b="1" dirty="0" smtClean="0"/>
+              <a:t>9636</a:t>
+            </a:r>
+            <a:endParaRPr lang="it-IT" sz="2400" b="1" dirty="0" smtClean="0"/>
           </a:p>
         </p:txBody>
       </p:sp>
@@ -9987,10 +10559,130 @@
           </a:p>
         </p:txBody>
       </p:sp>
+      <p:pic>
+        <p:nvPicPr>
+          <p:cNvPr id="5" name="Immagine 4"/>
+          <p:cNvPicPr>
+            <a:picLocks noChangeAspect="1"/>
+          </p:cNvPicPr>
+          <p:nvPr/>
+        </p:nvPicPr>
+        <p:blipFill>
+          <a:blip r:embed="rId2">
+            <a:extLst>
+              <a:ext uri="{28A0092B-C50C-407E-A947-70E740481C1C}">
+                <a14:useLocalDpi xmlns:a14="http://schemas.microsoft.com/office/drawing/2010/main" val="0"/>
+              </a:ext>
+            </a:extLst>
+          </a:blip>
+          <a:stretch>
+            <a:fillRect/>
+          </a:stretch>
+        </p:blipFill>
+        <p:spPr>
+          <a:xfrm>
+            <a:off x="609600" y="1922859"/>
+            <a:ext cx="4556200" cy="4122276"/>
+          </a:xfrm>
+          <a:prstGeom prst="rect">
+            <a:avLst/>
+          </a:prstGeom>
+        </p:spPr>
+      </p:pic>
+      <p:sp>
+        <p:nvSpPr>
+          <p:cNvPr id="6" name="CasellaDiTesto 5"/>
+          <p:cNvSpPr txBox="1"/>
+          <p:nvPr/>
+        </p:nvSpPr>
+        <p:spPr>
+          <a:xfrm>
+            <a:off x="5208228" y="2140743"/>
+            <a:ext cx="3207544" cy="4154984"/>
+          </a:xfrm>
+          <a:prstGeom prst="rect">
+            <a:avLst/>
+          </a:prstGeom>
+          <a:noFill/>
+        </p:spPr>
+        <p:txBody>
+          <a:bodyPr wrap="square" rtlCol="0">
+            <a:spAutoFit/>
+          </a:bodyPr>
+          <a:lstStyle/>
+          <a:p>
+            <a:pPr marL="342900" indent="-342900">
+              <a:buFont typeface="Arial" charset="0"/>
+              <a:buChar char="•"/>
+            </a:pPr>
+            <a:r>
+              <a:rPr lang="it-IT" dirty="0"/>
+              <a:t>La scheda </a:t>
+            </a:r>
+            <a:r>
+              <a:rPr lang="it-IT" dirty="0" smtClean="0"/>
+              <a:t>comprende un </a:t>
+            </a:r>
+            <a:r>
+              <a:rPr lang="it-IT" b="1" dirty="0" smtClean="0"/>
+              <a:t>FPGA</a:t>
+            </a:r>
+            <a:r>
+              <a:rPr lang="it-IT" dirty="0" smtClean="0"/>
+              <a:t> </a:t>
+            </a:r>
+            <a:r>
+              <a:rPr lang="it-IT" dirty="0"/>
+              <a:t>ed un </a:t>
+            </a:r>
+            <a:r>
+              <a:rPr lang="it-IT" b="1" dirty="0" smtClean="0"/>
+              <a:t>microcontrollore</a:t>
+            </a:r>
+            <a:br>
+              <a:rPr lang="it-IT" b="1" dirty="0" smtClean="0"/>
+            </a:br>
+            <a:endParaRPr lang="it-IT" b="1" dirty="0" smtClean="0"/>
+          </a:p>
+          <a:p>
+            <a:pPr marL="342900" indent="-342900">
+              <a:buFont typeface="Arial" charset="0"/>
+              <a:buChar char="•"/>
+            </a:pPr>
+            <a:r>
+              <a:rPr lang="it-IT" dirty="0"/>
+              <a:t>S</a:t>
+            </a:r>
+            <a:r>
+              <a:rPr lang="it-IT" dirty="0" smtClean="0"/>
+              <a:t>i </a:t>
+            </a:r>
+            <a:r>
+              <a:rPr lang="it-IT" dirty="0"/>
+              <a:t>occupa dell’</a:t>
+            </a:r>
+            <a:r>
+              <a:rPr lang="it-IT" b="1" dirty="0"/>
+              <a:t>elaborazione </a:t>
+            </a:r>
+            <a:r>
+              <a:rPr lang="it-IT" b="1" dirty="0" smtClean="0"/>
+              <a:t>digitale </a:t>
+            </a:r>
+            <a:r>
+              <a:rPr lang="it-IT" dirty="0"/>
+              <a:t>del segnale interferometrico</a:t>
+            </a:r>
+          </a:p>
+          <a:p>
+            <a:endParaRPr lang="it-IT" dirty="0"/>
+          </a:p>
+        </p:txBody>
+      </p:sp>
     </p:spTree>
     <p:extLst>
       <p:ext uri="{BB962C8B-B14F-4D97-AF65-F5344CB8AC3E}">
-        <p14:creationId xmlns:p14="http://schemas.microsoft.com/office/powerpoint/2010/main" val="2372177897"/>
+        <p14:creationId xmlns:p14="http://schemas.microsoft.com/office/powerpoint/2010/main" val="594836213"/>
       </p:ext>
     </p:extLst>
   </p:cSld>

</xml_diff>

<commit_message>
sistemata parte su arch sw
</commit_message>
<xml_diff>
--- a/presentazione_discussione.pptx
+++ b/presentazione_discussione.pptx
@@ -5,10 +5,10 @@
     <p:sldMasterId id="2147483652" r:id="rId4"/>
   </p:sldMasterIdLst>
   <p:notesMasterIdLst>
-    <p:notesMasterId r:id="rId26"/>
+    <p:notesMasterId r:id="rId27"/>
   </p:notesMasterIdLst>
   <p:handoutMasterIdLst>
-    <p:handoutMasterId r:id="rId27"/>
+    <p:handoutMasterId r:id="rId28"/>
   </p:handoutMasterIdLst>
   <p:sldIdLst>
     <p:sldId id="277" r:id="rId5"/>
@@ -25,18 +25,19 @@
     <p:sldId id="289" r:id="rId16"/>
     <p:sldId id="290" r:id="rId17"/>
     <p:sldId id="291" r:id="rId18"/>
-    <p:sldId id="292" r:id="rId19"/>
-    <p:sldId id="293" r:id="rId20"/>
-    <p:sldId id="294" r:id="rId21"/>
-    <p:sldId id="295" r:id="rId22"/>
-    <p:sldId id="297" r:id="rId23"/>
-    <p:sldId id="296" r:id="rId24"/>
-    <p:sldId id="300" r:id="rId25"/>
+    <p:sldId id="293" r:id="rId19"/>
+    <p:sldId id="294" r:id="rId20"/>
+    <p:sldId id="295" r:id="rId21"/>
+    <p:sldId id="303" r:id="rId22"/>
+    <p:sldId id="304" r:id="rId23"/>
+    <p:sldId id="297" r:id="rId24"/>
+    <p:sldId id="296" r:id="rId25"/>
+    <p:sldId id="300" r:id="rId26"/>
   </p:sldIdLst>
   <p:sldSz cx="9144000" cy="6858000" type="screen4x3"/>
   <p:notesSz cx="7099300" cy="10234613"/>
   <p:custDataLst>
-    <p:tags r:id="rId28"/>
+    <p:tags r:id="rId29"/>
   </p:custDataLst>
   <p:defaultTextStyle>
     <a:defPPr>
@@ -1736,6 +1737,160 @@
     <p:extLst>
       <p:ext uri="{BB962C8B-B14F-4D97-AF65-F5344CB8AC3E}">
         <p14:creationId xmlns:p14="http://schemas.microsoft.com/office/powerpoint/2010/main" val="1144522535"/>
+      </p:ext>
+    </p:extLst>
+  </p:cSld>
+  <p:clrMapOvr>
+    <a:masterClrMapping/>
+  </p:clrMapOvr>
+</p:notes>
+</file>
+
+<file path=ppt/notesSlides/notesSlide3.xml><?xml version="1.0" encoding="utf-8"?>
+<p:notes xmlns:a="http://schemas.openxmlformats.org/drawingml/2006/main" xmlns:r="http://schemas.openxmlformats.org/officeDocument/2006/relationships" xmlns:p="http://schemas.openxmlformats.org/presentationml/2006/main">
+  <p:cSld>
+    <p:spTree>
+      <p:nvGrpSpPr>
+        <p:cNvPr id="1" name=""/>
+        <p:cNvGrpSpPr/>
+        <p:nvPr/>
+      </p:nvGrpSpPr>
+      <p:grpSpPr>
+        <a:xfrm>
+          <a:off x="0" y="0"/>
+          <a:ext cx="0" cy="0"/>
+          <a:chOff x="0" y="0"/>
+          <a:chExt cx="0" cy="0"/>
+        </a:xfrm>
+      </p:grpSpPr>
+      <p:sp>
+        <p:nvSpPr>
+          <p:cNvPr id="2" name="Segnaposto immagine diapositiva 1"/>
+          <p:cNvSpPr>
+            <a:spLocks noGrp="1" noRot="1" noChangeAspect="1"/>
+          </p:cNvSpPr>
+          <p:nvPr>
+            <p:ph type="sldImg"/>
+          </p:nvPr>
+        </p:nvSpPr>
+        <p:spPr/>
+      </p:sp>
+      <p:sp>
+        <p:nvSpPr>
+          <p:cNvPr id="3" name="Segnaposto note 2"/>
+          <p:cNvSpPr>
+            <a:spLocks noGrp="1"/>
+          </p:cNvSpPr>
+          <p:nvPr>
+            <p:ph type="body" idx="1"/>
+          </p:nvPr>
+        </p:nvSpPr>
+        <p:spPr/>
+        <p:txBody>
+          <a:bodyPr/>
+          <a:lstStyle/>
+          <a:p>
+            <a:endParaRPr lang="it-IT" dirty="0"/>
+          </a:p>
+        </p:txBody>
+      </p:sp>
+      <p:sp>
+        <p:nvSpPr>
+          <p:cNvPr id="4" name="Segnaposto intestazione 3"/>
+          <p:cNvSpPr>
+            <a:spLocks noGrp="1"/>
+          </p:cNvSpPr>
+          <p:nvPr>
+            <p:ph type="hdr" sz="quarter" idx="10"/>
+          </p:nvPr>
+        </p:nvSpPr>
+        <p:spPr/>
+        <p:txBody>
+          <a:bodyPr/>
+          <a:lstStyle/>
+          <a:p>
+            <a:r>
+              <a:rPr lang="en-US" altLang="nl-NL" smtClean="0"/>
+              <a:t>Process synchronization</a:t>
+            </a:r>
+            <a:endParaRPr lang="en-US" altLang="nl-NL"/>
+          </a:p>
+        </p:txBody>
+      </p:sp>
+      <p:sp>
+        <p:nvSpPr>
+          <p:cNvPr id="5" name="Segnaposto data 4"/>
+          <p:cNvSpPr>
+            <a:spLocks noGrp="1"/>
+          </p:cNvSpPr>
+          <p:nvPr>
+            <p:ph type="dt" idx="11"/>
+          </p:nvPr>
+        </p:nvSpPr>
+        <p:spPr/>
+        <p:txBody>
+          <a:bodyPr/>
+          <a:lstStyle/>
+          <a:p>
+            <a:r>
+              <a:rPr lang="en-US" altLang="nl-NL" smtClean="0"/>
+              <a:t>Operating System</a:t>
+            </a:r>
+            <a:endParaRPr lang="en-US" altLang="nl-NL"/>
+          </a:p>
+        </p:txBody>
+      </p:sp>
+      <p:sp>
+        <p:nvSpPr>
+          <p:cNvPr id="6" name="Segnaposto piè di pagina 5"/>
+          <p:cNvSpPr>
+            <a:spLocks noGrp="1"/>
+          </p:cNvSpPr>
+          <p:nvPr>
+            <p:ph type="ftr" sz="quarter" idx="12"/>
+          </p:nvPr>
+        </p:nvSpPr>
+        <p:spPr/>
+        <p:txBody>
+          <a:bodyPr/>
+          <a:lstStyle/>
+          <a:p>
+            <a:r>
+              <a:rPr lang="en-US" altLang="nl-NL" smtClean="0"/>
+              <a:t>© 2005 William Fornaciari</a:t>
+            </a:r>
+            <a:endParaRPr lang="en-US" altLang="nl-NL"/>
+          </a:p>
+        </p:txBody>
+      </p:sp>
+      <p:sp>
+        <p:nvSpPr>
+          <p:cNvPr id="7" name="Segnaposto numero diapositiva 6"/>
+          <p:cNvSpPr>
+            <a:spLocks noGrp="1"/>
+          </p:cNvSpPr>
+          <p:nvPr>
+            <p:ph type="sldNum" sz="quarter" idx="13"/>
+          </p:nvPr>
+        </p:nvSpPr>
+        <p:spPr/>
+        <p:txBody>
+          <a:bodyPr/>
+          <a:lstStyle/>
+          <a:p>
+            <a:fld id="{88C0D9CF-78A8-4FBE-960E-41C6F5A4AF95}" type="slidenum">
+              <a:rPr lang="en-US" altLang="nl-NL" smtClean="0"/>
+              <a:pPr/>
+              <a:t>13</a:t>
+            </a:fld>
+            <a:endParaRPr lang="en-US" altLang="nl-NL"/>
+          </a:p>
+        </p:txBody>
+      </p:sp>
+    </p:spTree>
+    <p:extLst>
+      <p:ext uri="{BB962C8B-B14F-4D97-AF65-F5344CB8AC3E}">
+        <p14:creationId xmlns:p14="http://schemas.microsoft.com/office/powerpoint/2010/main" val="2032454154"/>
       </p:ext>
     </p:extLst>
   </p:cSld>
@@ -5466,7 +5621,6 @@
               <a:rPr lang="it-IT" sz="2400" dirty="0"/>
               <a:t>digitale.</a:t>
             </a:r>
-            <a:endParaRPr lang="it-IT" sz="2400" dirty="0"/>
           </a:p>
         </p:txBody>
       </p:sp>
@@ -5972,22 +6126,19 @@
             </a:r>
           </a:p>
           <a:p>
-            <a:pPr lvl="1"/>
-            <a:r>
-              <a:rPr lang="it-IT" sz="2000" dirty="0"/>
-              <a:t>Analisi degli algoritmi</a:t>
-            </a:r>
-          </a:p>
-          <a:p>
+            <a:r>
+              <a:rPr lang="it-IT" sz="2400" dirty="0" smtClean="0"/>
+              <a:t>Risultati </a:t>
+            </a:r>
             <a:r>
               <a:rPr lang="it-IT" sz="2400" dirty="0"/>
-              <a:t>Risultati sperimentali</a:t>
+              <a:t>sperimentali</a:t>
             </a:r>
           </a:p>
           <a:p>
             <a:r>
               <a:rPr lang="it-IT" sz="2400" dirty="0"/>
-              <a:t>Sviluppi futuri e conclusioni</a:t>
+              <a:t>Conclusioni e sviluppi futuri</a:t>
             </a:r>
             <a:endParaRPr lang="it-IT" sz="2400" dirty="0"/>
           </a:p>
@@ -6087,99 +6238,35 @@
             <p:ph idx="1"/>
           </p:nvPr>
         </p:nvSpPr>
-        <p:spPr/>
+        <p:spPr>
+          <a:xfrm>
+            <a:off x="609600" y="5845290"/>
+            <a:ext cx="7772400" cy="528638"/>
+          </a:xfrm>
+        </p:spPr>
         <p:txBody>
           <a:bodyPr/>
           <a:lstStyle/>
           <a:p>
             <a:r>
               <a:rPr lang="it-IT" sz="2400" dirty="0" smtClean="0"/>
-              <a:t>Linguaggio </a:t>
-            </a:r>
-            <a:r>
-              <a:rPr lang="it-IT" sz="2400" dirty="0" err="1" smtClean="0"/>
+              <a:t>Ambiente di sviluppo: </a:t>
+            </a:r>
+            <a:r>
+              <a:rPr lang="it-IT" sz="2400" b="1" dirty="0" smtClean="0"/>
+              <a:t>NI </a:t>
+            </a:r>
+            <a:r>
+              <a:rPr lang="it-IT" sz="2400" b="1" dirty="0" err="1" smtClean="0"/>
               <a:t>LabVIEW</a:t>
             </a:r>
-            <a:endParaRPr lang="it-IT" sz="2400" dirty="0"/>
-          </a:p>
-          <a:p>
-            <a:pPr lvl="1"/>
-            <a:r>
-              <a:rPr lang="it-IT" sz="2000" dirty="0" smtClean="0"/>
-              <a:t>Sviluppato da National </a:t>
-            </a:r>
-            <a:br>
-              <a:rPr lang="it-IT" sz="2000" dirty="0" smtClean="0"/>
-            </a:br>
-            <a:r>
-              <a:rPr lang="it-IT" sz="2000" dirty="0" smtClean="0"/>
-              <a:t>Instruments</a:t>
-            </a:r>
-            <a:br>
-              <a:rPr lang="it-IT" sz="2000" dirty="0" smtClean="0"/>
-            </a:br>
+            <a:endParaRPr lang="it-IT" sz="2400" b="1" dirty="0"/>
+          </a:p>
+          <a:p>
+            <a:pPr marL="457200" lvl="1" indent="0">
+              <a:buNone/>
+            </a:pPr>
             <a:endParaRPr lang="it-IT" sz="2000" dirty="0" smtClean="0"/>
-          </a:p>
-          <a:p>
-            <a:r>
-              <a:rPr lang="it-IT" sz="2400" dirty="0" smtClean="0"/>
-              <a:t>Struttura a cicli paralleli con</a:t>
-            </a:r>
-            <a:br>
-              <a:rPr lang="it-IT" sz="2400" dirty="0" smtClean="0"/>
-            </a:br>
-            <a:r>
-              <a:rPr lang="it-IT" sz="2400" dirty="0" smtClean="0"/>
-              <a:t>scambio di dati tramite code</a:t>
-            </a:r>
-            <a:br>
-              <a:rPr lang="it-IT" sz="2400" dirty="0" smtClean="0"/>
-            </a:br>
-            <a:r>
-              <a:rPr lang="it-IT" sz="2400" dirty="0" smtClean="0"/>
-              <a:t>FIFO</a:t>
-            </a:r>
-          </a:p>
-          <a:p>
-            <a:pPr lvl="1"/>
-            <a:r>
-              <a:rPr lang="it-IT" sz="2000" dirty="0" smtClean="0"/>
-              <a:t>Pattern producer-consumer</a:t>
-            </a:r>
-          </a:p>
-          <a:p>
-            <a:pPr lvl="1"/>
-            <a:r>
-              <a:rPr lang="it-IT" sz="2000" dirty="0" smtClean="0"/>
-              <a:t>Usato anche per lo scambio di dati tra FPGA e microcontrollore (DMA)</a:t>
-            </a:r>
-            <a:br>
-              <a:rPr lang="it-IT" sz="2000" dirty="0" smtClean="0"/>
-            </a:br>
-            <a:endParaRPr lang="it-IT" sz="2000" dirty="0" smtClean="0"/>
-          </a:p>
-          <a:p>
-            <a:r>
-              <a:rPr lang="it-IT" sz="2400" dirty="0" smtClean="0"/>
-              <a:t>Uso dell’aritmetica </a:t>
-            </a:r>
-            <a:r>
-              <a:rPr lang="it-IT" sz="2400" i="1" dirty="0" err="1" smtClean="0"/>
-              <a:t>fixed</a:t>
-            </a:r>
-            <a:r>
-              <a:rPr lang="it-IT" sz="2400" i="1" dirty="0" smtClean="0"/>
-              <a:t> </a:t>
-            </a:r>
-            <a:r>
-              <a:rPr lang="it-IT" sz="2400" i="1" dirty="0" err="1" smtClean="0"/>
-              <a:t>point</a:t>
-            </a:r>
-            <a:r>
-              <a:rPr lang="it-IT" sz="2400" dirty="0" smtClean="0"/>
-              <a:t> (12-bit) per migliorare le prestazioni su FPGA</a:t>
-            </a:r>
-            <a:endParaRPr lang="it-IT" sz="2400" dirty="0"/>
           </a:p>
         </p:txBody>
       </p:sp>
@@ -6209,7 +6296,7 @@
       </p:sp>
       <p:pic>
         <p:nvPicPr>
-          <p:cNvPr id="6" name="Immagine 5"/>
+          <p:cNvPr id="8" name="Immagine 7"/>
           <p:cNvPicPr>
             <a:picLocks noChangeAspect="1"/>
           </p:cNvPicPr>
@@ -6229,14 +6316,297 @@
         </p:blipFill>
         <p:spPr>
           <a:xfrm>
-            <a:off x="5320934" y="1143000"/>
-            <a:ext cx="3137266" cy="1343026"/>
+            <a:off x="1443037" y="3013645"/>
+            <a:ext cx="6329363" cy="2709525"/>
           </a:xfrm>
           <a:prstGeom prst="rect">
             <a:avLst/>
           </a:prstGeom>
         </p:spPr>
       </p:pic>
+      <p:sp>
+        <p:nvSpPr>
+          <p:cNvPr id="9" name="Segnaposto contenuto 2"/>
+          <p:cNvSpPr txBox="1">
+            <a:spLocks/>
+          </p:cNvSpPr>
+          <p:nvPr/>
+        </p:nvSpPr>
+        <p:spPr bwMode="auto">
+          <a:xfrm>
+            <a:off x="528636" y="979379"/>
+            <a:ext cx="8158163" cy="1931191"/>
+          </a:xfrm>
+          <a:prstGeom prst="rect">
+            <a:avLst/>
+          </a:prstGeom>
+          <a:noFill/>
+          <a:ln>
+            <a:noFill/>
+          </a:ln>
+          <a:extLst>
+            <a:ext uri="{909E8E84-426E-40DD-AFC4-6F175D3DCCD1}">
+              <a14:hiddenFill xmlns:a14="http://schemas.microsoft.com/office/drawing/2010/main">
+                <a:solidFill>
+                  <a:srgbClr val="FFFFFF"/>
+                </a:solidFill>
+              </a14:hiddenFill>
+            </a:ext>
+            <a:ext uri="{91240B29-F687-4F45-9708-019B960494DF}">
+              <a14:hiddenLine xmlns:a14="http://schemas.microsoft.com/office/drawing/2010/main" w="9525">
+                <a:solidFill>
+                  <a:srgbClr val="000000"/>
+                </a:solidFill>
+                <a:miter lim="800000"/>
+                <a:headEnd/>
+                <a:tailEnd/>
+              </a14:hiddenLine>
+            </a:ext>
+          </a:extLst>
+        </p:spPr>
+        <p:txBody>
+          <a:bodyPr vert="horz" wrap="square" lIns="91440" tIns="45720" rIns="91440" bIns="45720" numCol="1" anchor="t" anchorCtr="0" compatLnSpc="1">
+            <a:prstTxWarp prst="textNoShape">
+              <a:avLst/>
+            </a:prstTxWarp>
+          </a:bodyPr>
+          <a:lstStyle>
+            <a:lvl1pPr marL="342900" indent="-342900" algn="l" rtl="0" eaLnBrk="1" fontAlgn="base" hangingPunct="1">
+              <a:spcBef>
+                <a:spcPct val="20000"/>
+              </a:spcBef>
+              <a:spcAft>
+                <a:spcPct val="0"/>
+              </a:spcAft>
+              <a:buClr>
+                <a:srgbClr val="003366"/>
+              </a:buClr>
+              <a:buFont typeface="Times" panose="02020603050405020304" pitchFamily="18" charset="0"/>
+              <a:buChar char="•"/>
+              <a:defRPr sz="3200">
+                <a:solidFill>
+                  <a:schemeClr val="tx1"/>
+                </a:solidFill>
+                <a:latin typeface="+mn-lt"/>
+                <a:ea typeface="+mn-ea"/>
+                <a:cs typeface="+mn-cs"/>
+              </a:defRPr>
+            </a:lvl1pPr>
+            <a:lvl2pPr marL="742950" indent="-285750" algn="l" rtl="0" eaLnBrk="1" fontAlgn="base" hangingPunct="1">
+              <a:spcBef>
+                <a:spcPct val="20000"/>
+              </a:spcBef>
+              <a:spcAft>
+                <a:spcPct val="0"/>
+              </a:spcAft>
+              <a:buClr>
+                <a:srgbClr val="FF9900"/>
+              </a:buClr>
+              <a:buFont typeface="Wingdings" panose="05000000000000000000" pitchFamily="2" charset="2"/>
+              <a:buChar char="§"/>
+              <a:defRPr sz="2800">
+                <a:solidFill>
+                  <a:schemeClr val="tx1"/>
+                </a:solidFill>
+                <a:latin typeface="+mn-lt"/>
+                <a:ea typeface="+mn-ea"/>
+                <a:cs typeface="+mn-cs"/>
+              </a:defRPr>
+            </a:lvl2pPr>
+            <a:lvl3pPr marL="1143000" indent="-228600" algn="l" rtl="0" eaLnBrk="1" fontAlgn="base" hangingPunct="1">
+              <a:spcBef>
+                <a:spcPct val="20000"/>
+              </a:spcBef>
+              <a:spcAft>
+                <a:spcPct val="0"/>
+              </a:spcAft>
+              <a:buClr>
+                <a:srgbClr val="003366"/>
+              </a:buClr>
+              <a:buFont typeface="Times" panose="02020603050405020304" pitchFamily="18" charset="0"/>
+              <a:buChar char="•"/>
+              <a:defRPr sz="2400">
+                <a:solidFill>
+                  <a:schemeClr val="tx1"/>
+                </a:solidFill>
+                <a:latin typeface="+mn-lt"/>
+                <a:ea typeface="+mn-ea"/>
+                <a:cs typeface="+mn-cs"/>
+              </a:defRPr>
+            </a:lvl3pPr>
+            <a:lvl4pPr marL="1600200" indent="-228600" algn="l" rtl="0" eaLnBrk="1" fontAlgn="base" hangingPunct="1">
+              <a:spcBef>
+                <a:spcPct val="20000"/>
+              </a:spcBef>
+              <a:spcAft>
+                <a:spcPct val="0"/>
+              </a:spcAft>
+              <a:buClr>
+                <a:srgbClr val="003366"/>
+              </a:buClr>
+              <a:buChar char="–"/>
+              <a:defRPr sz="2000">
+                <a:solidFill>
+                  <a:schemeClr val="tx1"/>
+                </a:solidFill>
+                <a:latin typeface="+mn-lt"/>
+                <a:ea typeface="+mn-ea"/>
+                <a:cs typeface="+mn-cs"/>
+              </a:defRPr>
+            </a:lvl4pPr>
+            <a:lvl5pPr marL="2057400" indent="-228600" algn="l" rtl="0" eaLnBrk="1" fontAlgn="base" hangingPunct="1">
+              <a:spcBef>
+                <a:spcPct val="20000"/>
+              </a:spcBef>
+              <a:spcAft>
+                <a:spcPct val="0"/>
+              </a:spcAft>
+              <a:buChar char="»"/>
+              <a:defRPr sz="2000">
+                <a:solidFill>
+                  <a:schemeClr val="tx1"/>
+                </a:solidFill>
+                <a:latin typeface="+mn-lt"/>
+                <a:ea typeface="+mn-ea"/>
+                <a:cs typeface="+mn-cs"/>
+              </a:defRPr>
+            </a:lvl5pPr>
+            <a:lvl6pPr marL="2514600" indent="-228600" algn="l" rtl="0" eaLnBrk="1" fontAlgn="base" hangingPunct="1">
+              <a:spcBef>
+                <a:spcPct val="20000"/>
+              </a:spcBef>
+              <a:spcAft>
+                <a:spcPct val="0"/>
+              </a:spcAft>
+              <a:buChar char="»"/>
+              <a:defRPr sz="2000">
+                <a:solidFill>
+                  <a:schemeClr val="tx1"/>
+                </a:solidFill>
+                <a:latin typeface="+mn-lt"/>
+                <a:ea typeface="+mn-ea"/>
+                <a:cs typeface="+mn-cs"/>
+              </a:defRPr>
+            </a:lvl6pPr>
+            <a:lvl7pPr marL="2971800" indent="-228600" algn="l" rtl="0" eaLnBrk="1" fontAlgn="base" hangingPunct="1">
+              <a:spcBef>
+                <a:spcPct val="20000"/>
+              </a:spcBef>
+              <a:spcAft>
+                <a:spcPct val="0"/>
+              </a:spcAft>
+              <a:buChar char="»"/>
+              <a:defRPr sz="2000">
+                <a:solidFill>
+                  <a:schemeClr val="tx1"/>
+                </a:solidFill>
+                <a:latin typeface="+mn-lt"/>
+                <a:ea typeface="+mn-ea"/>
+                <a:cs typeface="+mn-cs"/>
+              </a:defRPr>
+            </a:lvl7pPr>
+            <a:lvl8pPr marL="3429000" indent="-228600" algn="l" rtl="0" eaLnBrk="1" fontAlgn="base" hangingPunct="1">
+              <a:spcBef>
+                <a:spcPct val="20000"/>
+              </a:spcBef>
+              <a:spcAft>
+                <a:spcPct val="0"/>
+              </a:spcAft>
+              <a:buChar char="»"/>
+              <a:defRPr sz="2000">
+                <a:solidFill>
+                  <a:schemeClr val="tx1"/>
+                </a:solidFill>
+                <a:latin typeface="+mn-lt"/>
+                <a:ea typeface="+mn-ea"/>
+                <a:cs typeface="+mn-cs"/>
+              </a:defRPr>
+            </a:lvl8pPr>
+            <a:lvl9pPr marL="3886200" indent="-228600" algn="l" rtl="0" eaLnBrk="1" fontAlgn="base" hangingPunct="1">
+              <a:spcBef>
+                <a:spcPct val="20000"/>
+              </a:spcBef>
+              <a:spcAft>
+                <a:spcPct val="0"/>
+              </a:spcAft>
+              <a:buChar char="»"/>
+              <a:defRPr sz="2000">
+                <a:solidFill>
+                  <a:schemeClr val="tx1"/>
+                </a:solidFill>
+                <a:latin typeface="+mn-lt"/>
+                <a:ea typeface="+mn-ea"/>
+                <a:cs typeface="+mn-cs"/>
+              </a:defRPr>
+            </a:lvl9pPr>
+          </a:lstStyle>
+          <a:p>
+            <a:r>
+              <a:rPr lang="it-IT" sz="2400" kern="0" dirty="0" smtClean="0"/>
+              <a:t>L’elaborazione numerica del segnale interferometrico è eseguita </a:t>
+            </a:r>
+            <a:r>
+              <a:rPr lang="it-IT" sz="2400" dirty="0" smtClean="0"/>
+              <a:t>in </a:t>
+            </a:r>
+            <a:r>
+              <a:rPr lang="it-IT" sz="2400" dirty="0"/>
+              <a:t>parte su </a:t>
+            </a:r>
+            <a:r>
+              <a:rPr lang="it-IT" sz="2400" b="1" dirty="0"/>
+              <a:t>FPGA</a:t>
+            </a:r>
+            <a:r>
+              <a:rPr lang="it-IT" sz="2400" dirty="0"/>
+              <a:t> ed in parte su </a:t>
+            </a:r>
+            <a:r>
+              <a:rPr lang="it-IT" sz="2400" b="1" dirty="0" smtClean="0"/>
+              <a:t>microcontrollore</a:t>
+            </a:r>
+          </a:p>
+          <a:p>
+            <a:r>
+              <a:rPr lang="it-IT" sz="2400" dirty="0" smtClean="0"/>
+              <a:t>Il </a:t>
+            </a:r>
+            <a:r>
+              <a:rPr lang="it-IT" sz="2400" b="1" dirty="0" smtClean="0"/>
+              <a:t>PC</a:t>
+            </a:r>
+            <a:r>
+              <a:rPr lang="it-IT" sz="2400" dirty="0" smtClean="0"/>
+              <a:t> ha solo il compito di mostrare </a:t>
+            </a:r>
+            <a:r>
+              <a:rPr lang="it-IT" sz="2400" dirty="0"/>
+              <a:t>all’utente finale la misura </a:t>
+            </a:r>
+            <a:r>
+              <a:rPr lang="it-IT" sz="2400" dirty="0" smtClean="0"/>
+              <a:t>di distanza</a:t>
+            </a:r>
+            <a:endParaRPr lang="it-IT" sz="2400" kern="0" dirty="0"/>
+          </a:p>
+          <a:p>
+            <a:pPr marL="0" indent="0">
+              <a:buNone/>
+            </a:pPr>
+            <a:endParaRPr lang="it-IT" sz="2400" dirty="0"/>
+          </a:p>
+          <a:p>
+            <a:endParaRPr lang="it-IT" sz="2400" kern="0" dirty="0" smtClean="0"/>
+          </a:p>
+          <a:p>
+            <a:pPr marL="457200" lvl="1" indent="0">
+              <a:buFont typeface="Wingdings" panose="05000000000000000000" pitchFamily="2" charset="2"/>
+              <a:buNone/>
+            </a:pPr>
+            <a:endParaRPr lang="it-IT" sz="2000" kern="0" dirty="0" smtClean="0"/>
+          </a:p>
+        </p:txBody>
+      </p:sp>
     </p:spTree>
     <p:extLst>
       <p:ext uri="{BB962C8B-B14F-4D97-AF65-F5344CB8AC3E}">
@@ -6291,7 +6661,7 @@
           <a:p>
             <a:r>
               <a:rPr lang="it-IT" dirty="0" smtClean="0"/>
-              <a:t>Firmware FPGA</a:t>
+              <a:t>FPGA</a:t>
             </a:r>
             <a:endParaRPr lang="it-IT" dirty="0"/>
           </a:p>
@@ -6307,93 +6677,131 @@
             <p:ph idx="1"/>
           </p:nvPr>
         </p:nvSpPr>
-        <p:spPr/>
+        <p:spPr>
+          <a:xfrm>
+            <a:off x="609600" y="1024102"/>
+            <a:ext cx="8120063" cy="5093494"/>
+          </a:xfrm>
+        </p:spPr>
         <p:txBody>
           <a:bodyPr/>
           <a:lstStyle/>
           <a:p>
             <a:r>
               <a:rPr lang="it-IT" sz="2400" dirty="0" smtClean="0"/>
-              <a:t>Si compone di una parte di inizializzazione e di cinque cicli paralleli:</a:t>
-            </a:r>
+              <a:t>Le funzionalità svolte in hardware dal FPGA sono:</a:t>
+            </a:r>
+            <a:br>
+              <a:rPr lang="it-IT" sz="2400" dirty="0" smtClean="0"/>
+            </a:br>
+            <a:endParaRPr lang="it-IT" sz="2400" dirty="0" smtClean="0"/>
           </a:p>
           <a:p>
             <a:pPr lvl="1"/>
             <a:r>
               <a:rPr lang="it-IT" sz="2000" dirty="0" smtClean="0"/>
-              <a:t>Pilotaggio scheda conversione e</a:t>
+              <a:t>Generazione del </a:t>
             </a:r>
             <a:br>
               <a:rPr lang="it-IT" sz="2000" dirty="0" smtClean="0"/>
             </a:br>
             <a:r>
               <a:rPr lang="it-IT" sz="2000" dirty="0" smtClean="0"/>
-              <a:t>generazione/acquisizione</a:t>
-            </a:r>
-          </a:p>
-          <a:p>
-            <a:pPr lvl="1"/>
-            <a:r>
-              <a:rPr lang="it-IT" sz="2000" dirty="0" smtClean="0"/>
-              <a:t>Lettura della memoria del segnale</a:t>
+              <a:t>segnale di modulazione </a:t>
             </a:r>
             <a:br>
               <a:rPr lang="it-IT" sz="2000" dirty="0" smtClean="0"/>
             </a:br>
             <a:r>
               <a:rPr lang="it-IT" sz="2000" dirty="0" smtClean="0"/>
-              <a:t>di modulazione</a:t>
-            </a:r>
+              <a:t>a </a:t>
+            </a:r>
+            <a:r>
+              <a:rPr lang="it-IT" sz="2000" i="1" dirty="0" smtClean="0"/>
+              <a:t>24KHz</a:t>
+            </a:r>
+            <a:br>
+              <a:rPr lang="it-IT" sz="2000" i="1" dirty="0" smtClean="0"/>
+            </a:br>
+            <a:endParaRPr lang="it-IT" sz="2000" i="1" dirty="0" smtClean="0"/>
           </a:p>
           <a:p>
             <a:pPr lvl="1"/>
             <a:r>
               <a:rPr lang="it-IT" sz="2000" dirty="0" smtClean="0"/>
-              <a:t>Condizionamento digitale del</a:t>
+              <a:t>Campionamento </a:t>
             </a:r>
             <a:br>
               <a:rPr lang="it-IT" sz="2000" dirty="0" smtClean="0"/>
             </a:br>
             <a:r>
               <a:rPr lang="it-IT" sz="2000" dirty="0" smtClean="0"/>
-              <a:t>segnale (sottrazione del fondo e </a:t>
+              <a:t>del segnale interferometrico </a:t>
             </a:r>
             <a:br>
               <a:rPr lang="it-IT" sz="2000" dirty="0" smtClean="0"/>
             </a:br>
             <a:r>
               <a:rPr lang="it-IT" sz="2000" dirty="0" smtClean="0"/>
-              <a:t>finestratura) </a:t>
-            </a:r>
+              <a:t>a </a:t>
+            </a:r>
+            <a:r>
+              <a:rPr lang="it-IT" sz="2000" i="1" dirty="0" smtClean="0"/>
+              <a:t>30MHz</a:t>
+            </a:r>
+            <a:br>
+              <a:rPr lang="it-IT" sz="2000" i="1" dirty="0" smtClean="0"/>
+            </a:br>
+            <a:endParaRPr lang="it-IT" sz="2000" i="1" dirty="0" smtClean="0"/>
           </a:p>
           <a:p>
             <a:pPr lvl="1"/>
             <a:r>
               <a:rPr lang="it-IT" sz="2000" dirty="0" smtClean="0"/>
-              <a:t>Computazione della trasformata di </a:t>
+              <a:t>Calcolo </a:t>
             </a:r>
             <a:br>
               <a:rPr lang="it-IT" sz="2000" dirty="0" smtClean="0"/>
             </a:br>
             <a:r>
               <a:rPr lang="it-IT" sz="2000" dirty="0" smtClean="0"/>
-              <a:t>Fourier</a:t>
-            </a:r>
-          </a:p>
-          <a:p>
-            <a:pPr lvl="1"/>
+              <a:t>della </a:t>
+            </a:r>
+            <a:r>
+              <a:rPr lang="it-IT" sz="2000" b="1" dirty="0" smtClean="0"/>
+              <a:t>Fast Fourier </a:t>
+            </a:r>
+            <a:r>
+              <a:rPr lang="it-IT" sz="2000" b="1" dirty="0" err="1" smtClean="0"/>
+              <a:t>Transform</a:t>
+            </a:r>
+            <a:r>
+              <a:rPr lang="it-IT" sz="2000" b="1" dirty="0" smtClean="0"/>
+              <a:t> </a:t>
+            </a:r>
             <a:r>
               <a:rPr lang="it-IT" sz="2000" dirty="0" smtClean="0"/>
-              <a:t>Estrazione del tono fondamentale</a:t>
+              <a:t>(FFT)</a:t>
             </a:r>
             <a:br>
               <a:rPr lang="it-IT" sz="2000" dirty="0" smtClean="0"/>
             </a:br>
+            <a:endParaRPr lang="it-IT" sz="2000" dirty="0" smtClean="0"/>
+          </a:p>
+          <a:p>
+            <a:pPr lvl="1"/>
             <a:r>
               <a:rPr lang="it-IT" sz="2000" dirty="0" smtClean="0"/>
-              <a:t>della trasformata</a:t>
-            </a:r>
-            <a:endParaRPr lang="it-IT" sz="2000" dirty="0"/>
+              <a:t>Estrazione </a:t>
+            </a:r>
+            <a:br>
+              <a:rPr lang="it-IT" sz="2000" dirty="0" smtClean="0"/>
+            </a:br>
+            <a:r>
+              <a:rPr lang="it-IT" sz="2000" dirty="0" smtClean="0"/>
+              <a:t>del tono fondamentale dal FFT</a:t>
+            </a:r>
+            <a:endParaRPr lang="it-IT" sz="2000" dirty="0" smtClean="0"/>
           </a:p>
         </p:txBody>
       </p:sp>
@@ -6423,14 +6831,14 @@
       </p:sp>
       <p:pic>
         <p:nvPicPr>
-          <p:cNvPr id="5" name="Immagine 4"/>
+          <p:cNvPr id="9" name="Immagine 8"/>
           <p:cNvPicPr>
             <a:picLocks noChangeAspect="1"/>
           </p:cNvPicPr>
           <p:nvPr/>
         </p:nvPicPr>
         <p:blipFill>
-          <a:blip r:embed="rId2">
+          <a:blip r:embed="rId3">
             <a:extLst>
               <a:ext uri="{28A0092B-C50C-407E-A947-70E740481C1C}">
                 <a14:useLocalDpi xmlns:a14="http://schemas.microsoft.com/office/drawing/2010/main" val="0"/>
@@ -6443,8 +6851,8 @@
         </p:blipFill>
         <p:spPr>
           <a:xfrm>
-            <a:off x="5418027" y="2183027"/>
-            <a:ext cx="3719482" cy="4370172"/>
+            <a:off x="5666509" y="1486069"/>
+            <a:ext cx="3619664" cy="5136406"/>
           </a:xfrm>
           <a:prstGeom prst="rect">
             <a:avLst/>
@@ -6505,7 +6913,7 @@
           <a:p>
             <a:r>
               <a:rPr lang="it-IT" dirty="0" smtClean="0"/>
-              <a:t>Firmware Microcontrollore</a:t>
+              <a:t>Microcontrollore</a:t>
             </a:r>
             <a:endParaRPr lang="it-IT" dirty="0"/>
           </a:p>
@@ -6521,36 +6929,146 @@
             <p:ph idx="1"/>
           </p:nvPr>
         </p:nvSpPr>
-        <p:spPr/>
+        <p:spPr>
+          <a:xfrm>
+            <a:off x="609600" y="1143000"/>
+            <a:ext cx="7772400" cy="5286375"/>
+          </a:xfrm>
+        </p:spPr>
         <p:txBody>
           <a:bodyPr/>
           <a:lstStyle/>
           <a:p>
             <a:r>
+              <a:rPr lang="it-IT" sz="2400" dirty="0"/>
+              <a:t>Le funzionalità </a:t>
+            </a:r>
+            <a:r>
               <a:rPr lang="it-IT" sz="2400" dirty="0" smtClean="0"/>
-              <a:t>Si compone di una parte di inizializzazione e configurazione dello strumento e da una parte di elaborazione dei dati:</a:t>
-            </a:r>
+              <a:t>svolte dal microcontrollore sono: </a:t>
+            </a:r>
+            <a:br>
+              <a:rPr lang="it-IT" sz="2400" dirty="0" smtClean="0"/>
+            </a:br>
+            <a:endParaRPr lang="it-IT" sz="2400" dirty="0" smtClean="0"/>
           </a:p>
           <a:p>
             <a:pPr lvl="1"/>
             <a:r>
+              <a:rPr lang="it-IT" sz="2000" dirty="0"/>
+              <a:t>Calcolo </a:t>
+            </a:r>
+            <a:r>
               <a:rPr lang="it-IT" sz="2000" dirty="0" smtClean="0"/>
-              <a:t>Inizialmente il firmware legge la configurazione fornita dall’utente e imposta i corretti parametri di funzionamento dell’FPGA</a:t>
-            </a:r>
+              <a:t>dell’</a:t>
+            </a:r>
+            <a:r>
+              <a:rPr lang="it-IT" sz="2000" b="1" dirty="0" err="1" smtClean="0"/>
+              <a:t>Interpolated</a:t>
+            </a:r>
+            <a:r>
+              <a:rPr lang="it-IT" sz="2000" dirty="0" smtClean="0"/>
+              <a:t> </a:t>
+            </a:r>
+            <a:r>
+              <a:rPr lang="it-IT" sz="2000" b="1" dirty="0" smtClean="0"/>
+              <a:t>Fast </a:t>
+            </a:r>
+            <a:r>
+              <a:rPr lang="it-IT" sz="2000" b="1" dirty="0"/>
+              <a:t>Fourier </a:t>
+            </a:r>
+            <a:r>
+              <a:rPr lang="it-IT" sz="2000" b="1" dirty="0" err="1" smtClean="0"/>
+              <a:t>Transform</a:t>
+            </a:r>
+            <a:r>
+              <a:rPr lang="it-IT" sz="2000" b="1" dirty="0" smtClean="0"/>
+              <a:t> </a:t>
+            </a:r>
+            <a:r>
+              <a:rPr lang="it-IT" sz="2000" dirty="0" smtClean="0"/>
+              <a:t>(IFFT)</a:t>
+            </a:r>
+            <a:br>
+              <a:rPr lang="it-IT" sz="2000" dirty="0" smtClean="0"/>
+            </a:br>
+            <a:r>
+              <a:rPr lang="it-IT" sz="2000" dirty="0"/>
+              <a:t/>
+            </a:r>
+            <a:br>
+              <a:rPr lang="it-IT" sz="2000" dirty="0"/>
+            </a:br>
+            <a:r>
+              <a:rPr lang="it-IT" sz="2000" dirty="0"/>
+              <a:t/>
+            </a:r>
+            <a:br>
+              <a:rPr lang="it-IT" sz="2000" dirty="0"/>
+            </a:br>
+            <a:r>
+              <a:rPr lang="it-IT" sz="2000" dirty="0" smtClean="0"/>
+              <a:t/>
+            </a:r>
+            <a:br>
+              <a:rPr lang="it-IT" sz="2000" dirty="0" smtClean="0"/>
+            </a:br>
+            <a:endParaRPr lang="it-IT" sz="2000" dirty="0" smtClean="0"/>
+          </a:p>
+          <a:p>
+            <a:pPr marL="457200" lvl="1" indent="0">
+              <a:buNone/>
+            </a:pPr>
+            <a:endParaRPr lang="it-IT" sz="2000" dirty="0" smtClean="0"/>
+          </a:p>
+          <a:p>
+            <a:pPr marL="457200" lvl="1" indent="0">
+              <a:buNone/>
+            </a:pPr>
+            <a:endParaRPr lang="it-IT" sz="2000" dirty="0" smtClean="0"/>
+          </a:p>
+          <a:p>
+            <a:pPr marL="457200" lvl="1" indent="0">
+              <a:buNone/>
+            </a:pPr>
+            <a:endParaRPr lang="it-IT" sz="2000" dirty="0"/>
+          </a:p>
+          <a:p>
+            <a:pPr marL="457200" lvl="1" indent="0">
+              <a:buNone/>
+            </a:pPr>
+            <a:endParaRPr lang="it-IT" sz="2000" dirty="0" smtClean="0"/>
+          </a:p>
+          <a:p>
+            <a:pPr marL="457200" lvl="1" indent="0">
+              <a:buNone/>
+            </a:pPr>
+            <a:endParaRPr lang="it-IT" sz="2000" dirty="0" smtClean="0"/>
           </a:p>
           <a:p>
             <a:pPr lvl="1"/>
             <a:r>
               <a:rPr lang="it-IT" sz="2000" dirty="0" smtClean="0"/>
-              <a:t>Il secondo passo consiste nell’estrazione del fondo da sottrarre al segnale</a:t>
-            </a:r>
-          </a:p>
-          <a:p>
-            <a:pPr lvl="1"/>
+              <a:t>Calcolo </a:t>
+            </a:r>
+            <a:r>
+              <a:rPr lang="it-IT" sz="2000" dirty="0"/>
+              <a:t>della </a:t>
+            </a:r>
+            <a:r>
+              <a:rPr lang="it-IT" sz="2000" b="1" dirty="0"/>
+              <a:t>distanza </a:t>
+            </a:r>
+            <a:r>
+              <a:rPr lang="it-IT" sz="2000" b="1" dirty="0" smtClean="0"/>
+              <a:t>assoluta</a:t>
+            </a:r>
             <a:r>
               <a:rPr lang="it-IT" sz="2000" dirty="0" smtClean="0"/>
-              <a:t>Infine ciclicamente si acquisiscono i risultati dell’elaborazione dell’FPGA e si calcola la distanza dal bersaglio.</a:t>
-            </a:r>
+              <a:t>:</a:t>
+            </a:r>
+            <a:endParaRPr lang="it-IT" sz="2000" dirty="0"/>
           </a:p>
         </p:txBody>
       </p:sp>
@@ -6578,6 +7096,231 @@
           </a:p>
         </p:txBody>
       </p:sp>
+      <mc:AlternateContent xmlns:mc="http://schemas.openxmlformats.org/markup-compatibility/2006">
+        <mc:Choice xmlns:a14="http://schemas.microsoft.com/office/drawing/2010/main" Requires="a14">
+          <p:sp>
+            <p:nvSpPr>
+              <p:cNvPr id="7" name="CasellaDiTesto 6"/>
+              <p:cNvSpPr txBox="1"/>
+              <p:nvPr/>
+            </p:nvSpPr>
+            <p:spPr>
+              <a:xfrm>
+                <a:off x="5546043" y="5455607"/>
+                <a:ext cx="2503457" cy="733855"/>
+              </a:xfrm>
+              <a:prstGeom prst="rect">
+                <a:avLst/>
+              </a:prstGeom>
+              <a:noFill/>
+            </p:spPr>
+            <p:txBody>
+              <a:bodyPr wrap="square" lIns="0" tIns="0" rIns="0" bIns="0" rtlCol="0">
+                <a:spAutoFit/>
+              </a:bodyPr>
+              <a:lstStyle/>
+              <a:p>
+                <a:pPr/>
+                <a14:m>
+                  <m:oMathPara xmlns:m="http://schemas.openxmlformats.org/officeDocument/2006/math">
+                    <m:oMathParaPr>
+                      <m:jc m:val="centerGroup"/>
+                    </m:oMathParaPr>
+                    <m:oMath xmlns:m="http://schemas.openxmlformats.org/officeDocument/2006/math">
+                      <m:r>
+                        <a:rPr lang="it-IT" b="0" i="1" smtClean="0">
+                          <a:latin typeface="Cambria Math" charset="0"/>
+                          <a:ea typeface="Cambria Math" charset="0"/>
+                          <a:cs typeface="Cambria Math" charset="0"/>
+                        </a:rPr>
+                        <m:t>𝑑</m:t>
+                      </m:r>
+                      <m:r>
+                        <a:rPr lang="it-IT" i="1">
+                          <a:latin typeface="Cambria Math" charset="0"/>
+                          <a:ea typeface="Cambria Math" charset="0"/>
+                          <a:cs typeface="Cambria Math" charset="0"/>
+                        </a:rPr>
+                        <m:t>∝</m:t>
+                      </m:r>
+                      <m:r>
+                        <a:rPr lang="it-IT" b="0" i="1" smtClean="0">
+                          <a:latin typeface="Cambria Math" charset="0"/>
+                          <a:ea typeface="Cambria Math" charset="0"/>
+                          <a:cs typeface="Cambria Math" charset="0"/>
+                        </a:rPr>
+                        <m:t> </m:t>
+                      </m:r>
+                      <m:f>
+                        <m:fPr>
+                          <m:ctrlPr>
+                            <a:rPr lang="it-IT" i="1" smtClean="0">
+                              <a:latin typeface="Cambria Math" charset="0"/>
+                              <a:ea typeface="Cambria Math" charset="0"/>
+                              <a:cs typeface="Cambria Math" charset="0"/>
+                            </a:rPr>
+                          </m:ctrlPr>
+                        </m:fPr>
+                        <m:num>
+                          <m:sSub>
+                            <m:sSubPr>
+                              <m:ctrlPr>
+                                <a:rPr lang="it-IT" i="1" smtClean="0">
+                                  <a:latin typeface="Cambria Math" charset="0"/>
+                                  <a:ea typeface="Cambria Math" charset="0"/>
+                                  <a:cs typeface="Cambria Math" charset="0"/>
+                                </a:rPr>
+                              </m:ctrlPr>
+                            </m:sSubPr>
+                            <m:e>
+                              <m:r>
+                                <a:rPr lang="it-IT" b="0" i="1" smtClean="0">
+                                  <a:latin typeface="Cambria Math" charset="0"/>
+                                  <a:ea typeface="Cambria Math" charset="0"/>
+                                  <a:cs typeface="Cambria Math" charset="0"/>
+                                </a:rPr>
+                                <m:t>𝑓</m:t>
+                              </m:r>
+                            </m:e>
+                            <m:sub>
+                              <m:r>
+                                <a:rPr lang="it-IT" b="0" i="1" smtClean="0">
+                                  <a:latin typeface="Cambria Math" charset="0"/>
+                                  <a:ea typeface="Cambria Math" charset="0"/>
+                                  <a:cs typeface="Cambria Math" charset="0"/>
+                                </a:rPr>
+                                <m:t>𝑓𝑎𝑙𝑙</m:t>
+                              </m:r>
+                            </m:sub>
+                          </m:sSub>
+                          <m:r>
+                            <a:rPr lang="it-IT" b="0" i="1" smtClean="0">
+                              <a:latin typeface="Cambria Math" charset="0"/>
+                              <a:ea typeface="Cambria Math" charset="0"/>
+                              <a:cs typeface="Cambria Math" charset="0"/>
+                            </a:rPr>
+                            <m:t>+</m:t>
+                          </m:r>
+                          <m:sSub>
+                            <m:sSubPr>
+                              <m:ctrlPr>
+                                <a:rPr lang="it-IT" b="0" i="1" smtClean="0">
+                                  <a:latin typeface="Cambria Math" charset="0"/>
+                                  <a:ea typeface="Cambria Math" charset="0"/>
+                                  <a:cs typeface="Cambria Math" charset="0"/>
+                                </a:rPr>
+                              </m:ctrlPr>
+                            </m:sSubPr>
+                            <m:e>
+                              <m:r>
+                                <a:rPr lang="it-IT" b="0" i="1" smtClean="0">
+                                  <a:latin typeface="Cambria Math" charset="0"/>
+                                  <a:ea typeface="Cambria Math" charset="0"/>
+                                  <a:cs typeface="Cambria Math" charset="0"/>
+                                </a:rPr>
+                                <m:t>𝑓</m:t>
+                              </m:r>
+                            </m:e>
+                            <m:sub>
+                              <m:r>
+                                <a:rPr lang="it-IT" b="0" i="1" smtClean="0">
+                                  <a:latin typeface="Cambria Math" charset="0"/>
+                                  <a:ea typeface="Cambria Math" charset="0"/>
+                                  <a:cs typeface="Cambria Math" charset="0"/>
+                                </a:rPr>
+                                <m:t>𝑟𝑖𝑠𝑒</m:t>
+                              </m:r>
+                            </m:sub>
+                          </m:sSub>
+                        </m:num>
+                        <m:den>
+                          <m:r>
+                            <a:rPr lang="it-IT" b="0" i="1" smtClean="0">
+                              <a:latin typeface="Cambria Math" charset="0"/>
+                              <a:ea typeface="Cambria Math" charset="0"/>
+                              <a:cs typeface="Cambria Math" charset="0"/>
+                            </a:rPr>
+                            <m:t>2</m:t>
+                          </m:r>
+                        </m:den>
+                      </m:f>
+                    </m:oMath>
+                  </m:oMathPara>
+                </a14:m>
+                <a:endParaRPr lang="it-IT" dirty="0"/>
+              </a:p>
+            </p:txBody>
+          </p:sp>
+        </mc:Choice>
+        <mc:Fallback>
+          <p:sp>
+            <p:nvSpPr>
+              <p:cNvPr id="7" name="CasellaDiTesto 6"/>
+              <p:cNvSpPr txBox="1">
+                <a:spLocks noRot="1" noChangeAspect="1" noMove="1" noResize="1" noEditPoints="1" noAdjustHandles="1" noChangeArrowheads="1" noChangeShapeType="1" noTextEdit="1"/>
+              </p:cNvSpPr>
+              <p:nvPr/>
+            </p:nvSpPr>
+            <p:spPr>
+              <a:xfrm>
+                <a:off x="5546043" y="5455607"/>
+                <a:ext cx="2503457" cy="733855"/>
+              </a:xfrm>
+              <a:prstGeom prst="rect">
+                <a:avLst/>
+              </a:prstGeom>
+              <a:blipFill rotWithShape="0">
+                <a:blip r:embed="rId2"/>
+                <a:stretch>
+                  <a:fillRect/>
+                </a:stretch>
+              </a:blipFill>
+            </p:spPr>
+            <p:txBody>
+              <a:bodyPr/>
+              <a:lstStyle/>
+              <a:p>
+                <a:r>
+                  <a:rPr lang="it-IT">
+                    <a:noFill/>
+                  </a:rPr>
+                  <a:t> </a:t>
+                </a:r>
+              </a:p>
+            </p:txBody>
+          </p:sp>
+        </mc:Fallback>
+      </mc:AlternateContent>
+      <p:pic>
+        <p:nvPicPr>
+          <p:cNvPr id="9" name="Immagine 8"/>
+          <p:cNvPicPr>
+            <a:picLocks noChangeAspect="1"/>
+          </p:cNvPicPr>
+          <p:nvPr/>
+        </p:nvPicPr>
+        <p:blipFill>
+          <a:blip r:embed="rId3">
+            <a:extLst>
+              <a:ext uri="{28A0092B-C50C-407E-A947-70E740481C1C}">
+                <a14:useLocalDpi xmlns:a14="http://schemas.microsoft.com/office/drawing/2010/main" val="0"/>
+              </a:ext>
+            </a:extLst>
+          </a:blip>
+          <a:stretch>
+            <a:fillRect/>
+          </a:stretch>
+        </p:blipFill>
+        <p:spPr>
+          <a:xfrm>
+            <a:off x="2809049" y="2662808"/>
+            <a:ext cx="3373502" cy="2552320"/>
+          </a:xfrm>
+          <a:prstGeom prst="rect">
+            <a:avLst/>
+          </a:prstGeom>
+        </p:spPr>
+      </p:pic>
     </p:spTree>
     <p:extLst>
       <p:ext uri="{BB962C8B-B14F-4D97-AF65-F5344CB8AC3E}">
@@ -6625,19 +7368,14 @@
             <p:ph type="title"/>
           </p:nvPr>
         </p:nvSpPr>
-        <p:spPr>
-          <a:xfrm>
-            <a:off x="609600" y="0"/>
-            <a:ext cx="8534400" cy="762000"/>
-          </a:xfrm>
-        </p:spPr>
+        <p:spPr/>
         <p:txBody>
           <a:bodyPr/>
           <a:lstStyle/>
           <a:p>
             <a:r>
               <a:rPr lang="it-IT" dirty="0" smtClean="0"/>
-              <a:t>Analisi algoritmi</a:t>
+              <a:t>Indice</a:t>
             </a:r>
             <a:endParaRPr lang="it-IT" dirty="0"/>
           </a:p>
@@ -6653,53 +7391,162 @@
             <p:ph idx="1"/>
           </p:nvPr>
         </p:nvSpPr>
-        <p:spPr/>
+        <p:spPr>
+          <a:xfrm>
+            <a:off x="685799" y="1143000"/>
+            <a:ext cx="7800975" cy="5077692"/>
+          </a:xfrm>
+        </p:spPr>
         <p:txBody>
           <a:bodyPr/>
           <a:lstStyle/>
           <a:p>
             <a:r>
-              <a:rPr lang="it-IT" sz="2400" dirty="0" smtClean="0"/>
-              <a:t>Sottrazione fondo</a:t>
-            </a:r>
-          </a:p>
-          <a:p>
-            <a:r>
-              <a:rPr lang="it-IT" sz="2400" dirty="0" smtClean="0"/>
-              <a:t>Finestratura</a:t>
-            </a:r>
-          </a:p>
-          <a:p>
-            <a:r>
-              <a:rPr lang="it-IT" sz="2400" dirty="0" smtClean="0"/>
-              <a:t>Accenno 5 triangolari</a:t>
-            </a:r>
-          </a:p>
-          <a:p>
-            <a:r>
-              <a:rPr lang="it-IT" sz="2400" dirty="0" smtClean="0"/>
-              <a:t>FFT</a:t>
-            </a:r>
-          </a:p>
-          <a:p>
-            <a:r>
-              <a:rPr lang="it-IT" sz="2400" dirty="0" smtClean="0"/>
-              <a:t>Interpolazione</a:t>
-            </a:r>
-          </a:p>
-          <a:p>
-            <a:r>
-              <a:rPr lang="it-IT" sz="2400" dirty="0" smtClean="0"/>
-              <a:t>Calcolo distanza</a:t>
-            </a:r>
-          </a:p>
-          <a:p>
-            <a:endParaRPr lang="it-IT" sz="2400" dirty="0"/>
-          </a:p>
-          <a:p>
-            <a:r>
-              <a:rPr lang="it-IT" sz="2400" dirty="0" smtClean="0"/>
-              <a:t>TODO!!</a:t>
+              <a:rPr lang="it-IT" sz="2400" dirty="0">
+                <a:solidFill>
+                  <a:schemeClr val="bg2">
+                    <a:lumMod val="40000"/>
+                    <a:lumOff val="60000"/>
+                  </a:schemeClr>
+                </a:solidFill>
+              </a:rPr>
+              <a:t>Interferometria</a:t>
+            </a:r>
+          </a:p>
+          <a:p>
+            <a:pPr lvl="1"/>
+            <a:r>
+              <a:rPr lang="it-IT" sz="2000" dirty="0">
+                <a:solidFill>
+                  <a:schemeClr val="bg2">
+                    <a:lumMod val="40000"/>
+                    <a:lumOff val="60000"/>
+                  </a:schemeClr>
+                </a:solidFill>
+              </a:rPr>
+              <a:t>Interferometria a self-mixing</a:t>
+            </a:r>
+          </a:p>
+          <a:p>
+            <a:pPr lvl="1"/>
+            <a:r>
+              <a:rPr lang="it-IT" sz="2000" dirty="0">
+                <a:solidFill>
+                  <a:schemeClr val="bg2">
+                    <a:lumMod val="40000"/>
+                    <a:lumOff val="60000"/>
+                  </a:schemeClr>
+                </a:solidFill>
+              </a:rPr>
+              <a:t>Misura della distanza</a:t>
+            </a:r>
+          </a:p>
+          <a:p>
+            <a:r>
+              <a:rPr lang="it-IT" sz="2400" dirty="0">
+                <a:solidFill>
+                  <a:schemeClr val="bg2">
+                    <a:lumMod val="40000"/>
+                    <a:lumOff val="60000"/>
+                  </a:schemeClr>
+                </a:solidFill>
+              </a:rPr>
+              <a:t>Architettura hardware</a:t>
+            </a:r>
+          </a:p>
+          <a:p>
+            <a:pPr lvl="1"/>
+            <a:r>
+              <a:rPr lang="it-IT" sz="2000" dirty="0">
+                <a:solidFill>
+                  <a:schemeClr val="bg2">
+                    <a:lumMod val="40000"/>
+                    <a:lumOff val="60000"/>
+                  </a:schemeClr>
+                </a:solidFill>
+              </a:rPr>
+              <a:t>Parte analogica</a:t>
+            </a:r>
+          </a:p>
+          <a:p>
+            <a:pPr lvl="1"/>
+            <a:r>
+              <a:rPr lang="it-IT" sz="2000" dirty="0">
+                <a:solidFill>
+                  <a:schemeClr val="bg2">
+                    <a:lumMod val="40000"/>
+                    <a:lumOff val="60000"/>
+                  </a:schemeClr>
+                </a:solidFill>
+              </a:rPr>
+              <a:t>Parte digitale</a:t>
+            </a:r>
+          </a:p>
+          <a:p>
+            <a:pPr lvl="1"/>
+            <a:r>
+              <a:rPr lang="it-IT" sz="2000" dirty="0">
+                <a:solidFill>
+                  <a:schemeClr val="bg2">
+                    <a:lumMod val="40000"/>
+                    <a:lumOff val="60000"/>
+                  </a:schemeClr>
+                </a:solidFill>
+              </a:rPr>
+              <a:t>Parte di conversione</a:t>
+            </a:r>
+          </a:p>
+          <a:p>
+            <a:r>
+              <a:rPr lang="it-IT" sz="2400" dirty="0">
+                <a:solidFill>
+                  <a:schemeClr val="bg2">
+                    <a:lumMod val="40000"/>
+                    <a:lumOff val="60000"/>
+                  </a:schemeClr>
+                </a:solidFill>
+              </a:rPr>
+              <a:t>Architettura software</a:t>
+            </a:r>
+          </a:p>
+          <a:p>
+            <a:pPr lvl="1"/>
+            <a:r>
+              <a:rPr lang="it-IT" sz="2000" dirty="0">
+                <a:solidFill>
+                  <a:schemeClr val="bg2">
+                    <a:lumMod val="40000"/>
+                    <a:lumOff val="60000"/>
+                  </a:schemeClr>
+                </a:solidFill>
+              </a:rPr>
+              <a:t>FPGA</a:t>
+            </a:r>
+          </a:p>
+          <a:p>
+            <a:pPr lvl="1"/>
+            <a:r>
+              <a:rPr lang="it-IT" sz="2000" dirty="0">
+                <a:solidFill>
+                  <a:schemeClr val="bg2">
+                    <a:lumMod val="40000"/>
+                    <a:lumOff val="60000"/>
+                  </a:schemeClr>
+                </a:solidFill>
+              </a:rPr>
+              <a:t>Microcontrollore</a:t>
+            </a:r>
+          </a:p>
+          <a:p>
+            <a:r>
+              <a:rPr lang="it-IT" sz="2400" dirty="0"/>
+              <a:t>Risultati sperimentali</a:t>
+            </a:r>
+          </a:p>
+          <a:p>
+            <a:r>
+              <a:rPr lang="it-IT" sz="2400" dirty="0"/>
+              <a:t>Conclusioni e sviluppi futuri</a:t>
             </a:r>
             <a:endParaRPr lang="it-IT" sz="2400" dirty="0"/>
           </a:p>
@@ -6732,7 +7579,7 @@
     </p:spTree>
     <p:extLst>
       <p:ext uri="{BB962C8B-B14F-4D97-AF65-F5344CB8AC3E}">
-        <p14:creationId xmlns:p14="http://schemas.microsoft.com/office/powerpoint/2010/main" val="1116657620"/>
+        <p14:creationId xmlns:p14="http://schemas.microsoft.com/office/powerpoint/2010/main" val="3967324833"/>
       </p:ext>
     </p:extLst>
   </p:cSld>
@@ -6783,7 +7630,11 @@
           <a:p>
             <a:r>
               <a:rPr lang="it-IT" dirty="0" smtClean="0"/>
-              <a:t>Indice</a:t>
+              <a:t>Risultati </a:t>
+            </a:r>
+            <a:r>
+              <a:rPr lang="it-IT" dirty="0" smtClean="0"/>
+              <a:t>sperimentali (1)</a:t>
             </a:r>
             <a:endParaRPr lang="it-IT" dirty="0"/>
           </a:p>
@@ -6799,177 +7650,57 @@
             <p:ph idx="1"/>
           </p:nvPr>
         </p:nvSpPr>
-        <p:spPr>
-          <a:xfrm>
-            <a:off x="685799" y="1142999"/>
-            <a:ext cx="7800975" cy="5172075"/>
-          </a:xfrm>
-        </p:spPr>
+        <p:spPr/>
         <p:txBody>
           <a:bodyPr/>
           <a:lstStyle/>
           <a:p>
             <a:r>
-              <a:rPr lang="it-IT" sz="2400" dirty="0">
-                <a:solidFill>
-                  <a:schemeClr val="bg2">
-                    <a:lumMod val="40000"/>
-                    <a:lumOff val="60000"/>
-                  </a:schemeClr>
-                </a:solidFill>
-              </a:rPr>
-              <a:t>Cos’è l’interferometria</a:t>
+              <a:rPr lang="it-IT" sz="2400" dirty="0" smtClean="0"/>
+              <a:t>Due tipologie di prove, effettuate ad ogni passo dello sviluppo:</a:t>
             </a:r>
           </a:p>
           <a:p>
             <a:pPr lvl="1"/>
             <a:r>
-              <a:rPr lang="it-IT" sz="2000" dirty="0">
-                <a:solidFill>
-                  <a:schemeClr val="bg2">
-                    <a:lumMod val="40000"/>
-                    <a:lumOff val="60000"/>
-                  </a:schemeClr>
-                </a:solidFill>
-              </a:rPr>
-              <a:t>Interferometria tradizionale</a:t>
+              <a:rPr lang="it-IT" sz="2000" dirty="0" smtClean="0"/>
+              <a:t>Bersaglio fisso</a:t>
             </a:r>
           </a:p>
           <a:p>
             <a:pPr lvl="1"/>
             <a:r>
-              <a:rPr lang="it-IT" sz="2000" dirty="0">
-                <a:solidFill>
-                  <a:schemeClr val="bg2">
-                    <a:lumMod val="40000"/>
-                    <a:lumOff val="60000"/>
-                  </a:schemeClr>
-                </a:solidFill>
-              </a:rPr>
-              <a:t>Interferometria a self-mixing</a:t>
-            </a:r>
-          </a:p>
-          <a:p>
-            <a:r>
-              <a:rPr lang="it-IT" sz="2400" dirty="0">
-                <a:solidFill>
-                  <a:schemeClr val="bg2">
-                    <a:lumMod val="40000"/>
-                    <a:lumOff val="60000"/>
-                  </a:schemeClr>
-                </a:solidFill>
-              </a:rPr>
-              <a:t>Architettura hardware</a:t>
+              <a:rPr lang="it-IT" sz="2000" dirty="0" smtClean="0"/>
+              <a:t>Bersaglio mobile</a:t>
+            </a:r>
+          </a:p>
+          <a:p>
+            <a:r>
+              <a:rPr lang="it-IT" sz="2400" dirty="0" smtClean="0"/>
+              <a:t>Risultati sintetici:</a:t>
             </a:r>
           </a:p>
           <a:p>
             <a:pPr lvl="1"/>
             <a:r>
-              <a:rPr lang="it-IT" sz="2000" dirty="0">
-                <a:solidFill>
-                  <a:schemeClr val="bg2">
-                    <a:lumMod val="40000"/>
-                    <a:lumOff val="60000"/>
-                  </a:schemeClr>
-                </a:solidFill>
-              </a:rPr>
-              <a:t>Parte analogica</a:t>
-            </a:r>
-          </a:p>
-          <a:p>
-            <a:pPr lvl="1"/>
-            <a:r>
-              <a:rPr lang="it-IT" sz="2000" dirty="0">
-                <a:solidFill>
-                  <a:schemeClr val="bg2">
-                    <a:lumMod val="40000"/>
-                    <a:lumOff val="60000"/>
-                  </a:schemeClr>
-                </a:solidFill>
-              </a:rPr>
-              <a:t>Parte di conversione</a:t>
-            </a:r>
-          </a:p>
-          <a:p>
-            <a:pPr lvl="1"/>
-            <a:r>
-              <a:rPr lang="it-IT" sz="2000" dirty="0">
-                <a:solidFill>
-                  <a:schemeClr val="bg2">
-                    <a:lumMod val="40000"/>
-                    <a:lumOff val="60000"/>
-                  </a:schemeClr>
-                </a:solidFill>
-              </a:rPr>
-              <a:t>Parte digitale</a:t>
-            </a:r>
-          </a:p>
-          <a:p>
-            <a:r>
-              <a:rPr lang="it-IT" sz="2400" dirty="0">
-                <a:solidFill>
-                  <a:schemeClr val="bg2">
-                    <a:lumMod val="40000"/>
-                    <a:lumOff val="60000"/>
-                  </a:schemeClr>
-                </a:solidFill>
-              </a:rPr>
-              <a:t>Architettura software</a:t>
-            </a:r>
-          </a:p>
-          <a:p>
-            <a:pPr lvl="1"/>
-            <a:r>
-              <a:rPr lang="it-IT" sz="2000" dirty="0">
-                <a:solidFill>
-                  <a:schemeClr val="bg2">
-                    <a:lumMod val="40000"/>
-                    <a:lumOff val="60000"/>
-                  </a:schemeClr>
-                </a:solidFill>
-              </a:rPr>
-              <a:t>FPGA</a:t>
-            </a:r>
-          </a:p>
-          <a:p>
-            <a:pPr lvl="1"/>
-            <a:r>
-              <a:rPr lang="it-IT" sz="2000" dirty="0">
-                <a:solidFill>
-                  <a:schemeClr val="bg2">
-                    <a:lumMod val="40000"/>
-                    <a:lumOff val="60000"/>
-                  </a:schemeClr>
-                </a:solidFill>
-              </a:rPr>
-              <a:t>Microcontrollore</a:t>
-            </a:r>
-          </a:p>
-          <a:p>
-            <a:pPr lvl="1"/>
-            <a:r>
-              <a:rPr lang="it-IT" sz="2000" dirty="0">
-                <a:solidFill>
-                  <a:schemeClr val="bg2">
-                    <a:lumMod val="40000"/>
-                    <a:lumOff val="60000"/>
-                  </a:schemeClr>
-                </a:solidFill>
-              </a:rPr>
-              <a:t>Analisi degli algoritmi</a:t>
-            </a:r>
-          </a:p>
-          <a:p>
-            <a:r>
-              <a:rPr lang="it-IT" sz="2400" dirty="0"/>
-              <a:t>Risultati sperimentali</a:t>
-            </a:r>
-          </a:p>
-          <a:p>
-            <a:r>
-              <a:rPr lang="it-IT" sz="2400" dirty="0"/>
-              <a:t>Sviluppi futuri e conclusioni</a:t>
-            </a:r>
+              <a:rPr lang="it-IT" sz="2000" dirty="0" smtClean="0"/>
+              <a:t>Inserire dati di tutti i passi</a:t>
+            </a:r>
+            <a:br>
+              <a:rPr lang="it-IT" sz="2000" dirty="0" smtClean="0"/>
+            </a:br>
+            <a:r>
+              <a:rPr lang="it-IT" sz="2000" dirty="0" smtClean="0"/>
+              <a:t>sia per una che per l’altra</a:t>
+            </a:r>
+            <a:br>
+              <a:rPr lang="it-IT" sz="2000" dirty="0" smtClean="0"/>
+            </a:br>
+            <a:r>
+              <a:rPr lang="it-IT" sz="2000" dirty="0" smtClean="0"/>
+              <a:t>prova, poi si commentano a voce</a:t>
+            </a:r>
+            <a:endParaRPr lang="it-IT" sz="2000" dirty="0"/>
           </a:p>
         </p:txBody>
       </p:sp>
@@ -6992,154 +7723,6 @@
               <a:rPr lang="en-US" altLang="nl-NL" smtClean="0"/>
               <a:pPr/>
               <a:t>16</a:t>
-            </a:fld>
-            <a:endParaRPr lang="en-US" altLang="nl-NL"/>
-          </a:p>
-        </p:txBody>
-      </p:sp>
-    </p:spTree>
-    <p:extLst>
-      <p:ext uri="{BB962C8B-B14F-4D97-AF65-F5344CB8AC3E}">
-        <p14:creationId xmlns:p14="http://schemas.microsoft.com/office/powerpoint/2010/main" val="3967324833"/>
-      </p:ext>
-    </p:extLst>
-  </p:cSld>
-  <p:clrMapOvr>
-    <a:masterClrMapping/>
-  </p:clrMapOvr>
-  <p:timing>
-    <p:tnLst>
-      <p:par>
-        <p:cTn id="1" dur="indefinite" restart="never" nodeType="tmRoot"/>
-      </p:par>
-    </p:tnLst>
-  </p:timing>
-</p:sld>
-</file>
-
-<file path=ppt/slides/slide17.xml><?xml version="1.0" encoding="utf-8"?>
-<p:sld xmlns:a="http://schemas.openxmlformats.org/drawingml/2006/main" xmlns:r="http://schemas.openxmlformats.org/officeDocument/2006/relationships" xmlns:p="http://schemas.openxmlformats.org/presentationml/2006/main">
-  <p:cSld>
-    <p:spTree>
-      <p:nvGrpSpPr>
-        <p:cNvPr id="1" name=""/>
-        <p:cNvGrpSpPr/>
-        <p:nvPr/>
-      </p:nvGrpSpPr>
-      <p:grpSpPr>
-        <a:xfrm>
-          <a:off x="0" y="0"/>
-          <a:ext cx="0" cy="0"/>
-          <a:chOff x="0" y="0"/>
-          <a:chExt cx="0" cy="0"/>
-        </a:xfrm>
-      </p:grpSpPr>
-      <p:sp>
-        <p:nvSpPr>
-          <p:cNvPr id="2" name="Titolo 1"/>
-          <p:cNvSpPr>
-            <a:spLocks noGrp="1"/>
-          </p:cNvSpPr>
-          <p:nvPr>
-            <p:ph type="title"/>
-          </p:nvPr>
-        </p:nvSpPr>
-        <p:spPr/>
-        <p:txBody>
-          <a:bodyPr/>
-          <a:lstStyle/>
-          <a:p>
-            <a:r>
-              <a:rPr lang="it-IT" dirty="0" smtClean="0"/>
-              <a:t>Risultati sperimentali</a:t>
-            </a:r>
-            <a:endParaRPr lang="it-IT" dirty="0"/>
-          </a:p>
-        </p:txBody>
-      </p:sp>
-      <p:sp>
-        <p:nvSpPr>
-          <p:cNvPr id="3" name="Segnaposto contenuto 2"/>
-          <p:cNvSpPr>
-            <a:spLocks noGrp="1"/>
-          </p:cNvSpPr>
-          <p:nvPr>
-            <p:ph idx="1"/>
-          </p:nvPr>
-        </p:nvSpPr>
-        <p:spPr/>
-        <p:txBody>
-          <a:bodyPr/>
-          <a:lstStyle/>
-          <a:p>
-            <a:r>
-              <a:rPr lang="it-IT" sz="2400" dirty="0" smtClean="0"/>
-              <a:t>Due tipologie di prove, effettuate ad ogni passo dello sviluppo:</a:t>
-            </a:r>
-          </a:p>
-          <a:p>
-            <a:pPr lvl="1"/>
-            <a:r>
-              <a:rPr lang="it-IT" sz="2000" dirty="0" smtClean="0"/>
-              <a:t>Bersaglio fisso</a:t>
-            </a:r>
-          </a:p>
-          <a:p>
-            <a:pPr lvl="1"/>
-            <a:r>
-              <a:rPr lang="it-IT" sz="2000" dirty="0" smtClean="0"/>
-              <a:t>Bersaglio mobile</a:t>
-            </a:r>
-          </a:p>
-          <a:p>
-            <a:r>
-              <a:rPr lang="it-IT" sz="2400" dirty="0" smtClean="0"/>
-              <a:t>Risultati sintetici:</a:t>
-            </a:r>
-          </a:p>
-          <a:p>
-            <a:pPr lvl="1"/>
-            <a:r>
-              <a:rPr lang="it-IT" sz="2000" dirty="0" smtClean="0"/>
-              <a:t>Inserire dati di tutti i passi</a:t>
-            </a:r>
-            <a:br>
-              <a:rPr lang="it-IT" sz="2000" dirty="0" smtClean="0"/>
-            </a:br>
-            <a:r>
-              <a:rPr lang="it-IT" sz="2000" dirty="0" smtClean="0"/>
-              <a:t>sia per una che per l’altra</a:t>
-            </a:r>
-            <a:br>
-              <a:rPr lang="it-IT" sz="2000" dirty="0" smtClean="0"/>
-            </a:br>
-            <a:r>
-              <a:rPr lang="it-IT" sz="2000" dirty="0" smtClean="0"/>
-              <a:t>prova, poi si commentano a voce</a:t>
-            </a:r>
-            <a:endParaRPr lang="it-IT" sz="2000" dirty="0"/>
-          </a:p>
-        </p:txBody>
-      </p:sp>
-      <p:sp>
-        <p:nvSpPr>
-          <p:cNvPr id="4" name="Segnaposto numero diapositiva 3"/>
-          <p:cNvSpPr>
-            <a:spLocks noGrp="1"/>
-          </p:cNvSpPr>
-          <p:nvPr>
-            <p:ph type="sldNum" sz="quarter" idx="11"/>
-          </p:nvPr>
-        </p:nvSpPr>
-        <p:spPr/>
-        <p:txBody>
-          <a:bodyPr/>
-          <a:lstStyle/>
-          <a:p>
-            <a:fld id="{C503DA3A-0C6B-48FC-931E-2C786AAFD5C1}" type="slidenum">
-              <a:rPr lang="en-US" altLang="nl-NL" smtClean="0"/>
-              <a:pPr/>
-              <a:t>17</a:t>
             </a:fld>
             <a:endParaRPr lang="en-US" altLang="nl-NL"/>
           </a:p>
@@ -7195,6 +7778,124 @@
 </p:sld>
 </file>
 
+<file path=ppt/slides/slide17.xml><?xml version="1.0" encoding="utf-8"?>
+<p:sld xmlns:a="http://schemas.openxmlformats.org/drawingml/2006/main" xmlns:r="http://schemas.openxmlformats.org/officeDocument/2006/relationships" xmlns:p="http://schemas.openxmlformats.org/presentationml/2006/main">
+  <p:cSld>
+    <p:spTree>
+      <p:nvGrpSpPr>
+        <p:cNvPr id="1" name=""/>
+        <p:cNvGrpSpPr/>
+        <p:nvPr/>
+      </p:nvGrpSpPr>
+      <p:grpSpPr>
+        <a:xfrm>
+          <a:off x="0" y="0"/>
+          <a:ext cx="0" cy="0"/>
+          <a:chOff x="0" y="0"/>
+          <a:chExt cx="0" cy="0"/>
+        </a:xfrm>
+      </p:grpSpPr>
+      <p:sp>
+        <p:nvSpPr>
+          <p:cNvPr id="2" name="Titolo 1"/>
+          <p:cNvSpPr>
+            <a:spLocks noGrp="1"/>
+          </p:cNvSpPr>
+          <p:nvPr>
+            <p:ph type="title"/>
+          </p:nvPr>
+        </p:nvSpPr>
+        <p:spPr/>
+        <p:txBody>
+          <a:bodyPr/>
+          <a:lstStyle/>
+          <a:p>
+            <a:r>
+              <a:rPr lang="it-IT" dirty="0" smtClean="0"/>
+              <a:t>Risultati </a:t>
+            </a:r>
+            <a:r>
+              <a:rPr lang="it-IT" dirty="0" smtClean="0"/>
+              <a:t>sperimentali (2)</a:t>
+            </a:r>
+            <a:endParaRPr lang="it-IT" dirty="0"/>
+          </a:p>
+        </p:txBody>
+      </p:sp>
+      <p:sp>
+        <p:nvSpPr>
+          <p:cNvPr id="3" name="Segnaposto contenuto 2"/>
+          <p:cNvSpPr>
+            <a:spLocks noGrp="1"/>
+          </p:cNvSpPr>
+          <p:nvPr>
+            <p:ph idx="1"/>
+          </p:nvPr>
+        </p:nvSpPr>
+        <p:spPr/>
+        <p:txBody>
+          <a:bodyPr/>
+          <a:lstStyle/>
+          <a:p>
+            <a:r>
+              <a:rPr lang="it-IT" sz="2400" dirty="0" smtClean="0"/>
+              <a:t>Prove con la versione finale dello strumento:</a:t>
+            </a:r>
+          </a:p>
+          <a:p>
+            <a:pPr lvl="1"/>
+            <a:r>
+              <a:rPr lang="it-IT" sz="2000" dirty="0" smtClean="0"/>
+              <a:t>Risultati con immagini</a:t>
+            </a:r>
+            <a:endParaRPr lang="it-IT" sz="2000" dirty="0"/>
+          </a:p>
+        </p:txBody>
+      </p:sp>
+      <p:sp>
+        <p:nvSpPr>
+          <p:cNvPr id="4" name="Segnaposto numero diapositiva 3"/>
+          <p:cNvSpPr>
+            <a:spLocks noGrp="1"/>
+          </p:cNvSpPr>
+          <p:nvPr>
+            <p:ph type="sldNum" sz="quarter" idx="11"/>
+          </p:nvPr>
+        </p:nvSpPr>
+        <p:spPr/>
+        <p:txBody>
+          <a:bodyPr/>
+          <a:lstStyle/>
+          <a:p>
+            <a:fld id="{C503DA3A-0C6B-48FC-931E-2C786AAFD5C1}" type="slidenum">
+              <a:rPr lang="en-US" altLang="nl-NL" smtClean="0"/>
+              <a:pPr/>
+              <a:t>17</a:t>
+            </a:fld>
+            <a:endParaRPr lang="en-US" altLang="nl-NL"/>
+          </a:p>
+        </p:txBody>
+      </p:sp>
+    </p:spTree>
+    <p:extLst>
+      <p:ext uri="{BB962C8B-B14F-4D97-AF65-F5344CB8AC3E}">
+        <p14:creationId xmlns:p14="http://schemas.microsoft.com/office/powerpoint/2010/main" val="676223027"/>
+      </p:ext>
+    </p:extLst>
+  </p:cSld>
+  <p:clrMapOvr>
+    <a:masterClrMapping/>
+  </p:clrMapOvr>
+  <p:timing>
+    <p:tnLst>
+      <p:par>
+        <p:cTn id="1" dur="indefinite" restart="never" nodeType="tmRoot"/>
+      </p:par>
+    </p:tnLst>
+  </p:timing>
+</p:sld>
+</file>
+
 <file path=ppt/slides/slide18.xml><?xml version="1.0" encoding="utf-8"?>
 <p:sld xmlns:a="http://schemas.openxmlformats.org/drawingml/2006/main" xmlns:r="http://schemas.openxmlformats.org/officeDocument/2006/relationships" xmlns:p="http://schemas.openxmlformats.org/presentationml/2006/main">
   <p:cSld>
@@ -7229,7 +7930,11 @@
           <a:p>
             <a:r>
               <a:rPr lang="it-IT" dirty="0" smtClean="0"/>
-              <a:t>Risultati sperimentali</a:t>
+              <a:t>Risultati </a:t>
+            </a:r>
+            <a:r>
+              <a:rPr lang="it-IT" dirty="0" smtClean="0"/>
+              <a:t>sperimentali (3)</a:t>
             </a:r>
             <a:endParaRPr lang="it-IT" dirty="0"/>
           </a:p>
@@ -7292,7 +7997,7 @@
     </p:spTree>
     <p:extLst>
       <p:ext uri="{BB962C8B-B14F-4D97-AF65-F5344CB8AC3E}">
-        <p14:creationId xmlns:p14="http://schemas.microsoft.com/office/powerpoint/2010/main" val="676223027"/>
+        <p14:creationId xmlns:p14="http://schemas.microsoft.com/office/powerpoint/2010/main" val="1015857464"/>
       </p:ext>
     </p:extLst>
   </p:cSld>
@@ -7343,7 +8048,7 @@
           <a:p>
             <a:r>
               <a:rPr lang="it-IT" dirty="0" smtClean="0"/>
-              <a:t>Indice</a:t>
+              <a:t>Prestazioni</a:t>
             </a:r>
             <a:endParaRPr lang="it-IT" dirty="0"/>
           </a:p>
@@ -7359,184 +8064,12 @@
             <p:ph idx="1"/>
           </p:nvPr>
         </p:nvSpPr>
-        <p:spPr>
-          <a:xfrm>
-            <a:off x="685800" y="1142999"/>
-            <a:ext cx="7086600" cy="5229225"/>
-          </a:xfrm>
-        </p:spPr>
+        <p:spPr/>
         <p:txBody>
           <a:bodyPr/>
           <a:lstStyle/>
           <a:p>
-            <a:r>
-              <a:rPr lang="it-IT" sz="2400" dirty="0">
-                <a:solidFill>
-                  <a:schemeClr val="bg2">
-                    <a:lumMod val="40000"/>
-                    <a:lumOff val="60000"/>
-                  </a:schemeClr>
-                </a:solidFill>
-              </a:rPr>
-              <a:t>Cos’è l’interferometria</a:t>
-            </a:r>
-          </a:p>
-          <a:p>
-            <a:pPr lvl="1"/>
-            <a:r>
-              <a:rPr lang="it-IT" sz="2000" dirty="0">
-                <a:solidFill>
-                  <a:schemeClr val="bg2">
-                    <a:lumMod val="40000"/>
-                    <a:lumOff val="60000"/>
-                  </a:schemeClr>
-                </a:solidFill>
-              </a:rPr>
-              <a:t>Interferometria tradizionale</a:t>
-            </a:r>
-          </a:p>
-          <a:p>
-            <a:pPr lvl="1"/>
-            <a:r>
-              <a:rPr lang="it-IT" sz="2000" dirty="0">
-                <a:solidFill>
-                  <a:schemeClr val="bg2">
-                    <a:lumMod val="40000"/>
-                    <a:lumOff val="60000"/>
-                  </a:schemeClr>
-                </a:solidFill>
-              </a:rPr>
-              <a:t>Interferometria a self-mixing</a:t>
-            </a:r>
-          </a:p>
-          <a:p>
-            <a:r>
-              <a:rPr lang="it-IT" sz="2400" dirty="0">
-                <a:solidFill>
-                  <a:schemeClr val="bg2">
-                    <a:lumMod val="40000"/>
-                    <a:lumOff val="60000"/>
-                  </a:schemeClr>
-                </a:solidFill>
-              </a:rPr>
-              <a:t>Architettura hardware</a:t>
-            </a:r>
-          </a:p>
-          <a:p>
-            <a:pPr lvl="1"/>
-            <a:r>
-              <a:rPr lang="it-IT" sz="2000" dirty="0">
-                <a:solidFill>
-                  <a:schemeClr val="bg2">
-                    <a:lumMod val="40000"/>
-                    <a:lumOff val="60000"/>
-                  </a:schemeClr>
-                </a:solidFill>
-              </a:rPr>
-              <a:t>Parte analogica</a:t>
-            </a:r>
-          </a:p>
-          <a:p>
-            <a:pPr lvl="1"/>
-            <a:r>
-              <a:rPr lang="it-IT" sz="2000" dirty="0">
-                <a:solidFill>
-                  <a:schemeClr val="bg2">
-                    <a:lumMod val="40000"/>
-                    <a:lumOff val="60000"/>
-                  </a:schemeClr>
-                </a:solidFill>
-              </a:rPr>
-              <a:t>Parte di conversione</a:t>
-            </a:r>
-          </a:p>
-          <a:p>
-            <a:pPr lvl="1"/>
-            <a:r>
-              <a:rPr lang="it-IT" sz="2000" dirty="0">
-                <a:solidFill>
-                  <a:schemeClr val="bg2">
-                    <a:lumMod val="40000"/>
-                    <a:lumOff val="60000"/>
-                  </a:schemeClr>
-                </a:solidFill>
-              </a:rPr>
-              <a:t>Parte digitale</a:t>
-            </a:r>
-          </a:p>
-          <a:p>
-            <a:r>
-              <a:rPr lang="it-IT" sz="2400" dirty="0">
-                <a:solidFill>
-                  <a:schemeClr val="bg2">
-                    <a:lumMod val="40000"/>
-                    <a:lumOff val="60000"/>
-                  </a:schemeClr>
-                </a:solidFill>
-              </a:rPr>
-              <a:t>Architettura software</a:t>
-            </a:r>
-          </a:p>
-          <a:p>
-            <a:pPr lvl="1"/>
-            <a:r>
-              <a:rPr lang="it-IT" sz="2000" dirty="0">
-                <a:solidFill>
-                  <a:schemeClr val="bg2">
-                    <a:lumMod val="40000"/>
-                    <a:lumOff val="60000"/>
-                  </a:schemeClr>
-                </a:solidFill>
-              </a:rPr>
-              <a:t>FPGA</a:t>
-            </a:r>
-          </a:p>
-          <a:p>
-            <a:pPr lvl="1"/>
-            <a:r>
-              <a:rPr lang="it-IT" sz="2000" dirty="0">
-                <a:solidFill>
-                  <a:schemeClr val="bg2">
-                    <a:lumMod val="40000"/>
-                    <a:lumOff val="60000"/>
-                  </a:schemeClr>
-                </a:solidFill>
-              </a:rPr>
-              <a:t>Microcontrollore</a:t>
-            </a:r>
-          </a:p>
-          <a:p>
-            <a:pPr lvl="1"/>
-            <a:r>
-              <a:rPr lang="it-IT" sz="2000" dirty="0">
-                <a:solidFill>
-                  <a:schemeClr val="bg2">
-                    <a:lumMod val="40000"/>
-                    <a:lumOff val="60000"/>
-                  </a:schemeClr>
-                </a:solidFill>
-              </a:rPr>
-              <a:t>Analisi degli algoritmi</a:t>
-            </a:r>
-          </a:p>
-          <a:p>
-            <a:r>
-              <a:rPr lang="it-IT" sz="2400" dirty="0">
-                <a:solidFill>
-                  <a:schemeClr val="bg2">
-                    <a:lumMod val="40000"/>
-                    <a:lumOff val="60000"/>
-                  </a:schemeClr>
-                </a:solidFill>
-              </a:rPr>
-              <a:t>Risultati sperimentali</a:t>
-            </a:r>
-          </a:p>
-          <a:p>
-            <a:r>
-              <a:rPr lang="it-IT" sz="2400" dirty="0"/>
-              <a:t>Sviluppi futuri e conclusioni</a:t>
-            </a:r>
+            <a:endParaRPr lang="it-IT" sz="2000" dirty="0"/>
           </a:p>
         </p:txBody>
       </p:sp>
@@ -7567,7 +8100,7 @@
     </p:spTree>
     <p:extLst>
       <p:ext uri="{BB962C8B-B14F-4D97-AF65-F5344CB8AC3E}">
-        <p14:creationId xmlns:p14="http://schemas.microsoft.com/office/powerpoint/2010/main" val="2461533339"/>
+        <p14:creationId xmlns:p14="http://schemas.microsoft.com/office/powerpoint/2010/main" val="1195950186"/>
       </p:ext>
     </p:extLst>
   </p:cSld>
@@ -7645,21 +8178,21 @@
           <a:lstStyle/>
           <a:p>
             <a:r>
-              <a:rPr lang="it-IT" sz="2400" dirty="0" smtClean="0"/>
+              <a:rPr lang="it-IT" sz="2400" dirty="0"/>
               <a:t>Interferometria</a:t>
             </a:r>
           </a:p>
           <a:p>
             <a:pPr lvl="1"/>
             <a:r>
-              <a:rPr lang="it-IT" sz="2000" dirty="0" smtClean="0"/>
+              <a:rPr lang="it-IT" sz="2000" dirty="0"/>
               <a:t>Interferometria a self-mixing</a:t>
             </a:r>
           </a:p>
           <a:p>
             <a:pPr lvl="1"/>
             <a:r>
-              <a:rPr lang="it-IT" sz="2000" dirty="0" smtClean="0"/>
+              <a:rPr lang="it-IT" sz="2000" dirty="0"/>
               <a:t>Misura della distanza</a:t>
             </a:r>
           </a:p>
@@ -7680,14 +8213,14 @@
             <a:pPr lvl="1"/>
             <a:r>
               <a:rPr lang="it-IT" sz="2000" dirty="0"/>
+              <a:t>Parte digitale</a:t>
+            </a:r>
+          </a:p>
+          <a:p>
+            <a:pPr lvl="1"/>
+            <a:r>
+              <a:rPr lang="it-IT" sz="2000" dirty="0"/>
               <a:t>Parte di conversione</a:t>
-            </a:r>
-          </a:p>
-          <a:p>
-            <a:pPr lvl="1"/>
-            <a:r>
-              <a:rPr lang="it-IT" sz="2000" dirty="0"/>
-              <a:t>Parte digitale</a:t>
             </a:r>
           </a:p>
           <a:p>
@@ -7711,27 +8244,17 @@
             </a:r>
           </a:p>
           <a:p>
-            <a:pPr lvl="1"/>
-            <a:r>
-              <a:rPr lang="it-IT" sz="2000" dirty="0"/>
-              <a:t>Analisi degli algoritmi</a:t>
-            </a:r>
-          </a:p>
-          <a:p>
-            <a:r>
-              <a:rPr lang="it-IT" sz="2400" dirty="0" smtClean="0"/>
-              <a:t>Risultati </a:t>
-            </a:r>
             <a:r>
               <a:rPr lang="it-IT" sz="2400" dirty="0"/>
-              <a:t>sperimentali</a:t>
+              <a:t>Risultati sperimentali</a:t>
             </a:r>
           </a:p>
           <a:p>
             <a:r>
               <a:rPr lang="it-IT" sz="2400" dirty="0"/>
-              <a:t>Sviluppi futuri e conclusioni</a:t>
-            </a:r>
+              <a:t>Conclusioni e sviluppi futuri</a:t>
+            </a:r>
+            <a:endParaRPr lang="it-IT" sz="2400" dirty="0"/>
           </a:p>
         </p:txBody>
       </p:sp>
@@ -7813,7 +8336,7 @@
           <a:p>
             <a:r>
               <a:rPr lang="it-IT" dirty="0" smtClean="0"/>
-              <a:t>Conclusioni e sviluppi futuri</a:t>
+              <a:t>Indice</a:t>
             </a:r>
             <a:endParaRPr lang="it-IT" dirty="0"/>
           </a:p>
@@ -7829,47 +8352,171 @@
             <p:ph idx="1"/>
           </p:nvPr>
         </p:nvSpPr>
-        <p:spPr/>
+        <p:spPr>
+          <a:xfrm>
+            <a:off x="685800" y="1142999"/>
+            <a:ext cx="7086600" cy="5229225"/>
+          </a:xfrm>
+        </p:spPr>
         <p:txBody>
           <a:bodyPr/>
           <a:lstStyle/>
           <a:p>
             <a:r>
-              <a:rPr lang="it-IT" sz="2400" dirty="0" smtClean="0"/>
-              <a:t>I risultati ottenuti mostrano la possibilità di realizzare uno strumento di misura con buone prestazioni e a basso costo, sfruttando la tecnica di interferometria a self-mixing. </a:t>
-            </a:r>
-          </a:p>
-          <a:p>
-            <a:r>
-              <a:rPr lang="it-IT" sz="2400" dirty="0" smtClean="0"/>
-              <a:t>Lo strumento mostra ancora alcuni limiti:</a:t>
+              <a:rPr lang="it-IT" sz="2400" dirty="0">
+                <a:solidFill>
+                  <a:schemeClr val="bg2">
+                    <a:lumMod val="40000"/>
+                    <a:lumOff val="60000"/>
+                  </a:schemeClr>
+                </a:solidFill>
+              </a:rPr>
+              <a:t>Interferometria</a:t>
             </a:r>
           </a:p>
           <a:p>
             <a:pPr lvl="1"/>
             <a:r>
-              <a:rPr lang="it-IT" sz="2000" dirty="0" err="1" smtClean="0"/>
-              <a:t>Drift</a:t>
-            </a:r>
-            <a:r>
-              <a:rPr lang="it-IT" sz="2000" dirty="0" smtClean="0"/>
-              <a:t> termico</a:t>
+              <a:rPr lang="it-IT" sz="2000" dirty="0">
+                <a:solidFill>
+                  <a:schemeClr val="bg2">
+                    <a:lumMod val="40000"/>
+                    <a:lumOff val="60000"/>
+                  </a:schemeClr>
+                </a:solidFill>
+              </a:rPr>
+              <a:t>Interferometria a self-mixing</a:t>
             </a:r>
           </a:p>
           <a:p>
             <a:pPr lvl="1"/>
             <a:r>
-              <a:rPr lang="it-IT" sz="2000" dirty="0" smtClean="0"/>
-              <a:t>Comunicazione tra PC e scheda di sviluppo</a:t>
+              <a:rPr lang="it-IT" sz="2000" dirty="0">
+                <a:solidFill>
+                  <a:schemeClr val="bg2">
+                    <a:lumMod val="40000"/>
+                    <a:lumOff val="60000"/>
+                  </a:schemeClr>
+                </a:solidFill>
+              </a:rPr>
+              <a:t>Misura della distanza</a:t>
+            </a:r>
+          </a:p>
+          <a:p>
+            <a:r>
+              <a:rPr lang="it-IT" sz="2400" dirty="0">
+                <a:solidFill>
+                  <a:schemeClr val="bg2">
+                    <a:lumMod val="40000"/>
+                    <a:lumOff val="60000"/>
+                  </a:schemeClr>
+                </a:solidFill>
+              </a:rPr>
+              <a:t>Architettura hardware</a:t>
             </a:r>
           </a:p>
           <a:p>
             <a:pPr lvl="1"/>
             <a:r>
-              <a:rPr lang="it-IT" sz="2000" dirty="0" smtClean="0"/>
-              <a:t>Lettura della configurazione da file </a:t>
-            </a:r>
-            <a:endParaRPr lang="it-IT" sz="2000" dirty="0"/>
+              <a:rPr lang="it-IT" sz="2000" dirty="0">
+                <a:solidFill>
+                  <a:schemeClr val="bg2">
+                    <a:lumMod val="40000"/>
+                    <a:lumOff val="60000"/>
+                  </a:schemeClr>
+                </a:solidFill>
+              </a:rPr>
+              <a:t>Parte analogica</a:t>
+            </a:r>
+          </a:p>
+          <a:p>
+            <a:pPr lvl="1"/>
+            <a:r>
+              <a:rPr lang="it-IT" sz="2000" dirty="0">
+                <a:solidFill>
+                  <a:schemeClr val="bg2">
+                    <a:lumMod val="40000"/>
+                    <a:lumOff val="60000"/>
+                  </a:schemeClr>
+                </a:solidFill>
+              </a:rPr>
+              <a:t>Parte digitale</a:t>
+            </a:r>
+          </a:p>
+          <a:p>
+            <a:pPr lvl="1"/>
+            <a:r>
+              <a:rPr lang="it-IT" sz="2000" dirty="0">
+                <a:solidFill>
+                  <a:schemeClr val="bg2">
+                    <a:lumMod val="40000"/>
+                    <a:lumOff val="60000"/>
+                  </a:schemeClr>
+                </a:solidFill>
+              </a:rPr>
+              <a:t>Parte di conversione</a:t>
+            </a:r>
+          </a:p>
+          <a:p>
+            <a:r>
+              <a:rPr lang="it-IT" sz="2400" dirty="0">
+                <a:solidFill>
+                  <a:schemeClr val="bg2">
+                    <a:lumMod val="40000"/>
+                    <a:lumOff val="60000"/>
+                  </a:schemeClr>
+                </a:solidFill>
+              </a:rPr>
+              <a:t>Architettura software</a:t>
+            </a:r>
+          </a:p>
+          <a:p>
+            <a:pPr lvl="1"/>
+            <a:r>
+              <a:rPr lang="it-IT" sz="2000" dirty="0">
+                <a:solidFill>
+                  <a:schemeClr val="bg2">
+                    <a:lumMod val="40000"/>
+                    <a:lumOff val="60000"/>
+                  </a:schemeClr>
+                </a:solidFill>
+              </a:rPr>
+              <a:t>FPGA</a:t>
+            </a:r>
+          </a:p>
+          <a:p>
+            <a:pPr lvl="1"/>
+            <a:r>
+              <a:rPr lang="it-IT" sz="2000" dirty="0">
+                <a:solidFill>
+                  <a:schemeClr val="bg2">
+                    <a:lumMod val="40000"/>
+                    <a:lumOff val="60000"/>
+                  </a:schemeClr>
+                </a:solidFill>
+              </a:rPr>
+              <a:t>Microcontrollore</a:t>
+            </a:r>
+          </a:p>
+          <a:p>
+            <a:r>
+              <a:rPr lang="it-IT" sz="2400" dirty="0">
+                <a:solidFill>
+                  <a:schemeClr val="bg2">
+                    <a:lumMod val="40000"/>
+                    <a:lumOff val="60000"/>
+                  </a:schemeClr>
+                </a:solidFill>
+              </a:rPr>
+              <a:t>Risultati sperimentali</a:t>
+            </a:r>
+          </a:p>
+          <a:p>
+            <a:r>
+              <a:rPr lang="it-IT" sz="2400" dirty="0"/>
+              <a:t>Conclusioni e sviluppi futuri</a:t>
+            </a:r>
+            <a:endParaRPr lang="it-IT" sz="2400" dirty="0"/>
           </a:p>
         </p:txBody>
       </p:sp>
@@ -7900,7 +8547,7 @@
     </p:spTree>
     <p:extLst>
       <p:ext uri="{BB962C8B-B14F-4D97-AF65-F5344CB8AC3E}">
-        <p14:creationId xmlns:p14="http://schemas.microsoft.com/office/powerpoint/2010/main" val="781321479"/>
+        <p14:creationId xmlns:p14="http://schemas.microsoft.com/office/powerpoint/2010/main" val="2461533339"/>
       </p:ext>
     </p:extLst>
   </p:cSld>
@@ -7936,6 +8583,83 @@
       </p:grpSpPr>
       <p:sp>
         <p:nvSpPr>
+          <p:cNvPr id="2" name="Titolo 1"/>
+          <p:cNvSpPr>
+            <a:spLocks noGrp="1"/>
+          </p:cNvSpPr>
+          <p:nvPr>
+            <p:ph type="title"/>
+          </p:nvPr>
+        </p:nvSpPr>
+        <p:spPr/>
+        <p:txBody>
+          <a:bodyPr/>
+          <a:lstStyle/>
+          <a:p>
+            <a:r>
+              <a:rPr lang="it-IT" dirty="0" smtClean="0"/>
+              <a:t>Conclusioni e sviluppi futuri</a:t>
+            </a:r>
+            <a:endParaRPr lang="it-IT" dirty="0"/>
+          </a:p>
+        </p:txBody>
+      </p:sp>
+      <p:sp>
+        <p:nvSpPr>
+          <p:cNvPr id="3" name="Segnaposto contenuto 2"/>
+          <p:cNvSpPr>
+            <a:spLocks noGrp="1"/>
+          </p:cNvSpPr>
+          <p:nvPr>
+            <p:ph idx="1"/>
+          </p:nvPr>
+        </p:nvSpPr>
+        <p:spPr/>
+        <p:txBody>
+          <a:bodyPr/>
+          <a:lstStyle/>
+          <a:p>
+            <a:r>
+              <a:rPr lang="it-IT" sz="2400" dirty="0" smtClean="0"/>
+              <a:t>I risultati ottenuti mostrano la possibilità di realizzare uno strumento di misura con buone prestazioni e a basso costo, sfruttando la tecnica di interferometria a self-mixing. </a:t>
+            </a:r>
+          </a:p>
+          <a:p>
+            <a:r>
+              <a:rPr lang="it-IT" sz="2400" dirty="0" smtClean="0"/>
+              <a:t>Lo strumento mostra ancora alcuni limiti:</a:t>
+            </a:r>
+          </a:p>
+          <a:p>
+            <a:pPr lvl="1"/>
+            <a:r>
+              <a:rPr lang="it-IT" sz="2000" dirty="0" err="1" smtClean="0"/>
+              <a:t>Drift</a:t>
+            </a:r>
+            <a:r>
+              <a:rPr lang="it-IT" sz="2000" dirty="0" smtClean="0"/>
+              <a:t> termico</a:t>
+            </a:r>
+          </a:p>
+          <a:p>
+            <a:pPr lvl="1"/>
+            <a:r>
+              <a:rPr lang="it-IT" sz="2000" dirty="0" smtClean="0"/>
+              <a:t>Comunicazione tra PC e scheda di sviluppo</a:t>
+            </a:r>
+          </a:p>
+          <a:p>
+            <a:pPr lvl="1"/>
+            <a:r>
+              <a:rPr lang="it-IT" sz="2000" dirty="0" smtClean="0"/>
+              <a:t>Lettura della configurazione da file </a:t>
+            </a:r>
+            <a:endParaRPr lang="it-IT" sz="2000" dirty="0"/>
+          </a:p>
+        </p:txBody>
+      </p:sp>
+      <p:sp>
+        <p:nvSpPr>
           <p:cNvPr id="4" name="Segnaposto numero diapositiva 3"/>
           <p:cNvSpPr>
             <a:spLocks noGrp="1"/>
@@ -7953,6 +8677,67 @@
               <a:rPr lang="en-US" altLang="nl-NL" smtClean="0"/>
               <a:pPr/>
               <a:t>21</a:t>
+            </a:fld>
+            <a:endParaRPr lang="en-US" altLang="nl-NL"/>
+          </a:p>
+        </p:txBody>
+      </p:sp>
+    </p:spTree>
+    <p:extLst>
+      <p:ext uri="{BB962C8B-B14F-4D97-AF65-F5344CB8AC3E}">
+        <p14:creationId xmlns:p14="http://schemas.microsoft.com/office/powerpoint/2010/main" val="781321479"/>
+      </p:ext>
+    </p:extLst>
+  </p:cSld>
+  <p:clrMapOvr>
+    <a:masterClrMapping/>
+  </p:clrMapOvr>
+  <p:timing>
+    <p:tnLst>
+      <p:par>
+        <p:cTn id="1" dur="indefinite" restart="never" nodeType="tmRoot"/>
+      </p:par>
+    </p:tnLst>
+  </p:timing>
+</p:sld>
+</file>
+
+<file path=ppt/slides/slide22.xml><?xml version="1.0" encoding="utf-8"?>
+<p:sld xmlns:a="http://schemas.openxmlformats.org/drawingml/2006/main" xmlns:r="http://schemas.openxmlformats.org/officeDocument/2006/relationships" xmlns:p="http://schemas.openxmlformats.org/presentationml/2006/main">
+  <p:cSld>
+    <p:spTree>
+      <p:nvGrpSpPr>
+        <p:cNvPr id="1" name=""/>
+        <p:cNvGrpSpPr/>
+        <p:nvPr/>
+      </p:nvGrpSpPr>
+      <p:grpSpPr>
+        <a:xfrm>
+          <a:off x="0" y="0"/>
+          <a:ext cx="0" cy="0"/>
+          <a:chOff x="0" y="0"/>
+          <a:chExt cx="0" cy="0"/>
+        </a:xfrm>
+      </p:grpSpPr>
+      <p:sp>
+        <p:nvSpPr>
+          <p:cNvPr id="4" name="Segnaposto numero diapositiva 3"/>
+          <p:cNvSpPr>
+            <a:spLocks noGrp="1"/>
+          </p:cNvSpPr>
+          <p:nvPr>
+            <p:ph type="sldNum" sz="quarter" idx="11"/>
+          </p:nvPr>
+        </p:nvSpPr>
+        <p:spPr/>
+        <p:txBody>
+          <a:bodyPr/>
+          <a:lstStyle/>
+          <a:p>
+            <a:fld id="{C503DA3A-0C6B-48FC-931E-2C786AAFD5C1}" type="slidenum">
+              <a:rPr lang="en-US" altLang="nl-NL" smtClean="0"/>
+              <a:pPr/>
+              <a:t>22</a:t>
             </a:fld>
             <a:endParaRPr lang="en-US" altLang="nl-NL"/>
           </a:p>
@@ -9930,23 +10715,21 @@
             </a:r>
           </a:p>
           <a:p>
-            <a:pPr lvl="1"/>
-            <a:r>
-              <a:rPr lang="it-IT" sz="2000" dirty="0"/>
-              <a:t>Analisi degli algoritmi</a:t>
-            </a:r>
-          </a:p>
-          <a:p>
+            <a:r>
+              <a:rPr lang="it-IT" sz="2400" dirty="0" smtClean="0"/>
+              <a:t>Risultati </a:t>
+            </a:r>
             <a:r>
               <a:rPr lang="it-IT" sz="2400" dirty="0"/>
-              <a:t>Risultati sperimentali</a:t>
+              <a:t>sperimentali</a:t>
             </a:r>
           </a:p>
           <a:p>
             <a:r>
               <a:rPr lang="it-IT" sz="2400" dirty="0"/>
-              <a:t>Sviluppi futuri e conclusioni</a:t>
-            </a:r>
+              <a:t>Conclusioni e sviluppi futuri</a:t>
+            </a:r>
+            <a:endParaRPr lang="it-IT" sz="2400" dirty="0"/>
           </a:p>
         </p:txBody>
       </p:sp>
@@ -10493,27 +11276,7 @@
           <a:p>
             <a:r>
               <a:rPr lang="it-IT" sz="2400" dirty="0" smtClean="0"/>
-              <a:t>La parte digitale </a:t>
-            </a:r>
-            <a:r>
-              <a:rPr lang="it-IT" sz="2400" dirty="0" smtClean="0"/>
-              <a:t>è </a:t>
-            </a:r>
-            <a:r>
-              <a:rPr lang="it-IT" sz="2400" dirty="0" smtClean="0"/>
-              <a:t>costituita </a:t>
-            </a:r>
-            <a:r>
-              <a:rPr lang="it-IT" sz="2400" dirty="0" smtClean="0"/>
-              <a:t>dalla scheda </a:t>
-            </a:r>
-            <a:r>
-              <a:rPr lang="it-IT" sz="2400" dirty="0" smtClean="0"/>
-              <a:t>di </a:t>
-            </a:r>
-            <a:r>
-              <a:rPr lang="it-IT" sz="2400" dirty="0" smtClean="0"/>
-              <a:t>prototipazione: </a:t>
+              <a:t>La parte digitale è costituita dalla scheda di prototipazione: </a:t>
             </a:r>
             <a:r>
               <a:rPr lang="it-IT" sz="2400" b="1" dirty="0" smtClean="0"/>
@@ -10525,13 +11288,8 @@
             </a:r>
             <a:r>
               <a:rPr lang="it-IT" sz="2400" b="1" dirty="0" smtClean="0"/>
-              <a:t> </a:t>
-            </a:r>
-            <a:r>
-              <a:rPr lang="it-IT" sz="2400" b="1" dirty="0" smtClean="0"/>
-              <a:t>9636</a:t>
-            </a:r>
-            <a:endParaRPr lang="it-IT" sz="2400" b="1" dirty="0" smtClean="0"/>
+              <a:t> 9636</a:t>
+            </a:r>
           </a:p>
         </p:txBody>
       </p:sp>

</xml_diff>

<commit_message>
inserite prestazioni di misura
</commit_message>
<xml_diff>
--- a/presentazione_discussione.pptx
+++ b/presentazione_discussione.pptx
@@ -186,6 +186,32 @@
 </p:presentation>
 </file>
 
+<file path=ppt/commentAuthors.xml><?xml version="1.0" encoding="utf-8"?>
+<p:cmAuthorLst xmlns:a="http://schemas.openxmlformats.org/drawingml/2006/main" xmlns:r="http://schemas.openxmlformats.org/officeDocument/2006/relationships" xmlns:p="http://schemas.openxmlformats.org/presentationml/2006/main">
+  <p:cmAuthor id="1" name="Leonardo Cavagnis" initials="LC" lastIdx="1" clrIdx="0">
+    <p:extLst>
+      <p:ext uri="{19B8F6BF-5375-455C-9EA6-DF929625EA0E}">
+        <p15:presenceInfo xmlns:p15="http://schemas.microsoft.com/office/powerpoint/2012/main" userId="" providerId=""/>
+      </p:ext>
+    </p:extLst>
+  </p:cmAuthor>
+</p:cmAuthorLst>
+</file>
+
+<file path=ppt/comments/comment1.xml><?xml version="1.0" encoding="utf-8"?>
+<p:cmLst xmlns:a="http://schemas.openxmlformats.org/drawingml/2006/main" xmlns:r="http://schemas.openxmlformats.org/officeDocument/2006/relationships" xmlns:p="http://schemas.openxmlformats.org/presentationml/2006/main">
+  <p:cm authorId="1" dt="2015-12-05T16:05:50.877" idx="1">
+    <p:pos x="4896" y="1898"/>
+    <p:text>Sistemare immagine</p:text>
+    <p:extLst>
+      <p:ext uri="{C676402C-5697-4E1C-873F-D02D1690AC5C}">
+        <p15:threadingInfo xmlns:p15="http://schemas.microsoft.com/office/powerpoint/2012/main" timeZoneBias="-60"/>
+      </p:ext>
+    </p:extLst>
+  </p:cm>
+</p:cmLst>
+</file>
+
 <file path=ppt/handoutMasters/handoutMaster1.xml><?xml version="1.0" encoding="utf-8"?>
 <p:handoutMaster xmlns:a="http://schemas.openxmlformats.org/drawingml/2006/main" xmlns:r="http://schemas.openxmlformats.org/officeDocument/2006/relationships" xmlns:p="http://schemas.openxmlformats.org/presentationml/2006/main">
   <p:cSld>
@@ -1891,6 +1917,160 @@
     <p:extLst>
       <p:ext uri="{BB962C8B-B14F-4D97-AF65-F5344CB8AC3E}">
         <p14:creationId xmlns:p14="http://schemas.microsoft.com/office/powerpoint/2010/main" val="2032454154"/>
+      </p:ext>
+    </p:extLst>
+  </p:cSld>
+  <p:clrMapOvr>
+    <a:masterClrMapping/>
+  </p:clrMapOvr>
+</p:notes>
+</file>
+
+<file path=ppt/notesSlides/notesSlide4.xml><?xml version="1.0" encoding="utf-8"?>
+<p:notes xmlns:a="http://schemas.openxmlformats.org/drawingml/2006/main" xmlns:r="http://schemas.openxmlformats.org/officeDocument/2006/relationships" xmlns:p="http://schemas.openxmlformats.org/presentationml/2006/main">
+  <p:cSld>
+    <p:spTree>
+      <p:nvGrpSpPr>
+        <p:cNvPr id="1" name=""/>
+        <p:cNvGrpSpPr/>
+        <p:nvPr/>
+      </p:nvGrpSpPr>
+      <p:grpSpPr>
+        <a:xfrm>
+          <a:off x="0" y="0"/>
+          <a:ext cx="0" cy="0"/>
+          <a:chOff x="0" y="0"/>
+          <a:chExt cx="0" cy="0"/>
+        </a:xfrm>
+      </p:grpSpPr>
+      <p:sp>
+        <p:nvSpPr>
+          <p:cNvPr id="2" name="Segnaposto immagine diapositiva 1"/>
+          <p:cNvSpPr>
+            <a:spLocks noGrp="1" noRot="1" noChangeAspect="1"/>
+          </p:cNvSpPr>
+          <p:nvPr>
+            <p:ph type="sldImg"/>
+          </p:nvPr>
+        </p:nvSpPr>
+        <p:spPr/>
+      </p:sp>
+      <p:sp>
+        <p:nvSpPr>
+          <p:cNvPr id="3" name="Segnaposto note 2"/>
+          <p:cNvSpPr>
+            <a:spLocks noGrp="1"/>
+          </p:cNvSpPr>
+          <p:nvPr>
+            <p:ph type="body" idx="1"/>
+          </p:nvPr>
+        </p:nvSpPr>
+        <p:spPr/>
+        <p:txBody>
+          <a:bodyPr/>
+          <a:lstStyle/>
+          <a:p>
+            <a:endParaRPr lang="it-IT" dirty="0"/>
+          </a:p>
+        </p:txBody>
+      </p:sp>
+      <p:sp>
+        <p:nvSpPr>
+          <p:cNvPr id="4" name="Segnaposto intestazione 3"/>
+          <p:cNvSpPr>
+            <a:spLocks noGrp="1"/>
+          </p:cNvSpPr>
+          <p:nvPr>
+            <p:ph type="hdr" sz="quarter" idx="10"/>
+          </p:nvPr>
+        </p:nvSpPr>
+        <p:spPr/>
+        <p:txBody>
+          <a:bodyPr/>
+          <a:lstStyle/>
+          <a:p>
+            <a:r>
+              <a:rPr lang="en-US" altLang="nl-NL" smtClean="0"/>
+              <a:t>Process synchronization</a:t>
+            </a:r>
+            <a:endParaRPr lang="en-US" altLang="nl-NL"/>
+          </a:p>
+        </p:txBody>
+      </p:sp>
+      <p:sp>
+        <p:nvSpPr>
+          <p:cNvPr id="5" name="Segnaposto data 4"/>
+          <p:cNvSpPr>
+            <a:spLocks noGrp="1"/>
+          </p:cNvSpPr>
+          <p:nvPr>
+            <p:ph type="dt" idx="11"/>
+          </p:nvPr>
+        </p:nvSpPr>
+        <p:spPr/>
+        <p:txBody>
+          <a:bodyPr/>
+          <a:lstStyle/>
+          <a:p>
+            <a:r>
+              <a:rPr lang="en-US" altLang="nl-NL" smtClean="0"/>
+              <a:t>Operating System</a:t>
+            </a:r>
+            <a:endParaRPr lang="en-US" altLang="nl-NL"/>
+          </a:p>
+        </p:txBody>
+      </p:sp>
+      <p:sp>
+        <p:nvSpPr>
+          <p:cNvPr id="6" name="Segnaposto piè di pagina 5"/>
+          <p:cNvSpPr>
+            <a:spLocks noGrp="1"/>
+          </p:cNvSpPr>
+          <p:nvPr>
+            <p:ph type="ftr" sz="quarter" idx="12"/>
+          </p:nvPr>
+        </p:nvSpPr>
+        <p:spPr/>
+        <p:txBody>
+          <a:bodyPr/>
+          <a:lstStyle/>
+          <a:p>
+            <a:r>
+              <a:rPr lang="en-US" altLang="nl-NL" smtClean="0"/>
+              <a:t>© 2005 William Fornaciari</a:t>
+            </a:r>
+            <a:endParaRPr lang="en-US" altLang="nl-NL"/>
+          </a:p>
+        </p:txBody>
+      </p:sp>
+      <p:sp>
+        <p:nvSpPr>
+          <p:cNvPr id="7" name="Segnaposto numero diapositiva 6"/>
+          <p:cNvSpPr>
+            <a:spLocks noGrp="1"/>
+          </p:cNvSpPr>
+          <p:nvPr>
+            <p:ph type="sldNum" sz="quarter" idx="13"/>
+          </p:nvPr>
+        </p:nvSpPr>
+        <p:spPr/>
+        <p:txBody>
+          <a:bodyPr/>
+          <a:lstStyle/>
+          <a:p>
+            <a:fld id="{88C0D9CF-78A8-4FBE-960E-41C6F5A4AF95}" type="slidenum">
+              <a:rPr lang="en-US" altLang="nl-NL" smtClean="0"/>
+              <a:pPr/>
+              <a:t>19</a:t>
+            </a:fld>
+            <a:endParaRPr lang="en-US" altLang="nl-NL"/>
+          </a:p>
+        </p:txBody>
+      </p:sp>
+    </p:spTree>
+    <p:extLst>
+      <p:ext uri="{BB962C8B-B14F-4D97-AF65-F5344CB8AC3E}">
+        <p14:creationId xmlns:p14="http://schemas.microsoft.com/office/powerpoint/2010/main" val="1645933681"/>
       </p:ext>
     </p:extLst>
   </p:cSld>
@@ -6140,7 +6320,6 @@
               <a:rPr lang="it-IT" sz="2400" dirty="0"/>
               <a:t>Conclusioni e sviluppi futuri</a:t>
             </a:r>
-            <a:endParaRPr lang="it-IT" sz="2400" dirty="0"/>
           </a:p>
         </p:txBody>
       </p:sp>
@@ -6718,7 +6897,11 @@
             </a:r>
             <a:r>
               <a:rPr lang="it-IT" sz="2000" i="1" dirty="0" smtClean="0"/>
-              <a:t>24KHz</a:t>
+              <a:t>24kHz</a:t>
+            </a:r>
+            <a:r>
+              <a:rPr lang="it-IT" sz="2000" i="1" dirty="0" smtClean="0"/>
+              <a:t/>
             </a:r>
             <a:br>
               <a:rPr lang="it-IT" sz="2000" i="1" dirty="0" smtClean="0"/>
@@ -6749,6 +6932,10 @@
               <a:rPr lang="it-IT" sz="2000" i="1" dirty="0" smtClean="0"/>
               <a:t>30MHz</a:t>
             </a:r>
+            <a:r>
+              <a:rPr lang="it-IT" sz="2000" i="1" dirty="0" smtClean="0"/>
+              <a:t/>
+            </a:r>
             <a:br>
               <a:rPr lang="it-IT" sz="2000" i="1" dirty="0" smtClean="0"/>
             </a:br>
@@ -6801,7 +6988,6 @@
               <a:rPr lang="it-IT" sz="2000" dirty="0" smtClean="0"/>
               <a:t>del tono fondamentale dal FFT</a:t>
             </a:r>
-            <a:endParaRPr lang="it-IT" sz="2000" dirty="0" smtClean="0"/>
           </a:p>
         </p:txBody>
       </p:sp>
@@ -6931,7 +7117,7 @@
         </p:nvSpPr>
         <p:spPr>
           <a:xfrm>
-            <a:off x="609600" y="1143000"/>
+            <a:off x="609600" y="903087"/>
             <a:ext cx="7772400" cy="5286375"/>
           </a:xfrm>
         </p:spPr>
@@ -6939,6 +7125,11 @@
           <a:bodyPr/>
           <a:lstStyle/>
           <a:p>
+            <a:pPr>
+              <a:lnSpc>
+                <a:spcPct val="200000"/>
+              </a:lnSpc>
+            </a:pPr>
             <a:r>
               <a:rPr lang="it-IT" sz="2400" dirty="0"/>
               <a:t>Le funzionalità </a:t>
@@ -6947,10 +7138,6 @@
               <a:rPr lang="it-IT" sz="2400" dirty="0" smtClean="0"/>
               <a:t>svolte dal microcontrollore sono: </a:t>
             </a:r>
-            <a:br>
-              <a:rPr lang="it-IT" sz="2400" dirty="0" smtClean="0"/>
-            </a:br>
-            <a:endParaRPr lang="it-IT" sz="2400" dirty="0" smtClean="0"/>
           </a:p>
           <a:p>
             <a:pPr lvl="1"/>
@@ -6972,23 +7159,15 @@
             </a:r>
             <a:r>
               <a:rPr lang="it-IT" sz="2000" b="1" dirty="0" smtClean="0"/>
-              <a:t>Fast </a:t>
-            </a:r>
-            <a:r>
-              <a:rPr lang="it-IT" sz="2000" b="1" dirty="0"/>
-              <a:t>Fourier </a:t>
-            </a:r>
-            <a:r>
-              <a:rPr lang="it-IT" sz="2000" b="1" dirty="0" err="1" smtClean="0"/>
-              <a:t>Transform</a:t>
-            </a:r>
-            <a:r>
-              <a:rPr lang="it-IT" sz="2000" b="1" dirty="0" smtClean="0"/>
-              <a:t> </a:t>
+              <a:t>FFT</a:t>
             </a:r>
             <a:r>
               <a:rPr lang="it-IT" sz="2000" dirty="0" smtClean="0"/>
-              <a:t>(IFFT)</a:t>
+              <a:t> (IFFT</a:t>
+            </a:r>
+            <a:r>
+              <a:rPr lang="it-IT" sz="2000" dirty="0" smtClean="0"/>
+              <a:t>)</a:t>
             </a:r>
             <a:br>
               <a:rPr lang="it-IT" sz="2000" dirty="0" smtClean="0"/>
@@ -7033,6 +7212,12 @@
               <a:buNone/>
             </a:pPr>
             <a:endParaRPr lang="it-IT" sz="2000" dirty="0"/>
+          </a:p>
+          <a:p>
+            <a:pPr marL="457200" lvl="1" indent="0">
+              <a:buNone/>
+            </a:pPr>
+            <a:endParaRPr lang="it-IT" sz="2000" dirty="0" smtClean="0"/>
           </a:p>
           <a:p>
             <a:pPr marL="457200" lvl="1" indent="0">
@@ -7106,7 +7291,7 @@
             </p:nvSpPr>
             <p:spPr>
               <a:xfrm>
-                <a:off x="5546043" y="5455607"/>
+                <a:off x="5658580" y="5270549"/>
                 <a:ext cx="2503457" cy="733855"/>
               </a:xfrm>
               <a:prstGeom prst="rect">
@@ -7263,7 +7448,7 @@
             </p:nvSpPr>
             <p:spPr>
               <a:xfrm>
-                <a:off x="5546043" y="5455607"/>
+                <a:off x="5658580" y="5270549"/>
                 <a:ext cx="2503457" cy="733855"/>
               </a:xfrm>
               <a:prstGeom prst="rect">
@@ -7313,8 +7498,8 @@
         </p:blipFill>
         <p:spPr>
           <a:xfrm>
-            <a:off x="2809049" y="2662808"/>
-            <a:ext cx="3373502" cy="2552320"/>
+            <a:off x="2698318" y="2452200"/>
+            <a:ext cx="3594964" cy="2719873"/>
           </a:xfrm>
           <a:prstGeom prst="rect">
             <a:avLst/>
@@ -7548,7 +7733,6 @@
               <a:rPr lang="it-IT" sz="2400" dirty="0"/>
               <a:t>Conclusioni e sviluppi futuri</a:t>
             </a:r>
-            <a:endParaRPr lang="it-IT" sz="2400" dirty="0"/>
           </a:p>
         </p:txBody>
       </p:sp>
@@ -7630,11 +7814,7 @@
           <a:p>
             <a:r>
               <a:rPr lang="it-IT" dirty="0" smtClean="0"/>
-              <a:t>Risultati </a:t>
-            </a:r>
-            <a:r>
-              <a:rPr lang="it-IT" dirty="0" smtClean="0"/>
-              <a:t>sperimentali (1)</a:t>
+              <a:t>Risultati sperimentali (1)</a:t>
             </a:r>
             <a:endParaRPr lang="it-IT" dirty="0"/>
           </a:p>
@@ -7812,11 +7992,7 @@
           <a:p>
             <a:r>
               <a:rPr lang="it-IT" dirty="0" smtClean="0"/>
-              <a:t>Risultati </a:t>
-            </a:r>
-            <a:r>
-              <a:rPr lang="it-IT" dirty="0" smtClean="0"/>
-              <a:t>sperimentali (2)</a:t>
+              <a:t>Risultati sperimentali (2)</a:t>
             </a:r>
             <a:endParaRPr lang="it-IT" dirty="0"/>
           </a:p>
@@ -7839,14 +8015,7 @@
           <a:p>
             <a:r>
               <a:rPr lang="it-IT" sz="2400" dirty="0" smtClean="0"/>
-              <a:t>Prove con la versione finale dello strumento:</a:t>
-            </a:r>
-          </a:p>
-          <a:p>
-            <a:pPr lvl="1"/>
-            <a:r>
-              <a:rPr lang="it-IT" sz="2000" dirty="0" smtClean="0"/>
-              <a:t>Risultati con immagini</a:t>
+              <a:t>TODO</a:t>
             </a:r>
             <a:endParaRPr lang="it-IT" sz="2000" dirty="0"/>
           </a:p>
@@ -7930,11 +8099,7 @@
           <a:p>
             <a:r>
               <a:rPr lang="it-IT" dirty="0" smtClean="0"/>
-              <a:t>Risultati </a:t>
-            </a:r>
-            <a:r>
-              <a:rPr lang="it-IT" dirty="0" smtClean="0"/>
-              <a:t>sperimentali (3)</a:t>
+              <a:t>Risultati sperimentali (3)</a:t>
             </a:r>
             <a:endParaRPr lang="it-IT" dirty="0"/>
           </a:p>
@@ -7957,14 +8122,7 @@
           <a:p>
             <a:r>
               <a:rPr lang="it-IT" sz="2400" dirty="0" smtClean="0"/>
-              <a:t>Prove con la versione finale dello strumento:</a:t>
-            </a:r>
-          </a:p>
-          <a:p>
-            <a:pPr lvl="1"/>
-            <a:r>
-              <a:rPr lang="it-IT" sz="2000" dirty="0" smtClean="0"/>
-              <a:t>Risultati con immagini</a:t>
+              <a:t>TODO</a:t>
             </a:r>
             <a:endParaRPr lang="it-IT" sz="2000" dirty="0"/>
           </a:p>
@@ -8054,25 +8212,367 @@
           </a:p>
         </p:txBody>
       </p:sp>
-      <p:sp>
-        <p:nvSpPr>
-          <p:cNvPr id="3" name="Segnaposto contenuto 2"/>
-          <p:cNvSpPr>
-            <a:spLocks noGrp="1"/>
-          </p:cNvSpPr>
-          <p:nvPr>
-            <p:ph idx="1"/>
-          </p:nvPr>
-        </p:nvSpPr>
-        <p:spPr/>
-        <p:txBody>
-          <a:bodyPr/>
-          <a:lstStyle/>
-          <a:p>
-            <a:endParaRPr lang="it-IT" sz="2000" dirty="0"/>
-          </a:p>
-        </p:txBody>
-      </p:sp>
+      <mc:AlternateContent xmlns:mc="http://schemas.openxmlformats.org/markup-compatibility/2006">
+        <mc:Choice xmlns:a14="http://schemas.microsoft.com/office/drawing/2010/main" Requires="a14">
+          <p:sp>
+            <p:nvSpPr>
+              <p:cNvPr id="3" name="Segnaposto contenuto 2"/>
+              <p:cNvSpPr>
+                <a:spLocks noGrp="1"/>
+              </p:cNvSpPr>
+              <p:nvPr>
+                <p:ph idx="1"/>
+              </p:nvPr>
+            </p:nvSpPr>
+            <p:spPr>
+              <a:xfrm>
+                <a:off x="609600" y="1298376"/>
+                <a:ext cx="7805738" cy="4718447"/>
+              </a:xfrm>
+            </p:spPr>
+            <p:txBody>
+              <a:bodyPr/>
+              <a:lstStyle/>
+              <a:p>
+                <a:r>
+                  <a:rPr lang="it-IT" sz="2400" dirty="0" smtClean="0"/>
+                  <a:t>Range spaziale di misura: </a:t>
+                </a:r>
+                <a:r>
+                  <a:rPr lang="it-IT" sz="2400" b="1" dirty="0" smtClean="0"/>
+                  <a:t>10 cm </a:t>
+                </a:r>
+                <a:r>
+                  <a:rPr lang="it-IT" sz="2400" b="1" dirty="0"/>
+                  <a:t>÷ </a:t>
+                </a:r>
+                <a:r>
+                  <a:rPr lang="it-IT" sz="2400" b="1" dirty="0" smtClean="0"/>
+                  <a:t>100 cm</a:t>
+                </a:r>
+                <a:br>
+                  <a:rPr lang="it-IT" sz="2400" b="1" dirty="0" smtClean="0"/>
+                </a:br>
+                <a:endParaRPr lang="it-IT" sz="2400" dirty="0" smtClean="0"/>
+              </a:p>
+              <a:p>
+                <a:r>
+                  <a:rPr lang="it-IT" sz="2200" dirty="0" smtClean="0"/>
+                  <a:t>Incertezza relativa di misura</a:t>
+                </a:r>
+                <a:r>
+                  <a:rPr lang="it-IT" sz="2200" dirty="0" smtClean="0">
+                    <a:latin typeface="+mj-lt"/>
+                  </a:rPr>
+                  <a:t>: </a:t>
+                </a:r>
+                <a:r>
+                  <a:rPr lang="it-IT" sz="2200" b="1" dirty="0" smtClean="0">
+                    <a:latin typeface="+mj-lt"/>
+                  </a:rPr>
+                  <a:t>2 </a:t>
+                </a:r>
+                <a:r>
+                  <a:rPr lang="it-IT" sz="2200" b="1" dirty="0" smtClean="0"/>
+                  <a:t>* </a:t>
+                </a:r>
+                <a14:m>
+                  <m:oMath xmlns:m="http://schemas.openxmlformats.org/officeDocument/2006/math">
+                    <m:sSup>
+                      <m:sSupPr>
+                        <m:ctrlPr>
+                          <a:rPr lang="it-IT" sz="2200" b="1" i="1">
+                            <a:latin typeface="Cambria Math" charset="0"/>
+                            <a:ea typeface="Lucida Grande" charset="0"/>
+                            <a:cs typeface="Lucida Grande" charset="0"/>
+                          </a:rPr>
+                        </m:ctrlPr>
+                      </m:sSupPr>
+                      <m:e>
+                        <m:r>
+                          <m:rPr>
+                            <m:nor/>
+                          </m:rPr>
+                          <a:rPr lang="it-IT" sz="2200" b="1">
+                            <a:ea typeface="Lucida Grande" charset="0"/>
+                            <a:cs typeface="Lucida Grande" charset="0"/>
+                          </a:rPr>
+                          <m:t>10</m:t>
+                        </m:r>
+                      </m:e>
+                      <m:sup>
+                        <m:r>
+                          <m:rPr>
+                            <m:nor/>
+                          </m:rPr>
+                          <a:rPr lang="it-IT" sz="2200" b="1">
+                            <a:ea typeface="Lucida Grande" charset="0"/>
+                            <a:cs typeface="Lucida Grande" charset="0"/>
+                          </a:rPr>
+                          <m:t>−4</m:t>
+                        </m:r>
+                      </m:sup>
+                    </m:sSup>
+                  </m:oMath>
+                </a14:m>
+                <a:r>
+                  <a:rPr lang="it-IT" sz="2200" b="1" dirty="0" smtClean="0"/>
+                  <a:t> ÷ 8 * </a:t>
+                </a:r>
+                <a14:m>
+                  <m:oMath xmlns:m="http://schemas.openxmlformats.org/officeDocument/2006/math">
+                    <m:sSup>
+                      <m:sSupPr>
+                        <m:ctrlPr>
+                          <a:rPr lang="it-IT" sz="2200" b="1" i="1">
+                            <a:latin typeface="+mj-lt"/>
+                            <a:ea typeface="Lucida Grande" charset="0"/>
+                            <a:cs typeface="Lucida Grande" charset="0"/>
+                          </a:rPr>
+                        </m:ctrlPr>
+                      </m:sSupPr>
+                      <m:e>
+                        <m:r>
+                          <m:rPr>
+                            <m:nor/>
+                          </m:rPr>
+                          <a:rPr lang="it-IT" sz="2200" b="1" i="0">
+                            <a:latin typeface="+mj-lt"/>
+                            <a:ea typeface="Lucida Grande" charset="0"/>
+                            <a:cs typeface="Lucida Grande" charset="0"/>
+                          </a:rPr>
+                          <m:t>10</m:t>
+                        </m:r>
+                      </m:e>
+                      <m:sup>
+                        <m:r>
+                          <m:rPr>
+                            <m:nor/>
+                          </m:rPr>
+                          <a:rPr lang="it-IT" sz="2200" b="1" i="0">
+                            <a:latin typeface="+mj-lt"/>
+                            <a:ea typeface="Lucida Grande" charset="0"/>
+                            <a:cs typeface="Lucida Grande" charset="0"/>
+                          </a:rPr>
+                          <m:t>-4</m:t>
+                        </m:r>
+                      </m:sup>
+                    </m:sSup>
+                  </m:oMath>
+                </a14:m>
+                <a:endParaRPr lang="it-IT" sz="2200" b="1" dirty="0">
+                  <a:latin typeface="+mj-lt"/>
+                  <a:ea typeface="Lucida Grande" charset="0"/>
+                  <a:cs typeface="Lucida Grande" charset="0"/>
+                </a:endParaRPr>
+              </a:p>
+              <a:p>
+                <a:pPr lvl="1"/>
+                <a:r>
+                  <a:rPr lang="it-IT" sz="2000" b="1" dirty="0" smtClean="0"/>
+                  <a:t>20÷80um </a:t>
+                </a:r>
+                <a:r>
+                  <a:rPr lang="it-IT" sz="2000" b="1" dirty="0"/>
+                  <a:t>a 10cm</a:t>
+                </a:r>
+              </a:p>
+              <a:p>
+                <a:pPr lvl="1"/>
+                <a:r>
+                  <a:rPr lang="it-IT" sz="2000" b="1" dirty="0" smtClean="0"/>
+                  <a:t>200÷800um </a:t>
+                </a:r>
+                <a:r>
+                  <a:rPr lang="it-IT" sz="2000" b="1" dirty="0"/>
+                  <a:t>a </a:t>
+                </a:r>
+                <a:r>
+                  <a:rPr lang="it-IT" sz="2000" b="1" dirty="0" smtClean="0"/>
+                  <a:t>100cm</a:t>
+                </a:r>
+              </a:p>
+              <a:p>
+                <a:pPr lvl="1"/>
+                <a:endParaRPr lang="it-IT" sz="1600" b="1" dirty="0" smtClean="0">
+                  <a:latin typeface="+mj-lt"/>
+                </a:endParaRPr>
+              </a:p>
+              <a:p>
+                <a:r>
+                  <a:rPr lang="it-IT" sz="2400" dirty="0" smtClean="0"/>
+                  <a:t>Frequenza </a:t>
+                </a:r>
+                <a:r>
+                  <a:rPr lang="it-IT" sz="2400" i="1" dirty="0" smtClean="0"/>
+                  <a:t>massima</a:t>
+                </a:r>
+                <a:r>
+                  <a:rPr lang="it-IT" sz="2400" dirty="0" smtClean="0"/>
+                  <a:t> </a:t>
+                </a:r>
+                <a:r>
+                  <a:rPr lang="it-IT" sz="2400" dirty="0"/>
+                  <a:t>di misura</a:t>
+                </a:r>
+                <a:r>
+                  <a:rPr lang="it-IT" sz="2400" dirty="0" smtClean="0"/>
+                  <a:t>: </a:t>
+                </a:r>
+                <a:br>
+                  <a:rPr lang="it-IT" sz="2400" dirty="0" smtClean="0"/>
+                </a:br>
+                <a:r>
+                  <a:rPr lang="it-IT" sz="2400" dirty="0" smtClean="0"/>
+                  <a:t>1 misura valida ogni </a:t>
+                </a:r>
+                <a:r>
+                  <a:rPr lang="it-IT" sz="2400" b="1" dirty="0" smtClean="0"/>
+                  <a:t>208us </a:t>
+                </a:r>
+                <a:r>
+                  <a:rPr lang="it-IT" sz="2400" dirty="0" smtClean="0"/>
+                  <a:t>(</a:t>
+                </a:r>
+                <a:r>
+                  <a:rPr lang="it-IT" sz="2400" i="1" dirty="0" smtClean="0"/>
+                  <a:t>4.8 kHz</a:t>
+                </a:r>
+                <a:r>
+                  <a:rPr lang="it-IT" sz="2400" dirty="0" smtClean="0"/>
+                  <a:t>)</a:t>
+                </a:r>
+              </a:p>
+              <a:p>
+                <a:endParaRPr lang="it-IT" sz="2000" dirty="0">
+                  <a:latin typeface="+mj-lt"/>
+                </a:endParaRPr>
+              </a:p>
+              <a:p>
+                <a:r>
+                  <a:rPr lang="it-IT" sz="2400" dirty="0" smtClean="0">
+                    <a:latin typeface="+mj-lt"/>
+                  </a:rPr>
+                  <a:t>Frequenza</a:t>
+                </a:r>
+                <a:r>
+                  <a:rPr lang="it-IT" sz="2400" i="1" dirty="0" smtClean="0">
+                    <a:latin typeface="+mj-lt"/>
+                  </a:rPr>
+                  <a:t> reale </a:t>
+                </a:r>
+                <a:r>
+                  <a:rPr lang="it-IT" sz="2400" dirty="0" smtClean="0">
+                    <a:latin typeface="+mj-lt"/>
+                  </a:rPr>
+                  <a:t>di misura:</a:t>
+                </a:r>
+                <a:br>
+                  <a:rPr lang="it-IT" sz="2400" dirty="0" smtClean="0">
+                    <a:latin typeface="+mj-lt"/>
+                  </a:rPr>
+                </a:br>
+                <a:r>
+                  <a:rPr lang="it-IT" sz="2400" dirty="0" smtClean="0">
+                    <a:latin typeface="+mj-lt"/>
+                  </a:rPr>
+                  <a:t>1 </a:t>
+                </a:r>
+                <a:r>
+                  <a:rPr lang="it-IT" sz="2400" dirty="0">
+                    <a:latin typeface="+mj-lt"/>
+                  </a:rPr>
+                  <a:t>misura valida ogni </a:t>
+                </a:r>
+                <a:r>
+                  <a:rPr lang="it-IT" sz="2400" b="1" dirty="0" smtClean="0">
+                    <a:latin typeface="+mj-lt"/>
+                  </a:rPr>
+                  <a:t>20ms</a:t>
+                </a:r>
+                <a:r>
+                  <a:rPr lang="it-IT" sz="2400" dirty="0" smtClean="0">
+                    <a:latin typeface="+mj-lt"/>
+                  </a:rPr>
+                  <a:t> (</a:t>
+                </a:r>
+                <a:r>
+                  <a:rPr lang="it-IT" sz="2400" i="1" dirty="0" smtClean="0">
+                    <a:latin typeface="+mj-lt"/>
+                  </a:rPr>
+                  <a:t>50 Hz</a:t>
+                </a:r>
+                <a:r>
+                  <a:rPr lang="it-IT" sz="2400" dirty="0">
+                    <a:latin typeface="+mj-lt"/>
+                  </a:rPr>
+                  <a:t>)</a:t>
+                </a:r>
+              </a:p>
+              <a:p>
+                <a:endParaRPr lang="it-IT" sz="2000" dirty="0" smtClean="0">
+                  <a:latin typeface="+mj-lt"/>
+                </a:endParaRPr>
+              </a:p>
+              <a:p>
+                <a:pPr marL="457200" lvl="1" indent="0">
+                  <a:buNone/>
+                </a:pPr>
+                <a:endParaRPr lang="it-IT" sz="1600" b="1" dirty="0" smtClean="0"/>
+              </a:p>
+              <a:p>
+                <a:pPr lvl="1"/>
+                <a:endParaRPr lang="it-IT" sz="1600" b="1" dirty="0" smtClean="0">
+                  <a:latin typeface="+mj-lt"/>
+                </a:endParaRPr>
+              </a:p>
+              <a:p>
+                <a:pPr lvl="1"/>
+                <a:endParaRPr lang="it-IT" sz="1600" b="1" dirty="0">
+                  <a:latin typeface="+mj-lt"/>
+                </a:endParaRPr>
+              </a:p>
+            </p:txBody>
+          </p:sp>
+        </mc:Choice>
+        <mc:Fallback>
+          <p:sp>
+            <p:nvSpPr>
+              <p:cNvPr id="3" name="Segnaposto contenuto 2"/>
+              <p:cNvSpPr>
+                <a:spLocks noGrp="1" noRot="1" noChangeAspect="1" noMove="1" noResize="1" noEditPoints="1" noAdjustHandles="1" noChangeArrowheads="1" noChangeShapeType="1" noTextEdit="1"/>
+              </p:cNvSpPr>
+              <p:nvPr>
+                <p:ph idx="1"/>
+              </p:nvPr>
+            </p:nvSpPr>
+            <p:spPr>
+              <a:xfrm>
+                <a:off x="609600" y="1298376"/>
+                <a:ext cx="7805738" cy="4718447"/>
+              </a:xfrm>
+              <a:blipFill rotWithShape="0">
+                <a:blip r:embed="rId3"/>
+                <a:stretch>
+                  <a:fillRect l="-1094" t="-1421"/>
+                </a:stretch>
+              </a:blipFill>
+            </p:spPr>
+            <p:txBody>
+              <a:bodyPr/>
+              <a:lstStyle/>
+              <a:p>
+                <a:r>
+                  <a:rPr lang="it-IT">
+                    <a:noFill/>
+                  </a:rPr>
+                  <a:t> </a:t>
+                </a:r>
+              </a:p>
+            </p:txBody>
+          </p:sp>
+        </mc:Fallback>
+      </mc:AlternateContent>
       <p:sp>
         <p:nvSpPr>
           <p:cNvPr id="4" name="Segnaposto numero diapositiva 3"/>
@@ -8094,6 +8594,32 @@
               <a:t>19</a:t>
             </a:fld>
             <a:endParaRPr lang="en-US" altLang="nl-NL"/>
+          </a:p>
+        </p:txBody>
+      </p:sp>
+      <p:sp>
+        <p:nvSpPr>
+          <p:cNvPr id="5" name="CasellaDiTesto 4"/>
+          <p:cNvSpPr txBox="1"/>
+          <p:nvPr/>
+        </p:nvSpPr>
+        <p:spPr>
+          <a:xfrm>
+            <a:off x="-200025" y="2686050"/>
+            <a:ext cx="184731" cy="461665"/>
+          </a:xfrm>
+          <a:prstGeom prst="rect">
+            <a:avLst/>
+          </a:prstGeom>
+          <a:noFill/>
+        </p:spPr>
+        <p:txBody>
+          <a:bodyPr wrap="none" rtlCol="0">
+            <a:spAutoFit/>
+          </a:bodyPr>
+          <a:lstStyle/>
+          <a:p>
+            <a:endParaRPr lang="it-IT" dirty="0"/>
           </a:p>
         </p:txBody>
       </p:sp>
@@ -8254,7 +8780,6 @@
               <a:rPr lang="it-IT" sz="2400" dirty="0"/>
               <a:t>Conclusioni e sviluppi futuri</a:t>
             </a:r>
-            <a:endParaRPr lang="it-IT" sz="2400" dirty="0"/>
           </a:p>
         </p:txBody>
       </p:sp>
@@ -8516,7 +9041,6 @@
               <a:rPr lang="it-IT" sz="2400" dirty="0"/>
               <a:t>Conclusioni e sviluppi futuri</a:t>
             </a:r>
-            <a:endParaRPr lang="it-IT" sz="2400" dirty="0"/>
           </a:p>
         </p:txBody>
       </p:sp>
@@ -10729,7 +11253,6 @@
               <a:rPr lang="it-IT" sz="2400" dirty="0"/>
               <a:t>Conclusioni e sviluppi futuri</a:t>
             </a:r>
-            <a:endParaRPr lang="it-IT" sz="2400" dirty="0"/>
           </a:p>
         </p:txBody>
       </p:sp>

</xml_diff>

<commit_message>
changed FPGA software image
Signed-off-by: Diego Rondelli <diego.rondelli@mail.polimi.it>
</commit_message>
<xml_diff>
--- a/presentazione_discussione.pptx
+++ b/presentazione_discussione.pptx
@@ -23,9 +23,9 @@
     <p:sldId id="286" r:id="rId14"/>
     <p:sldId id="308" r:id="rId15"/>
     <p:sldId id="289" r:id="rId16"/>
-    <p:sldId id="290" r:id="rId17"/>
-    <p:sldId id="291" r:id="rId18"/>
-    <p:sldId id="305" r:id="rId19"/>
+    <p:sldId id="305" r:id="rId17"/>
+    <p:sldId id="290" r:id="rId18"/>
+    <p:sldId id="291" r:id="rId19"/>
     <p:sldId id="306" r:id="rId20"/>
     <p:sldId id="309" r:id="rId21"/>
     <p:sldId id="294" r:id="rId22"/>
@@ -415,7 +415,7 @@
             <a:fld id="{09D1D7E3-DE3F-4B7A-BF5B-A3735BF12F5F}" type="slidenum">
               <a:rPr lang="en-US" altLang="nl-NL"/>
               <a:pPr/>
-              <a:t>‹n.›</a:t>
+              <a:t>‹N›</a:t>
             </a:fld>
             <a:endParaRPr lang="en-US" altLang="nl-NL"/>
           </a:p>
@@ -754,7 +754,7 @@
             <a:fld id="{88C0D9CF-78A8-4FBE-960E-41C6F5A4AF95}" type="slidenum">
               <a:rPr lang="en-US" altLang="nl-NL"/>
               <a:pPr/>
-              <a:t>‹n.›</a:t>
+              <a:t>‹N›</a:t>
             </a:fld>
             <a:endParaRPr lang="en-US" altLang="nl-NL"/>
           </a:p>
@@ -2359,7 +2359,7 @@
             <a:fld id="{88C0D9CF-78A8-4FBE-960E-41C6F5A4AF95}" type="slidenum">
               <a:rPr lang="en-US" altLang="nl-NL" smtClean="0"/>
               <a:pPr/>
-              <a:t>13</a:t>
+              <a:t>14</a:t>
             </a:fld>
             <a:endParaRPr lang="en-US" altLang="nl-NL"/>
           </a:p>
@@ -3345,7 +3345,7 @@
             <a:fld id="{2A6090BC-14A4-4032-A8EA-D874EB653524}" type="slidenum">
               <a:rPr lang="en-US" altLang="nl-NL"/>
               <a:pPr/>
-              <a:t>‹n.›</a:t>
+              <a:t>‹N›</a:t>
             </a:fld>
             <a:endParaRPr lang="en-US" altLang="nl-NL"/>
           </a:p>
@@ -3493,7 +3493,7 @@
             <a:fld id="{BA594880-8A78-40E1-8D62-51F97D4059C0}" type="slidenum">
               <a:rPr lang="en-US" altLang="nl-NL"/>
               <a:pPr/>
-              <a:t>‹n.›</a:t>
+              <a:t>‹N›</a:t>
             </a:fld>
             <a:endParaRPr lang="en-US" altLang="nl-NL"/>
           </a:p>
@@ -3678,7 +3678,7 @@
             <a:fld id="{C503DA3A-0C6B-48FC-931E-2C786AAFD5C1}" type="slidenum">
               <a:rPr lang="en-US" altLang="nl-NL"/>
               <a:pPr/>
-              <a:t>‹n.›</a:t>
+              <a:t>‹N›</a:t>
             </a:fld>
             <a:endParaRPr lang="en-US" altLang="nl-NL"/>
           </a:p>
@@ -3868,7 +3868,7 @@
             <a:fld id="{22038E9A-44DA-4A7D-8119-4DEABABB9975}" type="slidenum">
               <a:rPr lang="en-US" altLang="nl-NL"/>
               <a:pPr/>
-              <a:t>‹n.›</a:t>
+              <a:t>‹N›</a:t>
             </a:fld>
             <a:endParaRPr lang="en-US" altLang="nl-NL"/>
           </a:p>
@@ -4124,7 +4124,7 @@
             <a:fld id="{003F0B5A-3573-418F-94B3-BD5F75DB60BD}" type="slidenum">
               <a:rPr lang="en-US" altLang="nl-NL"/>
               <a:pPr/>
-              <a:t>‹n.›</a:t>
+              <a:t>‹N›</a:t>
             </a:fld>
             <a:endParaRPr lang="en-US" altLang="nl-NL"/>
           </a:p>
@@ -4519,7 +4519,7 @@
             <a:fld id="{42D42EED-7338-48C6-AA31-2E9FCA4532B1}" type="slidenum">
               <a:rPr lang="en-US" altLang="nl-NL"/>
               <a:pPr/>
-              <a:t>‹n.›</a:t>
+              <a:t>‹N›</a:t>
             </a:fld>
             <a:endParaRPr lang="en-US" altLang="nl-NL"/>
           </a:p>
@@ -4605,7 +4605,7 @@
             <a:fld id="{BBD7032E-400A-4C6B-9075-7A7CB7960EE8}" type="slidenum">
               <a:rPr lang="en-US" altLang="nl-NL"/>
               <a:pPr/>
-              <a:t>‹n.›</a:t>
+              <a:t>‹N›</a:t>
             </a:fld>
             <a:endParaRPr lang="en-US" altLang="nl-NL"/>
           </a:p>
@@ -4668,7 +4668,7 @@
             <a:fld id="{ED3AC776-BC4C-444F-A902-0153286FE118}" type="slidenum">
               <a:rPr lang="en-US" altLang="nl-NL"/>
               <a:pPr/>
-              <a:t>‹n.›</a:t>
+              <a:t>‹N›</a:t>
             </a:fld>
             <a:endParaRPr lang="en-US" altLang="nl-NL"/>
           </a:p>
@@ -4913,7 +4913,7 @@
             <a:fld id="{E5F65DD3-3E3C-40FA-A044-BE029E819A96}" type="slidenum">
               <a:rPr lang="en-US" altLang="nl-NL"/>
               <a:pPr/>
-              <a:t>‹n.›</a:t>
+              <a:t>‹N›</a:t>
             </a:fld>
             <a:endParaRPr lang="en-US" altLang="nl-NL"/>
           </a:p>
@@ -5139,7 +5139,7 @@
             <a:fld id="{D32360F0-7900-4280-B4D3-DB562730877F}" type="slidenum">
               <a:rPr lang="en-US" altLang="nl-NL"/>
               <a:pPr/>
-              <a:t>‹n.›</a:t>
+              <a:t>‹N›</a:t>
             </a:fld>
             <a:endParaRPr lang="en-US" altLang="nl-NL"/>
           </a:p>
@@ -5483,7 +5483,7 @@
             <a:fld id="{D11F1AE1-4445-46D7-BD14-4F1456A53146}" type="slidenum">
               <a:rPr lang="en-US" altLang="nl-NL"/>
               <a:pPr/>
-              <a:t>‹n.›</a:t>
+              <a:t>‹N›</a:t>
             </a:fld>
             <a:endParaRPr lang="en-US" altLang="nl-NL"/>
           </a:p>
@@ -7431,11 +7431,7 @@
             <a:pPr algn="ctr"/>
             <a:r>
               <a:rPr lang="it-IT" sz="2000" dirty="0" smtClean="0"/>
-              <a:t>Sistema </a:t>
-            </a:r>
-            <a:r>
-              <a:rPr lang="it-IT" sz="2000" dirty="0" smtClean="0"/>
-              <a:t>di conversione</a:t>
+              <a:t>Sistema di conversione</a:t>
             </a:r>
             <a:endParaRPr lang="it-IT" sz="2000" dirty="0"/>
           </a:p>
@@ -8323,7 +8319,7 @@
           <a:p>
             <a:r>
               <a:rPr lang="it-IT" dirty="0" smtClean="0"/>
-              <a:t>FPGA</a:t>
+              <a:t>Dettagli implementativi</a:t>
             </a:r>
             <a:endParaRPr lang="it-IT" dirty="0"/>
           </a:p>
@@ -8341,8 +8337,8 @@
         </p:nvSpPr>
         <p:spPr>
           <a:xfrm>
-            <a:off x="609600" y="1024102"/>
-            <a:ext cx="8120063" cy="5093494"/>
+            <a:off x="609600" y="1057274"/>
+            <a:ext cx="7648575" cy="5186363"/>
           </a:xfrm>
         </p:spPr>
         <p:txBody>
@@ -8350,128 +8346,150 @@
           <a:lstStyle/>
           <a:p>
             <a:r>
+              <a:rPr lang="it-IT" sz="2400" dirty="0"/>
+              <a:t>Ambiente di sviluppo: </a:t>
+            </a:r>
+            <a:r>
+              <a:rPr lang="it-IT" sz="2400" b="1" dirty="0"/>
+              <a:t>NI </a:t>
+            </a:r>
+            <a:r>
+              <a:rPr lang="it-IT" sz="2400" b="1" dirty="0" err="1"/>
+              <a:t>LabVIEW</a:t>
+            </a:r>
+            <a:endParaRPr lang="it-IT" sz="2400" dirty="0"/>
+          </a:p>
+          <a:p>
+            <a:pPr lvl="1"/>
+            <a:r>
+              <a:rPr lang="it-IT" sz="2000" b="1" dirty="0"/>
+              <a:t>FPGA </a:t>
+            </a:r>
+            <a:r>
+              <a:rPr lang="it-IT" sz="2000" dirty="0" err="1"/>
+              <a:t>Module</a:t>
+            </a:r>
+            <a:endParaRPr lang="it-IT" sz="2000" b="1" dirty="0"/>
+          </a:p>
+          <a:p>
+            <a:pPr lvl="1"/>
+            <a:r>
+              <a:rPr lang="it-IT" sz="2000" b="1" dirty="0"/>
+              <a:t>Real-Time </a:t>
+            </a:r>
+            <a:r>
+              <a:rPr lang="it-IT" sz="2000" dirty="0" err="1" smtClean="0"/>
+              <a:t>Module</a:t>
+            </a:r>
+            <a:r>
+              <a:rPr lang="it-IT" sz="2000" dirty="0" smtClean="0"/>
+              <a:t/>
+            </a:r>
+            <a:br>
+              <a:rPr lang="it-IT" sz="2000" dirty="0" smtClean="0"/>
+            </a:br>
+            <a:endParaRPr lang="it-IT" sz="2000" b="1" dirty="0"/>
+          </a:p>
+          <a:p>
+            <a:r>
+              <a:rPr lang="it-IT" sz="2400" dirty="0"/>
+              <a:t>Struttura a cicli paralleli </a:t>
+            </a:r>
+            <a:r>
               <a:rPr lang="it-IT" sz="2400" dirty="0" smtClean="0"/>
-              <a:t>Le funzionalità svolte in hardware dal FPGA sono:</a:t>
+              <a:t>con </a:t>
+            </a:r>
+            <a:r>
+              <a:rPr lang="it-IT" sz="2400" dirty="0"/>
+              <a:t>scambio </a:t>
+            </a:r>
+            <a:r>
+              <a:rPr lang="it-IT" sz="2400" dirty="0" smtClean="0"/>
+              <a:t/>
             </a:r>
             <a:br>
               <a:rPr lang="it-IT" sz="2400" dirty="0" smtClean="0"/>
             </a:br>
-            <a:endParaRPr lang="it-IT" sz="2400" dirty="0" smtClean="0"/>
+            <a:r>
+              <a:rPr lang="it-IT" sz="2400" dirty="0" smtClean="0"/>
+              <a:t>di </a:t>
+            </a:r>
+            <a:r>
+              <a:rPr lang="it-IT" sz="2400" dirty="0"/>
+              <a:t>dati tramite code </a:t>
+            </a:r>
+            <a:r>
+              <a:rPr lang="it-IT" sz="2400" b="1" dirty="0"/>
+              <a:t>FIFO</a:t>
+            </a:r>
+            <a:endParaRPr lang="it-IT" sz="2400" dirty="0"/>
           </a:p>
           <a:p>
             <a:pPr lvl="1"/>
             <a:r>
+              <a:rPr lang="it-IT" sz="2000" dirty="0"/>
+              <a:t>Pattern </a:t>
+            </a:r>
+            <a:r>
               <a:rPr lang="it-IT" sz="2000" b="1" dirty="0" smtClean="0"/>
-              <a:t>Generazione</a:t>
-            </a:r>
-            <a:r>
-              <a:rPr lang="it-IT" sz="2000" dirty="0" smtClean="0"/>
-              <a:t> del </a:t>
+              <a:t>Producer-Consumer</a:t>
             </a:r>
             <a:br>
-              <a:rPr lang="it-IT" sz="2000" dirty="0" smtClean="0"/>
+              <a:rPr lang="it-IT" sz="2000" b="1" dirty="0" smtClean="0"/>
             </a:br>
-            <a:r>
-              <a:rPr lang="it-IT" sz="2000" dirty="0" smtClean="0"/>
-              <a:t>segnale di modulazione </a:t>
-            </a:r>
-            <a:r>
-              <a:rPr lang="it-IT" sz="2000" i="1" dirty="0" smtClean="0"/>
+            <a:endParaRPr lang="it-IT" sz="2000" dirty="0"/>
+          </a:p>
+          <a:p>
+            <a:r>
+              <a:rPr lang="it-IT" sz="2400" b="1" dirty="0"/>
+              <a:t>DMA</a:t>
+            </a:r>
+            <a:r>
+              <a:rPr lang="it-IT" sz="2400" dirty="0"/>
+              <a:t> per lo scambio di dati tra FPGA </a:t>
+            </a:r>
+            <a:r>
+              <a:rPr lang="it-IT" sz="2400" dirty="0" smtClean="0"/>
+              <a:t>e microcontrollore</a:t>
+            </a:r>
+            <a:br>
+              <a:rPr lang="it-IT" sz="2400" dirty="0" smtClean="0"/>
+            </a:br>
+            <a:endParaRPr lang="it-IT" sz="2400" dirty="0"/>
+          </a:p>
+          <a:p>
+            <a:r>
+              <a:rPr lang="it-IT" sz="2400" dirty="0"/>
+              <a:t>Aritmetica </a:t>
+            </a:r>
+            <a:r>
+              <a:rPr lang="it-IT" sz="2400" b="1" dirty="0" err="1"/>
+              <a:t>fixed</a:t>
+            </a:r>
+            <a:r>
+              <a:rPr lang="it-IT" sz="2400" b="1" dirty="0"/>
+              <a:t> </a:t>
+            </a:r>
+            <a:r>
+              <a:rPr lang="it-IT" sz="2400" b="1" dirty="0" err="1"/>
+              <a:t>point</a:t>
+            </a:r>
+            <a:r>
+              <a:rPr lang="it-IT" sz="2400" dirty="0"/>
+              <a:t> per migliorare le prestazioni su </a:t>
+            </a:r>
+            <a:r>
+              <a:rPr lang="it-IT" sz="2400" dirty="0" smtClean="0"/>
+              <a:t>FPGA</a:t>
+            </a:r>
+            <a:r>
+              <a:rPr lang="it-IT" sz="2400" dirty="0"/>
               <a:t/>
             </a:r>
             <a:br>
-              <a:rPr lang="it-IT" sz="2000" i="1" dirty="0" smtClean="0"/>
+              <a:rPr lang="it-IT" sz="2400" dirty="0"/>
             </a:br>
-            <a:endParaRPr lang="it-IT" sz="2000" i="1" dirty="0" smtClean="0"/>
-          </a:p>
-          <a:p>
-            <a:pPr lvl="1"/>
-            <a:r>
-              <a:rPr lang="it-IT" sz="2000" b="1" dirty="0" smtClean="0"/>
-              <a:t>Campionamento</a:t>
-            </a:r>
-            <a:r>
-              <a:rPr lang="it-IT" sz="2000" dirty="0" smtClean="0"/>
-              <a:t> </a:t>
-            </a:r>
-            <a:br>
-              <a:rPr lang="it-IT" sz="2000" dirty="0" smtClean="0"/>
-            </a:br>
-            <a:r>
-              <a:rPr lang="it-IT" sz="2000" dirty="0" smtClean="0"/>
-              <a:t>del segnale interferometrico </a:t>
-            </a:r>
-            <a:br>
-              <a:rPr lang="it-IT" sz="2000" dirty="0" smtClean="0"/>
-            </a:br>
-            <a:r>
-              <a:rPr lang="it-IT" sz="2000" dirty="0" smtClean="0"/>
-              <a:t>a </a:t>
-            </a:r>
-            <a:r>
-              <a:rPr lang="it-IT" sz="2000" i="1" dirty="0" smtClean="0"/>
-              <a:t>30MHz</a:t>
-            </a:r>
-            <a:br>
-              <a:rPr lang="it-IT" sz="2000" i="1" dirty="0" smtClean="0"/>
-            </a:br>
-            <a:endParaRPr lang="it-IT" sz="2000" i="1" dirty="0" smtClean="0"/>
-          </a:p>
-          <a:p>
-            <a:pPr lvl="1"/>
-            <a:r>
-              <a:rPr lang="it-IT" sz="2000" dirty="0" smtClean="0"/>
-              <a:t>Calcolo </a:t>
-            </a:r>
-            <a:br>
-              <a:rPr lang="it-IT" sz="2000" dirty="0" smtClean="0"/>
-            </a:br>
-            <a:r>
-              <a:rPr lang="it-IT" sz="2000" dirty="0" smtClean="0"/>
-              <a:t>della </a:t>
-            </a:r>
-            <a:r>
-              <a:rPr lang="it-IT" sz="2000" b="1" dirty="0" smtClean="0"/>
-              <a:t>Fast Fourier </a:t>
-            </a:r>
-            <a:r>
-              <a:rPr lang="it-IT" sz="2000" b="1" dirty="0" err="1" smtClean="0"/>
-              <a:t>Transform</a:t>
-            </a:r>
-            <a:r>
-              <a:rPr lang="it-IT" sz="2000" b="1" dirty="0" smtClean="0"/>
-              <a:t> </a:t>
-            </a:r>
-            <a:r>
-              <a:rPr lang="it-IT" sz="2000" dirty="0" smtClean="0"/>
-              <a:t>(FFT)</a:t>
-            </a:r>
-            <a:br>
-              <a:rPr lang="it-IT" sz="2000" dirty="0" smtClean="0"/>
-            </a:br>
-            <a:endParaRPr lang="it-IT" sz="2000" dirty="0" smtClean="0"/>
-          </a:p>
-          <a:p>
-            <a:pPr lvl="1"/>
-            <a:r>
-              <a:rPr lang="it-IT" sz="2000" dirty="0" smtClean="0"/>
-              <a:t>Estrazione </a:t>
-            </a:r>
-            <a:br>
-              <a:rPr lang="it-IT" sz="2000" dirty="0" smtClean="0"/>
-            </a:br>
-            <a:r>
-              <a:rPr lang="it-IT" sz="2000" dirty="0" smtClean="0"/>
-              <a:t>del </a:t>
-            </a:r>
-            <a:r>
-              <a:rPr lang="it-IT" sz="2000" b="1" dirty="0" smtClean="0"/>
-              <a:t>tono fondamentale </a:t>
-            </a:r>
-            <a:r>
-              <a:rPr lang="it-IT" sz="2000" dirty="0" smtClean="0"/>
-              <a:t>dal FFT</a:t>
-            </a:r>
+            <a:endParaRPr lang="it-IT" sz="1800" dirty="0"/>
           </a:p>
         </p:txBody>
       </p:sp>
@@ -8499,16 +8517,248 @@
           </a:p>
         </p:txBody>
       </p:sp>
+      <p:sp>
+        <p:nvSpPr>
+          <p:cNvPr id="5" name="Rettangolo arrotondato 4"/>
+          <p:cNvSpPr/>
+          <p:nvPr/>
+        </p:nvSpPr>
+        <p:spPr>
+          <a:xfrm>
+            <a:off x="7473773" y="2484398"/>
+            <a:ext cx="1558976" cy="749509"/>
+          </a:xfrm>
+          <a:prstGeom prst="roundRect">
+            <a:avLst/>
+          </a:prstGeom>
+          <a:noFill/>
+          <a:ln>
+            <a:solidFill>
+              <a:srgbClr val="0070C0"/>
+            </a:solidFill>
+          </a:ln>
+        </p:spPr>
+        <p:style>
+          <a:lnRef idx="1">
+            <a:schemeClr val="accent1"/>
+          </a:lnRef>
+          <a:fillRef idx="3">
+            <a:schemeClr val="accent1"/>
+          </a:fillRef>
+          <a:effectRef idx="2">
+            <a:schemeClr val="accent1"/>
+          </a:effectRef>
+          <a:fontRef idx="minor">
+            <a:schemeClr val="lt1"/>
+          </a:fontRef>
+        </p:style>
+        <p:txBody>
+          <a:bodyPr rtlCol="0" anchor="ctr"/>
+          <a:lstStyle/>
+          <a:p>
+            <a:pPr algn="ctr"/>
+            <a:endParaRPr lang="it-IT"/>
+          </a:p>
+        </p:txBody>
+      </p:sp>
+      <p:sp>
+        <p:nvSpPr>
+          <p:cNvPr id="6" name="Rettangolo arrotondato 5"/>
+          <p:cNvSpPr/>
+          <p:nvPr/>
+        </p:nvSpPr>
+        <p:spPr>
+          <a:xfrm>
+            <a:off x="7495008" y="3743572"/>
+            <a:ext cx="1558976" cy="749509"/>
+          </a:xfrm>
+          <a:prstGeom prst="roundRect">
+            <a:avLst/>
+          </a:prstGeom>
+          <a:solidFill>
+            <a:schemeClr val="bg1"/>
+          </a:solidFill>
+          <a:ln>
+            <a:solidFill>
+              <a:srgbClr val="0070C0"/>
+            </a:solidFill>
+          </a:ln>
+        </p:spPr>
+        <p:style>
+          <a:lnRef idx="1">
+            <a:schemeClr val="accent1"/>
+          </a:lnRef>
+          <a:fillRef idx="3">
+            <a:schemeClr val="accent1"/>
+          </a:fillRef>
+          <a:effectRef idx="2">
+            <a:schemeClr val="accent1"/>
+          </a:effectRef>
+          <a:fontRef idx="minor">
+            <a:schemeClr val="lt1"/>
+          </a:fontRef>
+        </p:style>
+        <p:txBody>
+          <a:bodyPr rtlCol="0" anchor="ctr"/>
+          <a:lstStyle/>
+          <a:p>
+            <a:pPr algn="ctr"/>
+            <a:endParaRPr lang="it-IT"/>
+          </a:p>
+        </p:txBody>
+      </p:sp>
+      <p:sp>
+        <p:nvSpPr>
+          <p:cNvPr id="8" name="Freccia circolare a destra 7"/>
+          <p:cNvSpPr/>
+          <p:nvPr/>
+        </p:nvSpPr>
+        <p:spPr>
+          <a:xfrm>
+            <a:off x="6893062" y="2739231"/>
+            <a:ext cx="571966" cy="1588957"/>
+          </a:xfrm>
+          <a:prstGeom prst="curvedRightArrow">
+            <a:avLst/>
+          </a:prstGeom>
+          <a:gradFill>
+            <a:gsLst>
+              <a:gs pos="0">
+                <a:srgbClr val="0070C0"/>
+              </a:gs>
+              <a:gs pos="100000">
+                <a:srgbClr val="00B0F0"/>
+              </a:gs>
+            </a:gsLst>
+          </a:gradFill>
+        </p:spPr>
+        <p:style>
+          <a:lnRef idx="1">
+            <a:schemeClr val="accent1"/>
+          </a:lnRef>
+          <a:fillRef idx="3">
+            <a:schemeClr val="accent1"/>
+          </a:fillRef>
+          <a:effectRef idx="2">
+            <a:schemeClr val="accent1"/>
+          </a:effectRef>
+          <a:fontRef idx="minor">
+            <a:schemeClr val="lt1"/>
+          </a:fontRef>
+        </p:style>
+        <p:txBody>
+          <a:bodyPr rtlCol="0" anchor="ctr"/>
+          <a:lstStyle/>
+          <a:p>
+            <a:pPr algn="ctr"/>
+            <a:endParaRPr lang="it-IT">
+              <a:solidFill>
+                <a:schemeClr val="tx1"/>
+              </a:solidFill>
+            </a:endParaRPr>
+          </a:p>
+        </p:txBody>
+      </p:sp>
+      <p:sp>
+        <p:nvSpPr>
+          <p:cNvPr id="9" name="CasellaDiTesto 8"/>
+          <p:cNvSpPr txBox="1"/>
+          <p:nvPr/>
+        </p:nvSpPr>
+        <p:spPr>
+          <a:xfrm>
+            <a:off x="7685232" y="2674486"/>
+            <a:ext cx="1178528" cy="369332"/>
+          </a:xfrm>
+          <a:prstGeom prst="rect">
+            <a:avLst/>
+          </a:prstGeom>
+          <a:noFill/>
+        </p:spPr>
+        <p:txBody>
+          <a:bodyPr wrap="none" rtlCol="0">
+            <a:spAutoFit/>
+          </a:bodyPr>
+          <a:lstStyle/>
+          <a:p>
+            <a:r>
+              <a:rPr lang="it-IT" sz="1800" dirty="0" smtClean="0"/>
+              <a:t>Producer</a:t>
+            </a:r>
+            <a:endParaRPr lang="it-IT" sz="1800" dirty="0"/>
+          </a:p>
+        </p:txBody>
+      </p:sp>
+      <p:sp>
+        <p:nvSpPr>
+          <p:cNvPr id="10" name="CasellaDiTesto 9"/>
+          <p:cNvSpPr txBox="1"/>
+          <p:nvPr/>
+        </p:nvSpPr>
+        <p:spPr>
+          <a:xfrm>
+            <a:off x="7590259" y="3932741"/>
+            <a:ext cx="1326004" cy="369332"/>
+          </a:xfrm>
+          <a:prstGeom prst="rect">
+            <a:avLst/>
+          </a:prstGeom>
+          <a:noFill/>
+        </p:spPr>
+        <p:txBody>
+          <a:bodyPr wrap="none" rtlCol="0">
+            <a:spAutoFit/>
+          </a:bodyPr>
+          <a:lstStyle/>
+          <a:p>
+            <a:r>
+              <a:rPr lang="it-IT" sz="1800" dirty="0" smtClean="0"/>
+              <a:t>Consumer</a:t>
+            </a:r>
+            <a:endParaRPr lang="it-IT" sz="1800" dirty="0"/>
+          </a:p>
+        </p:txBody>
+      </p:sp>
+      <p:sp>
+        <p:nvSpPr>
+          <p:cNvPr id="11" name="CasellaDiTesto 10"/>
+          <p:cNvSpPr txBox="1"/>
+          <p:nvPr/>
+        </p:nvSpPr>
+        <p:spPr>
+          <a:xfrm rot="16200000">
+            <a:off x="6782766" y="3372126"/>
+            <a:ext cx="628698" cy="323165"/>
+          </a:xfrm>
+          <a:prstGeom prst="rect">
+            <a:avLst/>
+          </a:prstGeom>
+          <a:noFill/>
+        </p:spPr>
+        <p:txBody>
+          <a:bodyPr wrap="none" rtlCol="0">
+            <a:spAutoFit/>
+          </a:bodyPr>
+          <a:lstStyle/>
+          <a:p>
+            <a:r>
+              <a:rPr lang="it-IT" sz="1500" b="1" dirty="0" smtClean="0"/>
+              <a:t>FIFO</a:t>
+            </a:r>
+            <a:endParaRPr lang="it-IT" sz="1500" b="1" dirty="0"/>
+          </a:p>
+        </p:txBody>
+      </p:sp>
       <p:pic>
         <p:nvPicPr>
-          <p:cNvPr id="9" name="Immagine 8"/>
+          <p:cNvPr id="7" name="Immagine 6"/>
           <p:cNvPicPr>
             <a:picLocks noChangeAspect="1"/>
           </p:cNvPicPr>
           <p:nvPr/>
         </p:nvPicPr>
         <p:blipFill>
-          <a:blip r:embed="rId3">
+          <a:blip r:embed="rId2">
             <a:extLst>
               <a:ext uri="{28A0092B-C50C-407E-A947-70E740481C1C}">
                 <a14:useLocalDpi xmlns:a14="http://schemas.microsoft.com/office/drawing/2010/main" val="0"/>
@@ -8521,8 +8771,8 @@
         </p:blipFill>
         <p:spPr>
           <a:xfrm>
-            <a:off x="5666509" y="1486069"/>
-            <a:ext cx="3619664" cy="5136406"/>
+            <a:off x="7674768" y="1042706"/>
+            <a:ext cx="1033463" cy="1281494"/>
           </a:xfrm>
           <a:prstGeom prst="rect">
             <a:avLst/>
@@ -8532,7 +8782,7 @@
     </p:spTree>
     <p:extLst>
       <p:ext uri="{BB962C8B-B14F-4D97-AF65-F5344CB8AC3E}">
-        <p14:creationId xmlns:p14="http://schemas.microsoft.com/office/powerpoint/2010/main" val="2462577009"/>
+        <p14:creationId xmlns:p14="http://schemas.microsoft.com/office/powerpoint/2010/main" val="721427499"/>
       </p:ext>
     </p:extLst>
   </p:cSld>
@@ -8583,7 +8833,7 @@
           <a:p>
             <a:r>
               <a:rPr lang="it-IT" dirty="0" smtClean="0"/>
-              <a:t>Microcontrollore</a:t>
+              <a:t>FPGA</a:t>
             </a:r>
             <a:endParaRPr lang="it-IT" dirty="0"/>
           </a:p>
@@ -8601,74 +8851,121 @@
         </p:nvSpPr>
         <p:spPr>
           <a:xfrm>
-            <a:off x="609600" y="903087"/>
-            <a:ext cx="7772400" cy="5286375"/>
+            <a:off x="609600" y="1024102"/>
+            <a:ext cx="8120063" cy="5093494"/>
           </a:xfrm>
         </p:spPr>
         <p:txBody>
           <a:bodyPr/>
           <a:lstStyle/>
           <a:p>
-            <a:pPr>
-              <a:lnSpc>
-                <a:spcPct val="200000"/>
-              </a:lnSpc>
-            </a:pPr>
-            <a:r>
-              <a:rPr lang="it-IT" sz="2400" dirty="0"/>
-              <a:t>Le funzionalità </a:t>
-            </a:r>
             <a:r>
               <a:rPr lang="it-IT" sz="2400" dirty="0" smtClean="0"/>
-              <a:t>svolte dal microcontrollore sono: </a:t>
-            </a:r>
+              <a:t>Le funzionalità svolte in hardware dal FPGA sono:</a:t>
+            </a:r>
+            <a:br>
+              <a:rPr lang="it-IT" sz="2400" dirty="0" smtClean="0"/>
+            </a:br>
+            <a:endParaRPr lang="it-IT" sz="2400" dirty="0" smtClean="0"/>
           </a:p>
           <a:p>
             <a:pPr lvl="1"/>
             <a:r>
-              <a:rPr lang="it-IT" sz="2000" dirty="0"/>
-              <a:t>Calcolo </a:t>
+              <a:rPr lang="it-IT" sz="2000" b="1" dirty="0" smtClean="0"/>
+              <a:t>Generazione</a:t>
             </a:r>
             <a:r>
               <a:rPr lang="it-IT" sz="2000" dirty="0" smtClean="0"/>
-              <a:t>dell’</a:t>
-            </a:r>
-            <a:r>
-              <a:rPr lang="it-IT" sz="2000" b="1" dirty="0" err="1" smtClean="0"/>
-              <a:t>Interpolated</a:t>
-            </a:r>
-            <a:r>
-              <a:rPr lang="it-IT" sz="2000" dirty="0" smtClean="0"/>
-              <a:t> </a:t>
-            </a:r>
-            <a:r>
-              <a:rPr lang="it-IT" sz="2000" b="1" dirty="0" smtClean="0"/>
-              <a:t>FFT</a:t>
-            </a:r>
-            <a:r>
-              <a:rPr lang="it-IT" sz="2000" dirty="0" smtClean="0"/>
-              <a:t> (IFFT)</a:t>
+              <a:t> del </a:t>
             </a:r>
             <a:br>
               <a:rPr lang="it-IT" sz="2000" dirty="0" smtClean="0"/>
             </a:br>
             <a:r>
-              <a:rPr lang="it-IT" sz="2000" dirty="0"/>
+              <a:rPr lang="it-IT" sz="2000" dirty="0" smtClean="0"/>
+              <a:t>segnale di modulazione </a:t>
+            </a:r>
+            <a:r>
+              <a:rPr lang="it-IT" sz="2000" i="1" dirty="0" smtClean="0"/>
               <a:t/>
             </a:r>
             <a:br>
-              <a:rPr lang="it-IT" sz="2000" dirty="0"/>
+              <a:rPr lang="it-IT" sz="2000" i="1" dirty="0" smtClean="0"/>
             </a:br>
-            <a:r>
-              <a:rPr lang="it-IT" sz="2000" dirty="0"/>
+            <a:endParaRPr lang="it-IT" sz="2000" i="1" dirty="0" smtClean="0"/>
+          </a:p>
+          <a:p>
+            <a:pPr lvl="1"/>
+            <a:r>
+              <a:rPr lang="it-IT" sz="2000" b="1" dirty="0" smtClean="0"/>
+              <a:t>Campionamento</a:t>
+            </a:r>
+            <a:r>
+              <a:rPr lang="it-IT" sz="2000" dirty="0" smtClean="0"/>
+              <a:t> </a:t>
+            </a:r>
+            <a:br>
+              <a:rPr lang="it-IT" sz="2000" dirty="0" smtClean="0"/>
+            </a:br>
+            <a:r>
+              <a:rPr lang="it-IT" sz="2000" dirty="0" smtClean="0"/>
+              <a:t>del segnale interferometrico </a:t>
+            </a:r>
+            <a:br>
+              <a:rPr lang="it-IT" sz="2000" dirty="0" smtClean="0"/>
+            </a:br>
+            <a:r>
+              <a:rPr lang="it-IT" sz="2000" dirty="0" smtClean="0"/>
+              <a:t>a </a:t>
+            </a:r>
+            <a:r>
+              <a:rPr lang="it-IT" sz="2000" i="1" dirty="0" smtClean="0"/>
+              <a:t>30MHz</a:t>
+            </a:r>
+            <a:br>
+              <a:rPr lang="it-IT" sz="2000" i="1" dirty="0" smtClean="0"/>
+            </a:br>
+            <a:endParaRPr lang="it-IT" sz="2000" i="1" dirty="0" smtClean="0"/>
+          </a:p>
+          <a:p>
+            <a:pPr lvl="1"/>
+            <a:r>
+              <a:rPr lang="it-IT" sz="2000" dirty="0" smtClean="0"/>
+              <a:t>Calcolo </a:t>
+            </a:r>
+            <a:br>
+              <a:rPr lang="it-IT" sz="2000" dirty="0" smtClean="0"/>
+            </a:br>
+            <a:r>
+              <a:rPr lang="it-IT" sz="2000" dirty="0" smtClean="0"/>
+              <a:t>della </a:t>
+            </a:r>
+            <a:r>
+              <a:rPr lang="it-IT" sz="2000" b="1" dirty="0" smtClean="0"/>
+              <a:t>Fast Fourier </a:t>
+            </a:r>
+            <a:r>
+              <a:rPr lang="it-IT" sz="2000" b="1" dirty="0" err="1" smtClean="0"/>
+              <a:t>Transform</a:t>
+            </a:r>
+            <a:r>
+              <a:rPr lang="it-IT" sz="2000" b="1" dirty="0" smtClean="0"/>
+              <a:t> </a:t>
+            </a:r>
+            <a:r>
+              <a:rPr lang="it-IT" sz="2000" b="1" dirty="0" smtClean="0"/>
               <a:t/>
             </a:r>
             <a:br>
-              <a:rPr lang="it-IT" sz="2000" dirty="0"/>
+              <a:rPr lang="it-IT" sz="2000" b="1" dirty="0" smtClean="0"/>
             </a:br>
             <a:r>
               <a:rPr lang="it-IT" sz="2000" dirty="0" smtClean="0"/>
-              <a:t/>
+              <a:t>(</a:t>
+            </a:r>
+            <a:r>
+              <a:rPr lang="it-IT" sz="2000" dirty="0" smtClean="0"/>
+              <a:t>FFT)</a:t>
             </a:r>
             <a:br>
               <a:rPr lang="it-IT" sz="2000" dirty="0" smtClean="0"/>
@@ -8676,64 +8973,26 @@
             <a:endParaRPr lang="it-IT" sz="2000" dirty="0" smtClean="0"/>
           </a:p>
           <a:p>
-            <a:pPr marL="457200" lvl="1" indent="0">
-              <a:buNone/>
-            </a:pPr>
-            <a:endParaRPr lang="it-IT" sz="2000" dirty="0" smtClean="0"/>
-          </a:p>
-          <a:p>
-            <a:pPr marL="457200" lvl="1" indent="0">
-              <a:buNone/>
-            </a:pPr>
-            <a:endParaRPr lang="it-IT" sz="2000" dirty="0" smtClean="0"/>
-          </a:p>
-          <a:p>
-            <a:pPr marL="457200" lvl="1" indent="0">
-              <a:buNone/>
-            </a:pPr>
-            <a:endParaRPr lang="it-IT" sz="2000" dirty="0"/>
-          </a:p>
-          <a:p>
-            <a:pPr marL="457200" lvl="1" indent="0">
-              <a:buNone/>
-            </a:pPr>
-            <a:endParaRPr lang="it-IT" sz="2000" dirty="0" smtClean="0"/>
-          </a:p>
-          <a:p>
-            <a:pPr marL="457200" lvl="1" indent="0">
-              <a:buNone/>
-            </a:pPr>
-            <a:endParaRPr lang="it-IT" sz="2000" dirty="0" smtClean="0"/>
-          </a:p>
-          <a:p>
-            <a:pPr marL="457200" lvl="1" indent="0">
-              <a:buNone/>
-            </a:pPr>
-            <a:endParaRPr lang="it-IT" sz="2000" dirty="0" smtClean="0"/>
-          </a:p>
-          <a:p>
             <a:pPr lvl="1"/>
             <a:r>
               <a:rPr lang="it-IT" sz="2000" dirty="0" smtClean="0"/>
-              <a:t>Calcolo </a:t>
-            </a:r>
-            <a:r>
-              <a:rPr lang="it-IT" sz="2000" dirty="0"/>
-              <a:t>della </a:t>
-            </a:r>
-            <a:r>
-              <a:rPr lang="it-IT" sz="2000" b="1" dirty="0"/>
-              <a:t>distanza </a:t>
+              <a:t>Estrazione </a:t>
+            </a:r>
+            <a:br>
+              <a:rPr lang="it-IT" sz="2000" dirty="0" smtClean="0"/>
+            </a:br>
+            <a:r>
+              <a:rPr lang="it-IT" sz="2000" dirty="0" smtClean="0"/>
+              <a:t>del </a:t>
             </a:r>
             <a:r>
               <a:rPr lang="it-IT" sz="2000" b="1" dirty="0" smtClean="0"/>
-              <a:t>assoluta</a:t>
+              <a:t>tono fondamentale </a:t>
             </a:r>
             <a:r>
               <a:rPr lang="it-IT" sz="2000" dirty="0" smtClean="0"/>
-              <a:t>:</a:t>
-            </a:r>
-            <a:endParaRPr lang="it-IT" sz="2000" dirty="0"/>
+              <a:t>dal FFT</a:t>
+            </a:r>
           </a:p>
         </p:txBody>
       </p:sp>
@@ -8761,8 +9020,270 @@
           </a:p>
         </p:txBody>
       </p:sp>
-      <mc:AlternateContent xmlns:mc="http://schemas.openxmlformats.org/markup-compatibility/2006">
-        <mc:Choice xmlns:a14="http://schemas.microsoft.com/office/drawing/2010/main" Requires="a14">
+      <p:pic>
+        <p:nvPicPr>
+          <p:cNvPr id="5" name="Immagine 4"/>
+          <p:cNvPicPr>
+            <a:picLocks noChangeAspect="1"/>
+          </p:cNvPicPr>
+          <p:nvPr/>
+        </p:nvPicPr>
+        <p:blipFill>
+          <a:blip r:embed="rId3">
+            <a:extLst>
+              <a:ext uri="{28A0092B-C50C-407E-A947-70E740481C1C}">
+                <a14:useLocalDpi xmlns:a14="http://schemas.microsoft.com/office/drawing/2010/main" val="0"/>
+              </a:ext>
+            </a:extLst>
+          </a:blip>
+          <a:stretch>
+            <a:fillRect/>
+          </a:stretch>
+        </p:blipFill>
+        <p:spPr>
+          <a:xfrm>
+            <a:off x="5115633" y="1454331"/>
+            <a:ext cx="3968935" cy="4663265"/>
+          </a:xfrm>
+          <a:prstGeom prst="rect">
+            <a:avLst/>
+          </a:prstGeom>
+        </p:spPr>
+      </p:pic>
+    </p:spTree>
+    <p:extLst>
+      <p:ext uri="{BB962C8B-B14F-4D97-AF65-F5344CB8AC3E}">
+        <p14:creationId xmlns:p14="http://schemas.microsoft.com/office/powerpoint/2010/main" val="2462577009"/>
+      </p:ext>
+    </p:extLst>
+  </p:cSld>
+  <p:clrMapOvr>
+    <a:masterClrMapping/>
+  </p:clrMapOvr>
+  <p:timing>
+    <p:tnLst>
+      <p:par>
+        <p:cTn id="1" dur="indefinite" restart="never" nodeType="tmRoot"/>
+      </p:par>
+    </p:tnLst>
+  </p:timing>
+</p:sld>
+</file>
+
+<file path=ppt/slides/slide15.xml><?xml version="1.0" encoding="utf-8"?>
+<p:sld xmlns:a="http://schemas.openxmlformats.org/drawingml/2006/main" xmlns:r="http://schemas.openxmlformats.org/officeDocument/2006/relationships" xmlns:p="http://schemas.openxmlformats.org/presentationml/2006/main">
+  <p:cSld>
+    <p:spTree>
+      <p:nvGrpSpPr>
+        <p:cNvPr id="1" name=""/>
+        <p:cNvGrpSpPr/>
+        <p:nvPr/>
+      </p:nvGrpSpPr>
+      <p:grpSpPr>
+        <a:xfrm>
+          <a:off x="0" y="0"/>
+          <a:ext cx="0" cy="0"/>
+          <a:chOff x="0" y="0"/>
+          <a:chExt cx="0" cy="0"/>
+        </a:xfrm>
+      </p:grpSpPr>
+      <p:sp>
+        <p:nvSpPr>
+          <p:cNvPr id="2" name="Titolo 1"/>
+          <p:cNvSpPr>
+            <a:spLocks noGrp="1"/>
+          </p:cNvSpPr>
+          <p:nvPr>
+            <p:ph type="title"/>
+          </p:nvPr>
+        </p:nvSpPr>
+        <p:spPr/>
+        <p:txBody>
+          <a:bodyPr/>
+          <a:lstStyle/>
+          <a:p>
+            <a:r>
+              <a:rPr lang="it-IT" dirty="0" smtClean="0"/>
+              <a:t>Microcontrollore</a:t>
+            </a:r>
+            <a:endParaRPr lang="it-IT" dirty="0"/>
+          </a:p>
+        </p:txBody>
+      </p:sp>
+      <p:sp>
+        <p:nvSpPr>
+          <p:cNvPr id="3" name="Segnaposto contenuto 2"/>
+          <p:cNvSpPr>
+            <a:spLocks noGrp="1"/>
+          </p:cNvSpPr>
+          <p:nvPr>
+            <p:ph idx="1"/>
+          </p:nvPr>
+        </p:nvSpPr>
+        <p:spPr>
+          <a:xfrm>
+            <a:off x="609600" y="903087"/>
+            <a:ext cx="7772400" cy="5286375"/>
+          </a:xfrm>
+        </p:spPr>
+        <p:txBody>
+          <a:bodyPr/>
+          <a:lstStyle/>
+          <a:p>
+            <a:pPr>
+              <a:lnSpc>
+                <a:spcPct val="200000"/>
+              </a:lnSpc>
+            </a:pPr>
+            <a:r>
+              <a:rPr lang="it-IT" sz="2400" dirty="0"/>
+              <a:t>Le funzionalità </a:t>
+            </a:r>
+            <a:r>
+              <a:rPr lang="it-IT" sz="2400" dirty="0" smtClean="0"/>
+              <a:t>svolte dal microcontrollore sono: </a:t>
+            </a:r>
+          </a:p>
+          <a:p>
+            <a:pPr lvl="1"/>
+            <a:r>
+              <a:rPr lang="it-IT" sz="2000" dirty="0"/>
+              <a:t>Calcolo </a:t>
+            </a:r>
+            <a:r>
+              <a:rPr lang="it-IT" sz="2000" dirty="0" smtClean="0"/>
+              <a:t>dell’</a:t>
+            </a:r>
+            <a:r>
+              <a:rPr lang="it-IT" sz="2000" b="1" dirty="0" err="1" smtClean="0"/>
+              <a:t>Interpolated</a:t>
+            </a:r>
+            <a:r>
+              <a:rPr lang="it-IT" sz="2000" dirty="0" smtClean="0"/>
+              <a:t> </a:t>
+            </a:r>
+            <a:r>
+              <a:rPr lang="it-IT" sz="2000" b="1" dirty="0" smtClean="0"/>
+              <a:t>FFT</a:t>
+            </a:r>
+            <a:r>
+              <a:rPr lang="it-IT" sz="2000" dirty="0" smtClean="0"/>
+              <a:t> (IFFT)</a:t>
+            </a:r>
+            <a:br>
+              <a:rPr lang="it-IT" sz="2000" dirty="0" smtClean="0"/>
+            </a:br>
+            <a:r>
+              <a:rPr lang="it-IT" sz="2000" dirty="0"/>
+              <a:t/>
+            </a:r>
+            <a:br>
+              <a:rPr lang="it-IT" sz="2000" dirty="0"/>
+            </a:br>
+            <a:r>
+              <a:rPr lang="it-IT" sz="2000" dirty="0"/>
+              <a:t/>
+            </a:r>
+            <a:br>
+              <a:rPr lang="it-IT" sz="2000" dirty="0"/>
+            </a:br>
+            <a:r>
+              <a:rPr lang="it-IT" sz="2000" dirty="0" smtClean="0"/>
+              <a:t/>
+            </a:r>
+            <a:br>
+              <a:rPr lang="it-IT" sz="2000" dirty="0" smtClean="0"/>
+            </a:br>
+            <a:endParaRPr lang="it-IT" sz="2000" dirty="0" smtClean="0"/>
+          </a:p>
+          <a:p>
+            <a:pPr marL="457200" lvl="1" indent="0">
+              <a:buNone/>
+            </a:pPr>
+            <a:endParaRPr lang="it-IT" sz="2000" dirty="0" smtClean="0"/>
+          </a:p>
+          <a:p>
+            <a:pPr marL="457200" lvl="1" indent="0">
+              <a:buNone/>
+            </a:pPr>
+            <a:endParaRPr lang="it-IT" sz="2000" dirty="0" smtClean="0"/>
+          </a:p>
+          <a:p>
+            <a:pPr marL="457200" lvl="1" indent="0">
+              <a:buNone/>
+            </a:pPr>
+            <a:endParaRPr lang="it-IT" sz="2000" dirty="0"/>
+          </a:p>
+          <a:p>
+            <a:pPr marL="457200" lvl="1" indent="0">
+              <a:buNone/>
+            </a:pPr>
+            <a:endParaRPr lang="it-IT" sz="2000" dirty="0" smtClean="0"/>
+          </a:p>
+          <a:p>
+            <a:pPr marL="457200" lvl="1" indent="0">
+              <a:buNone/>
+            </a:pPr>
+            <a:endParaRPr lang="it-IT" sz="2000" dirty="0" smtClean="0"/>
+          </a:p>
+          <a:p>
+            <a:pPr marL="457200" lvl="1" indent="0">
+              <a:buNone/>
+            </a:pPr>
+            <a:endParaRPr lang="it-IT" sz="2000" dirty="0" smtClean="0"/>
+          </a:p>
+          <a:p>
+            <a:pPr lvl="1"/>
+            <a:r>
+              <a:rPr lang="it-IT" sz="2000" dirty="0" smtClean="0"/>
+              <a:t>Calcolo </a:t>
+            </a:r>
+            <a:r>
+              <a:rPr lang="it-IT" sz="2000" dirty="0"/>
+              <a:t>della </a:t>
+            </a:r>
+            <a:r>
+              <a:rPr lang="it-IT" sz="2000" b="1" dirty="0"/>
+              <a:t>distanza </a:t>
+            </a:r>
+            <a:r>
+              <a:rPr lang="it-IT" sz="2000" b="1" dirty="0" smtClean="0"/>
+              <a:t>assoluta</a:t>
+            </a:r>
+            <a:r>
+              <a:rPr lang="it-IT" sz="2000" dirty="0" smtClean="0"/>
+              <a:t>:</a:t>
+            </a:r>
+            <a:endParaRPr lang="it-IT" sz="2000" dirty="0"/>
+          </a:p>
+        </p:txBody>
+      </p:sp>
+      <p:sp>
+        <p:nvSpPr>
+          <p:cNvPr id="4" name="Segnaposto numero diapositiva 3"/>
+          <p:cNvSpPr>
+            <a:spLocks noGrp="1"/>
+          </p:cNvSpPr>
+          <p:nvPr>
+            <p:ph type="sldNum" sz="quarter" idx="11"/>
+          </p:nvPr>
+        </p:nvSpPr>
+        <p:spPr/>
+        <p:txBody>
+          <a:bodyPr/>
+          <a:lstStyle/>
+          <a:p>
+            <a:fld id="{C503DA3A-0C6B-48FC-931E-2C786AAFD5C1}" type="slidenum">
+              <a:rPr lang="en-US" altLang="nl-NL" smtClean="0"/>
+              <a:pPr/>
+              <a:t>15</a:t>
+            </a:fld>
+            <a:endParaRPr lang="en-US" altLang="nl-NL"/>
+          </a:p>
+        </p:txBody>
+      </p:sp>
+      <mc:AlternateContent xmlns:mc="http://schemas.openxmlformats.org/markup-compatibility/2006" xmlns:a14="http://schemas.microsoft.com/office/drawing/2010/main">
+        <mc:Choice Requires="a14">
           <p:sp>
             <p:nvSpPr>
               <p:cNvPr id="7" name="CasellaDiTesto 6"/>
@@ -8820,7 +9341,7 @@
                         <m:fPr>
                           <m:ctrlPr>
                             <a:rPr lang="it-IT" i="1" smtClean="0">
-                              <a:latin typeface="Cambria Math" charset="0"/>
+                              <a:latin typeface="Cambria Math" panose="02040503050406030204" pitchFamily="18" charset="0"/>
                               <a:ea typeface="Cambria Math" charset="0"/>
                               <a:cs typeface="Cambria Math" charset="0"/>
                             </a:rPr>
@@ -8831,7 +9352,7 @@
                             <m:sSubPr>
                               <m:ctrlPr>
                                 <a:rPr lang="it-IT" i="1" smtClean="0">
-                                  <a:latin typeface="Cambria Math" charset="0"/>
+                                  <a:latin typeface="Cambria Math" panose="02040503050406030204" pitchFamily="18" charset="0"/>
                                   <a:ea typeface="Cambria Math" charset="0"/>
                                   <a:cs typeface="Cambria Math" charset="0"/>
                                 </a:rPr>
@@ -8870,7 +9391,7 @@
                             <m:sSubPr>
                               <m:ctrlPr>
                                 <a:rPr lang="it-IT" b="0" i="1" smtClean="0">
-                                  <a:latin typeface="Cambria Math" charset="0"/>
+                                  <a:latin typeface="Cambria Math" panose="02040503050406030204" pitchFamily="18" charset="0"/>
                                   <a:ea typeface="Cambria Math" charset="0"/>
                                   <a:cs typeface="Cambria Math" charset="0"/>
                                 </a:rPr>
@@ -8917,7 +9438,7 @@
             </p:txBody>
           </p:sp>
         </mc:Choice>
-        <mc:Fallback>
+        <mc:Fallback xmlns="">
           <p:sp>
             <p:nvSpPr>
               <p:cNvPr id="7" name="CasellaDiTesto 6"/>
@@ -8978,7 +9499,7 @@
         </p:blipFill>
         <p:spPr>
           <a:xfrm>
-            <a:off x="2698318" y="2452200"/>
+            <a:off x="2698318" y="2409589"/>
             <a:ext cx="3594964" cy="2719873"/>
           </a:xfrm>
           <a:prstGeom prst="rect">
@@ -8990,520 +9511,6 @@
     <p:extLst>
       <p:ext uri="{BB962C8B-B14F-4D97-AF65-F5344CB8AC3E}">
         <p14:creationId xmlns:p14="http://schemas.microsoft.com/office/powerpoint/2010/main" val="3813134160"/>
-      </p:ext>
-    </p:extLst>
-  </p:cSld>
-  <p:clrMapOvr>
-    <a:masterClrMapping/>
-  </p:clrMapOvr>
-  <p:timing>
-    <p:tnLst>
-      <p:par>
-        <p:cTn id="1" dur="indefinite" restart="never" nodeType="tmRoot"/>
-      </p:par>
-    </p:tnLst>
-  </p:timing>
-</p:sld>
-</file>
-
-<file path=ppt/slides/slide15.xml><?xml version="1.0" encoding="utf-8"?>
-<p:sld xmlns:a="http://schemas.openxmlformats.org/drawingml/2006/main" xmlns:r="http://schemas.openxmlformats.org/officeDocument/2006/relationships" xmlns:p="http://schemas.openxmlformats.org/presentationml/2006/main">
-  <p:cSld>
-    <p:spTree>
-      <p:nvGrpSpPr>
-        <p:cNvPr id="1" name=""/>
-        <p:cNvGrpSpPr/>
-        <p:nvPr/>
-      </p:nvGrpSpPr>
-      <p:grpSpPr>
-        <a:xfrm>
-          <a:off x="0" y="0"/>
-          <a:ext cx="0" cy="0"/>
-          <a:chOff x="0" y="0"/>
-          <a:chExt cx="0" cy="0"/>
-        </a:xfrm>
-      </p:grpSpPr>
-      <p:sp>
-        <p:nvSpPr>
-          <p:cNvPr id="2" name="Titolo 1"/>
-          <p:cNvSpPr>
-            <a:spLocks noGrp="1"/>
-          </p:cNvSpPr>
-          <p:nvPr>
-            <p:ph type="title"/>
-          </p:nvPr>
-        </p:nvSpPr>
-        <p:spPr/>
-        <p:txBody>
-          <a:bodyPr/>
-          <a:lstStyle/>
-          <a:p>
-            <a:r>
-              <a:rPr lang="it-IT" dirty="0" smtClean="0"/>
-              <a:t>Dettagli implementativi</a:t>
-            </a:r>
-            <a:endParaRPr lang="it-IT" dirty="0"/>
-          </a:p>
-        </p:txBody>
-      </p:sp>
-      <p:sp>
-        <p:nvSpPr>
-          <p:cNvPr id="3" name="Segnaposto contenuto 2"/>
-          <p:cNvSpPr>
-            <a:spLocks noGrp="1"/>
-          </p:cNvSpPr>
-          <p:nvPr>
-            <p:ph idx="1"/>
-          </p:nvPr>
-        </p:nvSpPr>
-        <p:spPr>
-          <a:xfrm>
-            <a:off x="609600" y="1057274"/>
-            <a:ext cx="7648575" cy="5186363"/>
-          </a:xfrm>
-        </p:spPr>
-        <p:txBody>
-          <a:bodyPr/>
-          <a:lstStyle/>
-          <a:p>
-            <a:r>
-              <a:rPr lang="it-IT" sz="2400" dirty="0"/>
-              <a:t>Ambiente di sviluppo: </a:t>
-            </a:r>
-            <a:r>
-              <a:rPr lang="it-IT" sz="2400" b="1" dirty="0"/>
-              <a:t>NI </a:t>
-            </a:r>
-            <a:r>
-              <a:rPr lang="it-IT" sz="2400" b="1" dirty="0" err="1"/>
-              <a:t>LabVIEW</a:t>
-            </a:r>
-            <a:endParaRPr lang="it-IT" sz="2400" dirty="0"/>
-          </a:p>
-          <a:p>
-            <a:pPr lvl="1"/>
-            <a:r>
-              <a:rPr lang="it-IT" sz="2000" b="1" dirty="0"/>
-              <a:t>FPGA </a:t>
-            </a:r>
-            <a:r>
-              <a:rPr lang="it-IT" sz="2000" dirty="0" err="1"/>
-              <a:t>Module</a:t>
-            </a:r>
-            <a:endParaRPr lang="it-IT" sz="2000" b="1" dirty="0"/>
-          </a:p>
-          <a:p>
-            <a:pPr lvl="1"/>
-            <a:r>
-              <a:rPr lang="it-IT" sz="2000" b="1" dirty="0"/>
-              <a:t>Real-Time </a:t>
-            </a:r>
-            <a:r>
-              <a:rPr lang="it-IT" sz="2000" dirty="0" err="1" smtClean="0"/>
-              <a:t>Module</a:t>
-            </a:r>
-            <a:r>
-              <a:rPr lang="it-IT" sz="2000" dirty="0" smtClean="0"/>
-              <a:t/>
-            </a:r>
-            <a:br>
-              <a:rPr lang="it-IT" sz="2000" dirty="0" smtClean="0"/>
-            </a:br>
-            <a:endParaRPr lang="it-IT" sz="2000" b="1" dirty="0"/>
-          </a:p>
-          <a:p>
-            <a:r>
-              <a:rPr lang="it-IT" sz="2400" dirty="0"/>
-              <a:t>Struttura a cicli paralleli </a:t>
-            </a:r>
-            <a:r>
-              <a:rPr lang="it-IT" sz="2400" dirty="0" smtClean="0"/>
-              <a:t>con </a:t>
-            </a:r>
-            <a:r>
-              <a:rPr lang="it-IT" sz="2400" dirty="0"/>
-              <a:t>scambio </a:t>
-            </a:r>
-            <a:r>
-              <a:rPr lang="it-IT" sz="2400" dirty="0" smtClean="0"/>
-              <a:t/>
-            </a:r>
-            <a:br>
-              <a:rPr lang="it-IT" sz="2400" dirty="0" smtClean="0"/>
-            </a:br>
-            <a:r>
-              <a:rPr lang="it-IT" sz="2400" dirty="0" smtClean="0"/>
-              <a:t>di </a:t>
-            </a:r>
-            <a:r>
-              <a:rPr lang="it-IT" sz="2400" dirty="0"/>
-              <a:t>dati tramite code </a:t>
-            </a:r>
-            <a:r>
-              <a:rPr lang="it-IT" sz="2400" b="1" dirty="0"/>
-              <a:t>FIFO</a:t>
-            </a:r>
-            <a:endParaRPr lang="it-IT" sz="2400" dirty="0"/>
-          </a:p>
-          <a:p>
-            <a:pPr lvl="1"/>
-            <a:r>
-              <a:rPr lang="it-IT" sz="2000" dirty="0"/>
-              <a:t>Pattern </a:t>
-            </a:r>
-            <a:r>
-              <a:rPr lang="it-IT" sz="2000" b="1" dirty="0" smtClean="0"/>
-              <a:t>Producer-Consumer</a:t>
-            </a:r>
-            <a:br>
-              <a:rPr lang="it-IT" sz="2000" b="1" dirty="0" smtClean="0"/>
-            </a:br>
-            <a:endParaRPr lang="it-IT" sz="2000" dirty="0"/>
-          </a:p>
-          <a:p>
-            <a:r>
-              <a:rPr lang="it-IT" sz="2400" b="1" dirty="0"/>
-              <a:t>DMA</a:t>
-            </a:r>
-            <a:r>
-              <a:rPr lang="it-IT" sz="2400" dirty="0"/>
-              <a:t> per lo scambio di dati tra FPGA </a:t>
-            </a:r>
-            <a:r>
-              <a:rPr lang="it-IT" sz="2400" dirty="0" smtClean="0"/>
-              <a:t>e microcontrollore</a:t>
-            </a:r>
-            <a:br>
-              <a:rPr lang="it-IT" sz="2400" dirty="0" smtClean="0"/>
-            </a:br>
-            <a:endParaRPr lang="it-IT" sz="2400" dirty="0"/>
-          </a:p>
-          <a:p>
-            <a:r>
-              <a:rPr lang="it-IT" sz="2400" dirty="0"/>
-              <a:t>Aritmetica </a:t>
-            </a:r>
-            <a:r>
-              <a:rPr lang="it-IT" sz="2400" b="1" dirty="0" err="1"/>
-              <a:t>fixed</a:t>
-            </a:r>
-            <a:r>
-              <a:rPr lang="it-IT" sz="2400" b="1" dirty="0"/>
-              <a:t> </a:t>
-            </a:r>
-            <a:r>
-              <a:rPr lang="it-IT" sz="2400" b="1" dirty="0" err="1"/>
-              <a:t>point</a:t>
-            </a:r>
-            <a:r>
-              <a:rPr lang="it-IT" sz="2400" dirty="0"/>
-              <a:t> per migliorare le prestazioni su </a:t>
-            </a:r>
-            <a:r>
-              <a:rPr lang="it-IT" sz="2400" dirty="0" smtClean="0"/>
-              <a:t>FPGA</a:t>
-            </a:r>
-            <a:r>
-              <a:rPr lang="it-IT" sz="2400" dirty="0"/>
-              <a:t/>
-            </a:r>
-            <a:br>
-              <a:rPr lang="it-IT" sz="2400" dirty="0"/>
-            </a:br>
-            <a:endParaRPr lang="it-IT" sz="1800" dirty="0"/>
-          </a:p>
-        </p:txBody>
-      </p:sp>
-      <p:sp>
-        <p:nvSpPr>
-          <p:cNvPr id="4" name="Segnaposto numero diapositiva 3"/>
-          <p:cNvSpPr>
-            <a:spLocks noGrp="1"/>
-          </p:cNvSpPr>
-          <p:nvPr>
-            <p:ph type="sldNum" sz="quarter" idx="11"/>
-          </p:nvPr>
-        </p:nvSpPr>
-        <p:spPr/>
-        <p:txBody>
-          <a:bodyPr/>
-          <a:lstStyle/>
-          <a:p>
-            <a:fld id="{C503DA3A-0C6B-48FC-931E-2C786AAFD5C1}" type="slidenum">
-              <a:rPr lang="en-US" altLang="nl-NL" smtClean="0"/>
-              <a:pPr/>
-              <a:t>15</a:t>
-            </a:fld>
-            <a:endParaRPr lang="en-US" altLang="nl-NL"/>
-          </a:p>
-        </p:txBody>
-      </p:sp>
-      <p:sp>
-        <p:nvSpPr>
-          <p:cNvPr id="5" name="Rettangolo arrotondato 4"/>
-          <p:cNvSpPr/>
-          <p:nvPr/>
-        </p:nvSpPr>
-        <p:spPr>
-          <a:xfrm>
-            <a:off x="7473773" y="2484398"/>
-            <a:ext cx="1558976" cy="749509"/>
-          </a:xfrm>
-          <a:prstGeom prst="roundRect">
-            <a:avLst/>
-          </a:prstGeom>
-          <a:noFill/>
-          <a:ln>
-            <a:solidFill>
-              <a:srgbClr val="0070C0"/>
-            </a:solidFill>
-          </a:ln>
-        </p:spPr>
-        <p:style>
-          <a:lnRef idx="1">
-            <a:schemeClr val="accent1"/>
-          </a:lnRef>
-          <a:fillRef idx="3">
-            <a:schemeClr val="accent1"/>
-          </a:fillRef>
-          <a:effectRef idx="2">
-            <a:schemeClr val="accent1"/>
-          </a:effectRef>
-          <a:fontRef idx="minor">
-            <a:schemeClr val="lt1"/>
-          </a:fontRef>
-        </p:style>
-        <p:txBody>
-          <a:bodyPr rtlCol="0" anchor="ctr"/>
-          <a:lstStyle/>
-          <a:p>
-            <a:pPr algn="ctr"/>
-            <a:endParaRPr lang="it-IT"/>
-          </a:p>
-        </p:txBody>
-      </p:sp>
-      <p:sp>
-        <p:nvSpPr>
-          <p:cNvPr id="6" name="Rettangolo arrotondato 5"/>
-          <p:cNvSpPr/>
-          <p:nvPr/>
-        </p:nvSpPr>
-        <p:spPr>
-          <a:xfrm>
-            <a:off x="7495008" y="3743572"/>
-            <a:ext cx="1558976" cy="749509"/>
-          </a:xfrm>
-          <a:prstGeom prst="roundRect">
-            <a:avLst/>
-          </a:prstGeom>
-          <a:solidFill>
-            <a:schemeClr val="bg1"/>
-          </a:solidFill>
-          <a:ln>
-            <a:solidFill>
-              <a:srgbClr val="0070C0"/>
-            </a:solidFill>
-          </a:ln>
-        </p:spPr>
-        <p:style>
-          <a:lnRef idx="1">
-            <a:schemeClr val="accent1"/>
-          </a:lnRef>
-          <a:fillRef idx="3">
-            <a:schemeClr val="accent1"/>
-          </a:fillRef>
-          <a:effectRef idx="2">
-            <a:schemeClr val="accent1"/>
-          </a:effectRef>
-          <a:fontRef idx="minor">
-            <a:schemeClr val="lt1"/>
-          </a:fontRef>
-        </p:style>
-        <p:txBody>
-          <a:bodyPr rtlCol="0" anchor="ctr"/>
-          <a:lstStyle/>
-          <a:p>
-            <a:pPr algn="ctr"/>
-            <a:endParaRPr lang="it-IT"/>
-          </a:p>
-        </p:txBody>
-      </p:sp>
-      <p:sp>
-        <p:nvSpPr>
-          <p:cNvPr id="8" name="Freccia circolare a destra 7"/>
-          <p:cNvSpPr/>
-          <p:nvPr/>
-        </p:nvSpPr>
-        <p:spPr>
-          <a:xfrm>
-            <a:off x="6893062" y="2739231"/>
-            <a:ext cx="571966" cy="1588957"/>
-          </a:xfrm>
-          <a:prstGeom prst="curvedRightArrow">
-            <a:avLst/>
-          </a:prstGeom>
-          <a:gradFill>
-            <a:gsLst>
-              <a:gs pos="0">
-                <a:srgbClr val="0070C0"/>
-              </a:gs>
-              <a:gs pos="100000">
-                <a:srgbClr val="00B0F0"/>
-              </a:gs>
-            </a:gsLst>
-          </a:gradFill>
-        </p:spPr>
-        <p:style>
-          <a:lnRef idx="1">
-            <a:schemeClr val="accent1"/>
-          </a:lnRef>
-          <a:fillRef idx="3">
-            <a:schemeClr val="accent1"/>
-          </a:fillRef>
-          <a:effectRef idx="2">
-            <a:schemeClr val="accent1"/>
-          </a:effectRef>
-          <a:fontRef idx="minor">
-            <a:schemeClr val="lt1"/>
-          </a:fontRef>
-        </p:style>
-        <p:txBody>
-          <a:bodyPr rtlCol="0" anchor="ctr"/>
-          <a:lstStyle/>
-          <a:p>
-            <a:pPr algn="ctr"/>
-            <a:endParaRPr lang="it-IT">
-              <a:solidFill>
-                <a:schemeClr val="tx1"/>
-              </a:solidFill>
-            </a:endParaRPr>
-          </a:p>
-        </p:txBody>
-      </p:sp>
-      <p:sp>
-        <p:nvSpPr>
-          <p:cNvPr id="9" name="CasellaDiTesto 8"/>
-          <p:cNvSpPr txBox="1"/>
-          <p:nvPr/>
-        </p:nvSpPr>
-        <p:spPr>
-          <a:xfrm>
-            <a:off x="7685232" y="2674486"/>
-            <a:ext cx="1178528" cy="369332"/>
-          </a:xfrm>
-          <a:prstGeom prst="rect">
-            <a:avLst/>
-          </a:prstGeom>
-          <a:noFill/>
-        </p:spPr>
-        <p:txBody>
-          <a:bodyPr wrap="none" rtlCol="0">
-            <a:spAutoFit/>
-          </a:bodyPr>
-          <a:lstStyle/>
-          <a:p>
-            <a:r>
-              <a:rPr lang="it-IT" sz="1800" dirty="0" smtClean="0"/>
-              <a:t>Producer</a:t>
-            </a:r>
-            <a:endParaRPr lang="it-IT" sz="1800" dirty="0"/>
-          </a:p>
-        </p:txBody>
-      </p:sp>
-      <p:sp>
-        <p:nvSpPr>
-          <p:cNvPr id="10" name="CasellaDiTesto 9"/>
-          <p:cNvSpPr txBox="1"/>
-          <p:nvPr/>
-        </p:nvSpPr>
-        <p:spPr>
-          <a:xfrm>
-            <a:off x="7590259" y="3932741"/>
-            <a:ext cx="1326004" cy="369332"/>
-          </a:xfrm>
-          <a:prstGeom prst="rect">
-            <a:avLst/>
-          </a:prstGeom>
-          <a:noFill/>
-        </p:spPr>
-        <p:txBody>
-          <a:bodyPr wrap="none" rtlCol="0">
-            <a:spAutoFit/>
-          </a:bodyPr>
-          <a:lstStyle/>
-          <a:p>
-            <a:r>
-              <a:rPr lang="it-IT" sz="1800" dirty="0" smtClean="0"/>
-              <a:t>Consumer</a:t>
-            </a:r>
-            <a:endParaRPr lang="it-IT" sz="1800" dirty="0"/>
-          </a:p>
-        </p:txBody>
-      </p:sp>
-      <p:sp>
-        <p:nvSpPr>
-          <p:cNvPr id="11" name="CasellaDiTesto 10"/>
-          <p:cNvSpPr txBox="1"/>
-          <p:nvPr/>
-        </p:nvSpPr>
-        <p:spPr>
-          <a:xfrm rot="16200000">
-            <a:off x="6782766" y="3372126"/>
-            <a:ext cx="628698" cy="323165"/>
-          </a:xfrm>
-          <a:prstGeom prst="rect">
-            <a:avLst/>
-          </a:prstGeom>
-          <a:noFill/>
-        </p:spPr>
-        <p:txBody>
-          <a:bodyPr wrap="none" rtlCol="0">
-            <a:spAutoFit/>
-          </a:bodyPr>
-          <a:lstStyle/>
-          <a:p>
-            <a:r>
-              <a:rPr lang="it-IT" sz="1500" b="1" dirty="0" smtClean="0"/>
-              <a:t>FIFO</a:t>
-            </a:r>
-            <a:endParaRPr lang="it-IT" sz="1500" b="1" dirty="0"/>
-          </a:p>
-        </p:txBody>
-      </p:sp>
-      <p:pic>
-        <p:nvPicPr>
-          <p:cNvPr id="7" name="Immagine 6"/>
-          <p:cNvPicPr>
-            <a:picLocks noChangeAspect="1"/>
-          </p:cNvPicPr>
-          <p:nvPr/>
-        </p:nvPicPr>
-        <p:blipFill>
-          <a:blip r:embed="rId2">
-            <a:extLst>
-              <a:ext uri="{28A0092B-C50C-407E-A947-70E740481C1C}">
-                <a14:useLocalDpi xmlns:a14="http://schemas.microsoft.com/office/drawing/2010/main" val="0"/>
-              </a:ext>
-            </a:extLst>
-          </a:blip>
-          <a:stretch>
-            <a:fillRect/>
-          </a:stretch>
-        </p:blipFill>
-        <p:spPr>
-          <a:xfrm>
-            <a:off x="7674768" y="1042706"/>
-            <a:ext cx="1033463" cy="1281494"/>
-          </a:xfrm>
-          <a:prstGeom prst="rect">
-            <a:avLst/>
-          </a:prstGeom>
-        </p:spPr>
-      </p:pic>
-    </p:spTree>
-    <p:extLst>
-      <p:ext uri="{BB962C8B-B14F-4D97-AF65-F5344CB8AC3E}">
-        <p14:creationId xmlns:p14="http://schemas.microsoft.com/office/powerpoint/2010/main" val="721427499"/>
       </p:ext>
     </p:extLst>
   </p:cSld>
@@ -9758,7 +9765,7 @@
         </p:blipFill>
         <p:spPr>
           <a:xfrm>
-            <a:off x="1047502" y="2362822"/>
+            <a:off x="1047502" y="2092861"/>
             <a:ext cx="3131547" cy="2135676"/>
           </a:xfrm>
           <a:prstGeom prst="rect">
@@ -9788,7 +9795,7 @@
         </p:blipFill>
         <p:spPr>
           <a:xfrm>
-            <a:off x="5428426" y="2359344"/>
+            <a:off x="5428426" y="2089383"/>
             <a:ext cx="2763074" cy="2139154"/>
           </a:xfrm>
           <a:prstGeom prst="rect">
@@ -9804,7 +9811,7 @@
         </p:nvSpPr>
         <p:spPr>
           <a:xfrm>
-            <a:off x="3561941" y="2973048"/>
+            <a:off x="3561941" y="2703087"/>
             <a:ext cx="2016176" cy="793851"/>
           </a:xfrm>
           <a:prstGeom prst="rightArrow">
@@ -9864,7 +9871,7 @@
         <p:spPr>
           <a:xfrm>
             <a:off x="5488386" y="4498498"/>
-            <a:ext cx="2550548" cy="1978496"/>
+            <a:ext cx="3098265" cy="1978496"/>
           </a:xfrm>
           <a:prstGeom prst="rect">
             <a:avLst/>
@@ -10368,8 +10375,8 @@
           </a:p>
         </p:txBody>
       </p:sp>
-      <mc:AlternateContent xmlns:mc="http://schemas.openxmlformats.org/markup-compatibility/2006">
-        <mc:Choice xmlns:a14="http://schemas.microsoft.com/office/drawing/2010/main" Requires="a14">
+      <mc:AlternateContent xmlns:mc="http://schemas.openxmlformats.org/markup-compatibility/2006" xmlns:a14="http://schemas.microsoft.com/office/drawing/2010/main">
+        <mc:Choice Requires="a14">
           <p:sp>
             <p:nvSpPr>
               <p:cNvPr id="3" name="Segnaposto contenuto 2"/>
@@ -10416,15 +10423,7 @@
                 </a:r>
                 <a:r>
                   <a:rPr lang="it-IT" sz="2400" dirty="0" smtClean="0"/>
-                  <a:t>finale con </a:t>
-                </a:r>
-                <a:r>
-                  <a:rPr lang="it-IT" sz="2400" dirty="0" smtClean="0"/>
-                  <a:t>ostacolo </a:t>
-                </a:r>
-                <a:r>
-                  <a:rPr lang="it-IT" sz="2400" dirty="0" smtClean="0"/>
-                  <a:t>a </a:t>
+                  <a:t>finale con ostacolo a </a:t>
                 </a:r>
                 <a:r>
                   <a:rPr lang="it-IT" sz="2400" dirty="0"/>
@@ -10457,7 +10456,7 @@
                       <m:sSupPr>
                         <m:ctrlPr>
                           <a:rPr lang="it-IT" sz="2000" b="1" i="1">
-                            <a:latin typeface="Cambria Math" charset="0"/>
+                            <a:latin typeface="Cambria Math" panose="02040503050406030204" pitchFamily="18" charset="0"/>
                             <a:ea typeface="Lucida Grande" charset="0"/>
                             <a:cs typeface="Lucida Grande" charset="0"/>
                           </a:rPr>
@@ -10484,7 +10483,17 @@
                             <a:ea typeface="Lucida Grande" charset="0"/>
                             <a:cs typeface="Lucida Grande" charset="0"/>
                           </a:rPr>
-                          <m:t>−4</m:t>
+                          <m:t>−</m:t>
+                        </m:r>
+                        <m:r>
+                          <m:rPr>
+                            <m:nor/>
+                          </m:rPr>
+                          <a:rPr lang="it-IT" sz="2000" b="1">
+                            <a:ea typeface="Lucida Grande" charset="0"/>
+                            <a:cs typeface="Lucida Grande" charset="0"/>
+                          </a:rPr>
+                          <m:t>4</m:t>
                         </m:r>
                       </m:sup>
                     </m:sSup>
@@ -10500,11 +10509,7 @@
                 </a:r>
                 <a:r>
                   <a:rPr lang="it-IT" sz="2000" b="1" dirty="0" smtClean="0"/>
-                  <a:t>2.4</a:t>
-                </a:r>
-                <a:r>
-                  <a:rPr lang="it-IT" sz="2000" b="1" dirty="0" smtClean="0"/>
-                  <a:t>*</a:t>
+                  <a:t>2.4*</a:t>
                 </a:r>
                 <a14:m>
                   <m:oMath xmlns:m="http://schemas.openxmlformats.org/officeDocument/2006/math">
@@ -10512,7 +10517,7 @@
                       <m:sSupPr>
                         <m:ctrlPr>
                           <a:rPr lang="it-IT" sz="2000" b="1" i="1">
-                            <a:latin typeface="Cambria Math" charset="0"/>
+                            <a:latin typeface="Cambria Math" panose="02040503050406030204" pitchFamily="18" charset="0"/>
                             <a:ea typeface="Lucida Grande" charset="0"/>
                             <a:cs typeface="Lucida Grande" charset="0"/>
                           </a:rPr>
@@ -10539,7 +10544,17 @@
                             <a:ea typeface="Lucida Grande" charset="0"/>
                             <a:cs typeface="Lucida Grande" charset="0"/>
                           </a:rPr>
-                          <m:t>−4</m:t>
+                          <m:t>−</m:t>
+                        </m:r>
+                        <m:r>
+                          <m:rPr>
+                            <m:nor/>
+                          </m:rPr>
+                          <a:rPr lang="it-IT" sz="2000" b="1">
+                            <a:ea typeface="Lucida Grande" charset="0"/>
+                            <a:cs typeface="Lucida Grande" charset="0"/>
+                          </a:rPr>
+                          <m:t>4</m:t>
                         </m:r>
                       </m:sup>
                     </m:sSup>
@@ -10555,11 +10570,7 @@
                 </a:r>
                 <a:r>
                   <a:rPr lang="it-IT" sz="2000" b="1" dirty="0" smtClean="0"/>
-                  <a:t>6.5</a:t>
-                </a:r>
-                <a:r>
-                  <a:rPr lang="it-IT" sz="2000" b="1" dirty="0" smtClean="0"/>
-                  <a:t>*</a:t>
+                  <a:t>6.5*</a:t>
                 </a:r>
                 <a14:m>
                   <m:oMath xmlns:m="http://schemas.openxmlformats.org/officeDocument/2006/math">
@@ -10567,7 +10578,7 @@
                       <m:sSupPr>
                         <m:ctrlPr>
                           <a:rPr lang="it-IT" sz="2000" b="1" i="1">
-                            <a:latin typeface="Cambria Math" charset="0"/>
+                            <a:latin typeface="Cambria Math" panose="02040503050406030204" pitchFamily="18" charset="0"/>
                             <a:ea typeface="Lucida Grande" charset="0"/>
                             <a:cs typeface="Lucida Grande" charset="0"/>
                           </a:rPr>
@@ -10594,7 +10605,17 @@
                             <a:ea typeface="Lucida Grande" charset="0"/>
                             <a:cs typeface="Lucida Grande" charset="0"/>
                           </a:rPr>
-                          <m:t>−4</m:t>
+                          <m:t>−</m:t>
+                        </m:r>
+                        <m:r>
+                          <m:rPr>
+                            <m:nor/>
+                          </m:rPr>
+                          <a:rPr lang="it-IT" sz="2000" b="1">
+                            <a:ea typeface="Lucida Grande" charset="0"/>
+                            <a:cs typeface="Lucida Grande" charset="0"/>
+                          </a:rPr>
+                          <m:t>4</m:t>
                         </m:r>
                       </m:sup>
                     </m:sSup>
@@ -10605,7 +10626,7 @@
             </p:txBody>
           </p:sp>
         </mc:Choice>
-        <mc:Fallback>
+        <mc:Fallback xmlns="">
           <p:sp>
             <p:nvSpPr>
               <p:cNvPr id="3" name="Segnaposto contenuto 2"/>
@@ -11031,8 +11052,8 @@
           </a:p>
         </p:txBody>
       </p:sp>
-      <mc:AlternateContent xmlns:mc="http://schemas.openxmlformats.org/markup-compatibility/2006">
-        <mc:Choice xmlns:a14="http://schemas.microsoft.com/office/drawing/2010/main" Requires="a14">
+      <mc:AlternateContent xmlns:mc="http://schemas.openxmlformats.org/markup-compatibility/2006" xmlns:a14="http://schemas.microsoft.com/office/drawing/2010/main">
+        <mc:Choice Requires="a14">
           <p:sp>
             <p:nvSpPr>
               <p:cNvPr id="3" name="Segnaposto contenuto 2"/>
@@ -11071,11 +11092,7 @@
                 </a:r>
                 <a:r>
                   <a:rPr lang="it-IT" sz="2400" dirty="0" smtClean="0"/>
-                  <a:t>con </a:t>
-                </a:r>
-                <a:r>
-                  <a:rPr lang="it-IT" sz="2400" dirty="0" smtClean="0"/>
-                  <a:t>ostacolo </a:t>
+                  <a:t>con ostacolo </a:t>
                 </a:r>
                 <a:r>
                   <a:rPr lang="it-IT" sz="2400" dirty="0"/>
@@ -11128,7 +11145,7 @@
                       <m:sSupPr>
                         <m:ctrlPr>
                           <a:rPr lang="it-IT" sz="2000" b="1" i="1">
-                            <a:latin typeface="Cambria Math" charset="0"/>
+                            <a:latin typeface="Cambria Math" panose="02040503050406030204" pitchFamily="18" charset="0"/>
                             <a:ea typeface="Lucida Grande" charset="0"/>
                             <a:cs typeface="Lucida Grande" charset="0"/>
                           </a:rPr>
@@ -11155,7 +11172,17 @@
                             <a:ea typeface="Lucida Grande" charset="0"/>
                             <a:cs typeface="Lucida Grande" charset="0"/>
                           </a:rPr>
-                          <m:t>−4</m:t>
+                          <m:t>−</m:t>
+                        </m:r>
+                        <m:r>
+                          <m:rPr>
+                            <m:nor/>
+                          </m:rPr>
+                          <a:rPr lang="it-IT" sz="2000" b="1">
+                            <a:ea typeface="Lucida Grande" charset="0"/>
+                            <a:cs typeface="Lucida Grande" charset="0"/>
+                          </a:rPr>
+                          <m:t>4</m:t>
                         </m:r>
                       </m:sup>
                     </m:sSup>
@@ -11191,7 +11218,7 @@
                       <m:sSupPr>
                         <m:ctrlPr>
                           <a:rPr lang="it-IT" sz="2000" b="1" i="1">
-                            <a:latin typeface="Cambria Math" charset="0"/>
+                            <a:latin typeface="Cambria Math" panose="02040503050406030204" pitchFamily="18" charset="0"/>
                             <a:ea typeface="Lucida Grande" charset="0"/>
                             <a:cs typeface="Lucida Grande" charset="0"/>
                           </a:rPr>
@@ -11218,7 +11245,17 @@
                             <a:ea typeface="Lucida Grande" charset="0"/>
                             <a:cs typeface="Lucida Grande" charset="0"/>
                           </a:rPr>
-                          <m:t>−4</m:t>
+                          <m:t>−</m:t>
+                        </m:r>
+                        <m:r>
+                          <m:rPr>
+                            <m:nor/>
+                          </m:rPr>
+                          <a:rPr lang="it-IT" sz="2000" b="1">
+                            <a:ea typeface="Lucida Grande" charset="0"/>
+                            <a:cs typeface="Lucida Grande" charset="0"/>
+                          </a:rPr>
+                          <m:t>4</m:t>
                         </m:r>
                       </m:sup>
                     </m:sSup>
@@ -11254,7 +11291,7 @@
                       <m:sSupPr>
                         <m:ctrlPr>
                           <a:rPr lang="it-IT" sz="2000" b="1" i="1">
-                            <a:latin typeface="Cambria Math" charset="0"/>
+                            <a:latin typeface="Cambria Math" panose="02040503050406030204" pitchFamily="18" charset="0"/>
                             <a:ea typeface="Lucida Grande" charset="0"/>
                             <a:cs typeface="Lucida Grande" charset="0"/>
                           </a:rPr>
@@ -11281,7 +11318,17 @@
                             <a:ea typeface="Lucida Grande" charset="0"/>
                             <a:cs typeface="Lucida Grande" charset="0"/>
                           </a:rPr>
-                          <m:t>−4</m:t>
+                          <m:t>−</m:t>
+                        </m:r>
+                        <m:r>
+                          <m:rPr>
+                            <m:nor/>
+                          </m:rPr>
+                          <a:rPr lang="it-IT" sz="2000" b="1">
+                            <a:ea typeface="Lucida Grande" charset="0"/>
+                            <a:cs typeface="Lucida Grande" charset="0"/>
+                          </a:rPr>
+                          <m:t>4</m:t>
                         </m:r>
                       </m:sup>
                     </m:sSup>
@@ -11299,7 +11346,7 @@
             </p:txBody>
           </p:sp>
         </mc:Choice>
-        <mc:Fallback>
+        <mc:Fallback xmlns="">
           <p:sp>
             <p:nvSpPr>
               <p:cNvPr id="3" name="Segnaposto contenuto 2"/>
@@ -11516,8 +11563,8 @@
           </a:p>
         </p:txBody>
       </p:sp>
-      <mc:AlternateContent xmlns:mc="http://schemas.openxmlformats.org/markup-compatibility/2006">
-        <mc:Choice xmlns:a14="http://schemas.microsoft.com/office/drawing/2010/main" Requires="a14">
+      <mc:AlternateContent xmlns:mc="http://schemas.openxmlformats.org/markup-compatibility/2006" xmlns:a14="http://schemas.microsoft.com/office/drawing/2010/main">
+        <mc:Choice Requires="a14">
           <p:sp>
             <p:nvSpPr>
               <p:cNvPr id="3" name="Segnaposto contenuto 2"/>
@@ -11547,11 +11594,7 @@
                 </a:br>
                 <a:r>
                   <a:rPr lang="it-IT" sz="2400" b="1" dirty="0" smtClean="0"/>
-                  <a:t>10 </a:t>
-                </a:r>
-                <a:r>
-                  <a:rPr lang="it-IT" sz="2400" b="1" dirty="0" smtClean="0"/>
-                  <a:t>cm </a:t>
+                  <a:t>10 cm </a:t>
                 </a:r>
                 <a:r>
                   <a:rPr lang="it-IT" sz="2400" b="1" dirty="0"/>
@@ -11580,7 +11623,9 @@
                     <m:sSup>
                       <m:sSupPr>
                         <m:ctrlPr>
-                          <a:rPr lang="it-IT" sz="2400" b="1"/>
+                          <a:rPr lang="it-IT" sz="2400" b="1" i="1">
+                            <a:latin typeface="Cambria Math" panose="02040503050406030204" pitchFamily="18" charset="0"/>
+                          </a:rPr>
                         </m:ctrlPr>
                       </m:sSupPr>
                       <m:e>
@@ -11598,7 +11643,14 @@
                             <m:nor/>
                           </m:rPr>
                           <a:rPr lang="it-IT" sz="2400" b="1"/>
-                          <m:t>−4</m:t>
+                          <m:t>−</m:t>
+                        </m:r>
+                        <m:r>
+                          <m:rPr>
+                            <m:nor/>
+                          </m:rPr>
+                          <a:rPr lang="it-IT" sz="2400" b="1"/>
+                          <m:t>4</m:t>
                         </m:r>
                       </m:sup>
                     </m:sSup>
@@ -11613,7 +11665,9 @@
                     <m:sSup>
                       <m:sSupPr>
                         <m:ctrlPr>
-                          <a:rPr lang="it-IT" sz="2400" b="1"/>
+                          <a:rPr lang="it-IT" sz="2400" b="1" i="1">
+                            <a:latin typeface="Cambria Math" panose="02040503050406030204" pitchFamily="18" charset="0"/>
+                          </a:rPr>
                         </m:ctrlPr>
                       </m:sSupPr>
                       <m:e>
@@ -11631,7 +11685,14 @@
                             <m:nor/>
                           </m:rPr>
                           <a:rPr lang="it-IT" sz="2400" b="1"/>
-                          <m:t>−4</m:t>
+                          <m:t>−</m:t>
+                        </m:r>
+                        <m:r>
+                          <m:rPr>
+                            <m:nor/>
+                          </m:rPr>
+                          <a:rPr lang="it-IT" sz="2400" b="1"/>
+                          <m:t>4</m:t>
                         </m:r>
                       </m:sup>
                     </m:sSup>
@@ -11832,7 +11893,7 @@
             </p:txBody>
           </p:sp>
         </mc:Choice>
-        <mc:Fallback>
+        <mc:Fallback xmlns="">
           <p:sp>
             <p:nvSpPr>
               <p:cNvPr id="3" name="Segnaposto contenuto 2"/>
@@ -13333,11 +13394,7 @@
             </a:r>
             <a:r>
               <a:rPr lang="it-IT" sz="2200" kern="0" dirty="0" smtClean="0"/>
-              <a:t> di </a:t>
-            </a:r>
-            <a:r>
-              <a:rPr lang="it-IT" sz="2200" kern="0" dirty="0" smtClean="0"/>
-              <a:t>realizzazione e basso </a:t>
+              <a:t> di realizzazione e basso </a:t>
             </a:r>
             <a:r>
               <a:rPr lang="it-IT" sz="2200" b="1" kern="0" dirty="0"/>
@@ -14005,8 +14062,8 @@
           </p:sp>
         </mc:Fallback>
       </mc:AlternateContent>
-      <mc:AlternateContent xmlns:mc="http://schemas.openxmlformats.org/markup-compatibility/2006">
-        <mc:Choice xmlns:a14="http://schemas.microsoft.com/office/drawing/2010/main" Requires="a14">
+      <mc:AlternateContent xmlns:mc="http://schemas.openxmlformats.org/markup-compatibility/2006" xmlns:a14="http://schemas.microsoft.com/office/drawing/2010/main">
+        <mc:Choice Requires="a14">
           <p:sp>
             <p:nvSpPr>
               <p:cNvPr id="6" name="CasellaDiTesto 5"/>
@@ -14064,7 +14121,7 @@
                         <m:fPr>
                           <m:ctrlPr>
                             <a:rPr lang="it-IT" i="1" smtClean="0">
-                              <a:latin typeface="Cambria Math" charset="0"/>
+                              <a:latin typeface="Cambria Math" panose="02040503050406030204" pitchFamily="18" charset="0"/>
                               <a:ea typeface="Cambria Math" charset="0"/>
                               <a:cs typeface="Cambria Math" charset="0"/>
                             </a:rPr>
@@ -14075,7 +14132,7 @@
                             <m:sSubPr>
                               <m:ctrlPr>
                                 <a:rPr lang="it-IT" i="1" smtClean="0">
-                                  <a:latin typeface="Cambria Math" charset="0"/>
+                                  <a:latin typeface="Cambria Math" panose="02040503050406030204" pitchFamily="18" charset="0"/>
                                   <a:ea typeface="Cambria Math" charset="0"/>
                                   <a:cs typeface="Cambria Math" charset="0"/>
                                 </a:rPr>
@@ -14114,7 +14171,7 @@
                             <m:sSubPr>
                               <m:ctrlPr>
                                 <a:rPr lang="it-IT" b="0" i="1" smtClean="0">
-                                  <a:latin typeface="Cambria Math" charset="0"/>
+                                  <a:latin typeface="Cambria Math" panose="02040503050406030204" pitchFamily="18" charset="0"/>
                                   <a:ea typeface="Cambria Math" charset="0"/>
                                   <a:cs typeface="Cambria Math" charset="0"/>
                                 </a:rPr>
@@ -14161,7 +14218,7 @@
             </p:txBody>
           </p:sp>
         </mc:Choice>
-        <mc:Fallback>
+        <mc:Fallback xmlns="">
           <p:sp>
             <p:nvSpPr>
               <p:cNvPr id="6" name="CasellaDiTesto 5"/>
@@ -17217,6 +17274,15 @@
 </file>
 
 <file path=customXml/item1.xml><?xml version="1.0" encoding="utf-8"?>
+<?mso-contentType ?>
+<FormTemplates xmlns="http://schemas.microsoft.com/sharepoint/v3/contenttype/forms">
+  <Display>DocumentLibraryForm</Display>
+  <Edit>DocumentLibraryForm</Edit>
+  <New>DocumentLibraryForm</New>
+</FormTemplates>
+</file>
+
+<file path=customXml/item2.xml><?xml version="1.0" encoding="utf-8"?>
 <ct:contentTypeSchema xmlns:ct="http://schemas.microsoft.com/office/2006/metadata/contentType" xmlns:ma="http://schemas.microsoft.com/office/2006/metadata/properties/metaAttributes" ct:_="" ma:_="" ma:contentTypeName="Documento" ma:contentTypeID="0x010100DAC9E95AF84DC048A0D22167E412CEEC" ma:contentTypeVersion="0" ma:contentTypeDescription="Creare un nuovo documento." ma:contentTypeScope="" ma:versionID="77ab65c81d73c7b1811619c89623d2b9">
   <xsd:schema xmlns:xsd="http://www.w3.org/2001/XMLSchema" xmlns:xs="http://www.w3.org/2001/XMLSchema" xmlns:p="http://schemas.microsoft.com/office/2006/metadata/properties" targetNamespace="http://schemas.microsoft.com/office/2006/metadata/properties" ma:root="true" ma:fieldsID="8bf72f36140baa73d0623520154f6aaf">
     <xsd:element name="properties">
@@ -17330,15 +17396,6 @@
 </ct:contentTypeSchema>
 </file>
 
-<file path=customXml/item2.xml><?xml version="1.0" encoding="utf-8"?>
-<?mso-contentType ?>
-<FormTemplates xmlns="http://schemas.microsoft.com/sharepoint/v3/contenttype/forms">
-  <Display>DocumentLibraryForm</Display>
-  <Edit>DocumentLibraryForm</Edit>
-  <New>DocumentLibraryForm</New>
-</FormTemplates>
-</file>
-
 <file path=customXml/item3.xml><?xml version="1.0" encoding="utf-8"?>
 <p:properties xmlns:p="http://schemas.microsoft.com/office/2006/metadata/properties" xmlns:xsi="http://www.w3.org/2001/XMLSchema-instance" xmlns:pc="http://schemas.microsoft.com/office/infopath/2007/PartnerControls">
   <documentManagement/>
@@ -17346,6 +17403,14 @@
 </file>
 
 <file path=customXml/itemProps1.xml><?xml version="1.0" encoding="utf-8"?>
+<ds:datastoreItem xmlns:ds="http://schemas.openxmlformats.org/officeDocument/2006/customXml" ds:itemID="{642F071F-C090-42AB-8A40-E3A3A8F01244}">
+  <ds:schemaRefs>
+    <ds:schemaRef ds:uri="http://schemas.microsoft.com/sharepoint/v3/contenttype/forms"/>
+  </ds:schemaRefs>
+</ds:datastoreItem>
+</file>
+
+<file path=customXml/itemProps2.xml><?xml version="1.0" encoding="utf-8"?>
 <ds:datastoreItem xmlns:ds="http://schemas.openxmlformats.org/officeDocument/2006/customXml" ds:itemID="{B0C5135E-7452-41DD-A4B7-B217190CFF89}">
   <ds:schemaRefs>
     <ds:schemaRef ds:uri="http://schemas.microsoft.com/office/2006/metadata/contentType"/>
@@ -17357,14 +17422,6 @@
     <ds:schemaRef ds:uri="http://purl.org/dc/terms/"/>
     <ds:schemaRef ds:uri="http://schemas.microsoft.com/internal/obd"/>
     <ds:schemaRef ds:uri="http://schemas.microsoft.com/office/infopath/2007/PartnerControls"/>
-  </ds:schemaRefs>
-</ds:datastoreItem>
-</file>
-
-<file path=customXml/itemProps2.xml><?xml version="1.0" encoding="utf-8"?>
-<ds:datastoreItem xmlns:ds="http://schemas.openxmlformats.org/officeDocument/2006/customXml" ds:itemID="{642F071F-C090-42AB-8A40-E3A3A8F01244}">
-  <ds:schemaRefs>
-    <ds:schemaRef ds:uri="http://schemas.microsoft.com/sharepoint/v3/contenttype/forms"/>
   </ds:schemaRefs>
 </ds:datastoreItem>
 </file>

</xml_diff>

<commit_message>
sistemate alcune cose, mancano le immagini della parte diego e l’approfondimento su self-mix
</commit_message>
<xml_diff>
--- a/presentazione_discussione.pptx
+++ b/presentazione_discussione.pptx
@@ -5,10 +5,10 @@
     <p:sldMasterId id="2147483652" r:id="rId4"/>
   </p:sldMasterIdLst>
   <p:notesMasterIdLst>
-    <p:notesMasterId r:id="rId32"/>
+    <p:notesMasterId r:id="rId35"/>
   </p:notesMasterIdLst>
   <p:handoutMasterIdLst>
-    <p:handoutMasterId r:id="rId33"/>
+    <p:handoutMasterId r:id="rId36"/>
   </p:handoutMasterIdLst>
   <p:sldIdLst>
     <p:sldId id="277" r:id="rId5"/>
@@ -26,23 +26,26 @@
     <p:sldId id="308" r:id="rId17"/>
     <p:sldId id="289" r:id="rId18"/>
     <p:sldId id="305" r:id="rId19"/>
-    <p:sldId id="290" r:id="rId20"/>
-    <p:sldId id="291" r:id="rId21"/>
-    <p:sldId id="306" r:id="rId22"/>
-    <p:sldId id="312" r:id="rId23"/>
-    <p:sldId id="309" r:id="rId24"/>
-    <p:sldId id="294" r:id="rId25"/>
-    <p:sldId id="295" r:id="rId26"/>
-    <p:sldId id="303" r:id="rId27"/>
-    <p:sldId id="304" r:id="rId28"/>
-    <p:sldId id="297" r:id="rId29"/>
-    <p:sldId id="296" r:id="rId30"/>
-    <p:sldId id="300" r:id="rId31"/>
+    <p:sldId id="314" r:id="rId20"/>
+    <p:sldId id="315" r:id="rId21"/>
+    <p:sldId id="316" r:id="rId22"/>
+    <p:sldId id="317" r:id="rId23"/>
+    <p:sldId id="291" r:id="rId24"/>
+    <p:sldId id="306" r:id="rId25"/>
+    <p:sldId id="312" r:id="rId26"/>
+    <p:sldId id="309" r:id="rId27"/>
+    <p:sldId id="294" r:id="rId28"/>
+    <p:sldId id="295" r:id="rId29"/>
+    <p:sldId id="303" r:id="rId30"/>
+    <p:sldId id="304" r:id="rId31"/>
+    <p:sldId id="297" r:id="rId32"/>
+    <p:sldId id="296" r:id="rId33"/>
+    <p:sldId id="300" r:id="rId34"/>
   </p:sldIdLst>
   <p:sldSz cx="9144000" cy="6858000" type="screen4x3"/>
   <p:notesSz cx="7099300" cy="10234613"/>
   <p:custDataLst>
-    <p:tags r:id="rId34"/>
+    <p:tags r:id="rId37"/>
   </p:custDataLst>
   <p:defaultTextStyle>
     <a:defPPr>
@@ -207,45 +210,12 @@
 
 <file path=ppt/comments/comment1.xml><?xml version="1.0" encoding="utf-8"?>
 <p:cmLst xmlns:a="http://schemas.openxmlformats.org/drawingml/2006/main" xmlns:r="http://schemas.openxmlformats.org/officeDocument/2006/relationships" xmlns:p="http://schemas.openxmlformats.org/presentationml/2006/main">
-  <p:cm authorId="1" dt="2015-12-16T09:49:52.996" idx="3">
-    <p:pos x="10" y="10"/>
-    <p:text>misura lo spostamento</p:text>
+  <p:cm authorId="1" dt="2015-12-16T10:21:42.129" idx="9">
+    <p:pos x="5760" y="1134"/>
+    <p:text>mettere immagini/animazione</p:text>
     <p:extLst>
       <p:ext uri="{C676402C-5697-4E1C-873F-D02D1690AC5C}">
         <p15:threadingInfo xmlns:p15="http://schemas.microsoft.com/office/powerpoint/2012/main" timeZoneBias="-60"/>
-      </p:ext>
-    </p:extLst>
-  </p:cm>
-  <p:cm authorId="1" dt="2015-12-16T09:51:19.012" idx="4">
-    <p:pos x="10" y="146"/>
-    <p:text>e non la distanza,</p:text>
-    <p:extLst>
-      <p:ext uri="{C676402C-5697-4E1C-873F-D02D1690AC5C}">
-        <p15:threadingInfo xmlns:p15="http://schemas.microsoft.com/office/powerpoint/2012/main" timeZoneBias="-60">
-          <p15:parentCm authorId="1" idx="3"/>
-        </p15:threadingInfo>
-      </p:ext>
-    </p:extLst>
-  </p:cm>
-  <p:cm authorId="1" dt="2015-12-16T09:51:46.214" idx="5">
-    <p:pos x="10" y="282"/>
-    <p:text>architettura complessa</p:text>
-    <p:extLst>
-      <p:ext uri="{C676402C-5697-4E1C-873F-D02D1690AC5C}">
-        <p15:threadingInfo xmlns:p15="http://schemas.microsoft.com/office/powerpoint/2012/main" timeZoneBias="-60">
-          <p15:parentCm authorId="1" idx="3"/>
-        </p15:threadingInfo>
-      </p:ext>
-    </p:extLst>
-  </p:cm>
-  <p:cm authorId="1" dt="2015-12-16T09:52:10.237" idx="6">
-    <p:pos x="10" y="418"/>
-    <p:text>complesso allineamento ottico</p:text>
-    <p:extLst>
-      <p:ext uri="{C676402C-5697-4E1C-873F-D02D1690AC5C}">
-        <p15:threadingInfo xmlns:p15="http://schemas.microsoft.com/office/powerpoint/2012/main" timeZoneBias="-60">
-          <p15:parentCm authorId="1" idx="3"/>
-        </p15:threadingInfo>
       </p:ext>
     </p:extLst>
   </p:cm>
@@ -254,23 +224,12 @@
 
 <file path=ppt/comments/comment2.xml><?xml version="1.0" encoding="utf-8"?>
 <p:cmLst xmlns:a="http://schemas.openxmlformats.org/drawingml/2006/main" xmlns:r="http://schemas.openxmlformats.org/officeDocument/2006/relationships" xmlns:p="http://schemas.openxmlformats.org/presentationml/2006/main">
-  <p:cm authorId="1" dt="2015-12-16T09:52:22.747" idx="7">
-    <p:pos x="10" y="10"/>
-    <p:text>sistemare immagine</p:text>
+  <p:cm authorId="1" dt="2015-12-16T10:21:42.129" idx="9">
+    <p:pos x="5760" y="1134"/>
+    <p:text>mettere immagini/animazione</p:text>
     <p:extLst>
       <p:ext uri="{C676402C-5697-4E1C-873F-D02D1690AC5C}">
         <p15:threadingInfo xmlns:p15="http://schemas.microsoft.com/office/powerpoint/2012/main" timeZoneBias="-60"/>
-      </p:ext>
-    </p:extLst>
-  </p:cm>
-  <p:cm authorId="1" dt="2015-12-16T09:56:33.558" idx="8">
-    <p:pos x="10" y="146"/>
-    <p:text>il pro è che ci sono molti meno elementi</p:text>
-    <p:extLst>
-      <p:ext uri="{C676402C-5697-4E1C-873F-D02D1690AC5C}">
-        <p15:threadingInfo xmlns:p15="http://schemas.microsoft.com/office/powerpoint/2012/main" timeZoneBias="-60">
-          <p15:parentCm authorId="1" idx="7"/>
-        </p15:threadingInfo>
       </p:ext>
     </p:extLst>
   </p:cm>
@@ -293,9 +252,9 @@
 
 <file path=ppt/comments/comment4.xml><?xml version="1.0" encoding="utf-8"?>
 <p:cmLst xmlns:a="http://schemas.openxmlformats.org/drawingml/2006/main" xmlns:r="http://schemas.openxmlformats.org/officeDocument/2006/relationships" xmlns:p="http://schemas.openxmlformats.org/presentationml/2006/main">
-  <p:cm authorId="1" dt="2015-12-16T10:23:32.980" idx="10">
-    <p:pos x="3111" y="1518"/>
-    <p:text>aggiungere formule sull'interpolazione</p:text>
+  <p:cm authorId="1" dt="2015-12-16T10:21:42.129" idx="9">
+    <p:pos x="5760" y="1134"/>
+    <p:text>mettere immagini/animazione</p:text>
     <p:extLst>
       <p:ext uri="{C676402C-5697-4E1C-873F-D02D1690AC5C}">
         <p15:threadingInfo xmlns:p15="http://schemas.microsoft.com/office/powerpoint/2012/main" timeZoneBias="-60"/>
@@ -306,20 +265,6 @@
 </file>
 
 <file path=ppt/comments/comment5.xml><?xml version="1.0" encoding="utf-8"?>
-<p:cmLst xmlns:a="http://schemas.openxmlformats.org/drawingml/2006/main" xmlns:r="http://schemas.openxmlformats.org/officeDocument/2006/relationships" xmlns:p="http://schemas.openxmlformats.org/presentationml/2006/main">
-  <p:cm authorId="1" dt="2015-12-16T10:28:42.165" idx="11">
-    <p:pos x="10" y="10"/>
-    <p:text>suddivere in due slide</p:text>
-    <p:extLst>
-      <p:ext uri="{C676402C-5697-4E1C-873F-D02D1690AC5C}">
-        <p15:threadingInfo xmlns:p15="http://schemas.microsoft.com/office/powerpoint/2012/main" timeZoneBias="-60"/>
-      </p:ext>
-    </p:extLst>
-  </p:cm>
-</p:cmLst>
-</file>
-
-<file path=ppt/comments/comment6.xml><?xml version="1.0" encoding="utf-8"?>
 <p:cmLst xmlns:a="http://schemas.openxmlformats.org/drawingml/2006/main" xmlns:r="http://schemas.openxmlformats.org/officeDocument/2006/relationships" xmlns:p="http://schemas.openxmlformats.org/presentationml/2006/main">
   <p:cm authorId="1" dt="2015-12-16T10:35:26.815" idx="15">
     <p:pos x="4896" y="1755"/>
@@ -333,7 +278,7 @@
 </p:cmLst>
 </file>
 
-<file path=ppt/comments/comment7.xml><?xml version="1.0" encoding="utf-8"?>
+<file path=ppt/comments/comment6.xml><?xml version="1.0" encoding="utf-8"?>
 <p:cmLst xmlns:a="http://schemas.openxmlformats.org/drawingml/2006/main" xmlns:r="http://schemas.openxmlformats.org/officeDocument/2006/relationships" xmlns:p="http://schemas.openxmlformats.org/presentationml/2006/main">
   <p:cm authorId="1" dt="2015-12-16T10:33:04.661" idx="12">
     <p:pos x="5615" y="2713"/>
@@ -347,7 +292,7 @@
 </p:cmLst>
 </file>
 
-<file path=ppt/comments/comment8.xml><?xml version="1.0" encoding="utf-8"?>
+<file path=ppt/comments/comment7.xml><?xml version="1.0" encoding="utf-8"?>
 <p:cmLst xmlns:a="http://schemas.openxmlformats.org/drawingml/2006/main" xmlns:r="http://schemas.openxmlformats.org/officeDocument/2006/relationships" xmlns:p="http://schemas.openxmlformats.org/presentationml/2006/main">
   <p:cm authorId="1" dt="2015-12-16T10:33:21.314" idx="13">
     <p:pos x="5760" y="2641"/>
@@ -361,7 +306,7 @@
 </p:cmLst>
 </file>
 
-<file path=ppt/comments/comment9.xml><?xml version="1.0" encoding="utf-8"?>
+<file path=ppt/comments/comment8.xml><?xml version="1.0" encoding="utf-8"?>
 <p:cmLst xmlns:a="http://schemas.openxmlformats.org/drawingml/2006/main" xmlns:r="http://schemas.openxmlformats.org/officeDocument/2006/relationships" xmlns:p="http://schemas.openxmlformats.org/presentationml/2006/main">
   <p:cm authorId="1" dt="2015-12-16T10:34:08.054" idx="14">
     <p:pos x="5656" y="611"/>
@@ -1781,6 +1726,468 @@
 </p:notes>
 </file>
 
+<file path=ppt/notesSlides/notesSlide10.xml><?xml version="1.0" encoding="utf-8"?>
+<p:notes xmlns:a="http://schemas.openxmlformats.org/drawingml/2006/main" xmlns:r="http://schemas.openxmlformats.org/officeDocument/2006/relationships" xmlns:p="http://schemas.openxmlformats.org/presentationml/2006/main">
+  <p:cSld>
+    <p:spTree>
+      <p:nvGrpSpPr>
+        <p:cNvPr id="1" name=""/>
+        <p:cNvGrpSpPr/>
+        <p:nvPr/>
+      </p:nvGrpSpPr>
+      <p:grpSpPr>
+        <a:xfrm>
+          <a:off x="0" y="0"/>
+          <a:ext cx="0" cy="0"/>
+          <a:chOff x="0" y="0"/>
+          <a:chExt cx="0" cy="0"/>
+        </a:xfrm>
+      </p:grpSpPr>
+      <p:sp>
+        <p:nvSpPr>
+          <p:cNvPr id="2" name="Segnaposto immagine diapositiva 1"/>
+          <p:cNvSpPr>
+            <a:spLocks noGrp="1" noRot="1" noChangeAspect="1"/>
+          </p:cNvSpPr>
+          <p:nvPr>
+            <p:ph type="sldImg"/>
+          </p:nvPr>
+        </p:nvSpPr>
+        <p:spPr/>
+      </p:sp>
+      <p:sp>
+        <p:nvSpPr>
+          <p:cNvPr id="3" name="Segnaposto note 2"/>
+          <p:cNvSpPr>
+            <a:spLocks noGrp="1"/>
+          </p:cNvSpPr>
+          <p:nvPr>
+            <p:ph type="body" idx="1"/>
+          </p:nvPr>
+        </p:nvSpPr>
+        <p:spPr/>
+        <p:txBody>
+          <a:bodyPr/>
+          <a:lstStyle/>
+          <a:p>
+            <a:endParaRPr lang="it-IT" dirty="0"/>
+          </a:p>
+        </p:txBody>
+      </p:sp>
+      <p:sp>
+        <p:nvSpPr>
+          <p:cNvPr id="4" name="Segnaposto intestazione 3"/>
+          <p:cNvSpPr>
+            <a:spLocks noGrp="1"/>
+          </p:cNvSpPr>
+          <p:nvPr>
+            <p:ph type="hdr" sz="quarter" idx="10"/>
+          </p:nvPr>
+        </p:nvSpPr>
+        <p:spPr/>
+        <p:txBody>
+          <a:bodyPr/>
+          <a:lstStyle/>
+          <a:p>
+            <a:r>
+              <a:rPr lang="en-US" altLang="nl-NL" smtClean="0"/>
+              <a:t>Process synchronization</a:t>
+            </a:r>
+            <a:endParaRPr lang="en-US" altLang="nl-NL"/>
+          </a:p>
+        </p:txBody>
+      </p:sp>
+      <p:sp>
+        <p:nvSpPr>
+          <p:cNvPr id="5" name="Segnaposto data 4"/>
+          <p:cNvSpPr>
+            <a:spLocks noGrp="1"/>
+          </p:cNvSpPr>
+          <p:nvPr>
+            <p:ph type="dt" idx="11"/>
+          </p:nvPr>
+        </p:nvSpPr>
+        <p:spPr/>
+        <p:txBody>
+          <a:bodyPr/>
+          <a:lstStyle/>
+          <a:p>
+            <a:r>
+              <a:rPr lang="en-US" altLang="nl-NL" smtClean="0"/>
+              <a:t>Operating System</a:t>
+            </a:r>
+            <a:endParaRPr lang="en-US" altLang="nl-NL"/>
+          </a:p>
+        </p:txBody>
+      </p:sp>
+      <p:sp>
+        <p:nvSpPr>
+          <p:cNvPr id="6" name="Segnaposto piè di pagina 5"/>
+          <p:cNvSpPr>
+            <a:spLocks noGrp="1"/>
+          </p:cNvSpPr>
+          <p:nvPr>
+            <p:ph type="ftr" sz="quarter" idx="12"/>
+          </p:nvPr>
+        </p:nvSpPr>
+        <p:spPr/>
+        <p:txBody>
+          <a:bodyPr/>
+          <a:lstStyle/>
+          <a:p>
+            <a:r>
+              <a:rPr lang="en-US" altLang="nl-NL" smtClean="0"/>
+              <a:t>© 2005 William Fornaciari</a:t>
+            </a:r>
+            <a:endParaRPr lang="en-US" altLang="nl-NL"/>
+          </a:p>
+        </p:txBody>
+      </p:sp>
+      <p:sp>
+        <p:nvSpPr>
+          <p:cNvPr id="7" name="Segnaposto numero diapositiva 6"/>
+          <p:cNvSpPr>
+            <a:spLocks noGrp="1"/>
+          </p:cNvSpPr>
+          <p:nvPr>
+            <p:ph type="sldNum" sz="quarter" idx="13"/>
+          </p:nvPr>
+        </p:nvSpPr>
+        <p:spPr/>
+        <p:txBody>
+          <a:bodyPr/>
+          <a:lstStyle/>
+          <a:p>
+            <a:fld id="{88C0D9CF-78A8-4FBE-960E-41C6F5A4AF95}" type="slidenum">
+              <a:rPr lang="en-US" altLang="nl-NL" smtClean="0"/>
+              <a:pPr/>
+              <a:t>23</a:t>
+            </a:fld>
+            <a:endParaRPr lang="en-US" altLang="nl-NL"/>
+          </a:p>
+        </p:txBody>
+      </p:sp>
+    </p:spTree>
+    <p:extLst>
+      <p:ext uri="{BB962C8B-B14F-4D97-AF65-F5344CB8AC3E}">
+        <p14:creationId xmlns:p14="http://schemas.microsoft.com/office/powerpoint/2010/main" val="3617987220"/>
+      </p:ext>
+    </p:extLst>
+  </p:cSld>
+  <p:clrMapOvr>
+    <a:masterClrMapping/>
+  </p:clrMapOvr>
+</p:notes>
+</file>
+
+<file path=ppt/notesSlides/notesSlide11.xml><?xml version="1.0" encoding="utf-8"?>
+<p:notes xmlns:a="http://schemas.openxmlformats.org/drawingml/2006/main" xmlns:r="http://schemas.openxmlformats.org/officeDocument/2006/relationships" xmlns:p="http://schemas.openxmlformats.org/presentationml/2006/main">
+  <p:cSld>
+    <p:spTree>
+      <p:nvGrpSpPr>
+        <p:cNvPr id="1" name=""/>
+        <p:cNvGrpSpPr/>
+        <p:nvPr/>
+      </p:nvGrpSpPr>
+      <p:grpSpPr>
+        <a:xfrm>
+          <a:off x="0" y="0"/>
+          <a:ext cx="0" cy="0"/>
+          <a:chOff x="0" y="0"/>
+          <a:chExt cx="0" cy="0"/>
+        </a:xfrm>
+      </p:grpSpPr>
+      <p:sp>
+        <p:nvSpPr>
+          <p:cNvPr id="2" name="Segnaposto immagine diapositiva 1"/>
+          <p:cNvSpPr>
+            <a:spLocks noGrp="1" noRot="1" noChangeAspect="1"/>
+          </p:cNvSpPr>
+          <p:nvPr>
+            <p:ph type="sldImg"/>
+          </p:nvPr>
+        </p:nvSpPr>
+        <p:spPr/>
+      </p:sp>
+      <p:sp>
+        <p:nvSpPr>
+          <p:cNvPr id="3" name="Segnaposto note 2"/>
+          <p:cNvSpPr>
+            <a:spLocks noGrp="1"/>
+          </p:cNvSpPr>
+          <p:nvPr>
+            <p:ph type="body" idx="1"/>
+          </p:nvPr>
+        </p:nvSpPr>
+        <p:spPr/>
+        <p:txBody>
+          <a:bodyPr/>
+          <a:lstStyle/>
+          <a:p>
+            <a:endParaRPr lang="it-IT" dirty="0"/>
+          </a:p>
+        </p:txBody>
+      </p:sp>
+      <p:sp>
+        <p:nvSpPr>
+          <p:cNvPr id="4" name="Segnaposto intestazione 3"/>
+          <p:cNvSpPr>
+            <a:spLocks noGrp="1"/>
+          </p:cNvSpPr>
+          <p:nvPr>
+            <p:ph type="hdr" sz="quarter" idx="10"/>
+          </p:nvPr>
+        </p:nvSpPr>
+        <p:spPr/>
+        <p:txBody>
+          <a:bodyPr/>
+          <a:lstStyle/>
+          <a:p>
+            <a:r>
+              <a:rPr lang="en-US" altLang="nl-NL" smtClean="0"/>
+              <a:t>Process synchronization</a:t>
+            </a:r>
+            <a:endParaRPr lang="en-US" altLang="nl-NL"/>
+          </a:p>
+        </p:txBody>
+      </p:sp>
+      <p:sp>
+        <p:nvSpPr>
+          <p:cNvPr id="5" name="Segnaposto data 4"/>
+          <p:cNvSpPr>
+            <a:spLocks noGrp="1"/>
+          </p:cNvSpPr>
+          <p:nvPr>
+            <p:ph type="dt" idx="11"/>
+          </p:nvPr>
+        </p:nvSpPr>
+        <p:spPr/>
+        <p:txBody>
+          <a:bodyPr/>
+          <a:lstStyle/>
+          <a:p>
+            <a:r>
+              <a:rPr lang="en-US" altLang="nl-NL" smtClean="0"/>
+              <a:t>Operating System</a:t>
+            </a:r>
+            <a:endParaRPr lang="en-US" altLang="nl-NL"/>
+          </a:p>
+        </p:txBody>
+      </p:sp>
+      <p:sp>
+        <p:nvSpPr>
+          <p:cNvPr id="6" name="Segnaposto piè di pagina 5"/>
+          <p:cNvSpPr>
+            <a:spLocks noGrp="1"/>
+          </p:cNvSpPr>
+          <p:nvPr>
+            <p:ph type="ftr" sz="quarter" idx="12"/>
+          </p:nvPr>
+        </p:nvSpPr>
+        <p:spPr/>
+        <p:txBody>
+          <a:bodyPr/>
+          <a:lstStyle/>
+          <a:p>
+            <a:r>
+              <a:rPr lang="en-US" altLang="nl-NL" smtClean="0"/>
+              <a:t>© 2005 William Fornaciari</a:t>
+            </a:r>
+            <a:endParaRPr lang="en-US" altLang="nl-NL"/>
+          </a:p>
+        </p:txBody>
+      </p:sp>
+      <p:sp>
+        <p:nvSpPr>
+          <p:cNvPr id="7" name="Segnaposto numero diapositiva 6"/>
+          <p:cNvSpPr>
+            <a:spLocks noGrp="1"/>
+          </p:cNvSpPr>
+          <p:nvPr>
+            <p:ph type="sldNum" sz="quarter" idx="13"/>
+          </p:nvPr>
+        </p:nvSpPr>
+        <p:spPr/>
+        <p:txBody>
+          <a:bodyPr/>
+          <a:lstStyle/>
+          <a:p>
+            <a:fld id="{88C0D9CF-78A8-4FBE-960E-41C6F5A4AF95}" type="slidenum">
+              <a:rPr lang="en-US" altLang="nl-NL" smtClean="0"/>
+              <a:pPr/>
+              <a:t>25</a:t>
+            </a:fld>
+            <a:endParaRPr lang="en-US" altLang="nl-NL"/>
+          </a:p>
+        </p:txBody>
+      </p:sp>
+    </p:spTree>
+    <p:extLst>
+      <p:ext uri="{BB962C8B-B14F-4D97-AF65-F5344CB8AC3E}">
+        <p14:creationId xmlns:p14="http://schemas.microsoft.com/office/powerpoint/2010/main" val="767066249"/>
+      </p:ext>
+    </p:extLst>
+  </p:cSld>
+  <p:clrMapOvr>
+    <a:masterClrMapping/>
+  </p:clrMapOvr>
+</p:notes>
+</file>
+
+<file path=ppt/notesSlides/notesSlide12.xml><?xml version="1.0" encoding="utf-8"?>
+<p:notes xmlns:a="http://schemas.openxmlformats.org/drawingml/2006/main" xmlns:r="http://schemas.openxmlformats.org/officeDocument/2006/relationships" xmlns:p="http://schemas.openxmlformats.org/presentationml/2006/main">
+  <p:cSld>
+    <p:spTree>
+      <p:nvGrpSpPr>
+        <p:cNvPr id="1" name=""/>
+        <p:cNvGrpSpPr/>
+        <p:nvPr/>
+      </p:nvGrpSpPr>
+      <p:grpSpPr>
+        <a:xfrm>
+          <a:off x="0" y="0"/>
+          <a:ext cx="0" cy="0"/>
+          <a:chOff x="0" y="0"/>
+          <a:chExt cx="0" cy="0"/>
+        </a:xfrm>
+      </p:grpSpPr>
+      <p:sp>
+        <p:nvSpPr>
+          <p:cNvPr id="2" name="Segnaposto immagine diapositiva 1"/>
+          <p:cNvSpPr>
+            <a:spLocks noGrp="1" noRot="1" noChangeAspect="1"/>
+          </p:cNvSpPr>
+          <p:nvPr>
+            <p:ph type="sldImg"/>
+          </p:nvPr>
+        </p:nvSpPr>
+        <p:spPr/>
+      </p:sp>
+      <p:sp>
+        <p:nvSpPr>
+          <p:cNvPr id="3" name="Segnaposto note 2"/>
+          <p:cNvSpPr>
+            <a:spLocks noGrp="1"/>
+          </p:cNvSpPr>
+          <p:nvPr>
+            <p:ph type="body" idx="1"/>
+          </p:nvPr>
+        </p:nvSpPr>
+        <p:spPr/>
+        <p:txBody>
+          <a:bodyPr/>
+          <a:lstStyle/>
+          <a:p>
+            <a:endParaRPr lang="it-IT" dirty="0"/>
+          </a:p>
+        </p:txBody>
+      </p:sp>
+      <p:sp>
+        <p:nvSpPr>
+          <p:cNvPr id="4" name="Segnaposto intestazione 3"/>
+          <p:cNvSpPr>
+            <a:spLocks noGrp="1"/>
+          </p:cNvSpPr>
+          <p:nvPr>
+            <p:ph type="hdr" sz="quarter" idx="10"/>
+          </p:nvPr>
+        </p:nvSpPr>
+        <p:spPr/>
+        <p:txBody>
+          <a:bodyPr/>
+          <a:lstStyle/>
+          <a:p>
+            <a:r>
+              <a:rPr lang="en-US" altLang="nl-NL" smtClean="0"/>
+              <a:t>Process synchronization</a:t>
+            </a:r>
+            <a:endParaRPr lang="en-US" altLang="nl-NL"/>
+          </a:p>
+        </p:txBody>
+      </p:sp>
+      <p:sp>
+        <p:nvSpPr>
+          <p:cNvPr id="5" name="Segnaposto data 4"/>
+          <p:cNvSpPr>
+            <a:spLocks noGrp="1"/>
+          </p:cNvSpPr>
+          <p:nvPr>
+            <p:ph type="dt" idx="11"/>
+          </p:nvPr>
+        </p:nvSpPr>
+        <p:spPr/>
+        <p:txBody>
+          <a:bodyPr/>
+          <a:lstStyle/>
+          <a:p>
+            <a:r>
+              <a:rPr lang="en-US" altLang="nl-NL" smtClean="0"/>
+              <a:t>Operating System</a:t>
+            </a:r>
+            <a:endParaRPr lang="en-US" altLang="nl-NL"/>
+          </a:p>
+        </p:txBody>
+      </p:sp>
+      <p:sp>
+        <p:nvSpPr>
+          <p:cNvPr id="6" name="Segnaposto piè di pagina 5"/>
+          <p:cNvSpPr>
+            <a:spLocks noGrp="1"/>
+          </p:cNvSpPr>
+          <p:nvPr>
+            <p:ph type="ftr" sz="quarter" idx="12"/>
+          </p:nvPr>
+        </p:nvSpPr>
+        <p:spPr/>
+        <p:txBody>
+          <a:bodyPr/>
+          <a:lstStyle/>
+          <a:p>
+            <a:r>
+              <a:rPr lang="en-US" altLang="nl-NL" smtClean="0"/>
+              <a:t>© 2005 William Fornaciari</a:t>
+            </a:r>
+            <a:endParaRPr lang="en-US" altLang="nl-NL"/>
+          </a:p>
+        </p:txBody>
+      </p:sp>
+      <p:sp>
+        <p:nvSpPr>
+          <p:cNvPr id="7" name="Segnaposto numero diapositiva 6"/>
+          <p:cNvSpPr>
+            <a:spLocks noGrp="1"/>
+          </p:cNvSpPr>
+          <p:nvPr>
+            <p:ph type="sldNum" sz="quarter" idx="13"/>
+          </p:nvPr>
+        </p:nvSpPr>
+        <p:spPr/>
+        <p:txBody>
+          <a:bodyPr/>
+          <a:lstStyle/>
+          <a:p>
+            <a:fld id="{88C0D9CF-78A8-4FBE-960E-41C6F5A4AF95}" type="slidenum">
+              <a:rPr lang="en-US" altLang="nl-NL" smtClean="0"/>
+              <a:pPr/>
+              <a:t>27</a:t>
+            </a:fld>
+            <a:endParaRPr lang="en-US" altLang="nl-NL"/>
+          </a:p>
+        </p:txBody>
+      </p:sp>
+    </p:spTree>
+    <p:extLst>
+      <p:ext uri="{BB962C8B-B14F-4D97-AF65-F5344CB8AC3E}">
+        <p14:creationId xmlns:p14="http://schemas.microsoft.com/office/powerpoint/2010/main" val="1645933681"/>
+      </p:ext>
+    </p:extLst>
+  </p:cSld>
+  <p:clrMapOvr>
+    <a:masterClrMapping/>
+  </p:clrMapOvr>
+</p:notes>
+</file>
+
 <file path=ppt/notesSlides/notesSlide2.xml><?xml version="1.0" encoding="utf-8"?>
 <p:notes xmlns:a="http://schemas.openxmlformats.org/drawingml/2006/main" xmlns:r="http://schemas.openxmlformats.org/officeDocument/2006/relationships" xmlns:p="http://schemas.openxmlformats.org/presentationml/2006/main">
   <p:cSld>
@@ -2541,7 +2948,7 @@
     </p:spTree>
     <p:extLst>
       <p:ext uri="{BB962C8B-B14F-4D97-AF65-F5344CB8AC3E}">
-        <p14:creationId xmlns:p14="http://schemas.microsoft.com/office/powerpoint/2010/main" val="2032454154"/>
+        <p14:creationId xmlns:p14="http://schemas.microsoft.com/office/powerpoint/2010/main" val="94307398"/>
       </p:ext>
     </p:extLst>
   </p:cSld>
@@ -2686,7 +3093,7 @@
             <a:fld id="{88C0D9CF-78A8-4FBE-960E-41C6F5A4AF95}" type="slidenum">
               <a:rPr lang="en-US" altLang="nl-NL" smtClean="0"/>
               <a:pPr/>
-              <a:t>20</a:t>
+              <a:t>17</a:t>
             </a:fld>
             <a:endParaRPr lang="en-US" altLang="nl-NL"/>
           </a:p>
@@ -2695,7 +3102,7 @@
     </p:spTree>
     <p:extLst>
       <p:ext uri="{BB962C8B-B14F-4D97-AF65-F5344CB8AC3E}">
-        <p14:creationId xmlns:p14="http://schemas.microsoft.com/office/powerpoint/2010/main" val="3617987220"/>
+        <p14:creationId xmlns:p14="http://schemas.microsoft.com/office/powerpoint/2010/main" val="181271232"/>
       </p:ext>
     </p:extLst>
   </p:cSld>
@@ -2840,7 +3247,7 @@
             <a:fld id="{88C0D9CF-78A8-4FBE-960E-41C6F5A4AF95}" type="slidenum">
               <a:rPr lang="en-US" altLang="nl-NL" smtClean="0"/>
               <a:pPr/>
-              <a:t>22</a:t>
+              <a:t>18</a:t>
             </a:fld>
             <a:endParaRPr lang="en-US" altLang="nl-NL"/>
           </a:p>
@@ -2849,7 +3256,7 @@
     </p:spTree>
     <p:extLst>
       <p:ext uri="{BB962C8B-B14F-4D97-AF65-F5344CB8AC3E}">
-        <p14:creationId xmlns:p14="http://schemas.microsoft.com/office/powerpoint/2010/main" val="767066249"/>
+        <p14:creationId xmlns:p14="http://schemas.microsoft.com/office/powerpoint/2010/main" val="1597141723"/>
       </p:ext>
     </p:extLst>
   </p:cSld>
@@ -2994,7 +3401,7 @@
             <a:fld id="{88C0D9CF-78A8-4FBE-960E-41C6F5A4AF95}" type="slidenum">
               <a:rPr lang="en-US" altLang="nl-NL" smtClean="0"/>
               <a:pPr/>
-              <a:t>24</a:t>
+              <a:t>19</a:t>
             </a:fld>
             <a:endParaRPr lang="en-US" altLang="nl-NL"/>
           </a:p>
@@ -3003,7 +3410,7 @@
     </p:spTree>
     <p:extLst>
       <p:ext uri="{BB962C8B-B14F-4D97-AF65-F5344CB8AC3E}">
-        <p14:creationId xmlns:p14="http://schemas.microsoft.com/office/powerpoint/2010/main" val="1645933681"/>
+        <p14:creationId xmlns:p14="http://schemas.microsoft.com/office/powerpoint/2010/main" val="733450907"/>
       </p:ext>
     </p:extLst>
   </p:cSld>
@@ -9735,17 +10142,13 @@
             <a:pPr lvl="1"/>
             <a:r>
               <a:rPr lang="it-IT" sz="2000" b="1" dirty="0" smtClean="0"/>
-              <a:t>Generazione</a:t>
-            </a:r>
-            <a:r>
-              <a:rPr lang="it-IT" sz="2000" dirty="0" smtClean="0"/>
-              <a:t> del </a:t>
+              <a:t>Generazione del </a:t>
             </a:r>
             <a:br>
-              <a:rPr lang="it-IT" sz="2000" dirty="0" smtClean="0"/>
+              <a:rPr lang="it-IT" sz="2000" b="1" dirty="0" smtClean="0"/>
             </a:br>
             <a:r>
-              <a:rPr lang="it-IT" sz="2000" dirty="0" smtClean="0"/>
+              <a:rPr lang="it-IT" sz="2000" b="1" dirty="0" smtClean="0"/>
               <a:t>segnale di modulazione </a:t>
             </a:r>
             <a:r>
@@ -9760,12 +10163,8 @@
           <a:p>
             <a:pPr lvl="1"/>
             <a:r>
-              <a:rPr lang="it-IT" sz="2000" b="1" dirty="0" smtClean="0"/>
-              <a:t>Campionamento</a:t>
-            </a:r>
-            <a:r>
               <a:rPr lang="it-IT" sz="2000" dirty="0" smtClean="0"/>
-              <a:t> </a:t>
+              <a:t>Campionamento </a:t>
             </a:r>
             <a:br>
               <a:rPr lang="it-IT" sz="2000" dirty="0" smtClean="0"/>
@@ -9801,19 +10200,19 @@
             </a:br>
             <a:r>
               <a:rPr lang="it-IT" sz="2000" dirty="0" smtClean="0"/>
-              <a:t>della </a:t>
+              <a:t>della Fast Fourier </a:t>
+            </a:r>
+            <a:r>
+              <a:rPr lang="it-IT" sz="2000" dirty="0" err="1" smtClean="0"/>
+              <a:t>Transform</a:t>
+            </a:r>
+            <a:r>
+              <a:rPr lang="it-IT" sz="2000" dirty="0" smtClean="0"/>
+              <a:t> </a:t>
             </a:r>
             <a:r>
               <a:rPr lang="it-IT" sz="2000" b="1" dirty="0" smtClean="0"/>
-              <a:t>Fast Fourier </a:t>
-            </a:r>
-            <a:r>
-              <a:rPr lang="it-IT" sz="2000" b="1" dirty="0" err="1" smtClean="0"/>
-              <a:t>Transform</a:t>
-            </a:r>
-            <a:r>
-              <a:rPr lang="it-IT" sz="2000" b="1" dirty="0" smtClean="0"/>
-              <a:t> </a:t>
+              <a:t/>
             </a:r>
             <a:br>
               <a:rPr lang="it-IT" sz="2000" b="1" dirty="0" smtClean="0"/>
@@ -9838,15 +10237,7 @@
             </a:br>
             <a:r>
               <a:rPr lang="it-IT" sz="2000" dirty="0" smtClean="0"/>
-              <a:t>del </a:t>
-            </a:r>
-            <a:r>
-              <a:rPr lang="it-IT" sz="2000" b="1" dirty="0" smtClean="0"/>
-              <a:t>tono fondamentale </a:t>
-            </a:r>
-            <a:r>
-              <a:rPr lang="it-IT" sz="2000" dirty="0" smtClean="0"/>
-              <a:t>dal FFT</a:t>
+              <a:t>del tono fondamentale dal FFT</a:t>
             </a:r>
           </a:p>
         </p:txBody>
@@ -9871,44 +10262,14 @@
               <a:pPr/>
               <a:t>16</a:t>
             </a:fld>
-            <a:endParaRPr lang="en-US" altLang="nl-NL"/>
-          </a:p>
-        </p:txBody>
-      </p:sp>
-      <p:pic>
-        <p:nvPicPr>
-          <p:cNvPr id="5" name="Immagine 4"/>
-          <p:cNvPicPr>
-            <a:picLocks noChangeAspect="1"/>
-          </p:cNvPicPr>
-          <p:nvPr/>
-        </p:nvPicPr>
-        <p:blipFill>
-          <a:blip r:embed="rId3">
-            <a:extLst>
-              <a:ext uri="{28A0092B-C50C-407E-A947-70E740481C1C}">
-                <a14:useLocalDpi xmlns:a14="http://schemas.microsoft.com/office/drawing/2010/main" val="0"/>
-              </a:ext>
-            </a:extLst>
-          </a:blip>
-          <a:stretch>
-            <a:fillRect/>
-          </a:stretch>
-        </p:blipFill>
-        <p:spPr>
-          <a:xfrm>
-            <a:off x="5469076" y="1799777"/>
-            <a:ext cx="3674924" cy="4317819"/>
-          </a:xfrm>
-          <a:prstGeom prst="rect">
-            <a:avLst/>
-          </a:prstGeom>
-        </p:spPr>
-      </p:pic>
+            <a:endParaRPr lang="en-US" altLang="nl-NL" dirty="0"/>
+          </a:p>
+        </p:txBody>
+      </p:sp>
     </p:spTree>
     <p:extLst>
       <p:ext uri="{BB962C8B-B14F-4D97-AF65-F5344CB8AC3E}">
-        <p14:creationId xmlns:p14="http://schemas.microsoft.com/office/powerpoint/2010/main" val="2462577009"/>
+        <p14:creationId xmlns:p14="http://schemas.microsoft.com/office/powerpoint/2010/main" val="772970072"/>
       </p:ext>
     </p:extLst>
   </p:cSld>
@@ -9959,6 +10320,880 @@
           <a:p>
             <a:r>
               <a:rPr lang="it-IT" dirty="0" smtClean="0"/>
+              <a:t>FPGA</a:t>
+            </a:r>
+            <a:endParaRPr lang="it-IT" dirty="0"/>
+          </a:p>
+        </p:txBody>
+      </p:sp>
+      <p:sp>
+        <p:nvSpPr>
+          <p:cNvPr id="3" name="Segnaposto contenuto 2"/>
+          <p:cNvSpPr>
+            <a:spLocks noGrp="1"/>
+          </p:cNvSpPr>
+          <p:nvPr>
+            <p:ph idx="1"/>
+          </p:nvPr>
+        </p:nvSpPr>
+        <p:spPr>
+          <a:xfrm>
+            <a:off x="609600" y="1024102"/>
+            <a:ext cx="8120063" cy="5093494"/>
+          </a:xfrm>
+        </p:spPr>
+        <p:txBody>
+          <a:bodyPr/>
+          <a:lstStyle/>
+          <a:p>
+            <a:r>
+              <a:rPr lang="it-IT" sz="2400" dirty="0" smtClean="0"/>
+              <a:t>Le funzionalità svolte in hardware dal FPGA sono:</a:t>
+            </a:r>
+            <a:br>
+              <a:rPr lang="it-IT" sz="2400" dirty="0" smtClean="0"/>
+            </a:br>
+            <a:endParaRPr lang="it-IT" sz="2400" dirty="0" smtClean="0"/>
+          </a:p>
+          <a:p>
+            <a:pPr lvl="1"/>
+            <a:r>
+              <a:rPr lang="it-IT" sz="2000" dirty="0" smtClean="0"/>
+              <a:t>Generazione del </a:t>
+            </a:r>
+            <a:br>
+              <a:rPr lang="it-IT" sz="2000" dirty="0" smtClean="0"/>
+            </a:br>
+            <a:r>
+              <a:rPr lang="it-IT" sz="2000" dirty="0" smtClean="0"/>
+              <a:t>segnale di modulazione </a:t>
+            </a:r>
+            <a:r>
+              <a:rPr lang="it-IT" sz="2000" i="1" dirty="0" smtClean="0"/>
+              <a:t/>
+            </a:r>
+            <a:br>
+              <a:rPr lang="it-IT" sz="2000" i="1" dirty="0" smtClean="0"/>
+            </a:br>
+            <a:endParaRPr lang="it-IT" sz="2000" i="1" dirty="0" smtClean="0"/>
+          </a:p>
+          <a:p>
+            <a:pPr lvl="1"/>
+            <a:r>
+              <a:rPr lang="it-IT" sz="2000" b="1" dirty="0" smtClean="0"/>
+              <a:t>Campionamento </a:t>
+            </a:r>
+            <a:br>
+              <a:rPr lang="it-IT" sz="2000" b="1" dirty="0" smtClean="0"/>
+            </a:br>
+            <a:r>
+              <a:rPr lang="it-IT" sz="2000" b="1" dirty="0" smtClean="0"/>
+              <a:t>del segnale interferometrico </a:t>
+            </a:r>
+            <a:br>
+              <a:rPr lang="it-IT" sz="2000" b="1" dirty="0" smtClean="0"/>
+            </a:br>
+            <a:r>
+              <a:rPr lang="it-IT" sz="2000" b="1" dirty="0" smtClean="0"/>
+              <a:t>a </a:t>
+            </a:r>
+            <a:r>
+              <a:rPr lang="it-IT" sz="2000" b="1" i="1" dirty="0" smtClean="0"/>
+              <a:t>30MHz</a:t>
+            </a:r>
+            <a:r>
+              <a:rPr lang="it-IT" sz="2000" i="1" dirty="0" smtClean="0"/>
+              <a:t/>
+            </a:r>
+            <a:br>
+              <a:rPr lang="it-IT" sz="2000" i="1" dirty="0" smtClean="0"/>
+            </a:br>
+            <a:endParaRPr lang="it-IT" sz="2000" i="1" dirty="0" smtClean="0"/>
+          </a:p>
+          <a:p>
+            <a:pPr lvl="1"/>
+            <a:r>
+              <a:rPr lang="it-IT" sz="2000" dirty="0" smtClean="0"/>
+              <a:t>Calcolo </a:t>
+            </a:r>
+            <a:br>
+              <a:rPr lang="it-IT" sz="2000" dirty="0" smtClean="0"/>
+            </a:br>
+            <a:r>
+              <a:rPr lang="it-IT" sz="2000" dirty="0" smtClean="0"/>
+              <a:t>della Fast Fourier </a:t>
+            </a:r>
+            <a:r>
+              <a:rPr lang="it-IT" sz="2000" dirty="0" err="1" smtClean="0"/>
+              <a:t>Transform</a:t>
+            </a:r>
+            <a:r>
+              <a:rPr lang="it-IT" sz="2000" dirty="0" smtClean="0"/>
+              <a:t> </a:t>
+            </a:r>
+            <a:r>
+              <a:rPr lang="it-IT" sz="2000" b="1" dirty="0" smtClean="0"/>
+              <a:t/>
+            </a:r>
+            <a:br>
+              <a:rPr lang="it-IT" sz="2000" b="1" dirty="0" smtClean="0"/>
+            </a:br>
+            <a:r>
+              <a:rPr lang="it-IT" sz="2000" dirty="0" smtClean="0"/>
+              <a:t>(FFT)</a:t>
+            </a:r>
+            <a:br>
+              <a:rPr lang="it-IT" sz="2000" dirty="0" smtClean="0"/>
+            </a:br>
+            <a:endParaRPr lang="it-IT" sz="2000" dirty="0" smtClean="0"/>
+          </a:p>
+          <a:p>
+            <a:pPr lvl="1"/>
+            <a:r>
+              <a:rPr lang="it-IT" sz="2000" dirty="0" smtClean="0"/>
+              <a:t>Estrazione </a:t>
+            </a:r>
+            <a:br>
+              <a:rPr lang="it-IT" sz="2000" dirty="0" smtClean="0"/>
+            </a:br>
+            <a:r>
+              <a:rPr lang="it-IT" sz="2000" dirty="0" smtClean="0"/>
+              <a:t>del tono fondamentale dal FFT</a:t>
+            </a:r>
+          </a:p>
+        </p:txBody>
+      </p:sp>
+      <p:sp>
+        <p:nvSpPr>
+          <p:cNvPr id="4" name="Segnaposto numero diapositiva 3"/>
+          <p:cNvSpPr>
+            <a:spLocks noGrp="1"/>
+          </p:cNvSpPr>
+          <p:nvPr>
+            <p:ph type="sldNum" sz="quarter" idx="11"/>
+          </p:nvPr>
+        </p:nvSpPr>
+        <p:spPr/>
+        <p:txBody>
+          <a:bodyPr/>
+          <a:lstStyle/>
+          <a:p>
+            <a:fld id="{C503DA3A-0C6B-48FC-931E-2C786AAFD5C1}" type="slidenum">
+              <a:rPr lang="en-US" altLang="nl-NL" smtClean="0"/>
+              <a:pPr/>
+              <a:t>17</a:t>
+            </a:fld>
+            <a:endParaRPr lang="en-US" altLang="nl-NL" dirty="0"/>
+          </a:p>
+        </p:txBody>
+      </p:sp>
+    </p:spTree>
+    <p:extLst>
+      <p:ext uri="{BB962C8B-B14F-4D97-AF65-F5344CB8AC3E}">
+        <p14:creationId xmlns:p14="http://schemas.microsoft.com/office/powerpoint/2010/main" val="93189435"/>
+      </p:ext>
+    </p:extLst>
+  </p:cSld>
+  <p:clrMapOvr>
+    <a:masterClrMapping/>
+  </p:clrMapOvr>
+  <p:timing>
+    <p:tnLst>
+      <p:par>
+        <p:cTn id="1" dur="indefinite" restart="never" nodeType="tmRoot"/>
+      </p:par>
+    </p:tnLst>
+  </p:timing>
+</p:sld>
+</file>
+
+<file path=ppt/slides/slide18.xml><?xml version="1.0" encoding="utf-8"?>
+<p:sld xmlns:a="http://schemas.openxmlformats.org/drawingml/2006/main" xmlns:r="http://schemas.openxmlformats.org/officeDocument/2006/relationships" xmlns:p="http://schemas.openxmlformats.org/presentationml/2006/main">
+  <p:cSld>
+    <p:spTree>
+      <p:nvGrpSpPr>
+        <p:cNvPr id="1" name=""/>
+        <p:cNvGrpSpPr/>
+        <p:nvPr/>
+      </p:nvGrpSpPr>
+      <p:grpSpPr>
+        <a:xfrm>
+          <a:off x="0" y="0"/>
+          <a:ext cx="0" cy="0"/>
+          <a:chOff x="0" y="0"/>
+          <a:chExt cx="0" cy="0"/>
+        </a:xfrm>
+      </p:grpSpPr>
+      <p:sp>
+        <p:nvSpPr>
+          <p:cNvPr id="2" name="Titolo 1"/>
+          <p:cNvSpPr>
+            <a:spLocks noGrp="1"/>
+          </p:cNvSpPr>
+          <p:nvPr>
+            <p:ph type="title"/>
+          </p:nvPr>
+        </p:nvSpPr>
+        <p:spPr/>
+        <p:txBody>
+          <a:bodyPr/>
+          <a:lstStyle/>
+          <a:p>
+            <a:r>
+              <a:rPr lang="it-IT" dirty="0" smtClean="0"/>
+              <a:t>FPGA</a:t>
+            </a:r>
+            <a:endParaRPr lang="it-IT" dirty="0"/>
+          </a:p>
+        </p:txBody>
+      </p:sp>
+      <p:sp>
+        <p:nvSpPr>
+          <p:cNvPr id="3" name="Segnaposto contenuto 2"/>
+          <p:cNvSpPr>
+            <a:spLocks noGrp="1"/>
+          </p:cNvSpPr>
+          <p:nvPr>
+            <p:ph idx="1"/>
+          </p:nvPr>
+        </p:nvSpPr>
+        <p:spPr>
+          <a:xfrm>
+            <a:off x="609600" y="1024102"/>
+            <a:ext cx="8120063" cy="5093494"/>
+          </a:xfrm>
+        </p:spPr>
+        <p:txBody>
+          <a:bodyPr/>
+          <a:lstStyle/>
+          <a:p>
+            <a:r>
+              <a:rPr lang="it-IT" sz="2400" dirty="0" smtClean="0"/>
+              <a:t>Le funzionalità svolte in hardware dal FPGA sono:</a:t>
+            </a:r>
+            <a:br>
+              <a:rPr lang="it-IT" sz="2400" dirty="0" smtClean="0"/>
+            </a:br>
+            <a:endParaRPr lang="it-IT" sz="2400" dirty="0" smtClean="0"/>
+          </a:p>
+          <a:p>
+            <a:pPr lvl="1"/>
+            <a:r>
+              <a:rPr lang="it-IT" sz="2000" dirty="0" smtClean="0"/>
+              <a:t>Generazione del </a:t>
+            </a:r>
+            <a:br>
+              <a:rPr lang="it-IT" sz="2000" dirty="0" smtClean="0"/>
+            </a:br>
+            <a:r>
+              <a:rPr lang="it-IT" sz="2000" dirty="0" smtClean="0"/>
+              <a:t>segnale di modulazione </a:t>
+            </a:r>
+            <a:r>
+              <a:rPr lang="it-IT" sz="2000" i="1" dirty="0" smtClean="0"/>
+              <a:t/>
+            </a:r>
+            <a:br>
+              <a:rPr lang="it-IT" sz="2000" i="1" dirty="0" smtClean="0"/>
+            </a:br>
+            <a:endParaRPr lang="it-IT" sz="2000" i="1" dirty="0" smtClean="0"/>
+          </a:p>
+          <a:p>
+            <a:pPr lvl="1"/>
+            <a:r>
+              <a:rPr lang="it-IT" sz="2000" dirty="0" smtClean="0"/>
+              <a:t>Campionamento </a:t>
+            </a:r>
+            <a:br>
+              <a:rPr lang="it-IT" sz="2000" dirty="0" smtClean="0"/>
+            </a:br>
+            <a:r>
+              <a:rPr lang="it-IT" sz="2000" dirty="0" smtClean="0"/>
+              <a:t>del segnale interferometrico </a:t>
+            </a:r>
+            <a:br>
+              <a:rPr lang="it-IT" sz="2000" dirty="0" smtClean="0"/>
+            </a:br>
+            <a:r>
+              <a:rPr lang="it-IT" sz="2000" dirty="0" smtClean="0"/>
+              <a:t>a </a:t>
+            </a:r>
+            <a:r>
+              <a:rPr lang="it-IT" sz="2000" i="1" dirty="0" smtClean="0"/>
+              <a:t>30MHz</a:t>
+            </a:r>
+            <a:br>
+              <a:rPr lang="it-IT" sz="2000" i="1" dirty="0" smtClean="0"/>
+            </a:br>
+            <a:endParaRPr lang="it-IT" sz="2000" i="1" dirty="0" smtClean="0"/>
+          </a:p>
+          <a:p>
+            <a:pPr lvl="1"/>
+            <a:r>
+              <a:rPr lang="it-IT" sz="2000" b="1" dirty="0" smtClean="0"/>
+              <a:t>Calcolo </a:t>
+            </a:r>
+            <a:br>
+              <a:rPr lang="it-IT" sz="2000" b="1" dirty="0" smtClean="0"/>
+            </a:br>
+            <a:r>
+              <a:rPr lang="it-IT" sz="2000" b="1" dirty="0" smtClean="0"/>
+              <a:t>della Fast Fourier </a:t>
+            </a:r>
+            <a:r>
+              <a:rPr lang="it-IT" sz="2000" b="1" dirty="0" err="1" smtClean="0"/>
+              <a:t>Transform</a:t>
+            </a:r>
+            <a:r>
+              <a:rPr lang="it-IT" sz="2000" b="1" dirty="0" smtClean="0"/>
+              <a:t> </a:t>
+            </a:r>
+            <a:br>
+              <a:rPr lang="it-IT" sz="2000" b="1" dirty="0" smtClean="0"/>
+            </a:br>
+            <a:r>
+              <a:rPr lang="it-IT" sz="2000" b="1" dirty="0" smtClean="0"/>
+              <a:t>(FFT)</a:t>
+            </a:r>
+            <a:r>
+              <a:rPr lang="it-IT" sz="2000" dirty="0" smtClean="0"/>
+              <a:t/>
+            </a:r>
+            <a:br>
+              <a:rPr lang="it-IT" sz="2000" dirty="0" smtClean="0"/>
+            </a:br>
+            <a:endParaRPr lang="it-IT" sz="2000" dirty="0" smtClean="0"/>
+          </a:p>
+          <a:p>
+            <a:pPr lvl="1"/>
+            <a:r>
+              <a:rPr lang="it-IT" sz="2000" dirty="0" smtClean="0"/>
+              <a:t>Estrazione </a:t>
+            </a:r>
+            <a:br>
+              <a:rPr lang="it-IT" sz="2000" dirty="0" smtClean="0"/>
+            </a:br>
+            <a:r>
+              <a:rPr lang="it-IT" sz="2000" dirty="0" smtClean="0"/>
+              <a:t>del tono fondamentale dal FFT</a:t>
+            </a:r>
+          </a:p>
+        </p:txBody>
+      </p:sp>
+      <p:sp>
+        <p:nvSpPr>
+          <p:cNvPr id="4" name="Segnaposto numero diapositiva 3"/>
+          <p:cNvSpPr>
+            <a:spLocks noGrp="1"/>
+          </p:cNvSpPr>
+          <p:nvPr>
+            <p:ph type="sldNum" sz="quarter" idx="11"/>
+          </p:nvPr>
+        </p:nvSpPr>
+        <p:spPr/>
+        <p:txBody>
+          <a:bodyPr/>
+          <a:lstStyle/>
+          <a:p>
+            <a:fld id="{C503DA3A-0C6B-48FC-931E-2C786AAFD5C1}" type="slidenum">
+              <a:rPr lang="en-US" altLang="nl-NL" smtClean="0"/>
+              <a:pPr/>
+              <a:t>18</a:t>
+            </a:fld>
+            <a:endParaRPr lang="en-US" altLang="nl-NL" dirty="0"/>
+          </a:p>
+        </p:txBody>
+      </p:sp>
+    </p:spTree>
+    <p:extLst>
+      <p:ext uri="{BB962C8B-B14F-4D97-AF65-F5344CB8AC3E}">
+        <p14:creationId xmlns:p14="http://schemas.microsoft.com/office/powerpoint/2010/main" val="1581539848"/>
+      </p:ext>
+    </p:extLst>
+  </p:cSld>
+  <p:clrMapOvr>
+    <a:masterClrMapping/>
+  </p:clrMapOvr>
+  <p:timing>
+    <p:tnLst>
+      <p:par>
+        <p:cTn id="1" dur="indefinite" restart="never" nodeType="tmRoot"/>
+      </p:par>
+    </p:tnLst>
+  </p:timing>
+</p:sld>
+</file>
+
+<file path=ppt/slides/slide19.xml><?xml version="1.0" encoding="utf-8"?>
+<p:sld xmlns:a="http://schemas.openxmlformats.org/drawingml/2006/main" xmlns:r="http://schemas.openxmlformats.org/officeDocument/2006/relationships" xmlns:p="http://schemas.openxmlformats.org/presentationml/2006/main">
+  <p:cSld>
+    <p:spTree>
+      <p:nvGrpSpPr>
+        <p:cNvPr id="1" name=""/>
+        <p:cNvGrpSpPr/>
+        <p:nvPr/>
+      </p:nvGrpSpPr>
+      <p:grpSpPr>
+        <a:xfrm>
+          <a:off x="0" y="0"/>
+          <a:ext cx="0" cy="0"/>
+          <a:chOff x="0" y="0"/>
+          <a:chExt cx="0" cy="0"/>
+        </a:xfrm>
+      </p:grpSpPr>
+      <p:sp>
+        <p:nvSpPr>
+          <p:cNvPr id="2" name="Titolo 1"/>
+          <p:cNvSpPr>
+            <a:spLocks noGrp="1"/>
+          </p:cNvSpPr>
+          <p:nvPr>
+            <p:ph type="title"/>
+          </p:nvPr>
+        </p:nvSpPr>
+        <p:spPr/>
+        <p:txBody>
+          <a:bodyPr/>
+          <a:lstStyle/>
+          <a:p>
+            <a:r>
+              <a:rPr lang="it-IT" dirty="0" smtClean="0"/>
+              <a:t>FPGA</a:t>
+            </a:r>
+            <a:endParaRPr lang="it-IT" dirty="0"/>
+          </a:p>
+        </p:txBody>
+      </p:sp>
+      <p:sp>
+        <p:nvSpPr>
+          <p:cNvPr id="3" name="Segnaposto contenuto 2"/>
+          <p:cNvSpPr>
+            <a:spLocks noGrp="1"/>
+          </p:cNvSpPr>
+          <p:nvPr>
+            <p:ph idx="1"/>
+          </p:nvPr>
+        </p:nvSpPr>
+        <p:spPr>
+          <a:xfrm>
+            <a:off x="609600" y="1024102"/>
+            <a:ext cx="8120063" cy="5093494"/>
+          </a:xfrm>
+        </p:spPr>
+        <p:txBody>
+          <a:bodyPr/>
+          <a:lstStyle/>
+          <a:p>
+            <a:r>
+              <a:rPr lang="it-IT" sz="2400" dirty="0" smtClean="0"/>
+              <a:t>Le funzionalità svolte in hardware dal FPGA sono:</a:t>
+            </a:r>
+            <a:br>
+              <a:rPr lang="it-IT" sz="2400" dirty="0" smtClean="0"/>
+            </a:br>
+            <a:endParaRPr lang="it-IT" sz="2400" dirty="0" smtClean="0"/>
+          </a:p>
+          <a:p>
+            <a:pPr lvl="1"/>
+            <a:r>
+              <a:rPr lang="it-IT" sz="2000" dirty="0" smtClean="0"/>
+              <a:t>Generazione del </a:t>
+            </a:r>
+            <a:br>
+              <a:rPr lang="it-IT" sz="2000" dirty="0" smtClean="0"/>
+            </a:br>
+            <a:r>
+              <a:rPr lang="it-IT" sz="2000" dirty="0" smtClean="0"/>
+              <a:t>segnale di modulazione </a:t>
+            </a:r>
+            <a:r>
+              <a:rPr lang="it-IT" sz="2000" i="1" dirty="0" smtClean="0"/>
+              <a:t/>
+            </a:r>
+            <a:br>
+              <a:rPr lang="it-IT" sz="2000" i="1" dirty="0" smtClean="0"/>
+            </a:br>
+            <a:endParaRPr lang="it-IT" sz="2000" i="1" dirty="0" smtClean="0"/>
+          </a:p>
+          <a:p>
+            <a:pPr lvl="1"/>
+            <a:r>
+              <a:rPr lang="it-IT" sz="2000" dirty="0" smtClean="0"/>
+              <a:t>Campionamento </a:t>
+            </a:r>
+            <a:br>
+              <a:rPr lang="it-IT" sz="2000" dirty="0" smtClean="0"/>
+            </a:br>
+            <a:r>
+              <a:rPr lang="it-IT" sz="2000" dirty="0" smtClean="0"/>
+              <a:t>del segnale interferometrico </a:t>
+            </a:r>
+            <a:br>
+              <a:rPr lang="it-IT" sz="2000" dirty="0" smtClean="0"/>
+            </a:br>
+            <a:r>
+              <a:rPr lang="it-IT" sz="2000" dirty="0" smtClean="0"/>
+              <a:t>a </a:t>
+            </a:r>
+            <a:r>
+              <a:rPr lang="it-IT" sz="2000" i="1" dirty="0" smtClean="0"/>
+              <a:t>30MHz</a:t>
+            </a:r>
+            <a:br>
+              <a:rPr lang="it-IT" sz="2000" i="1" dirty="0" smtClean="0"/>
+            </a:br>
+            <a:endParaRPr lang="it-IT" sz="2000" i="1" dirty="0" smtClean="0"/>
+          </a:p>
+          <a:p>
+            <a:pPr lvl="1"/>
+            <a:r>
+              <a:rPr lang="it-IT" sz="2000" dirty="0" smtClean="0"/>
+              <a:t>Calcolo </a:t>
+            </a:r>
+            <a:br>
+              <a:rPr lang="it-IT" sz="2000" dirty="0" smtClean="0"/>
+            </a:br>
+            <a:r>
+              <a:rPr lang="it-IT" sz="2000" dirty="0" smtClean="0"/>
+              <a:t>della Fast Fourier </a:t>
+            </a:r>
+            <a:r>
+              <a:rPr lang="it-IT" sz="2000" dirty="0" err="1" smtClean="0"/>
+              <a:t>Transform</a:t>
+            </a:r>
+            <a:r>
+              <a:rPr lang="it-IT" sz="2000" dirty="0" smtClean="0"/>
+              <a:t> </a:t>
+            </a:r>
+            <a:r>
+              <a:rPr lang="it-IT" sz="2000" b="1" dirty="0" smtClean="0"/>
+              <a:t/>
+            </a:r>
+            <a:br>
+              <a:rPr lang="it-IT" sz="2000" b="1" dirty="0" smtClean="0"/>
+            </a:br>
+            <a:r>
+              <a:rPr lang="it-IT" sz="2000" dirty="0" smtClean="0"/>
+              <a:t>(FFT)</a:t>
+            </a:r>
+            <a:br>
+              <a:rPr lang="it-IT" sz="2000" dirty="0" smtClean="0"/>
+            </a:br>
+            <a:endParaRPr lang="it-IT" sz="2000" dirty="0" smtClean="0"/>
+          </a:p>
+          <a:p>
+            <a:pPr lvl="1"/>
+            <a:r>
+              <a:rPr lang="it-IT" sz="2000" b="1" dirty="0" smtClean="0"/>
+              <a:t>Estrazione </a:t>
+            </a:r>
+            <a:br>
+              <a:rPr lang="it-IT" sz="2000" b="1" dirty="0" smtClean="0"/>
+            </a:br>
+            <a:r>
+              <a:rPr lang="it-IT" sz="2000" b="1" dirty="0" smtClean="0"/>
+              <a:t>del tono fondamentale dal FFT</a:t>
+            </a:r>
+          </a:p>
+        </p:txBody>
+      </p:sp>
+      <p:sp>
+        <p:nvSpPr>
+          <p:cNvPr id="4" name="Segnaposto numero diapositiva 3"/>
+          <p:cNvSpPr>
+            <a:spLocks noGrp="1"/>
+          </p:cNvSpPr>
+          <p:nvPr>
+            <p:ph type="sldNum" sz="quarter" idx="11"/>
+          </p:nvPr>
+        </p:nvSpPr>
+        <p:spPr/>
+        <p:txBody>
+          <a:bodyPr/>
+          <a:lstStyle/>
+          <a:p>
+            <a:fld id="{C503DA3A-0C6B-48FC-931E-2C786AAFD5C1}" type="slidenum">
+              <a:rPr lang="en-US" altLang="nl-NL" smtClean="0"/>
+              <a:pPr/>
+              <a:t>19</a:t>
+            </a:fld>
+            <a:endParaRPr lang="en-US" altLang="nl-NL" dirty="0"/>
+          </a:p>
+        </p:txBody>
+      </p:sp>
+    </p:spTree>
+    <p:extLst>
+      <p:ext uri="{BB962C8B-B14F-4D97-AF65-F5344CB8AC3E}">
+        <p14:creationId xmlns:p14="http://schemas.microsoft.com/office/powerpoint/2010/main" val="1815209933"/>
+      </p:ext>
+    </p:extLst>
+  </p:cSld>
+  <p:clrMapOvr>
+    <a:masterClrMapping/>
+  </p:clrMapOvr>
+  <p:timing>
+    <p:tnLst>
+      <p:par>
+        <p:cTn id="1" dur="indefinite" restart="never" nodeType="tmRoot"/>
+      </p:par>
+    </p:tnLst>
+  </p:timing>
+</p:sld>
+</file>
+
+<file path=ppt/slides/slide2.xml><?xml version="1.0" encoding="utf-8"?>
+<p:sld xmlns:a="http://schemas.openxmlformats.org/drawingml/2006/main" xmlns:r="http://schemas.openxmlformats.org/officeDocument/2006/relationships" xmlns:p="http://schemas.openxmlformats.org/presentationml/2006/main">
+  <p:cSld>
+    <p:spTree>
+      <p:nvGrpSpPr>
+        <p:cNvPr id="1" name=""/>
+        <p:cNvGrpSpPr/>
+        <p:nvPr/>
+      </p:nvGrpSpPr>
+      <p:grpSpPr>
+        <a:xfrm>
+          <a:off x="0" y="0"/>
+          <a:ext cx="0" cy="0"/>
+          <a:chOff x="0" y="0"/>
+          <a:chExt cx="0" cy="0"/>
+        </a:xfrm>
+      </p:grpSpPr>
+      <p:sp>
+        <p:nvSpPr>
+          <p:cNvPr id="2" name="Titolo 1"/>
+          <p:cNvSpPr>
+            <a:spLocks noGrp="1"/>
+          </p:cNvSpPr>
+          <p:nvPr>
+            <p:ph type="title"/>
+          </p:nvPr>
+        </p:nvSpPr>
+        <p:spPr/>
+        <p:txBody>
+          <a:bodyPr/>
+          <a:lstStyle/>
+          <a:p>
+            <a:r>
+              <a:rPr lang="it-IT" dirty="0" smtClean="0"/>
+              <a:t>Indice</a:t>
+            </a:r>
+            <a:endParaRPr lang="it-IT" dirty="0"/>
+          </a:p>
+        </p:txBody>
+      </p:sp>
+      <p:sp>
+        <p:nvSpPr>
+          <p:cNvPr id="3" name="Segnaposto contenuto 2"/>
+          <p:cNvSpPr>
+            <a:spLocks noGrp="1"/>
+          </p:cNvSpPr>
+          <p:nvPr>
+            <p:ph idx="1"/>
+          </p:nvPr>
+        </p:nvSpPr>
+        <p:spPr>
+          <a:xfrm>
+            <a:off x="609600" y="891778"/>
+            <a:ext cx="7784892" cy="5531644"/>
+          </a:xfrm>
+        </p:spPr>
+        <p:txBody>
+          <a:bodyPr/>
+          <a:lstStyle/>
+          <a:p>
+            <a:r>
+              <a:rPr lang="it-IT" sz="2400" dirty="0"/>
+              <a:t>Interferometria</a:t>
+            </a:r>
+          </a:p>
+          <a:p>
+            <a:pPr lvl="1"/>
+            <a:r>
+              <a:rPr lang="it-IT" sz="2000" dirty="0"/>
+              <a:t>Interferometria a self-mixing</a:t>
+            </a:r>
+          </a:p>
+          <a:p>
+            <a:pPr lvl="1"/>
+            <a:r>
+              <a:rPr lang="it-IT" sz="2000" dirty="0"/>
+              <a:t>Misura della distanza</a:t>
+            </a:r>
+          </a:p>
+          <a:p>
+            <a:r>
+              <a:rPr lang="it-IT" sz="2400" dirty="0"/>
+              <a:t>Architettura hardware</a:t>
+            </a:r>
+          </a:p>
+          <a:p>
+            <a:pPr lvl="1"/>
+            <a:r>
+              <a:rPr lang="it-IT" sz="2000" dirty="0" smtClean="0"/>
+              <a:t>Sistema analogico</a:t>
+            </a:r>
+          </a:p>
+          <a:p>
+            <a:pPr lvl="1"/>
+            <a:r>
+              <a:rPr lang="it-IT" sz="2000" dirty="0"/>
+              <a:t>Sistema di </a:t>
+            </a:r>
+            <a:r>
+              <a:rPr lang="it-IT" sz="2000" dirty="0" smtClean="0"/>
+              <a:t>conversione</a:t>
+            </a:r>
+            <a:endParaRPr lang="it-IT" sz="2000" dirty="0"/>
+          </a:p>
+          <a:p>
+            <a:pPr lvl="1"/>
+            <a:r>
+              <a:rPr lang="it-IT" sz="2000" dirty="0" smtClean="0"/>
+              <a:t>Sistema digitale</a:t>
+            </a:r>
+            <a:endParaRPr lang="it-IT" sz="2000" dirty="0"/>
+          </a:p>
+          <a:p>
+            <a:r>
+              <a:rPr lang="it-IT" sz="2400" dirty="0" smtClean="0"/>
+              <a:t>Architettura </a:t>
+            </a:r>
+            <a:r>
+              <a:rPr lang="it-IT" sz="2400" dirty="0"/>
+              <a:t>software</a:t>
+            </a:r>
+          </a:p>
+          <a:p>
+            <a:pPr lvl="1"/>
+            <a:r>
+              <a:rPr lang="it-IT" sz="2000" dirty="0"/>
+              <a:t>Dettagli </a:t>
+            </a:r>
+            <a:r>
+              <a:rPr lang="it-IT" sz="2000" dirty="0" smtClean="0"/>
+              <a:t>implementativi</a:t>
+            </a:r>
+          </a:p>
+          <a:p>
+            <a:pPr lvl="1"/>
+            <a:r>
+              <a:rPr lang="it-IT" sz="2000" dirty="0" smtClean="0"/>
+              <a:t>FPGA</a:t>
+            </a:r>
+            <a:endParaRPr lang="it-IT" sz="2000" dirty="0"/>
+          </a:p>
+          <a:p>
+            <a:pPr lvl="1"/>
+            <a:r>
+              <a:rPr lang="it-IT" sz="2000" dirty="0" smtClean="0"/>
+              <a:t>Microcontrollore</a:t>
+            </a:r>
+          </a:p>
+          <a:p>
+            <a:pPr lvl="1"/>
+            <a:r>
+              <a:rPr lang="it-IT" sz="2000" dirty="0" smtClean="0"/>
+              <a:t>Ottimizzazioni</a:t>
+            </a:r>
+            <a:endParaRPr lang="it-IT" sz="2000" dirty="0"/>
+          </a:p>
+          <a:p>
+            <a:r>
+              <a:rPr lang="it-IT" sz="2400" dirty="0"/>
+              <a:t>Risultati </a:t>
+            </a:r>
+            <a:r>
+              <a:rPr lang="it-IT" sz="2400" dirty="0" smtClean="0"/>
+              <a:t>sperimentali</a:t>
+            </a:r>
+            <a:endParaRPr lang="it-IT" sz="2400" dirty="0"/>
+          </a:p>
+          <a:p>
+            <a:r>
+              <a:rPr lang="it-IT" sz="2400" dirty="0"/>
+              <a:t>Conclusioni e sviluppi futuri</a:t>
+            </a:r>
+          </a:p>
+        </p:txBody>
+      </p:sp>
+      <p:sp>
+        <p:nvSpPr>
+          <p:cNvPr id="4" name="Segnaposto numero diapositiva 3"/>
+          <p:cNvSpPr>
+            <a:spLocks noGrp="1"/>
+          </p:cNvSpPr>
+          <p:nvPr>
+            <p:ph type="sldNum" sz="quarter" idx="11"/>
+          </p:nvPr>
+        </p:nvSpPr>
+        <p:spPr/>
+        <p:txBody>
+          <a:bodyPr/>
+          <a:lstStyle/>
+          <a:p>
+            <a:fld id="{C503DA3A-0C6B-48FC-931E-2C786AAFD5C1}" type="slidenum">
+              <a:rPr lang="en-US" altLang="nl-NL" smtClean="0"/>
+              <a:pPr/>
+              <a:t>2</a:t>
+            </a:fld>
+            <a:endParaRPr lang="en-US" altLang="nl-NL"/>
+          </a:p>
+        </p:txBody>
+      </p:sp>
+    </p:spTree>
+    <p:extLst>
+      <p:ext uri="{BB962C8B-B14F-4D97-AF65-F5344CB8AC3E}">
+        <p14:creationId xmlns:p14="http://schemas.microsoft.com/office/powerpoint/2010/main" val="3953617699"/>
+      </p:ext>
+    </p:extLst>
+  </p:cSld>
+  <p:clrMapOvr>
+    <a:masterClrMapping/>
+  </p:clrMapOvr>
+  <p:timing>
+    <p:tnLst>
+      <p:par>
+        <p:cTn id="1" dur="indefinite" restart="never" nodeType="tmRoot"/>
+      </p:par>
+    </p:tnLst>
+  </p:timing>
+</p:sld>
+</file>
+
+<file path=ppt/slides/slide20.xml><?xml version="1.0" encoding="utf-8"?>
+<p:sld xmlns:a="http://schemas.openxmlformats.org/drawingml/2006/main" xmlns:r="http://schemas.openxmlformats.org/officeDocument/2006/relationships" xmlns:p="http://schemas.openxmlformats.org/presentationml/2006/main">
+  <p:cSld>
+    <p:spTree>
+      <p:nvGrpSpPr>
+        <p:cNvPr id="1" name=""/>
+        <p:cNvGrpSpPr/>
+        <p:nvPr/>
+      </p:nvGrpSpPr>
+      <p:grpSpPr>
+        <a:xfrm>
+          <a:off x="0" y="0"/>
+          <a:ext cx="0" cy="0"/>
+          <a:chOff x="0" y="0"/>
+          <a:chExt cx="0" cy="0"/>
+        </a:xfrm>
+      </p:grpSpPr>
+      <p:sp>
+        <p:nvSpPr>
+          <p:cNvPr id="2" name="Titolo 1"/>
+          <p:cNvSpPr>
+            <a:spLocks noGrp="1"/>
+          </p:cNvSpPr>
+          <p:nvPr>
+            <p:ph type="title"/>
+          </p:nvPr>
+        </p:nvSpPr>
+        <p:spPr/>
+        <p:txBody>
+          <a:bodyPr/>
+          <a:lstStyle/>
+          <a:p>
+            <a:r>
+              <a:rPr lang="it-IT" dirty="0" smtClean="0"/>
               <a:t>Microcontrollore</a:t>
             </a:r>
             <a:endParaRPr lang="it-IT" dirty="0"/>
@@ -10131,7 +11366,7 @@
             <a:fld id="{C503DA3A-0C6B-48FC-931E-2C786AAFD5C1}" type="slidenum">
               <a:rPr lang="en-US" altLang="nl-NL" smtClean="0"/>
               <a:pPr/>
-              <a:t>17</a:t>
+              <a:t>20</a:t>
             </a:fld>
             <a:endParaRPr lang="en-US" altLang="nl-NL"/>
           </a:p>
@@ -10354,998 +11589,82 @@
         </p:blipFill>
         <p:spPr>
           <a:xfrm>
-            <a:off x="1343046" y="2409589"/>
-            <a:ext cx="3594964" cy="2719873"/>
+            <a:off x="5176508" y="2378711"/>
+            <a:ext cx="3355070" cy="2538375"/>
           </a:xfrm>
           <a:prstGeom prst="rect">
             <a:avLst/>
           </a:prstGeom>
         </p:spPr>
       </p:pic>
+      <p:sp>
+        <p:nvSpPr>
+          <p:cNvPr id="8" name="CasellaDiTesto 7"/>
+          <p:cNvSpPr txBox="1"/>
+          <p:nvPr/>
+        </p:nvSpPr>
+        <p:spPr>
+          <a:xfrm>
+            <a:off x="342900" y="3130775"/>
+            <a:ext cx="4408714" cy="830997"/>
+          </a:xfrm>
+          <a:prstGeom prst="rect">
+            <a:avLst/>
+          </a:prstGeom>
+          <a:noFill/>
+        </p:spPr>
+        <p:txBody>
+          <a:bodyPr wrap="square" rtlCol="0">
+            <a:spAutoFit/>
+          </a:bodyPr>
+          <a:lstStyle/>
+          <a:p>
+            <a:r>
+              <a:rPr lang="it-IT" dirty="0" err="1" smtClean="0">
+                <a:solidFill>
+                  <a:srgbClr val="FF0000"/>
+                </a:solidFill>
+              </a:rPr>
+              <a:t>toDO</a:t>
+            </a:r>
+            <a:r>
+              <a:rPr lang="it-IT" dirty="0" smtClean="0">
+                <a:solidFill>
+                  <a:srgbClr val="FF0000"/>
+                </a:solidFill>
+              </a:rPr>
+              <a:t>: aggiungere</a:t>
+            </a:r>
+          </a:p>
+          <a:p>
+            <a:r>
+              <a:rPr lang="it-IT" dirty="0">
+                <a:solidFill>
+                  <a:srgbClr val="FF0000"/>
+                </a:solidFill>
+              </a:rPr>
+              <a:t>f</a:t>
+            </a:r>
+            <a:r>
+              <a:rPr lang="it-IT" dirty="0" smtClean="0">
+                <a:solidFill>
+                  <a:srgbClr val="FF0000"/>
+                </a:solidFill>
+              </a:rPr>
+              <a:t>ormule sull’interpolazione</a:t>
+            </a:r>
+            <a:endParaRPr lang="it-IT" dirty="0">
+              <a:solidFill>
+                <a:srgbClr val="FF0000"/>
+              </a:solidFill>
+            </a:endParaRPr>
+          </a:p>
+        </p:txBody>
+      </p:sp>
     </p:spTree>
     <p:extLst>
       <p:ext uri="{BB962C8B-B14F-4D97-AF65-F5344CB8AC3E}">
         <p14:creationId xmlns:p14="http://schemas.microsoft.com/office/powerpoint/2010/main" val="3813134160"/>
-      </p:ext>
-    </p:extLst>
-  </p:cSld>
-  <p:clrMapOvr>
-    <a:masterClrMapping/>
-  </p:clrMapOvr>
-  <p:timing>
-    <p:tnLst>
-      <p:par>
-        <p:cTn id="1" dur="indefinite" restart="never" nodeType="tmRoot"/>
-      </p:par>
-    </p:tnLst>
-  </p:timing>
-</p:sld>
-</file>
-
-<file path=ppt/slides/slide18.xml><?xml version="1.0" encoding="utf-8"?>
-<p:sld xmlns:a="http://schemas.openxmlformats.org/drawingml/2006/main" xmlns:r="http://schemas.openxmlformats.org/officeDocument/2006/relationships" xmlns:p="http://schemas.openxmlformats.org/presentationml/2006/main">
-  <p:cSld>
-    <p:spTree>
-      <p:nvGrpSpPr>
-        <p:cNvPr id="1" name=""/>
-        <p:cNvGrpSpPr/>
-        <p:nvPr/>
-      </p:nvGrpSpPr>
-      <p:grpSpPr>
-        <a:xfrm>
-          <a:off x="0" y="0"/>
-          <a:ext cx="0" cy="0"/>
-          <a:chOff x="0" y="0"/>
-          <a:chExt cx="0" cy="0"/>
-        </a:xfrm>
-      </p:grpSpPr>
-      <p:sp>
-        <p:nvSpPr>
-          <p:cNvPr id="2" name="Titolo 1"/>
-          <p:cNvSpPr>
-            <a:spLocks noGrp="1"/>
-          </p:cNvSpPr>
-          <p:nvPr>
-            <p:ph type="title"/>
-          </p:nvPr>
-        </p:nvSpPr>
-        <p:spPr/>
-        <p:txBody>
-          <a:bodyPr/>
-          <a:lstStyle/>
-          <a:p>
-            <a:r>
-              <a:rPr lang="it-IT" dirty="0" smtClean="0"/>
-              <a:t>Ottimizzazioni</a:t>
-            </a:r>
-            <a:endParaRPr lang="it-IT" dirty="0"/>
-          </a:p>
-        </p:txBody>
-      </p:sp>
-      <p:sp>
-        <p:nvSpPr>
-          <p:cNvPr id="3" name="Segnaposto contenuto 2"/>
-          <p:cNvSpPr>
-            <a:spLocks noGrp="1"/>
-          </p:cNvSpPr>
-          <p:nvPr>
-            <p:ph idx="1"/>
-          </p:nvPr>
-        </p:nvSpPr>
-        <p:spPr>
-          <a:xfrm>
-            <a:off x="685800" y="1142996"/>
-            <a:ext cx="7772400" cy="5333997"/>
-          </a:xfrm>
-        </p:spPr>
-        <p:txBody>
-          <a:bodyPr/>
-          <a:lstStyle/>
-          <a:p>
-            <a:r>
-              <a:rPr lang="it-IT" sz="2400" b="1" dirty="0"/>
-              <a:t>Finestratura</a:t>
-            </a:r>
-            <a:r>
-              <a:rPr lang="it-IT" sz="2400" dirty="0"/>
-              <a:t> di </a:t>
-            </a:r>
-            <a:r>
-              <a:rPr lang="it-IT" sz="2400" dirty="0" err="1"/>
-              <a:t>Hanning</a:t>
-            </a:r>
-            <a:r>
-              <a:rPr lang="it-IT" sz="2400" dirty="0"/>
-              <a:t> del segnale </a:t>
-            </a:r>
-            <a:r>
-              <a:rPr lang="it-IT" sz="2400" dirty="0" smtClean="0"/>
-              <a:t>interferometrico</a:t>
-            </a:r>
-            <a:endParaRPr lang="it-IT" sz="2400" dirty="0"/>
-          </a:p>
-          <a:p>
-            <a:r>
-              <a:rPr lang="it-IT" sz="2400" b="1" dirty="0" smtClean="0"/>
-              <a:t>Compensazione</a:t>
-            </a:r>
-            <a:r>
-              <a:rPr lang="it-IT" sz="2400" dirty="0" smtClean="0"/>
-              <a:t> </a:t>
-            </a:r>
-            <a:r>
-              <a:rPr lang="it-IT" sz="2400" dirty="0"/>
-              <a:t>della non-linearità del laser</a:t>
-            </a:r>
-            <a:br>
-              <a:rPr lang="it-IT" sz="2400" dirty="0"/>
-            </a:br>
-            <a:r>
-              <a:rPr lang="it-IT" sz="2400" dirty="0" smtClean="0"/>
-              <a:t/>
-            </a:r>
-            <a:br>
-              <a:rPr lang="it-IT" sz="2400" dirty="0" smtClean="0"/>
-            </a:br>
-            <a:r>
-              <a:rPr lang="it-IT" sz="2400" dirty="0" smtClean="0"/>
-              <a:t/>
-            </a:r>
-            <a:br>
-              <a:rPr lang="it-IT" sz="2400" dirty="0" smtClean="0"/>
-            </a:br>
-            <a:r>
-              <a:rPr lang="it-IT" sz="2400" dirty="0" smtClean="0"/>
-              <a:t/>
-            </a:r>
-            <a:br>
-              <a:rPr lang="it-IT" sz="2400" dirty="0" smtClean="0"/>
-            </a:br>
-            <a:r>
-              <a:rPr lang="it-IT" sz="2400" dirty="0" smtClean="0"/>
-              <a:t/>
-            </a:r>
-            <a:br>
-              <a:rPr lang="it-IT" sz="2400" dirty="0" smtClean="0"/>
-            </a:br>
-            <a:endParaRPr lang="it-IT" sz="2400" dirty="0"/>
-          </a:p>
-          <a:p>
-            <a:endParaRPr lang="it-IT" sz="2400" dirty="0"/>
-          </a:p>
-          <a:p>
-            <a:r>
-              <a:rPr lang="it-IT" sz="2400" dirty="0" smtClean="0"/>
-              <a:t>Segnali </a:t>
-            </a:r>
-            <a:r>
-              <a:rPr lang="it-IT" sz="2400" dirty="0"/>
-              <a:t>di </a:t>
-            </a:r>
-            <a:r>
-              <a:rPr lang="it-IT" sz="2400" dirty="0" smtClean="0"/>
-              <a:t>modulazione</a:t>
-            </a:r>
-            <a:br>
-              <a:rPr lang="it-IT" sz="2400" dirty="0" smtClean="0"/>
-            </a:br>
-            <a:r>
-              <a:rPr lang="it-IT" sz="2400" dirty="0" smtClean="0"/>
-              <a:t>con </a:t>
-            </a:r>
-            <a:r>
-              <a:rPr lang="it-IT" sz="2400" b="1" dirty="0" smtClean="0"/>
-              <a:t>ampiezze differenti</a:t>
-            </a:r>
-            <a:endParaRPr lang="it-IT" sz="2400" b="1" dirty="0"/>
-          </a:p>
-          <a:p>
-            <a:r>
-              <a:rPr lang="it-IT" sz="2400" b="1" dirty="0" smtClean="0"/>
-              <a:t>Sottrazione</a:t>
-            </a:r>
-            <a:r>
-              <a:rPr lang="it-IT" sz="2400" dirty="0" smtClean="0"/>
-              <a:t> </a:t>
-            </a:r>
-            <a:br>
-              <a:rPr lang="it-IT" sz="2400" dirty="0" smtClean="0"/>
-            </a:br>
-            <a:r>
-              <a:rPr lang="it-IT" sz="2400" dirty="0" smtClean="0"/>
-              <a:t>del </a:t>
-            </a:r>
-            <a:r>
-              <a:rPr lang="it-IT" sz="2400" dirty="0"/>
-              <a:t>fondo di </a:t>
-            </a:r>
-            <a:r>
-              <a:rPr lang="it-IT" sz="2400" b="1" dirty="0" smtClean="0"/>
-              <a:t>rumore</a:t>
-            </a:r>
-            <a:r>
-              <a:rPr lang="it-IT" sz="2400" dirty="0" smtClean="0"/>
-              <a:t> </a:t>
-            </a:r>
-            <a:endParaRPr lang="it-IT" sz="2400" dirty="0"/>
-          </a:p>
-          <a:p>
-            <a:endParaRPr lang="it-IT" sz="2400" dirty="0"/>
-          </a:p>
-        </p:txBody>
-      </p:sp>
-      <p:sp>
-        <p:nvSpPr>
-          <p:cNvPr id="4" name="Segnaposto numero diapositiva 3"/>
-          <p:cNvSpPr>
-            <a:spLocks noGrp="1"/>
-          </p:cNvSpPr>
-          <p:nvPr>
-            <p:ph type="sldNum" sz="quarter" idx="11"/>
-          </p:nvPr>
-        </p:nvSpPr>
-        <p:spPr/>
-        <p:txBody>
-          <a:bodyPr/>
-          <a:lstStyle/>
-          <a:p>
-            <a:fld id="{C503DA3A-0C6B-48FC-931E-2C786AAFD5C1}" type="slidenum">
-              <a:rPr lang="en-US" altLang="nl-NL" smtClean="0"/>
-              <a:pPr/>
-              <a:t>18</a:t>
-            </a:fld>
-            <a:endParaRPr lang="en-US" altLang="nl-NL"/>
-          </a:p>
-        </p:txBody>
-      </p:sp>
-      <p:pic>
-        <p:nvPicPr>
-          <p:cNvPr id="8" name="Immagine 7"/>
-          <p:cNvPicPr>
-            <a:picLocks noChangeAspect="1"/>
-          </p:cNvPicPr>
-          <p:nvPr/>
-        </p:nvPicPr>
-        <p:blipFill>
-          <a:blip r:embed="rId2">
-            <a:extLst>
-              <a:ext uri="{28A0092B-C50C-407E-A947-70E740481C1C}">
-                <a14:useLocalDpi xmlns:a14="http://schemas.microsoft.com/office/drawing/2010/main" val="0"/>
-              </a:ext>
-            </a:extLst>
-          </a:blip>
-          <a:stretch>
-            <a:fillRect/>
-          </a:stretch>
-        </p:blipFill>
-        <p:spPr>
-          <a:xfrm>
-            <a:off x="742952" y="2429100"/>
-            <a:ext cx="2902713" cy="1979614"/>
-          </a:xfrm>
-          <a:prstGeom prst="rect">
-            <a:avLst/>
-          </a:prstGeom>
-        </p:spPr>
-      </p:pic>
-      <p:pic>
-        <p:nvPicPr>
-          <p:cNvPr id="9" name="Immagine 8"/>
-          <p:cNvPicPr>
-            <a:picLocks noChangeAspect="1"/>
-          </p:cNvPicPr>
-          <p:nvPr/>
-        </p:nvPicPr>
-        <p:blipFill>
-          <a:blip r:embed="rId3">
-            <a:extLst>
-              <a:ext uri="{28A0092B-C50C-407E-A947-70E740481C1C}">
-                <a14:useLocalDpi xmlns:a14="http://schemas.microsoft.com/office/drawing/2010/main" val="0"/>
-              </a:ext>
-            </a:extLst>
-          </a:blip>
-          <a:stretch>
-            <a:fillRect/>
-          </a:stretch>
-        </p:blipFill>
-        <p:spPr>
-          <a:xfrm>
-            <a:off x="5147297" y="2396442"/>
-            <a:ext cx="2866327" cy="2219092"/>
-          </a:xfrm>
-          <a:prstGeom prst="rect">
-            <a:avLst/>
-          </a:prstGeom>
-        </p:spPr>
-      </p:pic>
-      <p:sp>
-        <p:nvSpPr>
-          <p:cNvPr id="10" name="Freccia destra 9"/>
-          <p:cNvSpPr/>
-          <p:nvPr/>
-        </p:nvSpPr>
-        <p:spPr>
-          <a:xfrm>
-            <a:off x="3248962" y="3031995"/>
-            <a:ext cx="2016176" cy="793851"/>
-          </a:xfrm>
-          <a:prstGeom prst="rightArrow">
-            <a:avLst/>
-          </a:prstGeom>
-          <a:solidFill>
-            <a:srgbClr val="FF0000"/>
-          </a:solidFill>
-        </p:spPr>
-        <p:style>
-          <a:lnRef idx="1">
-            <a:schemeClr val="accent1"/>
-          </a:lnRef>
-          <a:fillRef idx="3">
-            <a:schemeClr val="accent1"/>
-          </a:fillRef>
-          <a:effectRef idx="2">
-            <a:schemeClr val="accent1"/>
-          </a:effectRef>
-          <a:fontRef idx="minor">
-            <a:schemeClr val="lt1"/>
-          </a:fontRef>
-        </p:style>
-        <p:txBody>
-          <a:bodyPr rtlCol="0" anchor="ctr"/>
-          <a:lstStyle/>
-          <a:p>
-            <a:pPr algn="ctr"/>
-            <a:r>
-              <a:rPr lang="it-IT" sz="1500" dirty="0" smtClean="0"/>
-              <a:t>Compensazione</a:t>
-            </a:r>
-            <a:endParaRPr lang="it-IT" sz="1500" dirty="0"/>
-          </a:p>
-        </p:txBody>
-      </p:sp>
-      <p:pic>
-        <p:nvPicPr>
-          <p:cNvPr id="11" name="Immagine 10"/>
-          <p:cNvPicPr>
-            <a:picLocks noChangeAspect="1"/>
-          </p:cNvPicPr>
-          <p:nvPr/>
-        </p:nvPicPr>
-        <p:blipFill>
-          <a:blip r:embed="rId4">
-            <a:extLst>
-              <a:ext uri="{28A0092B-C50C-407E-A947-70E740481C1C}">
-                <a14:useLocalDpi xmlns:a14="http://schemas.microsoft.com/office/drawing/2010/main" val="0"/>
-              </a:ext>
-            </a:extLst>
-          </a:blip>
-          <a:stretch>
-            <a:fillRect/>
-          </a:stretch>
-        </p:blipFill>
-        <p:spPr>
-          <a:xfrm>
-            <a:off x="5147297" y="4633358"/>
-            <a:ext cx="2930203" cy="1871175"/>
-          </a:xfrm>
-          <a:prstGeom prst="rect">
-            <a:avLst/>
-          </a:prstGeom>
-        </p:spPr>
-      </p:pic>
-    </p:spTree>
-    <p:extLst>
-      <p:ext uri="{BB962C8B-B14F-4D97-AF65-F5344CB8AC3E}">
-        <p14:creationId xmlns:p14="http://schemas.microsoft.com/office/powerpoint/2010/main" val="2982879685"/>
-      </p:ext>
-    </p:extLst>
-  </p:cSld>
-  <p:clrMapOvr>
-    <a:masterClrMapping/>
-  </p:clrMapOvr>
-  <p:timing>
-    <p:tnLst>
-      <p:par>
-        <p:cTn id="1" dur="indefinite" restart="never" nodeType="tmRoot"/>
-      </p:par>
-    </p:tnLst>
-  </p:timing>
-</p:sld>
-</file>
-
-<file path=ppt/slides/slide19.xml><?xml version="1.0" encoding="utf-8"?>
-<p:sld xmlns:a="http://schemas.openxmlformats.org/drawingml/2006/main" xmlns:r="http://schemas.openxmlformats.org/officeDocument/2006/relationships" xmlns:p="http://schemas.openxmlformats.org/presentationml/2006/main">
-  <p:cSld>
-    <p:spTree>
-      <p:nvGrpSpPr>
-        <p:cNvPr id="1" name=""/>
-        <p:cNvGrpSpPr/>
-        <p:nvPr/>
-      </p:nvGrpSpPr>
-      <p:grpSpPr>
-        <a:xfrm>
-          <a:off x="0" y="0"/>
-          <a:ext cx="0" cy="0"/>
-          <a:chOff x="0" y="0"/>
-          <a:chExt cx="0" cy="0"/>
-        </a:xfrm>
-      </p:grpSpPr>
-      <p:sp>
-        <p:nvSpPr>
-          <p:cNvPr id="2" name="Titolo 1"/>
-          <p:cNvSpPr>
-            <a:spLocks noGrp="1"/>
-          </p:cNvSpPr>
-          <p:nvPr>
-            <p:ph type="title"/>
-          </p:nvPr>
-        </p:nvSpPr>
-        <p:spPr/>
-        <p:txBody>
-          <a:bodyPr/>
-          <a:lstStyle/>
-          <a:p>
-            <a:endParaRPr lang="it-IT"/>
-          </a:p>
-        </p:txBody>
-      </p:sp>
-      <p:sp>
-        <p:nvSpPr>
-          <p:cNvPr id="3" name="Segnaposto contenuto 2"/>
-          <p:cNvSpPr>
-            <a:spLocks noGrp="1"/>
-          </p:cNvSpPr>
-          <p:nvPr>
-            <p:ph idx="1"/>
-          </p:nvPr>
-        </p:nvSpPr>
-        <p:spPr/>
-        <p:txBody>
-          <a:bodyPr/>
-          <a:lstStyle/>
-          <a:p>
-            <a:endParaRPr lang="it-IT"/>
-          </a:p>
-        </p:txBody>
-      </p:sp>
-      <p:sp>
-        <p:nvSpPr>
-          <p:cNvPr id="4" name="Segnaposto numero diapositiva 3"/>
-          <p:cNvSpPr>
-            <a:spLocks noGrp="1"/>
-          </p:cNvSpPr>
-          <p:nvPr>
-            <p:ph type="sldNum" sz="quarter" idx="11"/>
-          </p:nvPr>
-        </p:nvSpPr>
-        <p:spPr/>
-        <p:txBody>
-          <a:bodyPr/>
-          <a:lstStyle/>
-          <a:p>
-            <a:fld id="{C503DA3A-0C6B-48FC-931E-2C786AAFD5C1}" type="slidenum">
-              <a:rPr lang="en-US" altLang="nl-NL" smtClean="0"/>
-              <a:pPr/>
-              <a:t>19</a:t>
-            </a:fld>
-            <a:endParaRPr lang="en-US" altLang="nl-NL"/>
-          </a:p>
-        </p:txBody>
-      </p:sp>
-    </p:spTree>
-    <p:extLst>
-      <p:ext uri="{BB962C8B-B14F-4D97-AF65-F5344CB8AC3E}">
-        <p14:creationId xmlns:p14="http://schemas.microsoft.com/office/powerpoint/2010/main" val="269455306"/>
-      </p:ext>
-    </p:extLst>
-  </p:cSld>
-  <p:clrMapOvr>
-    <a:masterClrMapping/>
-  </p:clrMapOvr>
-</p:sld>
-</file>
-
-<file path=ppt/slides/slide2.xml><?xml version="1.0" encoding="utf-8"?>
-<p:sld xmlns:a="http://schemas.openxmlformats.org/drawingml/2006/main" xmlns:r="http://schemas.openxmlformats.org/officeDocument/2006/relationships" xmlns:p="http://schemas.openxmlformats.org/presentationml/2006/main">
-  <p:cSld>
-    <p:spTree>
-      <p:nvGrpSpPr>
-        <p:cNvPr id="1" name=""/>
-        <p:cNvGrpSpPr/>
-        <p:nvPr/>
-      </p:nvGrpSpPr>
-      <p:grpSpPr>
-        <a:xfrm>
-          <a:off x="0" y="0"/>
-          <a:ext cx="0" cy="0"/>
-          <a:chOff x="0" y="0"/>
-          <a:chExt cx="0" cy="0"/>
-        </a:xfrm>
-      </p:grpSpPr>
-      <p:sp>
-        <p:nvSpPr>
-          <p:cNvPr id="2" name="Titolo 1"/>
-          <p:cNvSpPr>
-            <a:spLocks noGrp="1"/>
-          </p:cNvSpPr>
-          <p:nvPr>
-            <p:ph type="title"/>
-          </p:nvPr>
-        </p:nvSpPr>
-        <p:spPr/>
-        <p:txBody>
-          <a:bodyPr/>
-          <a:lstStyle/>
-          <a:p>
-            <a:r>
-              <a:rPr lang="it-IT" dirty="0" smtClean="0"/>
-              <a:t>Indice</a:t>
-            </a:r>
-            <a:endParaRPr lang="it-IT" dirty="0"/>
-          </a:p>
-        </p:txBody>
-      </p:sp>
-      <p:sp>
-        <p:nvSpPr>
-          <p:cNvPr id="3" name="Segnaposto contenuto 2"/>
-          <p:cNvSpPr>
-            <a:spLocks noGrp="1"/>
-          </p:cNvSpPr>
-          <p:nvPr>
-            <p:ph idx="1"/>
-          </p:nvPr>
-        </p:nvSpPr>
-        <p:spPr>
-          <a:xfrm>
-            <a:off x="609600" y="891778"/>
-            <a:ext cx="7784892" cy="5531644"/>
-          </a:xfrm>
-        </p:spPr>
-        <p:txBody>
-          <a:bodyPr/>
-          <a:lstStyle/>
-          <a:p>
-            <a:r>
-              <a:rPr lang="it-IT" sz="2400" dirty="0"/>
-              <a:t>Interferometria</a:t>
-            </a:r>
-          </a:p>
-          <a:p>
-            <a:pPr lvl="1"/>
-            <a:r>
-              <a:rPr lang="it-IT" sz="2000" dirty="0"/>
-              <a:t>Interferometria a self-mixing</a:t>
-            </a:r>
-          </a:p>
-          <a:p>
-            <a:pPr lvl="1"/>
-            <a:r>
-              <a:rPr lang="it-IT" sz="2000" dirty="0"/>
-              <a:t>Misura della distanza</a:t>
-            </a:r>
-          </a:p>
-          <a:p>
-            <a:r>
-              <a:rPr lang="it-IT" sz="2400" dirty="0"/>
-              <a:t>Architettura hardware</a:t>
-            </a:r>
-          </a:p>
-          <a:p>
-            <a:pPr lvl="1"/>
-            <a:r>
-              <a:rPr lang="it-IT" sz="2000" dirty="0" smtClean="0"/>
-              <a:t>Sistema analogico</a:t>
-            </a:r>
-          </a:p>
-          <a:p>
-            <a:pPr lvl="1"/>
-            <a:r>
-              <a:rPr lang="it-IT" sz="2000" dirty="0"/>
-              <a:t>Sistema di </a:t>
-            </a:r>
-            <a:r>
-              <a:rPr lang="it-IT" sz="2000" dirty="0" smtClean="0"/>
-              <a:t>conversione</a:t>
-            </a:r>
-            <a:endParaRPr lang="it-IT" sz="2000" dirty="0"/>
-          </a:p>
-          <a:p>
-            <a:pPr lvl="1"/>
-            <a:r>
-              <a:rPr lang="it-IT" sz="2000" dirty="0" smtClean="0"/>
-              <a:t>Sistema digitale</a:t>
-            </a:r>
-            <a:endParaRPr lang="it-IT" sz="2000" dirty="0"/>
-          </a:p>
-          <a:p>
-            <a:r>
-              <a:rPr lang="it-IT" sz="2400" dirty="0" smtClean="0"/>
-              <a:t>Architettura </a:t>
-            </a:r>
-            <a:r>
-              <a:rPr lang="it-IT" sz="2400" dirty="0"/>
-              <a:t>software</a:t>
-            </a:r>
-          </a:p>
-          <a:p>
-            <a:pPr lvl="1"/>
-            <a:r>
-              <a:rPr lang="it-IT" sz="2000" dirty="0"/>
-              <a:t>Dettagli </a:t>
-            </a:r>
-            <a:r>
-              <a:rPr lang="it-IT" sz="2000" dirty="0" smtClean="0"/>
-              <a:t>implementativi</a:t>
-            </a:r>
-          </a:p>
-          <a:p>
-            <a:pPr lvl="1"/>
-            <a:r>
-              <a:rPr lang="it-IT" sz="2000" dirty="0" smtClean="0"/>
-              <a:t>FPGA</a:t>
-            </a:r>
-            <a:endParaRPr lang="it-IT" sz="2000" dirty="0"/>
-          </a:p>
-          <a:p>
-            <a:pPr lvl="1"/>
-            <a:r>
-              <a:rPr lang="it-IT" sz="2000" dirty="0" smtClean="0"/>
-              <a:t>Microcontrollore</a:t>
-            </a:r>
-          </a:p>
-          <a:p>
-            <a:pPr lvl="1"/>
-            <a:r>
-              <a:rPr lang="it-IT" sz="2000" dirty="0" smtClean="0"/>
-              <a:t>Ottimizzazioni</a:t>
-            </a:r>
-            <a:endParaRPr lang="it-IT" sz="2000" dirty="0"/>
-          </a:p>
-          <a:p>
-            <a:r>
-              <a:rPr lang="it-IT" sz="2400" dirty="0"/>
-              <a:t>Risultati </a:t>
-            </a:r>
-            <a:r>
-              <a:rPr lang="it-IT" sz="2400" dirty="0" smtClean="0"/>
-              <a:t>sperimentali</a:t>
-            </a:r>
-            <a:endParaRPr lang="it-IT" sz="2400" dirty="0"/>
-          </a:p>
-          <a:p>
-            <a:r>
-              <a:rPr lang="it-IT" sz="2400" dirty="0"/>
-              <a:t>Conclusioni e sviluppi futuri</a:t>
-            </a:r>
-          </a:p>
-        </p:txBody>
-      </p:sp>
-      <p:sp>
-        <p:nvSpPr>
-          <p:cNvPr id="4" name="Segnaposto numero diapositiva 3"/>
-          <p:cNvSpPr>
-            <a:spLocks noGrp="1"/>
-          </p:cNvSpPr>
-          <p:nvPr>
-            <p:ph type="sldNum" sz="quarter" idx="11"/>
-          </p:nvPr>
-        </p:nvSpPr>
-        <p:spPr/>
-        <p:txBody>
-          <a:bodyPr/>
-          <a:lstStyle/>
-          <a:p>
-            <a:fld id="{C503DA3A-0C6B-48FC-931E-2C786AAFD5C1}" type="slidenum">
-              <a:rPr lang="en-US" altLang="nl-NL" smtClean="0"/>
-              <a:pPr/>
-              <a:t>2</a:t>
-            </a:fld>
-            <a:endParaRPr lang="en-US" altLang="nl-NL"/>
-          </a:p>
-        </p:txBody>
-      </p:sp>
-    </p:spTree>
-    <p:extLst>
-      <p:ext uri="{BB962C8B-B14F-4D97-AF65-F5344CB8AC3E}">
-        <p14:creationId xmlns:p14="http://schemas.microsoft.com/office/powerpoint/2010/main" val="3953617699"/>
-      </p:ext>
-    </p:extLst>
-  </p:cSld>
-  <p:clrMapOvr>
-    <a:masterClrMapping/>
-  </p:clrMapOvr>
-  <p:timing>
-    <p:tnLst>
-      <p:par>
-        <p:cTn id="1" dur="indefinite" restart="never" nodeType="tmRoot"/>
-      </p:par>
-    </p:tnLst>
-  </p:timing>
-</p:sld>
-</file>
-
-<file path=ppt/slides/slide20.xml><?xml version="1.0" encoding="utf-8"?>
-<p:sld xmlns:a="http://schemas.openxmlformats.org/drawingml/2006/main" xmlns:r="http://schemas.openxmlformats.org/officeDocument/2006/relationships" xmlns:p="http://schemas.openxmlformats.org/presentationml/2006/main">
-  <p:cSld>
-    <p:spTree>
-      <p:nvGrpSpPr>
-        <p:cNvPr id="1" name=""/>
-        <p:cNvGrpSpPr/>
-        <p:nvPr/>
-      </p:nvGrpSpPr>
-      <p:grpSpPr>
-        <a:xfrm>
-          <a:off x="0" y="0"/>
-          <a:ext cx="0" cy="0"/>
-          <a:chOff x="0" y="0"/>
-          <a:chExt cx="0" cy="0"/>
-        </a:xfrm>
-      </p:grpSpPr>
-      <p:sp>
-        <p:nvSpPr>
-          <p:cNvPr id="2" name="Titolo 1"/>
-          <p:cNvSpPr>
-            <a:spLocks noGrp="1"/>
-          </p:cNvSpPr>
-          <p:nvPr>
-            <p:ph type="title"/>
-          </p:nvPr>
-        </p:nvSpPr>
-        <p:spPr/>
-        <p:txBody>
-          <a:bodyPr/>
-          <a:lstStyle/>
-          <a:p>
-            <a:r>
-              <a:rPr lang="it-IT" dirty="0" smtClean="0"/>
-              <a:t>Indice</a:t>
-            </a:r>
-            <a:endParaRPr lang="it-IT" dirty="0"/>
-          </a:p>
-        </p:txBody>
-      </p:sp>
-      <p:sp>
-        <p:nvSpPr>
-          <p:cNvPr id="3" name="Segnaposto contenuto 2"/>
-          <p:cNvSpPr>
-            <a:spLocks noGrp="1"/>
-          </p:cNvSpPr>
-          <p:nvPr>
-            <p:ph idx="1"/>
-          </p:nvPr>
-        </p:nvSpPr>
-        <p:spPr>
-          <a:xfrm>
-            <a:off x="609600" y="1021556"/>
-            <a:ext cx="7815263" cy="5272088"/>
-          </a:xfrm>
-        </p:spPr>
-        <p:txBody>
-          <a:bodyPr/>
-          <a:lstStyle/>
-          <a:p>
-            <a:r>
-              <a:rPr lang="it-IT" sz="2400" dirty="0">
-                <a:solidFill>
-                  <a:schemeClr val="bg2">
-                    <a:lumMod val="40000"/>
-                    <a:lumOff val="60000"/>
-                  </a:schemeClr>
-                </a:solidFill>
-              </a:rPr>
-              <a:t>Interferometria</a:t>
-            </a:r>
-          </a:p>
-          <a:p>
-            <a:pPr lvl="1"/>
-            <a:r>
-              <a:rPr lang="it-IT" sz="2000" dirty="0">
-                <a:solidFill>
-                  <a:schemeClr val="bg2">
-                    <a:lumMod val="40000"/>
-                    <a:lumOff val="60000"/>
-                  </a:schemeClr>
-                </a:solidFill>
-              </a:rPr>
-              <a:t>Interferometria a self-mixing</a:t>
-            </a:r>
-          </a:p>
-          <a:p>
-            <a:pPr lvl="1"/>
-            <a:r>
-              <a:rPr lang="it-IT" sz="2000" dirty="0">
-                <a:solidFill>
-                  <a:schemeClr val="bg2">
-                    <a:lumMod val="40000"/>
-                    <a:lumOff val="60000"/>
-                  </a:schemeClr>
-                </a:solidFill>
-              </a:rPr>
-              <a:t>Misura della distanza</a:t>
-            </a:r>
-          </a:p>
-          <a:p>
-            <a:r>
-              <a:rPr lang="it-IT" sz="2400" dirty="0">
-                <a:solidFill>
-                  <a:schemeClr val="bg2">
-                    <a:lumMod val="40000"/>
-                    <a:lumOff val="60000"/>
-                  </a:schemeClr>
-                </a:solidFill>
-              </a:rPr>
-              <a:t>Architettura hardware</a:t>
-            </a:r>
-          </a:p>
-          <a:p>
-            <a:pPr lvl="1"/>
-            <a:r>
-              <a:rPr lang="it-IT" sz="2000" dirty="0">
-                <a:solidFill>
-                  <a:schemeClr val="bg2">
-                    <a:lumMod val="40000"/>
-                    <a:lumOff val="60000"/>
-                  </a:schemeClr>
-                </a:solidFill>
-              </a:rPr>
-              <a:t>Sistema analogico</a:t>
-            </a:r>
-          </a:p>
-          <a:p>
-            <a:pPr lvl="1"/>
-            <a:r>
-              <a:rPr lang="it-IT" sz="2000" dirty="0">
-                <a:solidFill>
-                  <a:schemeClr val="bg2">
-                    <a:lumMod val="40000"/>
-                    <a:lumOff val="60000"/>
-                  </a:schemeClr>
-                </a:solidFill>
-              </a:rPr>
-              <a:t>Sistema di conversione</a:t>
-            </a:r>
-          </a:p>
-          <a:p>
-            <a:pPr lvl="1"/>
-            <a:r>
-              <a:rPr lang="it-IT" sz="2000" dirty="0">
-                <a:solidFill>
-                  <a:schemeClr val="bg2">
-                    <a:lumMod val="40000"/>
-                    <a:lumOff val="60000"/>
-                  </a:schemeClr>
-                </a:solidFill>
-              </a:rPr>
-              <a:t>Sistema digitale</a:t>
-            </a:r>
-          </a:p>
-          <a:p>
-            <a:r>
-              <a:rPr lang="it-IT" sz="2400" dirty="0">
-                <a:solidFill>
-                  <a:schemeClr val="bg2">
-                    <a:lumMod val="40000"/>
-                    <a:lumOff val="60000"/>
-                  </a:schemeClr>
-                </a:solidFill>
-              </a:rPr>
-              <a:t>Architettura software</a:t>
-            </a:r>
-          </a:p>
-          <a:p>
-            <a:pPr lvl="1"/>
-            <a:r>
-              <a:rPr lang="it-IT" sz="2000" dirty="0">
-                <a:solidFill>
-                  <a:schemeClr val="bg2">
-                    <a:lumMod val="40000"/>
-                    <a:lumOff val="60000"/>
-                  </a:schemeClr>
-                </a:solidFill>
-              </a:rPr>
-              <a:t>Dettagli implementativi</a:t>
-            </a:r>
-          </a:p>
-          <a:p>
-            <a:pPr lvl="1"/>
-            <a:r>
-              <a:rPr lang="it-IT" sz="2000" dirty="0" smtClean="0">
-                <a:solidFill>
-                  <a:schemeClr val="bg2">
-                    <a:lumMod val="40000"/>
-                    <a:lumOff val="60000"/>
-                  </a:schemeClr>
-                </a:solidFill>
-              </a:rPr>
-              <a:t>FPGA</a:t>
-            </a:r>
-            <a:endParaRPr lang="it-IT" sz="2000" dirty="0">
-              <a:solidFill>
-                <a:schemeClr val="bg2">
-                  <a:lumMod val="40000"/>
-                  <a:lumOff val="60000"/>
-                </a:schemeClr>
-              </a:solidFill>
-            </a:endParaRPr>
-          </a:p>
-          <a:p>
-            <a:pPr lvl="1"/>
-            <a:r>
-              <a:rPr lang="it-IT" sz="2000" dirty="0">
-                <a:solidFill>
-                  <a:schemeClr val="bg2">
-                    <a:lumMod val="40000"/>
-                    <a:lumOff val="60000"/>
-                  </a:schemeClr>
-                </a:solidFill>
-              </a:rPr>
-              <a:t>Microcontrollore</a:t>
-            </a:r>
-          </a:p>
-          <a:p>
-            <a:pPr lvl="1"/>
-            <a:r>
-              <a:rPr lang="it-IT" sz="2000" dirty="0" smtClean="0">
-                <a:solidFill>
-                  <a:schemeClr val="bg2">
-                    <a:lumMod val="40000"/>
-                    <a:lumOff val="60000"/>
-                  </a:schemeClr>
-                </a:solidFill>
-              </a:rPr>
-              <a:t>Ottimizzazioni</a:t>
-            </a:r>
-            <a:endParaRPr lang="it-IT" sz="2000" dirty="0">
-              <a:solidFill>
-                <a:schemeClr val="bg2">
-                  <a:lumMod val="40000"/>
-                  <a:lumOff val="60000"/>
-                </a:schemeClr>
-              </a:solidFill>
-            </a:endParaRPr>
-          </a:p>
-          <a:p>
-            <a:r>
-              <a:rPr lang="it-IT" sz="2400" dirty="0"/>
-              <a:t>Risultati sperimentali</a:t>
-            </a:r>
-          </a:p>
-          <a:p>
-            <a:r>
-              <a:rPr lang="it-IT" sz="2400" dirty="0"/>
-              <a:t>Conclusioni e sviluppi futuri</a:t>
-            </a:r>
-          </a:p>
-        </p:txBody>
-      </p:sp>
-      <p:sp>
-        <p:nvSpPr>
-          <p:cNvPr id="4" name="Segnaposto numero diapositiva 3"/>
-          <p:cNvSpPr>
-            <a:spLocks noGrp="1"/>
-          </p:cNvSpPr>
-          <p:nvPr>
-            <p:ph type="sldNum" sz="quarter" idx="11"/>
-          </p:nvPr>
-        </p:nvSpPr>
-        <p:spPr/>
-        <p:txBody>
-          <a:bodyPr/>
-          <a:lstStyle/>
-          <a:p>
-            <a:fld id="{C503DA3A-0C6B-48FC-931E-2C786AAFD5C1}" type="slidenum">
-              <a:rPr lang="en-US" altLang="nl-NL" smtClean="0"/>
-              <a:pPr/>
-              <a:t>20</a:t>
-            </a:fld>
-            <a:endParaRPr lang="en-US" altLang="nl-NL"/>
-          </a:p>
-        </p:txBody>
-      </p:sp>
-    </p:spTree>
-    <p:extLst>
-      <p:ext uri="{BB962C8B-B14F-4D97-AF65-F5344CB8AC3E}">
-        <p14:creationId xmlns:p14="http://schemas.microsoft.com/office/powerpoint/2010/main" val="3354392950"/>
       </p:ext>
     </p:extLst>
   </p:cSld>
@@ -11396,6 +11715,914 @@
           <a:p>
             <a:r>
               <a:rPr lang="it-IT" dirty="0" smtClean="0"/>
+              <a:t>Ottimizzazioni</a:t>
+            </a:r>
+            <a:endParaRPr lang="it-IT" dirty="0"/>
+          </a:p>
+        </p:txBody>
+      </p:sp>
+      <p:sp>
+        <p:nvSpPr>
+          <p:cNvPr id="3" name="Segnaposto contenuto 2"/>
+          <p:cNvSpPr>
+            <a:spLocks noGrp="1"/>
+          </p:cNvSpPr>
+          <p:nvPr>
+            <p:ph idx="1"/>
+          </p:nvPr>
+        </p:nvSpPr>
+        <p:spPr>
+          <a:xfrm>
+            <a:off x="685800" y="1127802"/>
+            <a:ext cx="7772400" cy="927848"/>
+          </a:xfrm>
+        </p:spPr>
+        <p:txBody>
+          <a:bodyPr/>
+          <a:lstStyle/>
+          <a:p>
+            <a:r>
+              <a:rPr lang="it-IT" sz="2400" b="1" dirty="0"/>
+              <a:t>Finestratura</a:t>
+            </a:r>
+            <a:r>
+              <a:rPr lang="it-IT" sz="2400" dirty="0"/>
+              <a:t> di </a:t>
+            </a:r>
+            <a:r>
+              <a:rPr lang="it-IT" sz="2400" dirty="0" err="1"/>
+              <a:t>Hanning</a:t>
+            </a:r>
+            <a:r>
+              <a:rPr lang="it-IT" sz="2400" dirty="0"/>
+              <a:t> del segnale </a:t>
+            </a:r>
+            <a:r>
+              <a:rPr lang="it-IT" sz="2400" dirty="0" smtClean="0"/>
+              <a:t>interferometrico</a:t>
+            </a:r>
+            <a:r>
+              <a:rPr lang="it-IT" sz="2400" dirty="0"/>
+              <a:t/>
+            </a:r>
+            <a:br>
+              <a:rPr lang="it-IT" sz="2400" dirty="0"/>
+            </a:br>
+            <a:r>
+              <a:rPr lang="it-IT" sz="2400" dirty="0" smtClean="0"/>
+              <a:t/>
+            </a:r>
+            <a:br>
+              <a:rPr lang="it-IT" sz="2400" dirty="0" smtClean="0"/>
+            </a:br>
+            <a:r>
+              <a:rPr lang="it-IT" sz="2400" dirty="0" smtClean="0"/>
+              <a:t/>
+            </a:r>
+            <a:br>
+              <a:rPr lang="it-IT" sz="2400" dirty="0" smtClean="0"/>
+            </a:br>
+            <a:r>
+              <a:rPr lang="it-IT" sz="2400" dirty="0" smtClean="0"/>
+              <a:t/>
+            </a:r>
+            <a:br>
+              <a:rPr lang="it-IT" sz="2400" dirty="0" smtClean="0"/>
+            </a:br>
+            <a:r>
+              <a:rPr lang="it-IT" sz="2400" dirty="0" smtClean="0"/>
+              <a:t/>
+            </a:r>
+            <a:br>
+              <a:rPr lang="it-IT" sz="2400" dirty="0" smtClean="0"/>
+            </a:br>
+            <a:endParaRPr lang="it-IT" sz="2400" dirty="0"/>
+          </a:p>
+          <a:p>
+            <a:endParaRPr lang="it-IT" sz="2400" dirty="0"/>
+          </a:p>
+          <a:p>
+            <a:endParaRPr lang="it-IT" sz="2400" dirty="0"/>
+          </a:p>
+        </p:txBody>
+      </p:sp>
+      <p:sp>
+        <p:nvSpPr>
+          <p:cNvPr id="4" name="Segnaposto numero diapositiva 3"/>
+          <p:cNvSpPr>
+            <a:spLocks noGrp="1"/>
+          </p:cNvSpPr>
+          <p:nvPr>
+            <p:ph type="sldNum" sz="quarter" idx="11"/>
+          </p:nvPr>
+        </p:nvSpPr>
+        <p:spPr/>
+        <p:txBody>
+          <a:bodyPr/>
+          <a:lstStyle/>
+          <a:p>
+            <a:fld id="{C503DA3A-0C6B-48FC-931E-2C786AAFD5C1}" type="slidenum">
+              <a:rPr lang="en-US" altLang="nl-NL" smtClean="0"/>
+              <a:pPr/>
+              <a:t>21</a:t>
+            </a:fld>
+            <a:endParaRPr lang="en-US" altLang="nl-NL"/>
+          </a:p>
+        </p:txBody>
+      </p:sp>
+      <p:pic>
+        <p:nvPicPr>
+          <p:cNvPr id="8" name="Immagine 7"/>
+          <p:cNvPicPr>
+            <a:picLocks noChangeAspect="1"/>
+          </p:cNvPicPr>
+          <p:nvPr/>
+        </p:nvPicPr>
+        <p:blipFill>
+          <a:blip r:embed="rId2">
+            <a:extLst>
+              <a:ext uri="{28A0092B-C50C-407E-A947-70E740481C1C}">
+                <a14:useLocalDpi xmlns:a14="http://schemas.microsoft.com/office/drawing/2010/main" val="0"/>
+              </a:ext>
+            </a:extLst>
+          </a:blip>
+          <a:stretch>
+            <a:fillRect/>
+          </a:stretch>
+        </p:blipFill>
+        <p:spPr>
+          <a:xfrm>
+            <a:off x="996043" y="2598960"/>
+            <a:ext cx="2902713" cy="1979614"/>
+          </a:xfrm>
+          <a:prstGeom prst="rect">
+            <a:avLst/>
+          </a:prstGeom>
+        </p:spPr>
+      </p:pic>
+      <p:pic>
+        <p:nvPicPr>
+          <p:cNvPr id="9" name="Immagine 8"/>
+          <p:cNvPicPr>
+            <a:picLocks noChangeAspect="1"/>
+          </p:cNvPicPr>
+          <p:nvPr/>
+        </p:nvPicPr>
+        <p:blipFill>
+          <a:blip r:embed="rId3">
+            <a:extLst>
+              <a:ext uri="{28A0092B-C50C-407E-A947-70E740481C1C}">
+                <a14:useLocalDpi xmlns:a14="http://schemas.microsoft.com/office/drawing/2010/main" val="0"/>
+              </a:ext>
+            </a:extLst>
+          </a:blip>
+          <a:stretch>
+            <a:fillRect/>
+          </a:stretch>
+        </p:blipFill>
+        <p:spPr>
+          <a:xfrm>
+            <a:off x="5400388" y="2566302"/>
+            <a:ext cx="2623851" cy="2031369"/>
+          </a:xfrm>
+          <a:prstGeom prst="rect">
+            <a:avLst/>
+          </a:prstGeom>
+        </p:spPr>
+      </p:pic>
+      <p:sp>
+        <p:nvSpPr>
+          <p:cNvPr id="10" name="Freccia destra 9"/>
+          <p:cNvSpPr/>
+          <p:nvPr/>
+        </p:nvSpPr>
+        <p:spPr>
+          <a:xfrm>
+            <a:off x="3502053" y="3201855"/>
+            <a:ext cx="2016176" cy="793851"/>
+          </a:xfrm>
+          <a:prstGeom prst="rightArrow">
+            <a:avLst/>
+          </a:prstGeom>
+          <a:solidFill>
+            <a:srgbClr val="FF0000"/>
+          </a:solidFill>
+        </p:spPr>
+        <p:style>
+          <a:lnRef idx="1">
+            <a:schemeClr val="accent1"/>
+          </a:lnRef>
+          <a:fillRef idx="3">
+            <a:schemeClr val="accent1"/>
+          </a:fillRef>
+          <a:effectRef idx="2">
+            <a:schemeClr val="accent1"/>
+          </a:effectRef>
+          <a:fontRef idx="minor">
+            <a:schemeClr val="lt1"/>
+          </a:fontRef>
+        </p:style>
+        <p:txBody>
+          <a:bodyPr rtlCol="0" anchor="ctr"/>
+          <a:lstStyle/>
+          <a:p>
+            <a:pPr algn="ctr"/>
+            <a:r>
+              <a:rPr lang="it-IT" sz="1500" dirty="0" smtClean="0"/>
+              <a:t>Compensazione</a:t>
+            </a:r>
+            <a:endParaRPr lang="it-IT" sz="1500" dirty="0"/>
+          </a:p>
+        </p:txBody>
+      </p:sp>
+      <p:sp>
+        <p:nvSpPr>
+          <p:cNvPr id="6" name="CasellaDiTesto 5"/>
+          <p:cNvSpPr txBox="1"/>
+          <p:nvPr/>
+        </p:nvSpPr>
+        <p:spPr>
+          <a:xfrm>
+            <a:off x="685800" y="2055650"/>
+            <a:ext cx="7772400" cy="461665"/>
+          </a:xfrm>
+          <a:prstGeom prst="rect">
+            <a:avLst/>
+          </a:prstGeom>
+          <a:noFill/>
+        </p:spPr>
+        <p:txBody>
+          <a:bodyPr wrap="square" rtlCol="0">
+            <a:spAutoFit/>
+          </a:bodyPr>
+          <a:lstStyle/>
+          <a:p>
+            <a:pPr marL="342900" indent="-342900">
+              <a:buFont typeface="Arial" charset="0"/>
+              <a:buChar char="•"/>
+            </a:pPr>
+            <a:r>
+              <a:rPr lang="it-IT" b="1"/>
+              <a:t>Compensazione</a:t>
+            </a:r>
+            <a:r>
+              <a:rPr lang="it-IT"/>
+              <a:t> della non-linearità del laser</a:t>
+            </a:r>
+          </a:p>
+        </p:txBody>
+      </p:sp>
+      <p:sp>
+        <p:nvSpPr>
+          <p:cNvPr id="7" name="CasellaDiTesto 6"/>
+          <p:cNvSpPr txBox="1"/>
+          <p:nvPr/>
+        </p:nvSpPr>
+        <p:spPr>
+          <a:xfrm>
+            <a:off x="2432957" y="5339443"/>
+            <a:ext cx="4408714" cy="830997"/>
+          </a:xfrm>
+          <a:prstGeom prst="rect">
+            <a:avLst/>
+          </a:prstGeom>
+          <a:noFill/>
+        </p:spPr>
+        <p:txBody>
+          <a:bodyPr wrap="square" rtlCol="0">
+            <a:spAutoFit/>
+          </a:bodyPr>
+          <a:lstStyle/>
+          <a:p>
+            <a:r>
+              <a:rPr lang="it-IT" dirty="0" err="1" smtClean="0">
+                <a:solidFill>
+                  <a:srgbClr val="FF0000"/>
+                </a:solidFill>
+              </a:rPr>
+              <a:t>toDO</a:t>
+            </a:r>
+            <a:r>
+              <a:rPr lang="it-IT" dirty="0" smtClean="0">
+                <a:solidFill>
+                  <a:srgbClr val="FF0000"/>
+                </a:solidFill>
+              </a:rPr>
+              <a:t>: mettere la triangolare prima e dopo</a:t>
+            </a:r>
+            <a:endParaRPr lang="it-IT" dirty="0">
+              <a:solidFill>
+                <a:srgbClr val="FF0000"/>
+              </a:solidFill>
+            </a:endParaRPr>
+          </a:p>
+        </p:txBody>
+      </p:sp>
+    </p:spTree>
+    <p:extLst>
+      <p:ext uri="{BB962C8B-B14F-4D97-AF65-F5344CB8AC3E}">
+        <p14:creationId xmlns:p14="http://schemas.microsoft.com/office/powerpoint/2010/main" val="2982879685"/>
+      </p:ext>
+    </p:extLst>
+  </p:cSld>
+  <p:clrMapOvr>
+    <a:masterClrMapping/>
+  </p:clrMapOvr>
+  <p:timing>
+    <p:tnLst>
+      <p:par>
+        <p:cTn id="1" dur="indefinite" restart="never" nodeType="tmRoot"/>
+      </p:par>
+    </p:tnLst>
+  </p:timing>
+</p:sld>
+</file>
+
+<file path=ppt/slides/slide22.xml><?xml version="1.0" encoding="utf-8"?>
+<p:sld xmlns:a="http://schemas.openxmlformats.org/drawingml/2006/main" xmlns:r="http://schemas.openxmlformats.org/officeDocument/2006/relationships" xmlns:p="http://schemas.openxmlformats.org/presentationml/2006/main">
+  <p:cSld>
+    <p:spTree>
+      <p:nvGrpSpPr>
+        <p:cNvPr id="1" name=""/>
+        <p:cNvGrpSpPr/>
+        <p:nvPr/>
+      </p:nvGrpSpPr>
+      <p:grpSpPr>
+        <a:xfrm>
+          <a:off x="0" y="0"/>
+          <a:ext cx="0" cy="0"/>
+          <a:chOff x="0" y="0"/>
+          <a:chExt cx="0" cy="0"/>
+        </a:xfrm>
+      </p:grpSpPr>
+      <p:sp>
+        <p:nvSpPr>
+          <p:cNvPr id="3" name="Segnaposto contenuto 2"/>
+          <p:cNvSpPr>
+            <a:spLocks noGrp="1"/>
+          </p:cNvSpPr>
+          <p:nvPr>
+            <p:ph idx="1"/>
+          </p:nvPr>
+        </p:nvSpPr>
+        <p:spPr/>
+        <p:txBody>
+          <a:bodyPr/>
+          <a:lstStyle/>
+          <a:p>
+            <a:r>
+              <a:rPr lang="it-IT" sz="2400" dirty="0"/>
+              <a:t>Segnali di </a:t>
+            </a:r>
+            <a:r>
+              <a:rPr lang="it-IT" sz="2400" dirty="0" smtClean="0"/>
+              <a:t>modulazione con </a:t>
+            </a:r>
+            <a:r>
+              <a:rPr lang="it-IT" sz="2400" b="1" dirty="0"/>
+              <a:t>ampiezze differenti</a:t>
+            </a:r>
+          </a:p>
+          <a:p>
+            <a:endParaRPr lang="it-IT" sz="2400" b="1" dirty="0" smtClean="0"/>
+          </a:p>
+          <a:p>
+            <a:endParaRPr lang="it-IT" sz="2400" b="1" dirty="0"/>
+          </a:p>
+          <a:p>
+            <a:endParaRPr lang="it-IT" sz="2400" b="1" dirty="0" smtClean="0"/>
+          </a:p>
+          <a:p>
+            <a:pPr marL="0" indent="0">
+              <a:buNone/>
+            </a:pPr>
+            <a:endParaRPr lang="it-IT" sz="2400" b="1" dirty="0" smtClean="0"/>
+          </a:p>
+          <a:p>
+            <a:pPr marL="0" indent="0">
+              <a:buNone/>
+            </a:pPr>
+            <a:endParaRPr lang="it-IT" sz="2400" b="1" dirty="0" smtClean="0"/>
+          </a:p>
+          <a:p>
+            <a:pPr marL="0" indent="0">
+              <a:buNone/>
+            </a:pPr>
+            <a:endParaRPr lang="it-IT" sz="2400" b="1" dirty="0" smtClean="0"/>
+          </a:p>
+          <a:p>
+            <a:pPr marL="0" indent="0">
+              <a:buNone/>
+            </a:pPr>
+            <a:endParaRPr lang="it-IT" sz="2400" b="1" dirty="0" smtClean="0"/>
+          </a:p>
+          <a:p>
+            <a:r>
+              <a:rPr lang="it-IT" sz="2400" b="1" dirty="0" smtClean="0"/>
+              <a:t>Sottrazione</a:t>
+            </a:r>
+            <a:r>
+              <a:rPr lang="it-IT" sz="2400" dirty="0" smtClean="0"/>
+              <a:t> </a:t>
+            </a:r>
+            <a:br>
+              <a:rPr lang="it-IT" sz="2400" dirty="0" smtClean="0"/>
+            </a:br>
+            <a:r>
+              <a:rPr lang="it-IT" sz="2400" dirty="0" smtClean="0"/>
+              <a:t>del </a:t>
+            </a:r>
+            <a:r>
+              <a:rPr lang="it-IT" sz="2400" dirty="0"/>
+              <a:t>fondo di </a:t>
+            </a:r>
+            <a:r>
+              <a:rPr lang="it-IT" sz="2400" b="1" dirty="0"/>
+              <a:t>rumore</a:t>
+            </a:r>
+            <a:r>
+              <a:rPr lang="it-IT" sz="2400" dirty="0"/>
+              <a:t> </a:t>
+            </a:r>
+          </a:p>
+          <a:p>
+            <a:endParaRPr lang="it-IT" dirty="0"/>
+          </a:p>
+        </p:txBody>
+      </p:sp>
+      <p:sp>
+        <p:nvSpPr>
+          <p:cNvPr id="4" name="Segnaposto numero diapositiva 3"/>
+          <p:cNvSpPr>
+            <a:spLocks noGrp="1"/>
+          </p:cNvSpPr>
+          <p:nvPr>
+            <p:ph type="sldNum" sz="quarter" idx="11"/>
+          </p:nvPr>
+        </p:nvSpPr>
+        <p:spPr/>
+        <p:txBody>
+          <a:bodyPr/>
+          <a:lstStyle/>
+          <a:p>
+            <a:fld id="{C503DA3A-0C6B-48FC-931E-2C786AAFD5C1}" type="slidenum">
+              <a:rPr lang="en-US" altLang="nl-NL" smtClean="0"/>
+              <a:pPr/>
+              <a:t>22</a:t>
+            </a:fld>
+            <a:endParaRPr lang="en-US" altLang="nl-NL"/>
+          </a:p>
+        </p:txBody>
+      </p:sp>
+      <p:sp>
+        <p:nvSpPr>
+          <p:cNvPr id="5" name="Titolo 1"/>
+          <p:cNvSpPr>
+            <a:spLocks noGrp="1"/>
+          </p:cNvSpPr>
+          <p:nvPr>
+            <p:ph type="title"/>
+          </p:nvPr>
+        </p:nvSpPr>
+        <p:spPr>
+          <a:xfrm>
+            <a:off x="609600" y="0"/>
+            <a:ext cx="7162800" cy="762000"/>
+          </a:xfrm>
+        </p:spPr>
+        <p:txBody>
+          <a:bodyPr/>
+          <a:lstStyle/>
+          <a:p>
+            <a:r>
+              <a:rPr lang="it-IT" dirty="0" smtClean="0"/>
+              <a:t>Ottimizzazioni</a:t>
+            </a:r>
+            <a:endParaRPr lang="it-IT" dirty="0"/>
+          </a:p>
+        </p:txBody>
+      </p:sp>
+      <p:pic>
+        <p:nvPicPr>
+          <p:cNvPr id="6" name="Immagine 5"/>
+          <p:cNvPicPr>
+            <a:picLocks noChangeAspect="1"/>
+          </p:cNvPicPr>
+          <p:nvPr/>
+        </p:nvPicPr>
+        <p:blipFill>
+          <a:blip r:embed="rId2">
+            <a:extLst>
+              <a:ext uri="{28A0092B-C50C-407E-A947-70E740481C1C}">
+                <a14:useLocalDpi xmlns:a14="http://schemas.microsoft.com/office/drawing/2010/main" val="0"/>
+              </a:ext>
+            </a:extLst>
+          </a:blip>
+          <a:stretch>
+            <a:fillRect/>
+          </a:stretch>
+        </p:blipFill>
+        <p:spPr>
+          <a:xfrm>
+            <a:off x="4572000" y="4623617"/>
+            <a:ext cx="2930203" cy="1871175"/>
+          </a:xfrm>
+          <a:prstGeom prst="rect">
+            <a:avLst/>
+          </a:prstGeom>
+        </p:spPr>
+      </p:pic>
+      <p:sp>
+        <p:nvSpPr>
+          <p:cNvPr id="7" name="CasellaDiTesto 6"/>
+          <p:cNvSpPr txBox="1"/>
+          <p:nvPr/>
+        </p:nvSpPr>
+        <p:spPr>
+          <a:xfrm>
+            <a:off x="2549978" y="2596243"/>
+            <a:ext cx="3282043" cy="830997"/>
+          </a:xfrm>
+          <a:prstGeom prst="rect">
+            <a:avLst/>
+          </a:prstGeom>
+          <a:noFill/>
+        </p:spPr>
+        <p:txBody>
+          <a:bodyPr wrap="square" rtlCol="0">
+            <a:spAutoFit/>
+          </a:bodyPr>
+          <a:lstStyle/>
+          <a:p>
+            <a:r>
+              <a:rPr lang="it-IT" dirty="0" err="1" smtClean="0">
+                <a:solidFill>
+                  <a:srgbClr val="FF0000"/>
+                </a:solidFill>
+              </a:rPr>
+              <a:t>toDO</a:t>
+            </a:r>
+            <a:r>
+              <a:rPr lang="it-IT" dirty="0" smtClean="0">
+                <a:solidFill>
+                  <a:srgbClr val="FF0000"/>
+                </a:solidFill>
+              </a:rPr>
+              <a:t>: mettere le 5 triangolari</a:t>
+            </a:r>
+            <a:endParaRPr lang="it-IT" dirty="0">
+              <a:solidFill>
+                <a:srgbClr val="FF0000"/>
+              </a:solidFill>
+            </a:endParaRPr>
+          </a:p>
+        </p:txBody>
+      </p:sp>
+    </p:spTree>
+    <p:extLst>
+      <p:ext uri="{BB962C8B-B14F-4D97-AF65-F5344CB8AC3E}">
+        <p14:creationId xmlns:p14="http://schemas.microsoft.com/office/powerpoint/2010/main" val="269455306"/>
+      </p:ext>
+    </p:extLst>
+  </p:cSld>
+  <p:clrMapOvr>
+    <a:masterClrMapping/>
+  </p:clrMapOvr>
+</p:sld>
+</file>
+
+<file path=ppt/slides/slide23.xml><?xml version="1.0" encoding="utf-8"?>
+<p:sld xmlns:a="http://schemas.openxmlformats.org/drawingml/2006/main" xmlns:r="http://schemas.openxmlformats.org/officeDocument/2006/relationships" xmlns:p="http://schemas.openxmlformats.org/presentationml/2006/main">
+  <p:cSld>
+    <p:spTree>
+      <p:nvGrpSpPr>
+        <p:cNvPr id="1" name=""/>
+        <p:cNvGrpSpPr/>
+        <p:nvPr/>
+      </p:nvGrpSpPr>
+      <p:grpSpPr>
+        <a:xfrm>
+          <a:off x="0" y="0"/>
+          <a:ext cx="0" cy="0"/>
+          <a:chOff x="0" y="0"/>
+          <a:chExt cx="0" cy="0"/>
+        </a:xfrm>
+      </p:grpSpPr>
+      <p:sp>
+        <p:nvSpPr>
+          <p:cNvPr id="2" name="Titolo 1"/>
+          <p:cNvSpPr>
+            <a:spLocks noGrp="1"/>
+          </p:cNvSpPr>
+          <p:nvPr>
+            <p:ph type="title"/>
+          </p:nvPr>
+        </p:nvSpPr>
+        <p:spPr/>
+        <p:txBody>
+          <a:bodyPr/>
+          <a:lstStyle/>
+          <a:p>
+            <a:r>
+              <a:rPr lang="it-IT" dirty="0" smtClean="0"/>
+              <a:t>Indice</a:t>
+            </a:r>
+            <a:endParaRPr lang="it-IT" dirty="0"/>
+          </a:p>
+        </p:txBody>
+      </p:sp>
+      <p:sp>
+        <p:nvSpPr>
+          <p:cNvPr id="3" name="Segnaposto contenuto 2"/>
+          <p:cNvSpPr>
+            <a:spLocks noGrp="1"/>
+          </p:cNvSpPr>
+          <p:nvPr>
+            <p:ph idx="1"/>
+          </p:nvPr>
+        </p:nvSpPr>
+        <p:spPr>
+          <a:xfrm>
+            <a:off x="609600" y="1021556"/>
+            <a:ext cx="7815263" cy="5272088"/>
+          </a:xfrm>
+        </p:spPr>
+        <p:txBody>
+          <a:bodyPr/>
+          <a:lstStyle/>
+          <a:p>
+            <a:r>
+              <a:rPr lang="it-IT" sz="2400" dirty="0">
+                <a:solidFill>
+                  <a:schemeClr val="bg2">
+                    <a:lumMod val="40000"/>
+                    <a:lumOff val="60000"/>
+                  </a:schemeClr>
+                </a:solidFill>
+              </a:rPr>
+              <a:t>Interferometria</a:t>
+            </a:r>
+          </a:p>
+          <a:p>
+            <a:pPr lvl="1"/>
+            <a:r>
+              <a:rPr lang="it-IT" sz="2000" dirty="0">
+                <a:solidFill>
+                  <a:schemeClr val="bg2">
+                    <a:lumMod val="40000"/>
+                    <a:lumOff val="60000"/>
+                  </a:schemeClr>
+                </a:solidFill>
+              </a:rPr>
+              <a:t>Interferometria a self-mixing</a:t>
+            </a:r>
+          </a:p>
+          <a:p>
+            <a:pPr lvl="1"/>
+            <a:r>
+              <a:rPr lang="it-IT" sz="2000" dirty="0">
+                <a:solidFill>
+                  <a:schemeClr val="bg2">
+                    <a:lumMod val="40000"/>
+                    <a:lumOff val="60000"/>
+                  </a:schemeClr>
+                </a:solidFill>
+              </a:rPr>
+              <a:t>Misura della distanza</a:t>
+            </a:r>
+          </a:p>
+          <a:p>
+            <a:r>
+              <a:rPr lang="it-IT" sz="2400" dirty="0">
+                <a:solidFill>
+                  <a:schemeClr val="bg2">
+                    <a:lumMod val="40000"/>
+                    <a:lumOff val="60000"/>
+                  </a:schemeClr>
+                </a:solidFill>
+              </a:rPr>
+              <a:t>Architettura hardware</a:t>
+            </a:r>
+          </a:p>
+          <a:p>
+            <a:pPr lvl="1"/>
+            <a:r>
+              <a:rPr lang="it-IT" sz="2000" dirty="0">
+                <a:solidFill>
+                  <a:schemeClr val="bg2">
+                    <a:lumMod val="40000"/>
+                    <a:lumOff val="60000"/>
+                  </a:schemeClr>
+                </a:solidFill>
+              </a:rPr>
+              <a:t>Sistema analogico</a:t>
+            </a:r>
+          </a:p>
+          <a:p>
+            <a:pPr lvl="1"/>
+            <a:r>
+              <a:rPr lang="it-IT" sz="2000" dirty="0">
+                <a:solidFill>
+                  <a:schemeClr val="bg2">
+                    <a:lumMod val="40000"/>
+                    <a:lumOff val="60000"/>
+                  </a:schemeClr>
+                </a:solidFill>
+              </a:rPr>
+              <a:t>Sistema di conversione</a:t>
+            </a:r>
+          </a:p>
+          <a:p>
+            <a:pPr lvl="1"/>
+            <a:r>
+              <a:rPr lang="it-IT" sz="2000" dirty="0">
+                <a:solidFill>
+                  <a:schemeClr val="bg2">
+                    <a:lumMod val="40000"/>
+                    <a:lumOff val="60000"/>
+                  </a:schemeClr>
+                </a:solidFill>
+              </a:rPr>
+              <a:t>Sistema digitale</a:t>
+            </a:r>
+          </a:p>
+          <a:p>
+            <a:r>
+              <a:rPr lang="it-IT" sz="2400" dirty="0">
+                <a:solidFill>
+                  <a:schemeClr val="bg2">
+                    <a:lumMod val="40000"/>
+                    <a:lumOff val="60000"/>
+                  </a:schemeClr>
+                </a:solidFill>
+              </a:rPr>
+              <a:t>Architettura software</a:t>
+            </a:r>
+          </a:p>
+          <a:p>
+            <a:pPr lvl="1"/>
+            <a:r>
+              <a:rPr lang="it-IT" sz="2000" dirty="0">
+                <a:solidFill>
+                  <a:schemeClr val="bg2">
+                    <a:lumMod val="40000"/>
+                    <a:lumOff val="60000"/>
+                  </a:schemeClr>
+                </a:solidFill>
+              </a:rPr>
+              <a:t>Dettagli implementativi</a:t>
+            </a:r>
+          </a:p>
+          <a:p>
+            <a:pPr lvl="1"/>
+            <a:r>
+              <a:rPr lang="it-IT" sz="2000" dirty="0" smtClean="0">
+                <a:solidFill>
+                  <a:schemeClr val="bg2">
+                    <a:lumMod val="40000"/>
+                    <a:lumOff val="60000"/>
+                  </a:schemeClr>
+                </a:solidFill>
+              </a:rPr>
+              <a:t>FPGA</a:t>
+            </a:r>
+            <a:endParaRPr lang="it-IT" sz="2000" dirty="0">
+              <a:solidFill>
+                <a:schemeClr val="bg2">
+                  <a:lumMod val="40000"/>
+                  <a:lumOff val="60000"/>
+                </a:schemeClr>
+              </a:solidFill>
+            </a:endParaRPr>
+          </a:p>
+          <a:p>
+            <a:pPr lvl="1"/>
+            <a:r>
+              <a:rPr lang="it-IT" sz="2000" dirty="0">
+                <a:solidFill>
+                  <a:schemeClr val="bg2">
+                    <a:lumMod val="40000"/>
+                    <a:lumOff val="60000"/>
+                  </a:schemeClr>
+                </a:solidFill>
+              </a:rPr>
+              <a:t>Microcontrollore</a:t>
+            </a:r>
+          </a:p>
+          <a:p>
+            <a:pPr lvl="1"/>
+            <a:r>
+              <a:rPr lang="it-IT" sz="2000" dirty="0" smtClean="0">
+                <a:solidFill>
+                  <a:schemeClr val="bg2">
+                    <a:lumMod val="40000"/>
+                    <a:lumOff val="60000"/>
+                  </a:schemeClr>
+                </a:solidFill>
+              </a:rPr>
+              <a:t>Ottimizzazioni</a:t>
+            </a:r>
+            <a:endParaRPr lang="it-IT" sz="2000" dirty="0">
+              <a:solidFill>
+                <a:schemeClr val="bg2">
+                  <a:lumMod val="40000"/>
+                  <a:lumOff val="60000"/>
+                </a:schemeClr>
+              </a:solidFill>
+            </a:endParaRPr>
+          </a:p>
+          <a:p>
+            <a:r>
+              <a:rPr lang="it-IT" sz="2400" dirty="0"/>
+              <a:t>Risultati sperimentali</a:t>
+            </a:r>
+          </a:p>
+          <a:p>
+            <a:r>
+              <a:rPr lang="it-IT" sz="2400" dirty="0"/>
+              <a:t>Conclusioni e sviluppi futuri</a:t>
+            </a:r>
+          </a:p>
+        </p:txBody>
+      </p:sp>
+      <p:sp>
+        <p:nvSpPr>
+          <p:cNvPr id="4" name="Segnaposto numero diapositiva 3"/>
+          <p:cNvSpPr>
+            <a:spLocks noGrp="1"/>
+          </p:cNvSpPr>
+          <p:nvPr>
+            <p:ph type="sldNum" sz="quarter" idx="11"/>
+          </p:nvPr>
+        </p:nvSpPr>
+        <p:spPr/>
+        <p:txBody>
+          <a:bodyPr/>
+          <a:lstStyle/>
+          <a:p>
+            <a:fld id="{C503DA3A-0C6B-48FC-931E-2C786AAFD5C1}" type="slidenum">
+              <a:rPr lang="en-US" altLang="nl-NL" smtClean="0"/>
+              <a:pPr/>
+              <a:t>23</a:t>
+            </a:fld>
+            <a:endParaRPr lang="en-US" altLang="nl-NL"/>
+          </a:p>
+        </p:txBody>
+      </p:sp>
+    </p:spTree>
+    <p:extLst>
+      <p:ext uri="{BB962C8B-B14F-4D97-AF65-F5344CB8AC3E}">
+        <p14:creationId xmlns:p14="http://schemas.microsoft.com/office/powerpoint/2010/main" val="3354392950"/>
+      </p:ext>
+    </p:extLst>
+  </p:cSld>
+  <p:clrMapOvr>
+    <a:masterClrMapping/>
+  </p:clrMapOvr>
+  <p:timing>
+    <p:tnLst>
+      <p:par>
+        <p:cTn id="1" dur="indefinite" restart="never" nodeType="tmRoot"/>
+      </p:par>
+    </p:tnLst>
+  </p:timing>
+</p:sld>
+</file>
+
+<file path=ppt/slides/slide24.xml><?xml version="1.0" encoding="utf-8"?>
+<p:sld xmlns:a="http://schemas.openxmlformats.org/drawingml/2006/main" xmlns:r="http://schemas.openxmlformats.org/officeDocument/2006/relationships" xmlns:p="http://schemas.openxmlformats.org/presentationml/2006/main">
+  <p:cSld>
+    <p:spTree>
+      <p:nvGrpSpPr>
+        <p:cNvPr id="1" name=""/>
+        <p:cNvGrpSpPr/>
+        <p:nvPr/>
+      </p:nvGrpSpPr>
+      <p:grpSpPr>
+        <a:xfrm>
+          <a:off x="0" y="0"/>
+          <a:ext cx="0" cy="0"/>
+          <a:chOff x="0" y="0"/>
+          <a:chExt cx="0" cy="0"/>
+        </a:xfrm>
+      </p:grpSpPr>
+      <p:sp>
+        <p:nvSpPr>
+          <p:cNvPr id="2" name="Titolo 1"/>
+          <p:cNvSpPr>
+            <a:spLocks noGrp="1"/>
+          </p:cNvSpPr>
+          <p:nvPr>
+            <p:ph type="title"/>
+          </p:nvPr>
+        </p:nvSpPr>
+        <p:spPr/>
+        <p:txBody>
+          <a:bodyPr/>
+          <a:lstStyle/>
+          <a:p>
+            <a:r>
+              <a:rPr lang="it-IT" dirty="0" smtClean="0"/>
               <a:t>Risultati sperimentali</a:t>
             </a:r>
             <a:endParaRPr lang="it-IT" dirty="0"/>
@@ -11461,7 +12688,7 @@
             <a:fld id="{C503DA3A-0C6B-48FC-931E-2C786AAFD5C1}" type="slidenum">
               <a:rPr lang="en-US" altLang="nl-NL" smtClean="0"/>
               <a:pPr/>
-              <a:t>21</a:t>
+              <a:t>24</a:t>
             </a:fld>
             <a:endParaRPr lang="en-US" altLang="nl-NL"/>
           </a:p>
@@ -11517,7 +12744,7 @@
 </p:sld>
 </file>
 
-<file path=ppt/slides/slide22.xml><?xml version="1.0" encoding="utf-8"?>
+<file path=ppt/slides/slide25.xml><?xml version="1.0" encoding="utf-8"?>
 <p:sld xmlns:a="http://schemas.openxmlformats.org/drawingml/2006/main" xmlns:r="http://schemas.openxmlformats.org/officeDocument/2006/relationships" xmlns:p="http://schemas.openxmlformats.org/presentationml/2006/main">
   <p:cSld>
     <p:spTree>
@@ -11551,7 +12778,11 @@
           <a:p>
             <a:r>
               <a:rPr lang="it-IT" dirty="0" smtClean="0"/>
-              <a:t>Risultati sperimentali (2)</a:t>
+              <a:t>Risultati </a:t>
+            </a:r>
+            <a:r>
+              <a:rPr lang="it-IT" dirty="0" smtClean="0"/>
+              <a:t>sperimentali</a:t>
             </a:r>
             <a:endParaRPr lang="it-IT" dirty="0"/>
           </a:p>
@@ -11834,7 +13065,7 @@
             <a:fld id="{C503DA3A-0C6B-48FC-931E-2C786AAFD5C1}" type="slidenum">
               <a:rPr lang="en-US" altLang="nl-NL" smtClean="0"/>
               <a:pPr/>
-              <a:t>22</a:t>
+              <a:t>25</a:t>
             </a:fld>
             <a:endParaRPr lang="en-US" altLang="nl-NL"/>
           </a:p>
@@ -11950,7 +13181,7 @@
 </p:sld>
 </file>
 
-<file path=ppt/slides/slide23.xml><?xml version="1.0" encoding="utf-8"?>
+<file path=ppt/slides/slide26.xml><?xml version="1.0" encoding="utf-8"?>
 <p:sld xmlns:a="http://schemas.openxmlformats.org/drawingml/2006/main" xmlns:r="http://schemas.openxmlformats.org/officeDocument/2006/relationships" xmlns:p="http://schemas.openxmlformats.org/presentationml/2006/main">
   <p:cSld>
     <p:spTree>
@@ -11984,7 +13215,11 @@
           <a:p>
             <a:r>
               <a:rPr lang="it-IT" dirty="0" smtClean="0"/>
-              <a:t>Risultati sperimentali (3)</a:t>
+              <a:t>Risultati </a:t>
+            </a:r>
+            <a:r>
+              <a:rPr lang="it-IT" dirty="0" smtClean="0"/>
+              <a:t>sperimentali</a:t>
             </a:r>
             <a:endParaRPr lang="it-IT" dirty="0"/>
           </a:p>
@@ -12315,7 +13550,7 @@
             <a:fld id="{C503DA3A-0C6B-48FC-931E-2C786AAFD5C1}" type="slidenum">
               <a:rPr lang="en-US" altLang="nl-NL" smtClean="0"/>
               <a:pPr/>
-              <a:t>23</a:t>
+              <a:t>26</a:t>
             </a:fld>
             <a:endParaRPr lang="en-US" altLang="nl-NL" dirty="0"/>
           </a:p>
@@ -12431,7 +13666,7 @@
 </p:sld>
 </file>
 
-<file path=ppt/slides/slide24.xml><?xml version="1.0" encoding="utf-8"?>
+<file path=ppt/slides/slide27.xml><?xml version="1.0" encoding="utf-8"?>
 <p:sld xmlns:a="http://schemas.openxmlformats.org/drawingml/2006/main" xmlns:r="http://schemas.openxmlformats.org/officeDocument/2006/relationships" xmlns:p="http://schemas.openxmlformats.org/presentationml/2006/main">
   <p:cSld>
     <p:spTree>
@@ -12843,7 +14078,7 @@
             <a:fld id="{C503DA3A-0C6B-48FC-931E-2C786AAFD5C1}" type="slidenum">
               <a:rPr lang="en-US" altLang="nl-NL" smtClean="0"/>
               <a:pPr/>
-              <a:t>24</a:t>
+              <a:t>27</a:t>
             </a:fld>
             <a:endParaRPr lang="en-US" altLang="nl-NL"/>
           </a:p>
@@ -12936,7 +14171,7 @@
 </p:sld>
 </file>
 
-<file path=ppt/slides/slide25.xml><?xml version="1.0" encoding="utf-8"?>
+<file path=ppt/slides/slide28.xml><?xml version="1.0" encoding="utf-8"?>
 <p:sld xmlns:a="http://schemas.openxmlformats.org/drawingml/2006/main" xmlns:r="http://schemas.openxmlformats.org/officeDocument/2006/relationships" xmlns:p="http://schemas.openxmlformats.org/presentationml/2006/main">
   <p:cSld>
     <p:spTree>
@@ -13215,7 +14450,7 @@
             <a:fld id="{C503DA3A-0C6B-48FC-931E-2C786AAFD5C1}" type="slidenum">
               <a:rPr lang="en-US" altLang="nl-NL" smtClean="0"/>
               <a:pPr/>
-              <a:t>25</a:t>
+              <a:t>28</a:t>
             </a:fld>
             <a:endParaRPr lang="en-US" altLang="nl-NL"/>
           </a:p>
@@ -13241,7 +14476,7 @@
 </p:sld>
 </file>
 
-<file path=ppt/slides/slide26.xml><?xml version="1.0" encoding="utf-8"?>
+<file path=ppt/slides/slide29.xml><?xml version="1.0" encoding="utf-8"?>
 <p:sld xmlns:a="http://schemas.openxmlformats.org/drawingml/2006/main" xmlns:r="http://schemas.openxmlformats.org/officeDocument/2006/relationships" xmlns:p="http://schemas.openxmlformats.org/presentationml/2006/main">
   <p:cSld>
     <p:spTree>
@@ -13408,7 +14643,7 @@
             <a:fld id="{C503DA3A-0C6B-48FC-931E-2C786AAFD5C1}" type="slidenum">
               <a:rPr lang="en-US" altLang="nl-NL" smtClean="0"/>
               <a:pPr/>
-              <a:t>26</a:t>
+              <a:t>29</a:t>
             </a:fld>
             <a:endParaRPr lang="en-US" altLang="nl-NL"/>
           </a:p>
@@ -13521,98 +14756,6 @@
 </p:sld>
 </file>
 
-<file path=ppt/slides/slide27.xml><?xml version="1.0" encoding="utf-8"?>
-<p:sld xmlns:a="http://schemas.openxmlformats.org/drawingml/2006/main" xmlns:r="http://schemas.openxmlformats.org/officeDocument/2006/relationships" xmlns:p="http://schemas.openxmlformats.org/presentationml/2006/main">
-  <p:cSld>
-    <p:spTree>
-      <p:nvGrpSpPr>
-        <p:cNvPr id="1" name=""/>
-        <p:cNvGrpSpPr/>
-        <p:nvPr/>
-      </p:nvGrpSpPr>
-      <p:grpSpPr>
-        <a:xfrm>
-          <a:off x="0" y="0"/>
-          <a:ext cx="0" cy="0"/>
-          <a:chOff x="0" y="0"/>
-          <a:chExt cx="0" cy="0"/>
-        </a:xfrm>
-      </p:grpSpPr>
-      <p:sp>
-        <p:nvSpPr>
-          <p:cNvPr id="4" name="Segnaposto numero diapositiva 3"/>
-          <p:cNvSpPr>
-            <a:spLocks noGrp="1"/>
-          </p:cNvSpPr>
-          <p:nvPr>
-            <p:ph type="sldNum" sz="quarter" idx="11"/>
-          </p:nvPr>
-        </p:nvSpPr>
-        <p:spPr/>
-        <p:txBody>
-          <a:bodyPr/>
-          <a:lstStyle/>
-          <a:p>
-            <a:fld id="{C503DA3A-0C6B-48FC-931E-2C786AAFD5C1}" type="slidenum">
-              <a:rPr lang="en-US" altLang="nl-NL" smtClean="0"/>
-              <a:pPr/>
-              <a:t>27</a:t>
-            </a:fld>
-            <a:endParaRPr lang="en-US" altLang="nl-NL"/>
-          </a:p>
-        </p:txBody>
-      </p:sp>
-      <p:sp>
-        <p:nvSpPr>
-          <p:cNvPr id="5" name="Segnaposto contenuto 4"/>
-          <p:cNvSpPr>
-            <a:spLocks noGrp="1"/>
-          </p:cNvSpPr>
-          <p:nvPr>
-            <p:ph idx="1"/>
-          </p:nvPr>
-        </p:nvSpPr>
-        <p:spPr>
-          <a:xfrm>
-            <a:off x="761219" y="4514383"/>
-            <a:ext cx="7158038" cy="985837"/>
-          </a:xfrm>
-        </p:spPr>
-        <p:txBody>
-          <a:bodyPr/>
-          <a:lstStyle/>
-          <a:p>
-            <a:pPr marL="0" indent="0">
-              <a:buNone/>
-            </a:pPr>
-            <a:r>
-              <a:rPr lang="it-IT" sz="4800" dirty="0" smtClean="0"/>
-              <a:t>Grazie per l’attenzione</a:t>
-            </a:r>
-            <a:endParaRPr lang="it-IT" sz="2400" dirty="0"/>
-          </a:p>
-        </p:txBody>
-      </p:sp>
-    </p:spTree>
-    <p:extLst>
-      <p:ext uri="{BB962C8B-B14F-4D97-AF65-F5344CB8AC3E}">
-        <p14:creationId xmlns:p14="http://schemas.microsoft.com/office/powerpoint/2010/main" val="1960709859"/>
-      </p:ext>
-    </p:extLst>
-  </p:cSld>
-  <p:clrMapOvr>
-    <a:masterClrMapping/>
-  </p:clrMapOvr>
-  <p:timing>
-    <p:tnLst>
-      <p:par>
-        <p:cTn id="1" dur="indefinite" restart="never" nodeType="tmRoot"/>
-      </p:par>
-    </p:tnLst>
-  </p:timing>
-</p:sld>
-</file>
-
 <file path=ppt/slides/slide3.xml><?xml version="1.0" encoding="utf-8"?>
 <p:sld xmlns:a="http://schemas.openxmlformats.org/drawingml/2006/main" xmlns:r="http://schemas.openxmlformats.org/officeDocument/2006/relationships" xmlns:p="http://schemas.openxmlformats.org/presentationml/2006/main">
   <p:cSld>
@@ -13665,7 +14808,7 @@
         </p:nvSpPr>
         <p:spPr>
           <a:xfrm>
-            <a:off x="609599" y="1029592"/>
+            <a:off x="609600" y="1002153"/>
             <a:ext cx="8162926" cy="1200619"/>
           </a:xfrm>
         </p:spPr>
@@ -13747,8 +14890,8 @@
         </p:blipFill>
         <p:spPr>
           <a:xfrm>
-            <a:off x="609599" y="2314918"/>
-            <a:ext cx="4728023" cy="3196817"/>
+            <a:off x="609600" y="2615245"/>
+            <a:ext cx="4587339" cy="3100500"/>
           </a:xfrm>
           <a:prstGeom prst="rect">
             <a:avLst/>
@@ -13765,8 +14908,8 @@
         </p:nvSpPr>
         <p:spPr bwMode="auto">
           <a:xfrm>
-            <a:off x="4929190" y="2276318"/>
-            <a:ext cx="4114800" cy="3300413"/>
+            <a:off x="5029200" y="2246702"/>
+            <a:ext cx="4114800" cy="3667282"/>
           </a:xfrm>
           <a:prstGeom prst="rect">
             <a:avLst/>
@@ -14068,11 +15211,252 @@
             </a:r>
             <a:r>
               <a:rPr lang="it-IT" sz="2400" dirty="0"/>
-              <a:t> genera una corrente contenente l’informazione sulla distanza del </a:t>
+              <a:t> genera </a:t>
+            </a:r>
+            <a:r>
+              <a:rPr lang="it-IT" sz="2400" dirty="0" smtClean="0"/>
+              <a:t>una corrente che contiene l’informazione sullo spostamento del </a:t>
             </a:r>
             <a:r>
               <a:rPr lang="it-IT" sz="2400" dirty="0" smtClean="0"/>
               <a:t>bersaglio</a:t>
+            </a:r>
+            <a:endParaRPr lang="it-IT" sz="2400" kern="0" dirty="0"/>
+          </a:p>
+        </p:txBody>
+      </p:sp>
+      <p:sp>
+        <p:nvSpPr>
+          <p:cNvPr id="7" name="Segnaposto contenuto 2"/>
+          <p:cNvSpPr txBox="1">
+            <a:spLocks/>
+          </p:cNvSpPr>
+          <p:nvPr/>
+        </p:nvSpPr>
+        <p:spPr bwMode="auto">
+          <a:xfrm>
+            <a:off x="609600" y="5947555"/>
+            <a:ext cx="8162926" cy="587489"/>
+          </a:xfrm>
+          <a:prstGeom prst="rect">
+            <a:avLst/>
+          </a:prstGeom>
+          <a:noFill/>
+          <a:ln>
+            <a:noFill/>
+          </a:ln>
+          <a:extLst>
+            <a:ext uri="{909E8E84-426E-40DD-AFC4-6F175D3DCCD1}">
+              <a14:hiddenFill xmlns:a14="http://schemas.microsoft.com/office/drawing/2010/main">
+                <a:solidFill>
+                  <a:srgbClr val="FFFFFF"/>
+                </a:solidFill>
+              </a14:hiddenFill>
+            </a:ext>
+            <a:ext uri="{91240B29-F687-4F45-9708-019B960494DF}">
+              <a14:hiddenLine xmlns:a14="http://schemas.microsoft.com/office/drawing/2010/main" w="9525">
+                <a:solidFill>
+                  <a:srgbClr val="000000"/>
+                </a:solidFill>
+                <a:miter lim="800000"/>
+                <a:headEnd/>
+                <a:tailEnd/>
+              </a14:hiddenLine>
+            </a:ext>
+          </a:extLst>
+        </p:spPr>
+        <p:txBody>
+          <a:bodyPr vert="horz" wrap="square" lIns="91440" tIns="45720" rIns="91440" bIns="45720" numCol="1" anchor="t" anchorCtr="0" compatLnSpc="1">
+            <a:prstTxWarp prst="textNoShape">
+              <a:avLst/>
+            </a:prstTxWarp>
+          </a:bodyPr>
+          <a:lstStyle>
+            <a:lvl1pPr marL="342900" indent="-342900" algn="l" rtl="0" eaLnBrk="1" fontAlgn="base" hangingPunct="1">
+              <a:spcBef>
+                <a:spcPct val="20000"/>
+              </a:spcBef>
+              <a:spcAft>
+                <a:spcPct val="0"/>
+              </a:spcAft>
+              <a:buClr>
+                <a:srgbClr val="003366"/>
+              </a:buClr>
+              <a:buFont typeface="Times" panose="02020603050405020304" pitchFamily="18" charset="0"/>
+              <a:buChar char="•"/>
+              <a:defRPr sz="3200">
+                <a:solidFill>
+                  <a:schemeClr val="tx1"/>
+                </a:solidFill>
+                <a:latin typeface="+mn-lt"/>
+                <a:ea typeface="+mn-ea"/>
+                <a:cs typeface="+mn-cs"/>
+              </a:defRPr>
+            </a:lvl1pPr>
+            <a:lvl2pPr marL="742950" indent="-285750" algn="l" rtl="0" eaLnBrk="1" fontAlgn="base" hangingPunct="1">
+              <a:spcBef>
+                <a:spcPct val="20000"/>
+              </a:spcBef>
+              <a:spcAft>
+                <a:spcPct val="0"/>
+              </a:spcAft>
+              <a:buClr>
+                <a:srgbClr val="FF9900"/>
+              </a:buClr>
+              <a:buFont typeface="Wingdings" panose="05000000000000000000" pitchFamily="2" charset="2"/>
+              <a:buChar char="§"/>
+              <a:defRPr sz="2800">
+                <a:solidFill>
+                  <a:schemeClr val="tx1"/>
+                </a:solidFill>
+                <a:latin typeface="+mn-lt"/>
+                <a:ea typeface="+mn-ea"/>
+                <a:cs typeface="+mn-cs"/>
+              </a:defRPr>
+            </a:lvl2pPr>
+            <a:lvl3pPr marL="1143000" indent="-228600" algn="l" rtl="0" eaLnBrk="1" fontAlgn="base" hangingPunct="1">
+              <a:spcBef>
+                <a:spcPct val="20000"/>
+              </a:spcBef>
+              <a:spcAft>
+                <a:spcPct val="0"/>
+              </a:spcAft>
+              <a:buClr>
+                <a:srgbClr val="003366"/>
+              </a:buClr>
+              <a:buFont typeface="Times" panose="02020603050405020304" pitchFamily="18" charset="0"/>
+              <a:buChar char="•"/>
+              <a:defRPr sz="2400">
+                <a:solidFill>
+                  <a:schemeClr val="tx1"/>
+                </a:solidFill>
+                <a:latin typeface="+mn-lt"/>
+                <a:ea typeface="+mn-ea"/>
+                <a:cs typeface="+mn-cs"/>
+              </a:defRPr>
+            </a:lvl3pPr>
+            <a:lvl4pPr marL="1600200" indent="-228600" algn="l" rtl="0" eaLnBrk="1" fontAlgn="base" hangingPunct="1">
+              <a:spcBef>
+                <a:spcPct val="20000"/>
+              </a:spcBef>
+              <a:spcAft>
+                <a:spcPct val="0"/>
+              </a:spcAft>
+              <a:buClr>
+                <a:srgbClr val="003366"/>
+              </a:buClr>
+              <a:buChar char="–"/>
+              <a:defRPr sz="2000">
+                <a:solidFill>
+                  <a:schemeClr val="tx1"/>
+                </a:solidFill>
+                <a:latin typeface="+mn-lt"/>
+                <a:ea typeface="+mn-ea"/>
+                <a:cs typeface="+mn-cs"/>
+              </a:defRPr>
+            </a:lvl4pPr>
+            <a:lvl5pPr marL="2057400" indent="-228600" algn="l" rtl="0" eaLnBrk="1" fontAlgn="base" hangingPunct="1">
+              <a:spcBef>
+                <a:spcPct val="20000"/>
+              </a:spcBef>
+              <a:spcAft>
+                <a:spcPct val="0"/>
+              </a:spcAft>
+              <a:buChar char="»"/>
+              <a:defRPr sz="2000">
+                <a:solidFill>
+                  <a:schemeClr val="tx1"/>
+                </a:solidFill>
+                <a:latin typeface="+mn-lt"/>
+                <a:ea typeface="+mn-ea"/>
+                <a:cs typeface="+mn-cs"/>
+              </a:defRPr>
+            </a:lvl5pPr>
+            <a:lvl6pPr marL="2514600" indent="-228600" algn="l" rtl="0" eaLnBrk="1" fontAlgn="base" hangingPunct="1">
+              <a:spcBef>
+                <a:spcPct val="20000"/>
+              </a:spcBef>
+              <a:spcAft>
+                <a:spcPct val="0"/>
+              </a:spcAft>
+              <a:buChar char="»"/>
+              <a:defRPr sz="2000">
+                <a:solidFill>
+                  <a:schemeClr val="tx1"/>
+                </a:solidFill>
+                <a:latin typeface="+mn-lt"/>
+                <a:ea typeface="+mn-ea"/>
+                <a:cs typeface="+mn-cs"/>
+              </a:defRPr>
+            </a:lvl6pPr>
+            <a:lvl7pPr marL="2971800" indent="-228600" algn="l" rtl="0" eaLnBrk="1" fontAlgn="base" hangingPunct="1">
+              <a:spcBef>
+                <a:spcPct val="20000"/>
+              </a:spcBef>
+              <a:spcAft>
+                <a:spcPct val="0"/>
+              </a:spcAft>
+              <a:buChar char="»"/>
+              <a:defRPr sz="2000">
+                <a:solidFill>
+                  <a:schemeClr val="tx1"/>
+                </a:solidFill>
+                <a:latin typeface="+mn-lt"/>
+                <a:ea typeface="+mn-ea"/>
+                <a:cs typeface="+mn-cs"/>
+              </a:defRPr>
+            </a:lvl7pPr>
+            <a:lvl8pPr marL="3429000" indent="-228600" algn="l" rtl="0" eaLnBrk="1" fontAlgn="base" hangingPunct="1">
+              <a:spcBef>
+                <a:spcPct val="20000"/>
+              </a:spcBef>
+              <a:spcAft>
+                <a:spcPct val="0"/>
+              </a:spcAft>
+              <a:buChar char="»"/>
+              <a:defRPr sz="2000">
+                <a:solidFill>
+                  <a:schemeClr val="tx1"/>
+                </a:solidFill>
+                <a:latin typeface="+mn-lt"/>
+                <a:ea typeface="+mn-ea"/>
+                <a:cs typeface="+mn-cs"/>
+              </a:defRPr>
+            </a:lvl8pPr>
+            <a:lvl9pPr marL="3886200" indent="-228600" algn="l" rtl="0" eaLnBrk="1" fontAlgn="base" hangingPunct="1">
+              <a:spcBef>
+                <a:spcPct val="20000"/>
+              </a:spcBef>
+              <a:spcAft>
+                <a:spcPct val="0"/>
+              </a:spcAft>
+              <a:buChar char="»"/>
+              <a:defRPr sz="2000">
+                <a:solidFill>
+                  <a:schemeClr val="tx1"/>
+                </a:solidFill>
+                <a:latin typeface="+mn-lt"/>
+                <a:ea typeface="+mn-ea"/>
+                <a:cs typeface="+mn-cs"/>
+              </a:defRPr>
+            </a:lvl9pPr>
+          </a:lstStyle>
+          <a:p>
+            <a:r>
+              <a:rPr lang="it-IT" sz="2400" i="1" kern="0" dirty="0" smtClean="0"/>
+              <a:t>Contro</a:t>
+            </a:r>
+            <a:r>
+              <a:rPr lang="it-IT" sz="2400" kern="0" dirty="0" smtClean="0"/>
+              <a:t>: </a:t>
+            </a:r>
+            <a:r>
+              <a:rPr lang="it-IT" sz="2400" b="1" kern="0" dirty="0" smtClean="0"/>
+              <a:t>Difficile</a:t>
+            </a:r>
+            <a:r>
+              <a:rPr lang="it-IT" sz="2400" kern="0" dirty="0" smtClean="0"/>
+              <a:t> realizzazione</a:t>
             </a:r>
             <a:endParaRPr lang="it-IT" sz="2400" kern="0" dirty="0"/>
           </a:p>
@@ -14082,6 +15466,98 @@
     <p:extLst>
       <p:ext uri="{BB962C8B-B14F-4D97-AF65-F5344CB8AC3E}">
         <p14:creationId xmlns:p14="http://schemas.microsoft.com/office/powerpoint/2010/main" val="4012385140"/>
+      </p:ext>
+    </p:extLst>
+  </p:cSld>
+  <p:clrMapOvr>
+    <a:masterClrMapping/>
+  </p:clrMapOvr>
+  <p:timing>
+    <p:tnLst>
+      <p:par>
+        <p:cTn id="1" dur="indefinite" restart="never" nodeType="tmRoot"/>
+      </p:par>
+    </p:tnLst>
+  </p:timing>
+</p:sld>
+</file>
+
+<file path=ppt/slides/slide30.xml><?xml version="1.0" encoding="utf-8"?>
+<p:sld xmlns:a="http://schemas.openxmlformats.org/drawingml/2006/main" xmlns:r="http://schemas.openxmlformats.org/officeDocument/2006/relationships" xmlns:p="http://schemas.openxmlformats.org/presentationml/2006/main">
+  <p:cSld>
+    <p:spTree>
+      <p:nvGrpSpPr>
+        <p:cNvPr id="1" name=""/>
+        <p:cNvGrpSpPr/>
+        <p:nvPr/>
+      </p:nvGrpSpPr>
+      <p:grpSpPr>
+        <a:xfrm>
+          <a:off x="0" y="0"/>
+          <a:ext cx="0" cy="0"/>
+          <a:chOff x="0" y="0"/>
+          <a:chExt cx="0" cy="0"/>
+        </a:xfrm>
+      </p:grpSpPr>
+      <p:sp>
+        <p:nvSpPr>
+          <p:cNvPr id="4" name="Segnaposto numero diapositiva 3"/>
+          <p:cNvSpPr>
+            <a:spLocks noGrp="1"/>
+          </p:cNvSpPr>
+          <p:nvPr>
+            <p:ph type="sldNum" sz="quarter" idx="11"/>
+          </p:nvPr>
+        </p:nvSpPr>
+        <p:spPr/>
+        <p:txBody>
+          <a:bodyPr/>
+          <a:lstStyle/>
+          <a:p>
+            <a:fld id="{C503DA3A-0C6B-48FC-931E-2C786AAFD5C1}" type="slidenum">
+              <a:rPr lang="en-US" altLang="nl-NL" smtClean="0"/>
+              <a:pPr/>
+              <a:t>30</a:t>
+            </a:fld>
+            <a:endParaRPr lang="en-US" altLang="nl-NL"/>
+          </a:p>
+        </p:txBody>
+      </p:sp>
+      <p:sp>
+        <p:nvSpPr>
+          <p:cNvPr id="5" name="Segnaposto contenuto 4"/>
+          <p:cNvSpPr>
+            <a:spLocks noGrp="1"/>
+          </p:cNvSpPr>
+          <p:nvPr>
+            <p:ph idx="1"/>
+          </p:nvPr>
+        </p:nvSpPr>
+        <p:spPr>
+          <a:xfrm>
+            <a:off x="761219" y="4514383"/>
+            <a:ext cx="7158038" cy="985837"/>
+          </a:xfrm>
+        </p:spPr>
+        <p:txBody>
+          <a:bodyPr/>
+          <a:lstStyle/>
+          <a:p>
+            <a:pPr marL="0" indent="0">
+              <a:buNone/>
+            </a:pPr>
+            <a:r>
+              <a:rPr lang="it-IT" sz="4800" dirty="0" smtClean="0"/>
+              <a:t>Grazie per l’attenzione</a:t>
+            </a:r>
+            <a:endParaRPr lang="it-IT" sz="2400" dirty="0"/>
+          </a:p>
+        </p:txBody>
+      </p:sp>
+    </p:spTree>
+    <p:extLst>
+      <p:ext uri="{BB962C8B-B14F-4D97-AF65-F5344CB8AC3E}">
+        <p14:creationId xmlns:p14="http://schemas.microsoft.com/office/powerpoint/2010/main" val="1960709859"/>
       </p:ext>
     </p:extLst>
   </p:cSld>
@@ -14161,9 +15637,146 @@
           </a:p>
         </p:txBody>
       </p:sp>
+      <p:sp>
+        <p:nvSpPr>
+          <p:cNvPr id="7" name="Segnaposto contenuto 2"/>
+          <p:cNvSpPr>
+            <a:spLocks noGrp="1"/>
+          </p:cNvSpPr>
+          <p:nvPr>
+            <p:ph idx="1"/>
+          </p:nvPr>
+        </p:nvSpPr>
+        <p:spPr>
+          <a:xfrm>
+            <a:off x="380997" y="996103"/>
+            <a:ext cx="8405814" cy="2122711"/>
+          </a:xfrm>
+        </p:spPr>
+        <p:txBody>
+          <a:bodyPr/>
+          <a:lstStyle/>
+          <a:p>
+            <a:r>
+              <a:rPr lang="it-IT" sz="2400" b="1" dirty="0" smtClean="0"/>
+              <a:t>Variante</a:t>
+            </a:r>
+            <a:r>
+              <a:rPr lang="it-IT" sz="2400" dirty="0" smtClean="0"/>
+              <a:t> dell’interferometria tradizionale</a:t>
+            </a:r>
+          </a:p>
+          <a:p>
+            <a:r>
+              <a:rPr lang="it-IT" sz="2400" dirty="0" smtClean="0"/>
+              <a:t>L’architettura </a:t>
+            </a:r>
+            <a:r>
+              <a:rPr lang="it-IT" sz="2400" dirty="0"/>
+              <a:t>è </a:t>
+            </a:r>
+            <a:r>
+              <a:rPr lang="it-IT" sz="2400" dirty="0" smtClean="0"/>
+              <a:t>composta </a:t>
+            </a:r>
+            <a:r>
+              <a:rPr lang="it-IT" sz="2400" u="sng" dirty="0" smtClean="0"/>
+              <a:t>solamente</a:t>
+            </a:r>
+            <a:r>
+              <a:rPr lang="it-IT" sz="2400" dirty="0" smtClean="0"/>
+              <a:t> </a:t>
+            </a:r>
+            <a:r>
+              <a:rPr lang="it-IT" sz="2400" dirty="0"/>
+              <a:t>da:</a:t>
+            </a:r>
+          </a:p>
+          <a:p>
+            <a:pPr lvl="1"/>
+            <a:r>
+              <a:rPr lang="it-IT" sz="2000" dirty="0"/>
+              <a:t>un </a:t>
+            </a:r>
+            <a:r>
+              <a:rPr lang="it-IT" sz="2000" b="1" dirty="0" smtClean="0"/>
+              <a:t>fotodiodo</a:t>
+            </a:r>
+          </a:p>
+          <a:p>
+            <a:pPr lvl="1"/>
+            <a:r>
+              <a:rPr lang="it-IT" sz="2000" dirty="0"/>
+              <a:t>una sorgente </a:t>
+            </a:r>
+            <a:r>
+              <a:rPr lang="it-IT" sz="2000" b="1" dirty="0" smtClean="0"/>
+              <a:t>laser</a:t>
+            </a:r>
+          </a:p>
+          <a:p>
+            <a:pPr lvl="1"/>
+            <a:r>
+              <a:rPr lang="it-IT" sz="2000" dirty="0"/>
+              <a:t>una </a:t>
+            </a:r>
+            <a:r>
+              <a:rPr lang="it-IT" sz="2000" b="1" dirty="0"/>
+              <a:t>lente</a:t>
+            </a:r>
+            <a:endParaRPr lang="it-IT" sz="2000" dirty="0" smtClean="0"/>
+          </a:p>
+          <a:p>
+            <a:pPr marL="0" indent="0">
+              <a:buNone/>
+            </a:pPr>
+            <a:endParaRPr lang="it-IT" sz="2400" b="1" dirty="0" smtClean="0"/>
+          </a:p>
+        </p:txBody>
+      </p:sp>
+      <p:sp>
+        <p:nvSpPr>
+          <p:cNvPr id="3" name="CasellaDiTesto 2"/>
+          <p:cNvSpPr txBox="1"/>
+          <p:nvPr/>
+        </p:nvSpPr>
+        <p:spPr>
+          <a:xfrm>
+            <a:off x="380997" y="5288340"/>
+            <a:ext cx="8405814" cy="1569660"/>
+          </a:xfrm>
+          <a:prstGeom prst="rect">
+            <a:avLst/>
+          </a:prstGeom>
+          <a:noFill/>
+        </p:spPr>
+        <p:txBody>
+          <a:bodyPr wrap="square" rtlCol="0">
+            <a:spAutoFit/>
+          </a:bodyPr>
+          <a:lstStyle/>
+          <a:p>
+            <a:pPr marL="342900" indent="-342900">
+              <a:buFont typeface="Arial" charset="0"/>
+              <a:buChar char="•"/>
+            </a:pPr>
+            <a:r>
+              <a:rPr lang="it-IT" dirty="0"/>
+              <a:t>Il fascio laser emesso è riflesso dal bersaglio e rientra nella cavità causando un fenomeno di </a:t>
+            </a:r>
+            <a:r>
+              <a:rPr lang="it-IT" b="1" dirty="0"/>
+              <a:t>interferenza</a:t>
+            </a:r>
+          </a:p>
+          <a:p>
+            <a:endParaRPr lang="it-IT" dirty="0"/>
+          </a:p>
+        </p:txBody>
+      </p:sp>
       <p:pic>
         <p:nvPicPr>
-          <p:cNvPr id="5" name="Immagine 4"/>
+          <p:cNvPr id="6" name="Immagine 5"/>
           <p:cNvPicPr>
             <a:picLocks noChangeAspect="1"/>
           </p:cNvPicPr>
@@ -14183,91 +15796,14 @@
         </p:blipFill>
         <p:spPr>
           <a:xfrm>
-            <a:off x="1786797" y="4190274"/>
-            <a:ext cx="5594219" cy="1821120"/>
+            <a:off x="1474218" y="3118814"/>
+            <a:ext cx="6219371" cy="2024630"/>
           </a:xfrm>
           <a:prstGeom prst="rect">
             <a:avLst/>
           </a:prstGeom>
         </p:spPr>
       </p:pic>
-      <p:sp>
-        <p:nvSpPr>
-          <p:cNvPr id="7" name="Segnaposto contenuto 2"/>
-          <p:cNvSpPr>
-            <a:spLocks noGrp="1"/>
-          </p:cNvSpPr>
-          <p:nvPr>
-            <p:ph idx="1"/>
-          </p:nvPr>
-        </p:nvSpPr>
-        <p:spPr>
-          <a:xfrm>
-            <a:off x="380999" y="1303806"/>
-            <a:ext cx="8405814" cy="2678909"/>
-          </a:xfrm>
-        </p:spPr>
-        <p:txBody>
-          <a:bodyPr/>
-          <a:lstStyle/>
-          <a:p>
-            <a:r>
-              <a:rPr lang="it-IT" sz="2400" dirty="0"/>
-              <a:t>L’architettura è composta da:</a:t>
-            </a:r>
-          </a:p>
-          <a:p>
-            <a:pPr lvl="1"/>
-            <a:r>
-              <a:rPr lang="it-IT" sz="2000" dirty="0"/>
-              <a:t>un </a:t>
-            </a:r>
-            <a:r>
-              <a:rPr lang="it-IT" sz="2000" b="1" dirty="0" smtClean="0"/>
-              <a:t>fotodiodo</a:t>
-            </a:r>
-          </a:p>
-          <a:p>
-            <a:pPr lvl="1"/>
-            <a:r>
-              <a:rPr lang="it-IT" sz="2000" dirty="0"/>
-              <a:t>una sorgente </a:t>
-            </a:r>
-            <a:r>
-              <a:rPr lang="it-IT" sz="2000" b="1" dirty="0" smtClean="0"/>
-              <a:t>laser</a:t>
-            </a:r>
-          </a:p>
-          <a:p>
-            <a:pPr lvl="1"/>
-            <a:r>
-              <a:rPr lang="it-IT" sz="2000" dirty="0"/>
-              <a:t>una </a:t>
-            </a:r>
-            <a:r>
-              <a:rPr lang="it-IT" sz="2000" b="1" dirty="0"/>
-              <a:t>lente</a:t>
-            </a:r>
-            <a:endParaRPr lang="it-IT" sz="2000" dirty="0" smtClean="0"/>
-          </a:p>
-          <a:p>
-            <a:r>
-              <a:rPr lang="it-IT" sz="2400" dirty="0" smtClean="0"/>
-              <a:t>Il fascio laser emesso è riflesso dal bersaglio e rientra nella cavità causando un fenomeno di </a:t>
-            </a:r>
-            <a:r>
-              <a:rPr lang="it-IT" sz="2400" b="1" dirty="0" smtClean="0"/>
-              <a:t>interferenza</a:t>
-            </a:r>
-          </a:p>
-          <a:p>
-            <a:pPr marL="0" indent="0">
-              <a:buNone/>
-            </a:pPr>
-            <a:endParaRPr lang="it-IT" sz="2400" b="1" dirty="0" smtClean="0"/>
-          </a:p>
-        </p:txBody>
-      </p:sp>
     </p:spTree>
     <p:extLst>
       <p:ext uri="{BB962C8B-B14F-4D97-AF65-F5344CB8AC3E}">
@@ -14307,25 +15843,6 @@
       </p:grpSpPr>
       <p:sp>
         <p:nvSpPr>
-          <p:cNvPr id="2" name="Titolo 1"/>
-          <p:cNvSpPr>
-            <a:spLocks noGrp="1"/>
-          </p:cNvSpPr>
-          <p:nvPr>
-            <p:ph type="title"/>
-          </p:nvPr>
-        </p:nvSpPr>
-        <p:spPr/>
-        <p:txBody>
-          <a:bodyPr/>
-          <a:lstStyle/>
-          <a:p>
-            <a:endParaRPr lang="it-IT"/>
-          </a:p>
-        </p:txBody>
-      </p:sp>
-      <p:sp>
-        <p:nvSpPr>
           <p:cNvPr id="3" name="Segnaposto contenuto 2"/>
           <p:cNvSpPr>
             <a:spLocks noGrp="1"/>
@@ -14364,6 +15881,33 @@
               <a:t>5</a:t>
             </a:fld>
             <a:endParaRPr lang="en-US" altLang="nl-NL"/>
+          </a:p>
+        </p:txBody>
+      </p:sp>
+      <p:sp>
+        <p:nvSpPr>
+          <p:cNvPr id="5" name="Titolo 1"/>
+          <p:cNvSpPr>
+            <a:spLocks noGrp="1"/>
+          </p:cNvSpPr>
+          <p:nvPr>
+            <p:ph type="title"/>
+          </p:nvPr>
+        </p:nvSpPr>
+        <p:spPr>
+          <a:xfrm>
+            <a:off x="609600" y="0"/>
+            <a:ext cx="7162800" cy="762000"/>
+          </a:xfrm>
+        </p:spPr>
+        <p:txBody>
+          <a:bodyPr/>
+          <a:lstStyle/>
+          <a:p>
+            <a:r>
+              <a:rPr lang="it-IT" dirty="0"/>
+              <a:t>Interferometria a self-mixing</a:t>
+            </a:r>
           </a:p>
         </p:txBody>
       </p:sp>
@@ -14377,6 +15921,13 @@
   <p:clrMapOvr>
     <a:masterClrMapping/>
   </p:clrMapOvr>
+  <p:timing>
+    <p:tnLst>
+      <p:par>
+        <p:cTn id="1" dur="indefinite" restart="never" nodeType="tmRoot"/>
+      </p:par>
+    </p:tnLst>
+  </p:timing>
 </p:sld>
 </file>
 
@@ -14399,25 +15950,6 @@
       </p:grpSpPr>
       <p:sp>
         <p:nvSpPr>
-          <p:cNvPr id="2" name="Titolo 1"/>
-          <p:cNvSpPr>
-            <a:spLocks noGrp="1"/>
-          </p:cNvSpPr>
-          <p:nvPr>
-            <p:ph type="title"/>
-          </p:nvPr>
-        </p:nvSpPr>
-        <p:spPr/>
-        <p:txBody>
-          <a:bodyPr/>
-          <a:lstStyle/>
-          <a:p>
-            <a:endParaRPr lang="it-IT"/>
-          </a:p>
-        </p:txBody>
-      </p:sp>
-      <p:sp>
-        <p:nvSpPr>
           <p:cNvPr id="3" name="Segnaposto contenuto 2"/>
           <p:cNvSpPr>
             <a:spLocks noGrp="1"/>
@@ -14456,6 +15988,33 @@
               <a:t>6</a:t>
             </a:fld>
             <a:endParaRPr lang="en-US" altLang="nl-NL"/>
+          </a:p>
+        </p:txBody>
+      </p:sp>
+      <p:sp>
+        <p:nvSpPr>
+          <p:cNvPr id="5" name="Titolo 1"/>
+          <p:cNvSpPr>
+            <a:spLocks noGrp="1"/>
+          </p:cNvSpPr>
+          <p:nvPr>
+            <p:ph type="title"/>
+          </p:nvPr>
+        </p:nvSpPr>
+        <p:spPr>
+          <a:xfrm>
+            <a:off x="609600" y="0"/>
+            <a:ext cx="7162800" cy="762000"/>
+          </a:xfrm>
+        </p:spPr>
+        <p:txBody>
+          <a:bodyPr/>
+          <a:lstStyle/>
+          <a:p>
+            <a:r>
+              <a:rPr lang="it-IT" dirty="0"/>
+              <a:t>Interferometria a self-mixing</a:t>
+            </a:r>
           </a:p>
         </p:txBody>
       </p:sp>

</xml_diff>

<commit_message>
sistemata interpolazione (manca parte self-mix e resize delle img)
</commit_message>
<xml_diff>
--- a/presentazione_discussione.pptx
+++ b/presentazione_discussione.pptx
@@ -206,62 +206,6 @@
     <p:extLst/>
   </p:cmAuthor>
 </p:cmAuthorLst>
-</file>
-
-<file path=ppt/comments/comment1.xml><?xml version="1.0" encoding="utf-8"?>
-<p:cmLst xmlns:a="http://schemas.openxmlformats.org/drawingml/2006/main" xmlns:r="http://schemas.openxmlformats.org/officeDocument/2006/relationships" xmlns:p="http://schemas.openxmlformats.org/presentationml/2006/main">
-  <p:cm authorId="1" dt="2015-12-16T10:35:26.815" idx="15">
-    <p:pos x="4896" y="1755"/>
-    <p:text>spiegare bene questo set-up a voce</p:text>
-    <p:extLst>
-      <p:ext uri="{C676402C-5697-4E1C-873F-D02D1690AC5C}">
-        <p15:threadingInfo xmlns:p15="http://schemas.microsoft.com/office/powerpoint/2012/main" timeZoneBias="-60"/>
-      </p:ext>
-    </p:extLst>
-  </p:cm>
-</p:cmLst>
-</file>
-
-<file path=ppt/comments/comment2.xml><?xml version="1.0" encoding="utf-8"?>
-<p:cmLst xmlns:a="http://schemas.openxmlformats.org/drawingml/2006/main" xmlns:r="http://schemas.openxmlformats.org/officeDocument/2006/relationships" xmlns:p="http://schemas.openxmlformats.org/presentationml/2006/main">
-  <p:cm authorId="1" dt="2015-12-16T10:33:04.661" idx="12">
-    <p:pos x="5615" y="2713"/>
-    <p:text>ingrandire i caratteri</p:text>
-    <p:extLst>
-      <p:ext uri="{C676402C-5697-4E1C-873F-D02D1690AC5C}">
-        <p15:threadingInfo xmlns:p15="http://schemas.microsoft.com/office/powerpoint/2012/main" timeZoneBias="-60"/>
-      </p:ext>
-    </p:extLst>
-  </p:cm>
-</p:cmLst>
-</file>
-
-<file path=ppt/comments/comment3.xml><?xml version="1.0" encoding="utf-8"?>
-<p:cmLst xmlns:a="http://schemas.openxmlformats.org/drawingml/2006/main" xmlns:r="http://schemas.openxmlformats.org/officeDocument/2006/relationships" xmlns:p="http://schemas.openxmlformats.org/presentationml/2006/main">
-  <p:cm authorId="1" dt="2015-12-16T10:33:21.314" idx="13">
-    <p:pos x="5760" y="2641"/>
-    <p:text>ingrandire gli assi</p:text>
-    <p:extLst>
-      <p:ext uri="{C676402C-5697-4E1C-873F-D02D1690AC5C}">
-        <p15:threadingInfo xmlns:p15="http://schemas.microsoft.com/office/powerpoint/2012/main" timeZoneBias="-60"/>
-      </p:ext>
-    </p:extLst>
-  </p:cm>
-</p:cmLst>
-</file>
-
-<file path=ppt/comments/comment4.xml><?xml version="1.0" encoding="utf-8"?>
-<p:cmLst xmlns:a="http://schemas.openxmlformats.org/drawingml/2006/main" xmlns:r="http://schemas.openxmlformats.org/officeDocument/2006/relationships" xmlns:p="http://schemas.openxmlformats.org/presentationml/2006/main">
-  <p:cm authorId="1" dt="2015-12-16T10:34:08.054" idx="14">
-    <p:pos x="5656" y="611"/>
-    <p:text>ingrandire assi</p:text>
-    <p:extLst>
-      <p:ext uri="{C676402C-5697-4E1C-873F-D02D1690AC5C}">
-        <p15:threadingInfo xmlns:p15="http://schemas.microsoft.com/office/powerpoint/2012/main" timeZoneBias="-60"/>
-      </p:ext>
-    </p:extLst>
-  </p:cm>
-</p:cmLst>
 </file>
 
 <file path=ppt/handoutMasters/handoutMaster1.xml><?xml version="1.0" encoding="utf-8"?>
@@ -10322,7 +10266,11 @@
           <a:p>
             <a:r>
               <a:rPr lang="it-IT" sz="2400" dirty="0" smtClean="0"/>
-              <a:t>Le funzionalità svolte in hardware dal FPGA sono:</a:t>
+              <a:t>Le funzionalità svolte in hardware dal FPGA sono</a:t>
+            </a:r>
+            <a:r>
+              <a:rPr lang="it-IT" sz="2400" dirty="0" smtClean="0"/>
+              <a:t>:</a:t>
             </a:r>
             <a:br>
               <a:rPr lang="it-IT" sz="2400" dirty="0" smtClean="0"/>
@@ -10884,12 +10832,20 @@
               <a:rPr lang="it-IT" sz="2000" dirty="0" smtClean="0"/>
               <a:t>Calcolo </a:t>
             </a:r>
+            <a:r>
+              <a:rPr lang="it-IT" sz="2000" dirty="0" smtClean="0"/>
+              <a:t/>
+            </a:r>
             <a:br>
               <a:rPr lang="it-IT" sz="2000" dirty="0" smtClean="0"/>
             </a:br>
             <a:r>
               <a:rPr lang="it-IT" sz="2000" dirty="0" smtClean="0"/>
-              <a:t>della Fast Fourier </a:t>
+              <a:t>della Fast </a:t>
+            </a:r>
+            <a:r>
+              <a:rPr lang="it-IT" sz="2000" dirty="0" smtClean="0"/>
+              <a:t>Fourier </a:t>
             </a:r>
             <a:r>
               <a:rPr lang="it-IT" sz="2000" dirty="0" err="1" smtClean="0"/>
@@ -11311,154 +11267,757 @@
           </a:p>
         </p:txBody>
       </p:sp>
-      <p:sp>
-        <p:nvSpPr>
-          <p:cNvPr id="3" name="Segnaposto contenuto 2"/>
-          <p:cNvSpPr>
-            <a:spLocks noGrp="1"/>
-          </p:cNvSpPr>
-          <p:nvPr>
-            <p:ph idx="1"/>
-          </p:nvPr>
-        </p:nvSpPr>
-        <p:spPr>
-          <a:xfrm>
-            <a:off x="609600" y="903087"/>
-            <a:ext cx="7772400" cy="5286375"/>
-          </a:xfrm>
-        </p:spPr>
-        <p:txBody>
-          <a:bodyPr/>
-          <a:lstStyle/>
-          <a:p>
-            <a:pPr>
-              <a:lnSpc>
-                <a:spcPct val="200000"/>
-              </a:lnSpc>
-            </a:pPr>
-            <a:r>
-              <a:rPr lang="it-IT" sz="2400" dirty="0"/>
-              <a:t>Le funzionalità </a:t>
-            </a:r>
-            <a:r>
-              <a:rPr lang="it-IT" sz="2400" dirty="0" smtClean="0"/>
-              <a:t>svolte dal microcontrollore sono: </a:t>
-            </a:r>
-          </a:p>
-          <a:p>
-            <a:pPr lvl="1"/>
-            <a:r>
-              <a:rPr lang="it-IT" sz="2000" dirty="0"/>
-              <a:t>Calcolo </a:t>
-            </a:r>
-            <a:r>
-              <a:rPr lang="it-IT" sz="2000" dirty="0" smtClean="0"/>
-              <a:t>dell’</a:t>
-            </a:r>
-            <a:r>
-              <a:rPr lang="it-IT" sz="2000" b="1" dirty="0" err="1" smtClean="0"/>
-              <a:t>Interpolated</a:t>
-            </a:r>
-            <a:r>
-              <a:rPr lang="it-IT" sz="2000" dirty="0" smtClean="0"/>
-              <a:t> </a:t>
-            </a:r>
-            <a:r>
-              <a:rPr lang="it-IT" sz="2000" b="1" dirty="0" smtClean="0"/>
-              <a:t>FFT</a:t>
-            </a:r>
-            <a:r>
-              <a:rPr lang="it-IT" sz="2000" dirty="0" smtClean="0"/>
-              <a:t> (IFFT)</a:t>
-            </a:r>
-            <a:br>
-              <a:rPr lang="it-IT" sz="2000" dirty="0" smtClean="0"/>
-            </a:br>
-            <a:r>
-              <a:rPr lang="it-IT" sz="2000" dirty="0"/>
-              <a:t/>
-            </a:r>
-            <a:br>
-              <a:rPr lang="it-IT" sz="2000" dirty="0"/>
-            </a:br>
-            <a:r>
-              <a:rPr lang="it-IT" sz="2000" dirty="0"/>
-              <a:t/>
-            </a:r>
-            <a:br>
-              <a:rPr lang="it-IT" sz="2000" dirty="0"/>
-            </a:br>
-            <a:r>
-              <a:rPr lang="it-IT" sz="2000" dirty="0" smtClean="0"/>
-              <a:t/>
-            </a:r>
-            <a:br>
-              <a:rPr lang="it-IT" sz="2000" dirty="0" smtClean="0"/>
-            </a:br>
-            <a:endParaRPr lang="it-IT" sz="2000" dirty="0" smtClean="0"/>
-          </a:p>
-          <a:p>
-            <a:pPr marL="457200" lvl="1" indent="0">
-              <a:buNone/>
-            </a:pPr>
-            <a:endParaRPr lang="it-IT" sz="2000" dirty="0" smtClean="0"/>
-          </a:p>
-          <a:p>
-            <a:pPr marL="457200" lvl="1" indent="0">
-              <a:buNone/>
-            </a:pPr>
-            <a:endParaRPr lang="it-IT" sz="2000" dirty="0" smtClean="0"/>
-          </a:p>
-          <a:p>
-            <a:pPr marL="457200" lvl="1" indent="0">
-              <a:buNone/>
-            </a:pPr>
-            <a:endParaRPr lang="it-IT" sz="2000" dirty="0"/>
-          </a:p>
-          <a:p>
-            <a:pPr marL="457200" lvl="1" indent="0">
-              <a:buNone/>
-            </a:pPr>
-            <a:endParaRPr lang="it-IT" sz="2000" dirty="0" smtClean="0"/>
-          </a:p>
-          <a:p>
-            <a:pPr marL="457200" lvl="1" indent="0">
-              <a:buNone/>
-            </a:pPr>
-            <a:endParaRPr lang="it-IT" sz="2000" dirty="0" smtClean="0"/>
-          </a:p>
-          <a:p>
-            <a:pPr marL="457200" lvl="1" indent="0">
-              <a:buNone/>
-            </a:pPr>
-            <a:endParaRPr lang="it-IT" sz="2000" dirty="0" smtClean="0"/>
-          </a:p>
-          <a:p>
-            <a:pPr lvl="1"/>
-            <a:r>
-              <a:rPr lang="it-IT" sz="2000" dirty="0" smtClean="0"/>
-              <a:t>Calcolo </a:t>
-            </a:r>
-            <a:r>
-              <a:rPr lang="it-IT" sz="2000" dirty="0"/>
-              <a:t>della </a:t>
-            </a:r>
-            <a:r>
-              <a:rPr lang="it-IT" sz="2000" b="1" dirty="0"/>
-              <a:t>distanza </a:t>
-            </a:r>
-            <a:r>
-              <a:rPr lang="it-IT" sz="2000" b="1" dirty="0" smtClean="0"/>
-              <a:t>assoluta</a:t>
-            </a:r>
-            <a:r>
-              <a:rPr lang="it-IT" sz="2000" dirty="0" smtClean="0"/>
-              <a:t>:</a:t>
-            </a:r>
-            <a:endParaRPr lang="it-IT" sz="2000" dirty="0"/>
-          </a:p>
-        </p:txBody>
-      </p:sp>
+      <mc:AlternateContent xmlns:mc="http://schemas.openxmlformats.org/markup-compatibility/2006">
+        <mc:Choice xmlns:a14="http://schemas.microsoft.com/office/drawing/2010/main" Requires="a14">
+          <p:sp>
+            <p:nvSpPr>
+              <p:cNvPr id="3" name="Segnaposto contenuto 2"/>
+              <p:cNvSpPr>
+                <a:spLocks noGrp="1"/>
+              </p:cNvSpPr>
+              <p:nvPr>
+                <p:ph idx="1"/>
+              </p:nvPr>
+            </p:nvSpPr>
+            <p:spPr>
+              <a:xfrm>
+                <a:off x="609600" y="805087"/>
+                <a:ext cx="7772400" cy="5286375"/>
+              </a:xfrm>
+            </p:spPr>
+            <p:txBody>
+              <a:bodyPr/>
+              <a:lstStyle/>
+              <a:p>
+                <a:pPr>
+                  <a:lnSpc>
+                    <a:spcPct val="200000"/>
+                  </a:lnSpc>
+                </a:pPr>
+                <a:r>
+                  <a:rPr lang="it-IT" sz="2400" dirty="0" smtClean="0"/>
+                  <a:t>Le funzionalità </a:t>
+                </a:r>
+                <a:r>
+                  <a:rPr lang="it-IT" sz="2400" dirty="0" smtClean="0"/>
+                  <a:t>svolte dal microcontrollore sono: </a:t>
+                </a:r>
+              </a:p>
+              <a:p>
+                <a:pPr lvl="1"/>
+                <a:r>
+                  <a:rPr lang="it-IT" sz="2000" dirty="0"/>
+                  <a:t>Calcolo </a:t>
+                </a:r>
+                <a:r>
+                  <a:rPr lang="it-IT" sz="2000" dirty="0" smtClean="0"/>
+                  <a:t>dell’</a:t>
+                </a:r>
+                <a:r>
+                  <a:rPr lang="it-IT" sz="2000" b="1" dirty="0" err="1" smtClean="0"/>
+                  <a:t>Interpolated</a:t>
+                </a:r>
+                <a:r>
+                  <a:rPr lang="it-IT" sz="2000" dirty="0" smtClean="0"/>
+                  <a:t> </a:t>
+                </a:r>
+                <a:r>
+                  <a:rPr lang="it-IT" sz="2000" b="1" dirty="0" smtClean="0"/>
+                  <a:t>FFT</a:t>
+                </a:r>
+                <a:r>
+                  <a:rPr lang="it-IT" sz="2000" dirty="0" smtClean="0"/>
+                  <a:t> (IFFT</a:t>
+                </a:r>
+                <a:r>
+                  <a:rPr lang="it-IT" sz="2000" dirty="0" smtClean="0"/>
+                  <a:t>)</a:t>
+                </a:r>
+              </a:p>
+              <a:p>
+                <a:pPr lvl="2"/>
+                <a:r>
+                  <a:rPr lang="it-IT" sz="1600" dirty="0" smtClean="0"/>
+                  <a:t>Individuazione di posizione (</a:t>
+                </a:r>
+                <a14:m>
+                  <m:oMath xmlns:m="http://schemas.openxmlformats.org/officeDocument/2006/math">
+                    <m:r>
+                      <a:rPr lang="it-IT" sz="1600" b="0" i="1" smtClean="0">
+                        <a:latin typeface="Cambria Math" charset="0"/>
+                      </a:rPr>
+                      <m:t>𝑘</m:t>
+                    </m:r>
+                    <m:r>
+                      <a:rPr lang="it-IT" sz="1600" b="0" i="0" smtClean="0">
+                        <a:latin typeface="Cambria Math" charset="0"/>
+                      </a:rPr>
+                      <m:t> </m:t>
+                    </m:r>
+                    <m:r>
+                      <m:rPr>
+                        <m:sty m:val="p"/>
+                      </m:rPr>
+                      <a:rPr lang="it-IT" sz="1600" b="0" i="0" smtClean="0">
+                        <a:latin typeface="Cambria Math" charset="0"/>
+                      </a:rPr>
+                      <m:t>e</m:t>
+                    </m:r>
+                    <m:r>
+                      <a:rPr lang="it-IT" sz="1600" b="0" i="0" smtClean="0">
+                        <a:latin typeface="Cambria Math" charset="0"/>
+                      </a:rPr>
+                      <m:t>  </m:t>
+                    </m:r>
+                    <m:r>
+                      <a:rPr lang="it-IT" sz="1600" b="0" i="1" dirty="0" smtClean="0">
+                        <a:latin typeface="Cambria Math" charset="0"/>
+                      </a:rPr>
+                      <m:t>𝑘</m:t>
+                    </m:r>
+                    <m:r>
+                      <a:rPr lang="it-IT" sz="1600" b="0" i="1" dirty="0" smtClean="0">
+                        <a:latin typeface="Cambria Math" charset="0"/>
+                      </a:rPr>
+                      <m:t>+1</m:t>
+                    </m:r>
+                  </m:oMath>
+                </a14:m>
+                <a:r>
+                  <a:rPr lang="it-IT" sz="1600" dirty="0" smtClean="0"/>
+                  <a:t>) </a:t>
+                </a:r>
+                <a:br>
+                  <a:rPr lang="it-IT" sz="1600" dirty="0" smtClean="0"/>
+                </a:br>
+                <a:r>
+                  <a:rPr lang="it-IT" sz="1600" dirty="0" smtClean="0"/>
+                  <a:t>e ampiezza (</a:t>
+                </a:r>
+                <a14:m>
+                  <m:oMath xmlns:m="http://schemas.openxmlformats.org/officeDocument/2006/math">
+                    <m:d>
+                      <m:dPr>
+                        <m:begChr m:val="|"/>
+                        <m:endChr m:val="|"/>
+                        <m:ctrlPr>
+                          <a:rPr lang="it-IT" sz="1600" i="1">
+                            <a:latin typeface="Cambria Math" charset="0"/>
+                          </a:rPr>
+                        </m:ctrlPr>
+                      </m:dPr>
+                      <m:e>
+                        <m:sSub>
+                          <m:sSubPr>
+                            <m:ctrlPr>
+                              <a:rPr lang="it-IT" sz="1600" i="1">
+                                <a:latin typeface="Cambria Math" charset="0"/>
+                              </a:rPr>
+                            </m:ctrlPr>
+                          </m:sSubPr>
+                          <m:e>
+                            <m:r>
+                              <a:rPr lang="it-IT" sz="1600" i="1">
+                                <a:latin typeface="Cambria Math" charset="0"/>
+                              </a:rPr>
+                              <m:t>𝑉</m:t>
+                            </m:r>
+                          </m:e>
+                          <m:sub>
+                            <m:r>
+                              <a:rPr lang="it-IT" sz="1600" b="0" i="1" smtClean="0">
+                                <a:latin typeface="Cambria Math" charset="0"/>
+                              </a:rPr>
+                              <m:t>𝑘</m:t>
+                            </m:r>
+                          </m:sub>
+                        </m:sSub>
+                      </m:e>
+                    </m:d>
+                    <m:r>
+                      <a:rPr lang="it-IT" sz="1600" b="0" i="1">
+                        <a:latin typeface="Cambria Math" charset="0"/>
+                      </a:rPr>
+                      <m:t> </m:t>
+                    </m:r>
+                    <m:r>
+                      <a:rPr lang="it-IT" sz="1600" b="0" i="1" smtClean="0">
+                        <a:latin typeface="Cambria Math" charset="0"/>
+                      </a:rPr>
+                      <m:t>𝑒</m:t>
+                    </m:r>
+                    <m:r>
+                      <a:rPr lang="it-IT" sz="1600" i="1">
+                        <a:latin typeface="Cambria Math" charset="0"/>
+                      </a:rPr>
+                      <m:t> </m:t>
+                    </m:r>
+                    <m:d>
+                      <m:dPr>
+                        <m:begChr m:val="|"/>
+                        <m:endChr m:val="|"/>
+                        <m:ctrlPr>
+                          <a:rPr lang="it-IT" sz="1600" i="1">
+                            <a:latin typeface="Cambria Math" charset="0"/>
+                          </a:rPr>
+                        </m:ctrlPr>
+                      </m:dPr>
+                      <m:e>
+                        <m:sSub>
+                          <m:sSubPr>
+                            <m:ctrlPr>
+                              <a:rPr lang="it-IT" sz="1600" i="1">
+                                <a:latin typeface="Cambria Math" charset="0"/>
+                              </a:rPr>
+                            </m:ctrlPr>
+                          </m:sSubPr>
+                          <m:e>
+                            <m:r>
+                              <a:rPr lang="it-IT" sz="1600" i="1">
+                                <a:latin typeface="Cambria Math" charset="0"/>
+                              </a:rPr>
+                              <m:t>𝑉</m:t>
+                            </m:r>
+                          </m:e>
+                          <m:sub>
+                            <m:r>
+                              <a:rPr lang="it-IT" sz="1600" b="0" i="1" smtClean="0">
+                                <a:latin typeface="Cambria Math" charset="0"/>
+                              </a:rPr>
+                              <m:t>𝑘</m:t>
+                            </m:r>
+                            <m:r>
+                              <a:rPr lang="it-IT" sz="1600" b="0" i="1" smtClean="0">
+                                <a:latin typeface="Cambria Math" charset="0"/>
+                              </a:rPr>
+                              <m:t>+1</m:t>
+                            </m:r>
+                          </m:sub>
+                        </m:sSub>
+                      </m:e>
+                    </m:d>
+                  </m:oMath>
+                </a14:m>
+                <a:r>
+                  <a:rPr lang="it-IT" sz="1600" dirty="0" smtClean="0"/>
+                  <a:t>) </a:t>
+                </a:r>
+                <a:r>
+                  <a:rPr lang="it-IT" sz="1600" dirty="0"/>
+                  <a:t>dei due bin </a:t>
+                </a:r>
+                <a:r>
+                  <a:rPr lang="it-IT" sz="1600" dirty="0" smtClean="0"/>
+                  <a:t/>
+                </a:r>
+                <a:br>
+                  <a:rPr lang="it-IT" sz="1600" dirty="0" smtClean="0"/>
+                </a:br>
+                <a:r>
+                  <a:rPr lang="it-IT" sz="1600" dirty="0" smtClean="0"/>
+                  <a:t>di altezza massima </a:t>
+                </a:r>
+              </a:p>
+              <a:p>
+                <a:pPr lvl="2"/>
+                <a:r>
+                  <a:rPr lang="it-IT" sz="1600" dirty="0" smtClean="0"/>
+                  <a:t>Calcolo della correzione</a:t>
+                </a:r>
+                <a:br>
+                  <a:rPr lang="it-IT" sz="1600" dirty="0" smtClean="0"/>
+                </a:br>
+                <a:r>
+                  <a:rPr lang="it-IT" sz="1600" dirty="0" smtClean="0"/>
+                  <a:t>di frequenza:</a:t>
+                </a:r>
+                <a:br>
+                  <a:rPr lang="it-IT" sz="1600" dirty="0" smtClean="0"/>
+                </a:br>
+                <a:r>
+                  <a:rPr lang="it-IT" sz="1600" dirty="0" smtClean="0"/>
+                  <a:t>	 </a:t>
+                </a:r>
+                <a14:m>
+                  <m:oMath xmlns:m="http://schemas.openxmlformats.org/officeDocument/2006/math">
+                    <m:r>
+                      <a:rPr lang="it-IT" sz="1600" b="0" i="1" smtClean="0">
+                        <a:latin typeface="Cambria Math" charset="0"/>
+                      </a:rPr>
+                      <m:t>𝛿</m:t>
+                    </m:r>
+                    <m:r>
+                      <a:rPr lang="it-IT" sz="1600" b="0" i="1" smtClean="0">
+                        <a:latin typeface="Cambria Math" charset="0"/>
+                      </a:rPr>
+                      <m:t>=</m:t>
+                    </m:r>
+                    <m:f>
+                      <m:fPr>
+                        <m:ctrlPr>
+                          <a:rPr lang="it-IT" sz="1600" b="0" i="1" smtClean="0">
+                            <a:latin typeface="Cambria Math" charset="0"/>
+                          </a:rPr>
+                        </m:ctrlPr>
+                      </m:fPr>
+                      <m:num>
+                        <m:r>
+                          <a:rPr lang="it-IT" sz="1600" b="0" i="1" smtClean="0">
+                            <a:latin typeface="Cambria Math" charset="0"/>
+                          </a:rPr>
+                          <m:t>2</m:t>
+                        </m:r>
+                        <m:d>
+                          <m:dPr>
+                            <m:begChr m:val="|"/>
+                            <m:endChr m:val="|"/>
+                            <m:ctrlPr>
+                              <a:rPr lang="it-IT" sz="1600" b="0" i="1" smtClean="0">
+                                <a:latin typeface="Cambria Math" charset="0"/>
+                              </a:rPr>
+                            </m:ctrlPr>
+                          </m:dPr>
+                          <m:e>
+                            <m:sSub>
+                              <m:sSubPr>
+                                <m:ctrlPr>
+                                  <a:rPr lang="it-IT" sz="1600" b="0" i="1" smtClean="0">
+                                    <a:latin typeface="Cambria Math" charset="0"/>
+                                  </a:rPr>
+                                </m:ctrlPr>
+                              </m:sSubPr>
+                              <m:e>
+                                <m:r>
+                                  <a:rPr lang="it-IT" sz="1600" b="0" i="1" smtClean="0">
+                                    <a:latin typeface="Cambria Math" charset="0"/>
+                                  </a:rPr>
+                                  <m:t>𝑉</m:t>
+                                </m:r>
+                              </m:e>
+                              <m:sub>
+                                <m:r>
+                                  <a:rPr lang="it-IT" sz="1600" b="0" i="1" smtClean="0">
+                                    <a:latin typeface="Cambria Math" charset="0"/>
+                                  </a:rPr>
+                                  <m:t>𝐾</m:t>
+                                </m:r>
+                                <m:r>
+                                  <a:rPr lang="it-IT" sz="1600" b="0" i="1" smtClean="0">
+                                    <a:latin typeface="Cambria Math" charset="0"/>
+                                  </a:rPr>
+                                  <m:t>+1</m:t>
+                                </m:r>
+                              </m:sub>
+                            </m:sSub>
+                          </m:e>
+                        </m:d>
+                        <m:r>
+                          <a:rPr lang="it-IT" sz="1600" b="0" i="1" smtClean="0">
+                            <a:latin typeface="Cambria Math" charset="0"/>
+                          </a:rPr>
+                          <m:t>−</m:t>
+                        </m:r>
+                        <m:d>
+                          <m:dPr>
+                            <m:begChr m:val="|"/>
+                            <m:endChr m:val="|"/>
+                            <m:ctrlPr>
+                              <a:rPr lang="it-IT" sz="1600" i="1">
+                                <a:latin typeface="Cambria Math" charset="0"/>
+                              </a:rPr>
+                            </m:ctrlPr>
+                          </m:dPr>
+                          <m:e>
+                            <m:sSub>
+                              <m:sSubPr>
+                                <m:ctrlPr>
+                                  <a:rPr lang="it-IT" sz="1600" i="1">
+                                    <a:latin typeface="Cambria Math" charset="0"/>
+                                  </a:rPr>
+                                </m:ctrlPr>
+                              </m:sSubPr>
+                              <m:e>
+                                <m:r>
+                                  <a:rPr lang="it-IT" sz="1600" i="1">
+                                    <a:latin typeface="Cambria Math" charset="0"/>
+                                  </a:rPr>
+                                  <m:t>𝑉</m:t>
+                                </m:r>
+                              </m:e>
+                              <m:sub>
+                                <m:r>
+                                  <a:rPr lang="it-IT" sz="1600" i="1">
+                                    <a:latin typeface="Cambria Math" charset="0"/>
+                                  </a:rPr>
+                                  <m:t>𝐾</m:t>
+                                </m:r>
+                              </m:sub>
+                            </m:sSub>
+                          </m:e>
+                        </m:d>
+                      </m:num>
+                      <m:den>
+                        <m:d>
+                          <m:dPr>
+                            <m:begChr m:val="|"/>
+                            <m:endChr m:val="|"/>
+                            <m:ctrlPr>
+                              <a:rPr lang="it-IT" sz="1600" i="1">
+                                <a:latin typeface="Cambria Math" charset="0"/>
+                              </a:rPr>
+                            </m:ctrlPr>
+                          </m:dPr>
+                          <m:e>
+                            <m:sSub>
+                              <m:sSubPr>
+                                <m:ctrlPr>
+                                  <a:rPr lang="it-IT" sz="1600" i="1">
+                                    <a:latin typeface="Cambria Math" charset="0"/>
+                                  </a:rPr>
+                                </m:ctrlPr>
+                              </m:sSubPr>
+                              <m:e>
+                                <m:r>
+                                  <a:rPr lang="it-IT" sz="1600" i="1">
+                                    <a:latin typeface="Cambria Math" charset="0"/>
+                                  </a:rPr>
+                                  <m:t>𝑉</m:t>
+                                </m:r>
+                              </m:e>
+                              <m:sub>
+                                <m:r>
+                                  <a:rPr lang="it-IT" sz="1600" i="1">
+                                    <a:latin typeface="Cambria Math" charset="0"/>
+                                  </a:rPr>
+                                  <m:t>𝐾</m:t>
+                                </m:r>
+                                <m:r>
+                                  <a:rPr lang="it-IT" sz="1600" i="1">
+                                    <a:latin typeface="Cambria Math" charset="0"/>
+                                  </a:rPr>
+                                  <m:t>+1</m:t>
+                                </m:r>
+                              </m:sub>
+                            </m:sSub>
+                          </m:e>
+                        </m:d>
+                        <m:r>
+                          <a:rPr lang="it-IT" sz="1600" b="0" i="1" smtClean="0">
+                            <a:latin typeface="Cambria Math" charset="0"/>
+                          </a:rPr>
+                          <m:t>+</m:t>
+                        </m:r>
+                        <m:d>
+                          <m:dPr>
+                            <m:begChr m:val="|"/>
+                            <m:endChr m:val="|"/>
+                            <m:ctrlPr>
+                              <a:rPr lang="it-IT" sz="1600" i="1">
+                                <a:latin typeface="Cambria Math" charset="0"/>
+                              </a:rPr>
+                            </m:ctrlPr>
+                          </m:dPr>
+                          <m:e>
+                            <m:sSub>
+                              <m:sSubPr>
+                                <m:ctrlPr>
+                                  <a:rPr lang="it-IT" sz="1600" i="1">
+                                    <a:latin typeface="Cambria Math" charset="0"/>
+                                  </a:rPr>
+                                </m:ctrlPr>
+                              </m:sSubPr>
+                              <m:e>
+                                <m:r>
+                                  <a:rPr lang="it-IT" sz="1600" i="1">
+                                    <a:latin typeface="Cambria Math" charset="0"/>
+                                  </a:rPr>
+                                  <m:t>𝑉</m:t>
+                                </m:r>
+                              </m:e>
+                              <m:sub>
+                                <m:r>
+                                  <a:rPr lang="it-IT" sz="1600" i="1">
+                                    <a:latin typeface="Cambria Math" charset="0"/>
+                                  </a:rPr>
+                                  <m:t>𝐾</m:t>
+                                </m:r>
+                              </m:sub>
+                            </m:sSub>
+                          </m:e>
+                        </m:d>
+                      </m:den>
+                    </m:f>
+                  </m:oMath>
+                </a14:m>
+                <a:endParaRPr lang="it-IT" sz="1600" dirty="0" smtClean="0"/>
+              </a:p>
+              <a:p>
+                <a:pPr lvl="2"/>
+                <a:r>
+                  <a:rPr lang="it-IT" sz="1600" dirty="0" smtClean="0"/>
+                  <a:t>Calcolo della frequenza del tono</a:t>
+                </a:r>
+                <a:br>
+                  <a:rPr lang="it-IT" sz="1600" dirty="0" smtClean="0"/>
+                </a:br>
+                <a:r>
+                  <a:rPr lang="it-IT" sz="1600" dirty="0" smtClean="0"/>
+                  <a:t>fondamentale:</a:t>
+                </a:r>
+                <a:br>
+                  <a:rPr lang="it-IT" sz="1600" dirty="0" smtClean="0"/>
+                </a:br>
+                <a:r>
+                  <a:rPr lang="it-IT" sz="1600" dirty="0" smtClean="0"/>
+                  <a:t/>
+                </a:r>
+                <a:br>
+                  <a:rPr lang="it-IT" sz="1600" dirty="0" smtClean="0"/>
+                </a:br>
+                <a:r>
+                  <a:rPr lang="it-IT" sz="1600" dirty="0" smtClean="0"/>
+                  <a:t>	</a:t>
+                </a:r>
+                <a14:m>
+                  <m:oMath xmlns:m="http://schemas.openxmlformats.org/officeDocument/2006/math">
+                    <m:sSub>
+                      <m:sSubPr>
+                        <m:ctrlPr>
+                          <a:rPr lang="it-IT" sz="1600" i="1" smtClean="0">
+                            <a:latin typeface="Cambria Math" charset="0"/>
+                          </a:rPr>
+                        </m:ctrlPr>
+                      </m:sSubPr>
+                      <m:e>
+                        <m:r>
+                          <a:rPr lang="it-IT" sz="1600" b="0" i="1" smtClean="0">
+                            <a:latin typeface="Cambria Math" charset="0"/>
+                          </a:rPr>
+                          <m:t>𝑓</m:t>
+                        </m:r>
+                      </m:e>
+                      <m:sub>
+                        <m:r>
+                          <a:rPr lang="it-IT" sz="1600" b="0" i="1" smtClean="0">
+                            <a:latin typeface="Cambria Math" charset="0"/>
+                          </a:rPr>
+                          <m:t>𝑡𝑜𝑛𝑜</m:t>
+                        </m:r>
+                      </m:sub>
+                    </m:sSub>
+                    <m:r>
+                      <a:rPr lang="it-IT" sz="1600" b="0" i="1" smtClean="0">
+                        <a:latin typeface="Cambria Math" charset="0"/>
+                      </a:rPr>
+                      <m:t>=</m:t>
+                    </m:r>
+                    <m:d>
+                      <m:dPr>
+                        <m:ctrlPr>
+                          <a:rPr lang="it-IT" sz="1600" b="0" i="1" smtClean="0">
+                            <a:latin typeface="Cambria Math" charset="0"/>
+                          </a:rPr>
+                        </m:ctrlPr>
+                      </m:dPr>
+                      <m:e>
+                        <m:r>
+                          <a:rPr lang="it-IT" sz="1600" b="0" i="1" smtClean="0">
+                            <a:latin typeface="Cambria Math" charset="0"/>
+                          </a:rPr>
+                          <m:t>𝑘</m:t>
+                        </m:r>
+                        <m:r>
+                          <a:rPr lang="it-IT" sz="1600" b="0" i="1" smtClean="0">
+                            <a:latin typeface="Cambria Math" charset="0"/>
+                          </a:rPr>
+                          <m:t>+</m:t>
+                        </m:r>
+                        <m:r>
+                          <a:rPr lang="it-IT" sz="1600" b="0" i="1" smtClean="0">
+                            <a:latin typeface="Cambria Math" charset="0"/>
+                          </a:rPr>
+                          <m:t>𝛿</m:t>
+                        </m:r>
+                      </m:e>
+                    </m:d>
+                    <m:r>
+                      <m:rPr>
+                        <m:sty m:val="p"/>
+                      </m:rPr>
+                      <a:rPr lang="it-IT" sz="1600" b="0" i="0" smtClean="0">
+                        <a:latin typeface="Cambria Math" charset="0"/>
+                      </a:rPr>
+                      <m:t>Δ</m:t>
+                    </m:r>
+                    <m:r>
+                      <a:rPr lang="it-IT" sz="1600" b="0" i="1" smtClean="0">
+                        <a:latin typeface="Cambria Math" charset="0"/>
+                      </a:rPr>
+                      <m:t>𝑓</m:t>
+                    </m:r>
+                  </m:oMath>
+                </a14:m>
+                <a:r>
+                  <a:rPr lang="it-IT" sz="1600" b="0" dirty="0" smtClean="0"/>
+                  <a:t/>
+                </a:r>
+                <a:br>
+                  <a:rPr lang="it-IT" sz="1600" b="0" dirty="0" smtClean="0"/>
+                </a:br>
+                <a:r>
+                  <a:rPr lang="it-IT" sz="1600" b="0" dirty="0" smtClean="0"/>
+                  <a:t/>
+                </a:r>
+                <a:br>
+                  <a:rPr lang="it-IT" sz="1600" b="0" dirty="0" smtClean="0"/>
+                </a:br>
+                <a:r>
+                  <a:rPr lang="it-IT" sz="1600" b="0" dirty="0" smtClean="0"/>
+                  <a:t>dove: </a:t>
+                </a:r>
+                <a14:m>
+                  <m:oMath xmlns:m="http://schemas.openxmlformats.org/officeDocument/2006/math">
+                    <m:r>
+                      <m:rPr>
+                        <m:sty m:val="p"/>
+                      </m:rPr>
+                      <a:rPr lang="it-IT" sz="1600" b="0" i="0" smtClean="0">
+                        <a:latin typeface="Cambria Math" charset="0"/>
+                      </a:rPr>
+                      <m:t>Δ</m:t>
+                    </m:r>
+                    <m:r>
+                      <a:rPr lang="it-IT" sz="1600" b="0" i="1" smtClean="0">
+                        <a:latin typeface="Cambria Math" charset="0"/>
+                      </a:rPr>
+                      <m:t>𝑓</m:t>
+                    </m:r>
+                    <m:r>
+                      <a:rPr lang="it-IT" sz="1600" b="0" i="1" smtClean="0">
+                        <a:latin typeface="Cambria Math" charset="0"/>
+                      </a:rPr>
+                      <m:t>= </m:t>
+                    </m:r>
+                    <m:f>
+                      <m:fPr>
+                        <m:ctrlPr>
+                          <a:rPr lang="it-IT" sz="1600" b="0" i="1" smtClean="0">
+                            <a:latin typeface="Cambria Math" charset="0"/>
+                          </a:rPr>
+                        </m:ctrlPr>
+                      </m:fPr>
+                      <m:num>
+                        <m:sSub>
+                          <m:sSubPr>
+                            <m:ctrlPr>
+                              <a:rPr lang="it-IT" sz="1600" b="0" i="1" smtClean="0">
+                                <a:latin typeface="Cambria Math" charset="0"/>
+                              </a:rPr>
+                            </m:ctrlPr>
+                          </m:sSubPr>
+                          <m:e>
+                            <m:r>
+                              <a:rPr lang="it-IT" sz="1600" b="0" i="1" smtClean="0">
+                                <a:latin typeface="Cambria Math" charset="0"/>
+                              </a:rPr>
+                              <m:t>𝑓</m:t>
+                            </m:r>
+                          </m:e>
+                          <m:sub>
+                            <m:r>
+                              <a:rPr lang="it-IT" sz="1600" b="0" i="1" smtClean="0">
+                                <a:latin typeface="Cambria Math" charset="0"/>
+                              </a:rPr>
+                              <m:t>𝑠𝑎𝑚𝑝𝑙𝑒</m:t>
+                            </m:r>
+                          </m:sub>
+                        </m:sSub>
+                      </m:num>
+                      <m:den>
+                        <m:r>
+                          <a:rPr lang="it-IT" sz="1600" b="0" i="1" smtClean="0">
+                            <a:latin typeface="Cambria Math" charset="0"/>
+                          </a:rPr>
+                          <m:t>𝑁</m:t>
+                        </m:r>
+                      </m:den>
+                    </m:f>
+                  </m:oMath>
+                </a14:m>
+                <a:r>
+                  <a:rPr lang="it-IT" sz="2000" dirty="0" smtClean="0"/>
+                  <a:t/>
+                </a:r>
+                <a:br>
+                  <a:rPr lang="it-IT" sz="2000" dirty="0" smtClean="0"/>
+                </a:br>
+                <a:endParaRPr lang="it-IT" sz="2000" dirty="0" smtClean="0"/>
+              </a:p>
+              <a:p>
+                <a:pPr lvl="1"/>
+                <a:r>
+                  <a:rPr lang="it-IT" sz="2000" dirty="0" smtClean="0"/>
+                  <a:t>Calcolo </a:t>
+                </a:r>
+                <a:r>
+                  <a:rPr lang="it-IT" sz="2000" dirty="0"/>
+                  <a:t>della </a:t>
+                </a:r>
+                <a:r>
+                  <a:rPr lang="it-IT" sz="2000" b="1" dirty="0"/>
+                  <a:t>distanza </a:t>
+                </a:r>
+                <a:r>
+                  <a:rPr lang="it-IT" sz="2000" b="1" dirty="0" smtClean="0"/>
+                  <a:t>assoluta</a:t>
+                </a:r>
+                <a:r>
+                  <a:rPr lang="it-IT" sz="2000" dirty="0" smtClean="0"/>
+                  <a:t>:</a:t>
+                </a:r>
+                <a:endParaRPr lang="it-IT" sz="2000" dirty="0"/>
+              </a:p>
+            </p:txBody>
+          </p:sp>
+        </mc:Choice>
+        <mc:Fallback>
+          <p:sp>
+            <p:nvSpPr>
+              <p:cNvPr id="3" name="Segnaposto contenuto 2"/>
+              <p:cNvSpPr>
+                <a:spLocks noGrp="1" noRot="1" noChangeAspect="1" noMove="1" noResize="1" noEditPoints="1" noAdjustHandles="1" noChangeArrowheads="1" noChangeShapeType="1" noTextEdit="1"/>
+              </p:cNvSpPr>
+              <p:nvPr>
+                <p:ph idx="1"/>
+              </p:nvPr>
+            </p:nvSpPr>
+            <p:spPr>
+              <a:xfrm>
+                <a:off x="609600" y="805087"/>
+                <a:ext cx="7772400" cy="5286375"/>
+              </a:xfrm>
+              <a:blipFill rotWithShape="0">
+                <a:blip r:embed="rId2"/>
+                <a:stretch>
+                  <a:fillRect l="-1098" r="-1490" b="-577"/>
+                </a:stretch>
+              </a:blipFill>
+            </p:spPr>
+            <p:txBody>
+              <a:bodyPr/>
+              <a:lstStyle/>
+              <a:p>
+                <a:r>
+                  <a:rPr lang="it-IT">
+                    <a:noFill/>
+                  </a:rPr>
+                  <a:t> </a:t>
+                </a:r>
+              </a:p>
+            </p:txBody>
+          </p:sp>
+        </mc:Fallback>
+      </mc:AlternateContent>
       <p:sp>
         <p:nvSpPr>
           <p:cNvPr id="4" name="Segnaposto numero diapositiva 3"/>
@@ -11483,8 +12042,8 @@
           </a:p>
         </p:txBody>
       </p:sp>
-      <mc:AlternateContent xmlns:mc="http://schemas.openxmlformats.org/markup-compatibility/2006" xmlns:a14="http://schemas.microsoft.com/office/drawing/2010/main">
-        <mc:Choice Requires="a14">
+      <mc:AlternateContent xmlns:mc="http://schemas.openxmlformats.org/markup-compatibility/2006">
+        <mc:Choice xmlns:a14="http://schemas.microsoft.com/office/drawing/2010/main" Requires="a14">
           <p:sp>
             <p:nvSpPr>
               <p:cNvPr id="7" name="CasellaDiTesto 6"/>
@@ -11493,7 +12052,7 @@
             </p:nvSpPr>
             <p:spPr>
               <a:xfrm>
-                <a:off x="5602315" y="5270549"/>
+                <a:off x="5987271" y="5400694"/>
                 <a:ext cx="2503457" cy="733855"/>
               </a:xfrm>
               <a:prstGeom prst="rect">
@@ -11639,7 +12198,7 @@
             </p:txBody>
           </p:sp>
         </mc:Choice>
-        <mc:Fallback xmlns="">
+        <mc:Fallback>
           <p:sp>
             <p:nvSpPr>
               <p:cNvPr id="7" name="CasellaDiTesto 6"/>
@@ -11650,14 +12209,14 @@
             </p:nvSpPr>
             <p:spPr>
               <a:xfrm>
-                <a:off x="5602315" y="5270549"/>
+                <a:off x="5987271" y="5400694"/>
                 <a:ext cx="2503457" cy="733855"/>
               </a:xfrm>
               <a:prstGeom prst="rect">
                 <a:avLst/>
               </a:prstGeom>
               <a:blipFill rotWithShape="0">
-                <a:blip r:embed="rId2"/>
+                <a:blip r:embed="rId3"/>
                 <a:stretch>
                   <a:fillRect/>
                 </a:stretch>
@@ -11687,7 +12246,7 @@
           <p:nvPr/>
         </p:nvPicPr>
         <p:blipFill>
-          <a:blip r:embed="rId3">
+          <a:blip r:embed="rId4">
             <a:extLst>
               <a:ext uri="{28A0092B-C50C-407E-A947-70E740481C1C}">
                 <a14:useLocalDpi xmlns:a14="http://schemas.microsoft.com/office/drawing/2010/main" val="0"/>
@@ -11700,78 +12259,14 @@
         </p:blipFill>
         <p:spPr>
           <a:xfrm>
-            <a:off x="5176508" y="2378711"/>
-            <a:ext cx="3355070" cy="2538375"/>
+            <a:off x="5609240" y="2571685"/>
+            <a:ext cx="3259518" cy="2466082"/>
           </a:xfrm>
           <a:prstGeom prst="rect">
             <a:avLst/>
           </a:prstGeom>
         </p:spPr>
       </p:pic>
-      <p:sp>
-        <p:nvSpPr>
-          <p:cNvPr id="8" name="CasellaDiTesto 7"/>
-          <p:cNvSpPr txBox="1"/>
-          <p:nvPr/>
-        </p:nvSpPr>
-        <p:spPr>
-          <a:xfrm>
-            <a:off x="342900" y="3130775"/>
-            <a:ext cx="4408714" cy="830997"/>
-          </a:xfrm>
-          <a:prstGeom prst="rect">
-            <a:avLst/>
-          </a:prstGeom>
-          <a:noFill/>
-        </p:spPr>
-        <p:txBody>
-          <a:bodyPr wrap="square" rtlCol="0">
-            <a:spAutoFit/>
-          </a:bodyPr>
-          <a:lstStyle/>
-          <a:p>
-            <a:r>
-              <a:rPr lang="it-IT" dirty="0" err="1" smtClean="0">
-                <a:solidFill>
-                  <a:srgbClr val="FF0000"/>
-                </a:solidFill>
-              </a:rPr>
-              <a:t>toDO</a:t>
-            </a:r>
-            <a:r>
-              <a:rPr lang="it-IT" dirty="0" smtClean="0">
-                <a:solidFill>
-                  <a:srgbClr val="FF0000"/>
-                </a:solidFill>
-              </a:rPr>
-              <a:t>: aggiungere</a:t>
-            </a:r>
-          </a:p>
-          <a:p>
-            <a:r>
-              <a:rPr lang="it-IT" dirty="0">
-                <a:solidFill>
-                  <a:srgbClr val="FF0000"/>
-                </a:solidFill>
-              </a:rPr>
-              <a:t>f</a:t>
-            </a:r>
-            <a:r>
-              <a:rPr lang="it-IT" dirty="0" smtClean="0">
-                <a:solidFill>
-                  <a:srgbClr val="FF0000"/>
-                </a:solidFill>
-              </a:rPr>
-              <a:t>ormule sull’interpolazione</a:t>
-            </a:r>
-            <a:endParaRPr lang="it-IT" dirty="0">
-              <a:solidFill>
-                <a:srgbClr val="FF0000"/>
-              </a:solidFill>
-            </a:endParaRPr>
-          </a:p>
-        </p:txBody>
-      </p:sp>
     </p:spTree>
     <p:extLst>
       <p:ext uri="{BB962C8B-B14F-4D97-AF65-F5344CB8AC3E}">
@@ -12816,14 +13311,14 @@
           <a:p>
             <a:pPr lvl="1"/>
             <a:r>
-              <a:rPr lang="it-IT" sz="2000" dirty="0" smtClean="0"/>
+              <a:rPr lang="it-IT" sz="2000" b="1" dirty="0" smtClean="0"/>
               <a:t>Bersaglio fisso</a:t>
             </a:r>
           </a:p>
           <a:p>
             <a:pPr lvl="1"/>
             <a:r>
-              <a:rPr lang="it-IT" sz="2000" dirty="0" smtClean="0"/>
+              <a:rPr lang="it-IT" sz="2000" b="1" dirty="0" smtClean="0"/>
               <a:t>Bersaglio mobile</a:t>
             </a:r>
           </a:p>
@@ -13320,6 +13815,52 @@
           </a:prstGeom>
         </p:spPr>
       </p:pic>
+      <p:sp>
+        <p:nvSpPr>
+          <p:cNvPr id="8" name="CasellaDiTesto 7"/>
+          <p:cNvSpPr txBox="1"/>
+          <p:nvPr/>
+        </p:nvSpPr>
+        <p:spPr>
+          <a:xfrm>
+            <a:off x="2692885" y="4306320"/>
+            <a:ext cx="4408714" cy="461665"/>
+          </a:xfrm>
+          <a:prstGeom prst="rect">
+            <a:avLst/>
+          </a:prstGeom>
+          <a:noFill/>
+        </p:spPr>
+        <p:txBody>
+          <a:bodyPr wrap="square" rtlCol="0">
+            <a:spAutoFit/>
+          </a:bodyPr>
+          <a:lstStyle/>
+          <a:p>
+            <a:r>
+              <a:rPr lang="it-IT" dirty="0" err="1" smtClean="0">
+                <a:solidFill>
+                  <a:srgbClr val="FF0000"/>
+                </a:solidFill>
+              </a:rPr>
+              <a:t>toDO</a:t>
+            </a:r>
+            <a:r>
+              <a:rPr lang="it-IT" dirty="0" smtClean="0">
+                <a:solidFill>
+                  <a:srgbClr val="FF0000"/>
+                </a:solidFill>
+              </a:rPr>
+              <a:t>: ingrandire assi</a:t>
+            </a:r>
+            <a:endParaRPr lang="it-IT" dirty="0">
+              <a:solidFill>
+                <a:srgbClr val="FF0000"/>
+              </a:solidFill>
+            </a:endParaRPr>
+          </a:p>
+        </p:txBody>
+      </p:sp>
     </p:spTree>
     <p:extLst>
       <p:ext uri="{BB962C8B-B14F-4D97-AF65-F5344CB8AC3E}">
@@ -13805,6 +14346,52 @@
           </a:prstGeom>
         </p:spPr>
       </p:pic>
+      <p:sp>
+        <p:nvSpPr>
+          <p:cNvPr id="8" name="CasellaDiTesto 7"/>
+          <p:cNvSpPr txBox="1"/>
+          <p:nvPr/>
+        </p:nvSpPr>
+        <p:spPr>
+          <a:xfrm>
+            <a:off x="2830286" y="5319091"/>
+            <a:ext cx="4408714" cy="461665"/>
+          </a:xfrm>
+          <a:prstGeom prst="rect">
+            <a:avLst/>
+          </a:prstGeom>
+          <a:noFill/>
+        </p:spPr>
+        <p:txBody>
+          <a:bodyPr wrap="square" rtlCol="0">
+            <a:spAutoFit/>
+          </a:bodyPr>
+          <a:lstStyle/>
+          <a:p>
+            <a:r>
+              <a:rPr lang="it-IT" dirty="0" err="1" smtClean="0">
+                <a:solidFill>
+                  <a:srgbClr val="FF0000"/>
+                </a:solidFill>
+              </a:rPr>
+              <a:t>toDO</a:t>
+            </a:r>
+            <a:r>
+              <a:rPr lang="it-IT" dirty="0" smtClean="0">
+                <a:solidFill>
+                  <a:srgbClr val="FF0000"/>
+                </a:solidFill>
+              </a:rPr>
+              <a:t>: ingrandire assi</a:t>
+            </a:r>
+            <a:endParaRPr lang="it-IT" dirty="0">
+              <a:solidFill>
+                <a:srgbClr val="FF0000"/>
+              </a:solidFill>
+            </a:endParaRPr>
+          </a:p>
+        </p:txBody>
+      </p:sp>
     </p:spTree>
     <p:extLst>
       <p:ext uri="{BB962C8B-B14F-4D97-AF65-F5344CB8AC3E}">
@@ -14310,6 +14897,52 @@
           </a:extLst>
         </p:spPr>
       </p:pic>
+      <p:sp>
+        <p:nvSpPr>
+          <p:cNvPr id="7" name="CasellaDiTesto 6"/>
+          <p:cNvSpPr txBox="1"/>
+          <p:nvPr/>
+        </p:nvSpPr>
+        <p:spPr>
+          <a:xfrm>
+            <a:off x="5526026" y="2867322"/>
+            <a:ext cx="4408714" cy="461665"/>
+          </a:xfrm>
+          <a:prstGeom prst="rect">
+            <a:avLst/>
+          </a:prstGeom>
+          <a:noFill/>
+        </p:spPr>
+        <p:txBody>
+          <a:bodyPr wrap="square" rtlCol="0">
+            <a:spAutoFit/>
+          </a:bodyPr>
+          <a:lstStyle/>
+          <a:p>
+            <a:r>
+              <a:rPr lang="it-IT" dirty="0" err="1" smtClean="0">
+                <a:solidFill>
+                  <a:srgbClr val="FF0000"/>
+                </a:solidFill>
+              </a:rPr>
+              <a:t>toDO</a:t>
+            </a:r>
+            <a:r>
+              <a:rPr lang="it-IT" dirty="0" smtClean="0">
+                <a:solidFill>
+                  <a:srgbClr val="FF0000"/>
+                </a:solidFill>
+              </a:rPr>
+              <a:t>: ingrandire assi</a:t>
+            </a:r>
+            <a:endParaRPr lang="it-IT" dirty="0">
+              <a:solidFill>
+                <a:srgbClr val="FF0000"/>
+              </a:solidFill>
+            </a:endParaRPr>
+          </a:p>
+        </p:txBody>
+      </p:sp>
     </p:spTree>
     <p:extLst>
       <p:ext uri="{BB962C8B-B14F-4D97-AF65-F5344CB8AC3E}">
@@ -16184,25 +16817,6 @@
       </p:grpSpPr>
       <p:sp>
         <p:nvSpPr>
-          <p:cNvPr id="3" name="Segnaposto contenuto 2"/>
-          <p:cNvSpPr>
-            <a:spLocks noGrp="1"/>
-          </p:cNvSpPr>
-          <p:nvPr>
-            <p:ph idx="1"/>
-          </p:nvPr>
-        </p:nvSpPr>
-        <p:spPr/>
-        <p:txBody>
-          <a:bodyPr/>
-          <a:lstStyle/>
-          <a:p>
-            <a:endParaRPr lang="it-IT" dirty="0"/>
-          </a:p>
-        </p:txBody>
-      </p:sp>
-      <p:sp>
-        <p:nvSpPr>
           <p:cNvPr id="4" name="Segnaposto numero diapositiva 3"/>
           <p:cNvSpPr>
             <a:spLocks noGrp="1"/>
@@ -16249,6 +16863,68 @@
               <a:rPr lang="it-IT" dirty="0"/>
               <a:t>Interferometria a self-mixing</a:t>
             </a:r>
+          </a:p>
+        </p:txBody>
+      </p:sp>
+      <p:sp>
+        <p:nvSpPr>
+          <p:cNvPr id="7" name="CasellaDiTesto 6"/>
+          <p:cNvSpPr txBox="1"/>
+          <p:nvPr/>
+        </p:nvSpPr>
+        <p:spPr>
+          <a:xfrm>
+            <a:off x="1986643" y="3204001"/>
+            <a:ext cx="4408714" cy="1200329"/>
+          </a:xfrm>
+          <a:prstGeom prst="rect">
+            <a:avLst/>
+          </a:prstGeom>
+          <a:noFill/>
+        </p:spPr>
+        <p:txBody>
+          <a:bodyPr wrap="square" rtlCol="0">
+            <a:spAutoFit/>
+          </a:bodyPr>
+          <a:lstStyle/>
+          <a:p>
+            <a:r>
+              <a:rPr lang="it-IT" dirty="0" err="1" smtClean="0">
+                <a:solidFill>
+                  <a:srgbClr val="FF0000"/>
+                </a:solidFill>
+              </a:rPr>
+              <a:t>toDO</a:t>
+            </a:r>
+            <a:r>
+              <a:rPr lang="it-IT" dirty="0" smtClean="0">
+                <a:solidFill>
+                  <a:srgbClr val="FF0000"/>
+                </a:solidFill>
+              </a:rPr>
+              <a:t>: spiegare bene le caratteristiche del segnale </a:t>
+            </a:r>
+            <a:r>
+              <a:rPr lang="it-IT" dirty="0" err="1" smtClean="0">
+                <a:solidFill>
+                  <a:srgbClr val="FF0000"/>
+                </a:solidFill>
+              </a:rPr>
+              <a:t>inteferometrico</a:t>
+            </a:r>
+            <a:r>
+              <a:rPr lang="it-IT" dirty="0" smtClean="0">
+                <a:solidFill>
+                  <a:srgbClr val="FF0000"/>
+                </a:solidFill>
+              </a:rPr>
+              <a:t> e i vantaggi</a:t>
+            </a:r>
+            <a:endParaRPr lang="it-IT" dirty="0">
+              <a:solidFill>
+                <a:srgbClr val="FF0000"/>
+              </a:solidFill>
+            </a:endParaRPr>
           </a:p>
         </p:txBody>
       </p:sp>

</xml_diff>

<commit_message>
add slide: fpga code
Signed-off-by: Diego Rondelli <diego.rondelli@mail.polimi.it>
</commit_message>
<xml_diff>
--- a/presentazione_discussione.pptx
+++ b/presentazione_discussione.pptx
@@ -5,10 +5,10 @@
     <p:sldMasterId id="2147483652" r:id="rId4"/>
   </p:sldMasterIdLst>
   <p:notesMasterIdLst>
-    <p:notesMasterId r:id="rId34"/>
+    <p:notesMasterId r:id="rId35"/>
   </p:notesMasterIdLst>
   <p:handoutMasterIdLst>
-    <p:handoutMasterId r:id="rId35"/>
+    <p:handoutMasterId r:id="rId36"/>
   </p:handoutMasterIdLst>
   <p:sldIdLst>
     <p:sldId id="277" r:id="rId5"/>
@@ -25,26 +25,27 @@
     <p:sldId id="308" r:id="rId16"/>
     <p:sldId id="289" r:id="rId17"/>
     <p:sldId id="305" r:id="rId18"/>
-    <p:sldId id="314" r:id="rId19"/>
-    <p:sldId id="315" r:id="rId20"/>
-    <p:sldId id="316" r:id="rId21"/>
-    <p:sldId id="317" r:id="rId22"/>
-    <p:sldId id="291" r:id="rId23"/>
-    <p:sldId id="306" r:id="rId24"/>
-    <p:sldId id="312" r:id="rId25"/>
-    <p:sldId id="309" r:id="rId26"/>
-    <p:sldId id="294" r:id="rId27"/>
-    <p:sldId id="295" r:id="rId28"/>
-    <p:sldId id="303" r:id="rId29"/>
-    <p:sldId id="304" r:id="rId30"/>
-    <p:sldId id="297" r:id="rId31"/>
-    <p:sldId id="296" r:id="rId32"/>
-    <p:sldId id="300" r:id="rId33"/>
+    <p:sldId id="318" r:id="rId19"/>
+    <p:sldId id="314" r:id="rId20"/>
+    <p:sldId id="315" r:id="rId21"/>
+    <p:sldId id="316" r:id="rId22"/>
+    <p:sldId id="317" r:id="rId23"/>
+    <p:sldId id="291" r:id="rId24"/>
+    <p:sldId id="306" r:id="rId25"/>
+    <p:sldId id="312" r:id="rId26"/>
+    <p:sldId id="309" r:id="rId27"/>
+    <p:sldId id="294" r:id="rId28"/>
+    <p:sldId id="295" r:id="rId29"/>
+    <p:sldId id="303" r:id="rId30"/>
+    <p:sldId id="304" r:id="rId31"/>
+    <p:sldId id="297" r:id="rId32"/>
+    <p:sldId id="296" r:id="rId33"/>
+    <p:sldId id="300" r:id="rId34"/>
   </p:sldIdLst>
   <p:sldSz cx="9144000" cy="6858000" type="screen4x3"/>
   <p:notesSz cx="7099300" cy="10234613"/>
   <p:custDataLst>
-    <p:tags r:id="rId36"/>
+    <p:tags r:id="rId37"/>
   </p:custDataLst>
   <p:defaultTextStyle>
     <a:defPPr>
@@ -420,7 +421,7 @@
             <a:fld id="{09D1D7E3-DE3F-4B7A-BF5B-A3735BF12F5F}" type="slidenum">
               <a:rPr lang="en-US" altLang="nl-NL"/>
               <a:pPr/>
-              <a:t>‹n.›</a:t>
+              <a:t>‹N›</a:t>
             </a:fld>
             <a:endParaRPr lang="en-US" altLang="nl-NL"/>
           </a:p>
@@ -759,7 +760,7 @@
             <a:fld id="{88C0D9CF-78A8-4FBE-960E-41C6F5A4AF95}" type="slidenum">
               <a:rPr lang="en-US" altLang="nl-NL"/>
               <a:pPr/>
-              <a:t>‹n.›</a:t>
+              <a:t>‹N›</a:t>
             </a:fld>
             <a:endParaRPr lang="en-US" altLang="nl-NL"/>
           </a:p>
@@ -1748,7 +1749,7 @@
             <a:fld id="{88C0D9CF-78A8-4FBE-960E-41C6F5A4AF95}" type="slidenum">
               <a:rPr lang="en-US" altLang="nl-NL" smtClean="0"/>
               <a:pPr/>
-              <a:t>22</a:t>
+              <a:t>19</a:t>
             </a:fld>
             <a:endParaRPr lang="en-US" altLang="nl-NL"/>
           </a:p>
@@ -1757,7 +1758,7 @@
     </p:spTree>
     <p:extLst>
       <p:ext uri="{BB962C8B-B14F-4D97-AF65-F5344CB8AC3E}">
-        <p14:creationId xmlns:p14="http://schemas.microsoft.com/office/powerpoint/2010/main" val="3617987220"/>
+        <p14:creationId xmlns:p14="http://schemas.microsoft.com/office/powerpoint/2010/main" val="733450907"/>
       </p:ext>
     </p:extLst>
   </p:cSld>
@@ -1902,7 +1903,7 @@
             <a:fld id="{88C0D9CF-78A8-4FBE-960E-41C6F5A4AF95}" type="slidenum">
               <a:rPr lang="en-US" altLang="nl-NL" smtClean="0"/>
               <a:pPr/>
-              <a:t>24</a:t>
+              <a:t>23</a:t>
             </a:fld>
             <a:endParaRPr lang="en-US" altLang="nl-NL"/>
           </a:p>
@@ -1911,7 +1912,7 @@
     </p:spTree>
     <p:extLst>
       <p:ext uri="{BB962C8B-B14F-4D97-AF65-F5344CB8AC3E}">
-        <p14:creationId xmlns:p14="http://schemas.microsoft.com/office/powerpoint/2010/main" val="767066249"/>
+        <p14:creationId xmlns:p14="http://schemas.microsoft.com/office/powerpoint/2010/main" val="3617987220"/>
       </p:ext>
     </p:extLst>
   </p:cSld>
@@ -2065,7 +2066,7 @@
     </p:spTree>
     <p:extLst>
       <p:ext uri="{BB962C8B-B14F-4D97-AF65-F5344CB8AC3E}">
-        <p14:creationId xmlns:p14="http://schemas.microsoft.com/office/powerpoint/2010/main" val="2143493320"/>
+        <p14:creationId xmlns:p14="http://schemas.microsoft.com/office/powerpoint/2010/main" val="767066249"/>
       </p:ext>
     </p:extLst>
   </p:cSld>
@@ -2211,6 +2212,160 @@
               <a:rPr lang="en-US" altLang="nl-NL" smtClean="0"/>
               <a:pPr/>
               <a:t>26</a:t>
+            </a:fld>
+            <a:endParaRPr lang="en-US" altLang="nl-NL"/>
+          </a:p>
+        </p:txBody>
+      </p:sp>
+    </p:spTree>
+    <p:extLst>
+      <p:ext uri="{BB962C8B-B14F-4D97-AF65-F5344CB8AC3E}">
+        <p14:creationId xmlns:p14="http://schemas.microsoft.com/office/powerpoint/2010/main" val="2143493320"/>
+      </p:ext>
+    </p:extLst>
+  </p:cSld>
+  <p:clrMapOvr>
+    <a:masterClrMapping/>
+  </p:clrMapOvr>
+</p:notes>
+</file>
+
+<file path=ppt/notesSlides/notesSlide14.xml><?xml version="1.0" encoding="utf-8"?>
+<p:notes xmlns:a="http://schemas.openxmlformats.org/drawingml/2006/main" xmlns:r="http://schemas.openxmlformats.org/officeDocument/2006/relationships" xmlns:p="http://schemas.openxmlformats.org/presentationml/2006/main">
+  <p:cSld>
+    <p:spTree>
+      <p:nvGrpSpPr>
+        <p:cNvPr id="1" name=""/>
+        <p:cNvGrpSpPr/>
+        <p:nvPr/>
+      </p:nvGrpSpPr>
+      <p:grpSpPr>
+        <a:xfrm>
+          <a:off x="0" y="0"/>
+          <a:ext cx="0" cy="0"/>
+          <a:chOff x="0" y="0"/>
+          <a:chExt cx="0" cy="0"/>
+        </a:xfrm>
+      </p:grpSpPr>
+      <p:sp>
+        <p:nvSpPr>
+          <p:cNvPr id="2" name="Segnaposto immagine diapositiva 1"/>
+          <p:cNvSpPr>
+            <a:spLocks noGrp="1" noRot="1" noChangeAspect="1"/>
+          </p:cNvSpPr>
+          <p:nvPr>
+            <p:ph type="sldImg"/>
+          </p:nvPr>
+        </p:nvSpPr>
+        <p:spPr/>
+      </p:sp>
+      <p:sp>
+        <p:nvSpPr>
+          <p:cNvPr id="3" name="Segnaposto note 2"/>
+          <p:cNvSpPr>
+            <a:spLocks noGrp="1"/>
+          </p:cNvSpPr>
+          <p:nvPr>
+            <p:ph type="body" idx="1"/>
+          </p:nvPr>
+        </p:nvSpPr>
+        <p:spPr/>
+        <p:txBody>
+          <a:bodyPr/>
+          <a:lstStyle/>
+          <a:p>
+            <a:endParaRPr lang="it-IT" dirty="0"/>
+          </a:p>
+        </p:txBody>
+      </p:sp>
+      <p:sp>
+        <p:nvSpPr>
+          <p:cNvPr id="4" name="Segnaposto intestazione 3"/>
+          <p:cNvSpPr>
+            <a:spLocks noGrp="1"/>
+          </p:cNvSpPr>
+          <p:nvPr>
+            <p:ph type="hdr" sz="quarter" idx="10"/>
+          </p:nvPr>
+        </p:nvSpPr>
+        <p:spPr/>
+        <p:txBody>
+          <a:bodyPr/>
+          <a:lstStyle/>
+          <a:p>
+            <a:r>
+              <a:rPr lang="en-US" altLang="nl-NL" smtClean="0"/>
+              <a:t>Process synchronization</a:t>
+            </a:r>
+            <a:endParaRPr lang="en-US" altLang="nl-NL"/>
+          </a:p>
+        </p:txBody>
+      </p:sp>
+      <p:sp>
+        <p:nvSpPr>
+          <p:cNvPr id="5" name="Segnaposto data 4"/>
+          <p:cNvSpPr>
+            <a:spLocks noGrp="1"/>
+          </p:cNvSpPr>
+          <p:nvPr>
+            <p:ph type="dt" idx="11"/>
+          </p:nvPr>
+        </p:nvSpPr>
+        <p:spPr/>
+        <p:txBody>
+          <a:bodyPr/>
+          <a:lstStyle/>
+          <a:p>
+            <a:r>
+              <a:rPr lang="en-US" altLang="nl-NL" smtClean="0"/>
+              <a:t>Operating System</a:t>
+            </a:r>
+            <a:endParaRPr lang="en-US" altLang="nl-NL"/>
+          </a:p>
+        </p:txBody>
+      </p:sp>
+      <p:sp>
+        <p:nvSpPr>
+          <p:cNvPr id="6" name="Segnaposto piè di pagina 5"/>
+          <p:cNvSpPr>
+            <a:spLocks noGrp="1"/>
+          </p:cNvSpPr>
+          <p:nvPr>
+            <p:ph type="ftr" sz="quarter" idx="12"/>
+          </p:nvPr>
+        </p:nvSpPr>
+        <p:spPr/>
+        <p:txBody>
+          <a:bodyPr/>
+          <a:lstStyle/>
+          <a:p>
+            <a:r>
+              <a:rPr lang="en-US" altLang="nl-NL" smtClean="0"/>
+              <a:t>© 2005 William Fornaciari</a:t>
+            </a:r>
+            <a:endParaRPr lang="en-US" altLang="nl-NL"/>
+          </a:p>
+        </p:txBody>
+      </p:sp>
+      <p:sp>
+        <p:nvSpPr>
+          <p:cNvPr id="7" name="Segnaposto numero diapositiva 6"/>
+          <p:cNvSpPr>
+            <a:spLocks noGrp="1"/>
+          </p:cNvSpPr>
+          <p:nvPr>
+            <p:ph type="sldNum" sz="quarter" idx="13"/>
+          </p:nvPr>
+        </p:nvSpPr>
+        <p:spPr/>
+        <p:txBody>
+          <a:bodyPr/>
+          <a:lstStyle/>
+          <a:p>
+            <a:fld id="{88C0D9CF-78A8-4FBE-960E-41C6F5A4AF95}" type="slidenum">
+              <a:rPr lang="en-US" altLang="nl-NL" smtClean="0"/>
+              <a:pPr/>
+              <a:t>27</a:t>
             </a:fld>
             <a:endParaRPr lang="en-US" altLang="nl-NL"/>
           </a:p>
@@ -2989,7 +3144,7 @@
     </p:spTree>
     <p:extLst>
       <p:ext uri="{BB962C8B-B14F-4D97-AF65-F5344CB8AC3E}">
-        <p14:creationId xmlns:p14="http://schemas.microsoft.com/office/powerpoint/2010/main" val="94307398"/>
+        <p14:creationId xmlns:p14="http://schemas.microsoft.com/office/powerpoint/2010/main" val="3969629172"/>
       </p:ext>
     </p:extLst>
   </p:cSld>
@@ -3143,7 +3298,7 @@
     </p:spTree>
     <p:extLst>
       <p:ext uri="{BB962C8B-B14F-4D97-AF65-F5344CB8AC3E}">
-        <p14:creationId xmlns:p14="http://schemas.microsoft.com/office/powerpoint/2010/main" val="181271232"/>
+        <p14:creationId xmlns:p14="http://schemas.microsoft.com/office/powerpoint/2010/main" val="94307398"/>
       </p:ext>
     </p:extLst>
   </p:cSld>
@@ -3297,7 +3452,7 @@
     </p:spTree>
     <p:extLst>
       <p:ext uri="{BB962C8B-B14F-4D97-AF65-F5344CB8AC3E}">
-        <p14:creationId xmlns:p14="http://schemas.microsoft.com/office/powerpoint/2010/main" val="1597141723"/>
+        <p14:creationId xmlns:p14="http://schemas.microsoft.com/office/powerpoint/2010/main" val="181271232"/>
       </p:ext>
     </p:extLst>
   </p:cSld>
@@ -3451,7 +3606,7 @@
     </p:spTree>
     <p:extLst>
       <p:ext uri="{BB962C8B-B14F-4D97-AF65-F5344CB8AC3E}">
-        <p14:creationId xmlns:p14="http://schemas.microsoft.com/office/powerpoint/2010/main" val="733450907"/>
+        <p14:creationId xmlns:p14="http://schemas.microsoft.com/office/powerpoint/2010/main" val="1597141723"/>
       </p:ext>
     </p:extLst>
   </p:cSld>
@@ -3966,7 +4121,7 @@
             <a:fld id="{2A6090BC-14A4-4032-A8EA-D874EB653524}" type="slidenum">
               <a:rPr lang="en-US" altLang="nl-NL"/>
               <a:pPr/>
-              <a:t>‹n.›</a:t>
+              <a:t>‹N›</a:t>
             </a:fld>
             <a:endParaRPr lang="en-US" altLang="nl-NL"/>
           </a:p>
@@ -4114,7 +4269,7 @@
             <a:fld id="{BA594880-8A78-40E1-8D62-51F97D4059C0}" type="slidenum">
               <a:rPr lang="en-US" altLang="nl-NL"/>
               <a:pPr/>
-              <a:t>‹n.›</a:t>
+              <a:t>‹N›</a:t>
             </a:fld>
             <a:endParaRPr lang="en-US" altLang="nl-NL"/>
           </a:p>
@@ -4299,7 +4454,7 @@
             <a:fld id="{C503DA3A-0C6B-48FC-931E-2C786AAFD5C1}" type="slidenum">
               <a:rPr lang="en-US" altLang="nl-NL"/>
               <a:pPr/>
-              <a:t>‹n.›</a:t>
+              <a:t>‹N›</a:t>
             </a:fld>
             <a:endParaRPr lang="en-US" altLang="nl-NL"/>
           </a:p>
@@ -4489,7 +4644,7 @@
             <a:fld id="{22038E9A-44DA-4A7D-8119-4DEABABB9975}" type="slidenum">
               <a:rPr lang="en-US" altLang="nl-NL"/>
               <a:pPr/>
-              <a:t>‹n.›</a:t>
+              <a:t>‹N›</a:t>
             </a:fld>
             <a:endParaRPr lang="en-US" altLang="nl-NL"/>
           </a:p>
@@ -4745,7 +4900,7 @@
             <a:fld id="{003F0B5A-3573-418F-94B3-BD5F75DB60BD}" type="slidenum">
               <a:rPr lang="en-US" altLang="nl-NL"/>
               <a:pPr/>
-              <a:t>‹n.›</a:t>
+              <a:t>‹N›</a:t>
             </a:fld>
             <a:endParaRPr lang="en-US" altLang="nl-NL"/>
           </a:p>
@@ -5140,7 +5295,7 @@
             <a:fld id="{42D42EED-7338-48C6-AA31-2E9FCA4532B1}" type="slidenum">
               <a:rPr lang="en-US" altLang="nl-NL"/>
               <a:pPr/>
-              <a:t>‹n.›</a:t>
+              <a:t>‹N›</a:t>
             </a:fld>
             <a:endParaRPr lang="en-US" altLang="nl-NL"/>
           </a:p>
@@ -5226,7 +5381,7 @@
             <a:fld id="{BBD7032E-400A-4C6B-9075-7A7CB7960EE8}" type="slidenum">
               <a:rPr lang="en-US" altLang="nl-NL"/>
               <a:pPr/>
-              <a:t>‹n.›</a:t>
+              <a:t>‹N›</a:t>
             </a:fld>
             <a:endParaRPr lang="en-US" altLang="nl-NL"/>
           </a:p>
@@ -5289,7 +5444,7 @@
             <a:fld id="{ED3AC776-BC4C-444F-A902-0153286FE118}" type="slidenum">
               <a:rPr lang="en-US" altLang="nl-NL"/>
               <a:pPr/>
-              <a:t>‹n.›</a:t>
+              <a:t>‹N›</a:t>
             </a:fld>
             <a:endParaRPr lang="en-US" altLang="nl-NL"/>
           </a:p>
@@ -5534,7 +5689,7 @@
             <a:fld id="{E5F65DD3-3E3C-40FA-A044-BE029E819A96}" type="slidenum">
               <a:rPr lang="en-US" altLang="nl-NL"/>
               <a:pPr/>
-              <a:t>‹n.›</a:t>
+              <a:t>‹N›</a:t>
             </a:fld>
             <a:endParaRPr lang="en-US" altLang="nl-NL"/>
           </a:p>
@@ -5760,7 +5915,7 @@
             <a:fld id="{D32360F0-7900-4280-B4D3-DB562730877F}" type="slidenum">
               <a:rPr lang="en-US" altLang="nl-NL"/>
               <a:pPr/>
-              <a:t>‹n.›</a:t>
+              <a:t>‹N›</a:t>
             </a:fld>
             <a:endParaRPr lang="en-US" altLang="nl-NL"/>
           </a:p>
@@ -6104,7 +6259,7 @@
             <a:fld id="{D11F1AE1-4445-46D7-BD14-4F1456A53146}" type="slidenum">
               <a:rPr lang="en-US" altLang="nl-NL"/>
               <a:pPr/>
-              <a:t>‹n.›</a:t>
+              <a:t>‹N›</a:t>
             </a:fld>
             <a:endParaRPr lang="en-US" altLang="nl-NL"/>
           </a:p>
@@ -10071,7 +10226,7 @@
     </p:spTree>
     <p:extLst>
       <p:ext uri="{BB962C8B-B14F-4D97-AF65-F5344CB8AC3E}">
-        <p14:creationId xmlns:p14="http://schemas.microsoft.com/office/powerpoint/2010/main" val="772970072"/>
+        <p14:creationId xmlns:p14="http://schemas.microsoft.com/office/powerpoint/2010/main" val="3931982814"/>
       </p:ext>
     </p:extLst>
   </p:cSld>
@@ -10182,30 +10337,26 @@
           <a:p>
             <a:pPr lvl="1"/>
             <a:r>
-              <a:rPr lang="it-IT" sz="2000" b="1" dirty="0" smtClean="0"/>
+              <a:rPr lang="it-IT" sz="2000" dirty="0" smtClean="0"/>
               <a:t>Campionamento </a:t>
             </a:r>
             <a:br>
-              <a:rPr lang="it-IT" sz="2000" b="1" dirty="0" smtClean="0"/>
+              <a:rPr lang="it-IT" sz="2000" dirty="0" smtClean="0"/>
             </a:br>
             <a:r>
-              <a:rPr lang="it-IT" sz="2000" b="1" dirty="0" smtClean="0"/>
+              <a:rPr lang="it-IT" sz="2000" dirty="0" smtClean="0"/>
               <a:t>del segnale interferometrico </a:t>
             </a:r>
             <a:br>
-              <a:rPr lang="it-IT" sz="2000" b="1" dirty="0" smtClean="0"/>
+              <a:rPr lang="it-IT" sz="2000" dirty="0" smtClean="0"/>
             </a:br>
             <a:r>
-              <a:rPr lang="it-IT" sz="2000" b="1" dirty="0" smtClean="0"/>
+              <a:rPr lang="it-IT" sz="2000" dirty="0" smtClean="0"/>
               <a:t>a </a:t>
             </a:r>
             <a:r>
-              <a:rPr lang="it-IT" sz="2000" b="1" i="1" dirty="0" smtClean="0"/>
+              <a:rPr lang="it-IT" sz="2000" i="1" dirty="0" smtClean="0"/>
               <a:t>30MHz</a:t>
-            </a:r>
-            <a:r>
-              <a:rPr lang="it-IT" sz="2000" i="1" dirty="0" smtClean="0"/>
-              <a:t/>
             </a:r>
             <a:br>
               <a:rPr lang="it-IT" sz="2000" i="1" dirty="0" smtClean="0"/>
@@ -10284,6 +10435,257 @@
               <a:rPr lang="en-US" altLang="nl-NL" smtClean="0"/>
               <a:pPr/>
               <a:t>16</a:t>
+            </a:fld>
+            <a:endParaRPr lang="en-US" altLang="nl-NL" dirty="0"/>
+          </a:p>
+        </p:txBody>
+      </p:sp>
+      <p:pic>
+        <p:nvPicPr>
+          <p:cNvPr id="8" name="Immagine 7"/>
+          <p:cNvPicPr>
+            <a:picLocks noChangeAspect="1"/>
+          </p:cNvPicPr>
+          <p:nvPr/>
+        </p:nvPicPr>
+        <p:blipFill>
+          <a:blip r:embed="rId3">
+            <a:extLst>
+              <a:ext uri="{28A0092B-C50C-407E-A947-70E740481C1C}">
+                <a14:useLocalDpi xmlns:a14="http://schemas.microsoft.com/office/drawing/2010/main" val="0"/>
+              </a:ext>
+            </a:extLst>
+          </a:blip>
+          <a:stretch>
+            <a:fillRect/>
+          </a:stretch>
+        </p:blipFill>
+        <p:spPr>
+          <a:xfrm>
+            <a:off x="5020733" y="1494075"/>
+            <a:ext cx="3935109" cy="4623521"/>
+          </a:xfrm>
+          <a:prstGeom prst="rect">
+            <a:avLst/>
+          </a:prstGeom>
+        </p:spPr>
+      </p:pic>
+    </p:spTree>
+    <p:extLst>
+      <p:ext uri="{BB962C8B-B14F-4D97-AF65-F5344CB8AC3E}">
+        <p14:creationId xmlns:p14="http://schemas.microsoft.com/office/powerpoint/2010/main" val="772970072"/>
+      </p:ext>
+    </p:extLst>
+  </p:cSld>
+  <p:clrMapOvr>
+    <a:masterClrMapping/>
+  </p:clrMapOvr>
+  <p:timing>
+    <p:tnLst>
+      <p:par>
+        <p:cTn id="1" dur="indefinite" restart="never" nodeType="tmRoot"/>
+      </p:par>
+    </p:tnLst>
+  </p:timing>
+</p:sld>
+</file>
+
+<file path=ppt/slides/slide17.xml><?xml version="1.0" encoding="utf-8"?>
+<p:sld xmlns:a="http://schemas.openxmlformats.org/drawingml/2006/main" xmlns:r="http://schemas.openxmlformats.org/officeDocument/2006/relationships" xmlns:p="http://schemas.openxmlformats.org/presentationml/2006/main">
+  <p:cSld>
+    <p:spTree>
+      <p:nvGrpSpPr>
+        <p:cNvPr id="1" name=""/>
+        <p:cNvGrpSpPr/>
+        <p:nvPr/>
+      </p:nvGrpSpPr>
+      <p:grpSpPr>
+        <a:xfrm>
+          <a:off x="0" y="0"/>
+          <a:ext cx="0" cy="0"/>
+          <a:chOff x="0" y="0"/>
+          <a:chExt cx="0" cy="0"/>
+        </a:xfrm>
+      </p:grpSpPr>
+      <p:sp>
+        <p:nvSpPr>
+          <p:cNvPr id="2" name="Titolo 1"/>
+          <p:cNvSpPr>
+            <a:spLocks noGrp="1"/>
+          </p:cNvSpPr>
+          <p:nvPr>
+            <p:ph type="title"/>
+          </p:nvPr>
+        </p:nvSpPr>
+        <p:spPr/>
+        <p:txBody>
+          <a:bodyPr/>
+          <a:lstStyle/>
+          <a:p>
+            <a:r>
+              <a:rPr lang="it-IT" dirty="0" smtClean="0"/>
+              <a:t>FPGA</a:t>
+            </a:r>
+            <a:endParaRPr lang="it-IT" dirty="0"/>
+          </a:p>
+        </p:txBody>
+      </p:sp>
+      <p:sp>
+        <p:nvSpPr>
+          <p:cNvPr id="3" name="Segnaposto contenuto 2"/>
+          <p:cNvSpPr>
+            <a:spLocks noGrp="1"/>
+          </p:cNvSpPr>
+          <p:nvPr>
+            <p:ph idx="1"/>
+          </p:nvPr>
+        </p:nvSpPr>
+        <p:spPr>
+          <a:xfrm>
+            <a:off x="609600" y="1024102"/>
+            <a:ext cx="8120063" cy="5093494"/>
+          </a:xfrm>
+        </p:spPr>
+        <p:txBody>
+          <a:bodyPr/>
+          <a:lstStyle/>
+          <a:p>
+            <a:r>
+              <a:rPr lang="it-IT" sz="2400" dirty="0" smtClean="0"/>
+              <a:t>Le funzionalità svolte in hardware dal FPGA sono:</a:t>
+            </a:r>
+            <a:br>
+              <a:rPr lang="it-IT" sz="2400" dirty="0" smtClean="0"/>
+            </a:br>
+            <a:endParaRPr lang="it-IT" sz="2400" dirty="0" smtClean="0"/>
+          </a:p>
+          <a:p>
+            <a:pPr lvl="1"/>
+            <a:r>
+              <a:rPr lang="it-IT" sz="2000" dirty="0" smtClean="0"/>
+              <a:t>Generazione del </a:t>
+            </a:r>
+            <a:br>
+              <a:rPr lang="it-IT" sz="2000" dirty="0" smtClean="0"/>
+            </a:br>
+            <a:r>
+              <a:rPr lang="it-IT" sz="2000" dirty="0" smtClean="0"/>
+              <a:t>segnale di modulazione </a:t>
+            </a:r>
+            <a:r>
+              <a:rPr lang="it-IT" sz="2000" i="1" dirty="0" smtClean="0"/>
+              <a:t/>
+            </a:r>
+            <a:br>
+              <a:rPr lang="it-IT" sz="2000" i="1" dirty="0" smtClean="0"/>
+            </a:br>
+            <a:endParaRPr lang="it-IT" sz="2000" i="1" dirty="0" smtClean="0"/>
+          </a:p>
+          <a:p>
+            <a:pPr lvl="1"/>
+            <a:r>
+              <a:rPr lang="it-IT" sz="2000" b="1" dirty="0" smtClean="0"/>
+              <a:t>Campionamento </a:t>
+            </a:r>
+            <a:br>
+              <a:rPr lang="it-IT" sz="2000" b="1" dirty="0" smtClean="0"/>
+            </a:br>
+            <a:r>
+              <a:rPr lang="it-IT" sz="2000" b="1" dirty="0" smtClean="0"/>
+              <a:t>del segnale interferometrico </a:t>
+            </a:r>
+            <a:br>
+              <a:rPr lang="it-IT" sz="2000" b="1" dirty="0" smtClean="0"/>
+            </a:br>
+            <a:r>
+              <a:rPr lang="it-IT" sz="2000" b="1" dirty="0" smtClean="0"/>
+              <a:t>a </a:t>
+            </a:r>
+            <a:r>
+              <a:rPr lang="it-IT" sz="2000" b="1" i="1" dirty="0" smtClean="0"/>
+              <a:t>30MHz</a:t>
+            </a:r>
+            <a:r>
+              <a:rPr lang="it-IT" sz="2000" i="1" dirty="0" smtClean="0"/>
+              <a:t/>
+            </a:r>
+            <a:br>
+              <a:rPr lang="it-IT" sz="2000" i="1" dirty="0" smtClean="0"/>
+            </a:br>
+            <a:endParaRPr lang="it-IT" sz="2000" i="1" dirty="0" smtClean="0"/>
+          </a:p>
+          <a:p>
+            <a:pPr lvl="1"/>
+            <a:r>
+              <a:rPr lang="it-IT" sz="2000" dirty="0" smtClean="0"/>
+              <a:t>Calcolo </a:t>
+            </a:r>
+            <a:br>
+              <a:rPr lang="it-IT" sz="2000" dirty="0" smtClean="0"/>
+            </a:br>
+            <a:r>
+              <a:rPr lang="it-IT" sz="2000" dirty="0" smtClean="0"/>
+              <a:t>della Fast Fourier </a:t>
+            </a:r>
+            <a:r>
+              <a:rPr lang="it-IT" sz="2000" dirty="0" err="1" smtClean="0"/>
+              <a:t>Transform</a:t>
+            </a:r>
+            <a:r>
+              <a:rPr lang="it-IT" sz="2000" dirty="0" smtClean="0"/>
+              <a:t> </a:t>
+            </a:r>
+            <a:r>
+              <a:rPr lang="it-IT" sz="2000" b="1" dirty="0" smtClean="0"/>
+              <a:t/>
+            </a:r>
+            <a:br>
+              <a:rPr lang="it-IT" sz="2000" b="1" dirty="0" smtClean="0"/>
+            </a:br>
+            <a:r>
+              <a:rPr lang="it-IT" sz="2000" dirty="0" smtClean="0"/>
+              <a:t>(FFT)</a:t>
+            </a:r>
+            <a:br>
+              <a:rPr lang="it-IT" sz="2000" dirty="0" smtClean="0"/>
+            </a:br>
+            <a:endParaRPr lang="it-IT" sz="2000" dirty="0" smtClean="0"/>
+          </a:p>
+          <a:p>
+            <a:pPr lvl="1"/>
+            <a:r>
+              <a:rPr lang="it-IT" sz="2000" dirty="0" smtClean="0"/>
+              <a:t>Estrazione </a:t>
+            </a:r>
+            <a:br>
+              <a:rPr lang="it-IT" sz="2000" dirty="0" smtClean="0"/>
+            </a:br>
+            <a:r>
+              <a:rPr lang="it-IT" sz="2000" dirty="0" smtClean="0"/>
+              <a:t>del tono fondamentale dal FFT</a:t>
+            </a:r>
+          </a:p>
+        </p:txBody>
+      </p:sp>
+      <p:sp>
+        <p:nvSpPr>
+          <p:cNvPr id="4" name="Segnaposto numero diapositiva 3"/>
+          <p:cNvSpPr>
+            <a:spLocks noGrp="1"/>
+          </p:cNvSpPr>
+          <p:nvPr>
+            <p:ph type="sldNum" sz="quarter" idx="11"/>
+          </p:nvPr>
+        </p:nvSpPr>
+        <p:spPr/>
+        <p:txBody>
+          <a:bodyPr/>
+          <a:lstStyle/>
+          <a:p>
+            <a:fld id="{C503DA3A-0C6B-48FC-931E-2C786AAFD5C1}" type="slidenum">
+              <a:rPr lang="en-US" altLang="nl-NL" smtClean="0"/>
+              <a:pPr/>
+              <a:t>17</a:t>
             </a:fld>
             <a:endParaRPr lang="en-US" altLang="nl-NL" dirty="0"/>
           </a:p>
@@ -10339,7 +10741,7 @@
 </p:sld>
 </file>
 
-<file path=ppt/slides/slide17.xml><?xml version="1.0" encoding="utf-8"?>
+<file path=ppt/slides/slide18.xml><?xml version="1.0" encoding="utf-8"?>
 <p:sld xmlns:a="http://schemas.openxmlformats.org/drawingml/2006/main" xmlns:r="http://schemas.openxmlformats.org/officeDocument/2006/relationships" xmlns:p="http://schemas.openxmlformats.org/presentationml/2006/main">
   <p:cSld>
     <p:spTree>
@@ -10530,7 +10932,7 @@
             <a:fld id="{C503DA3A-0C6B-48FC-931E-2C786AAFD5C1}" type="slidenum">
               <a:rPr lang="en-US" altLang="nl-NL" smtClean="0"/>
               <a:pPr/>
-              <a:t>17</a:t>
+              <a:t>18</a:t>
             </a:fld>
             <a:endParaRPr lang="en-US" altLang="nl-NL" dirty="0"/>
           </a:p>
@@ -10586,7 +10988,7 @@
 </p:sld>
 </file>
 
-<file path=ppt/slides/slide18.xml><?xml version="1.0" encoding="utf-8"?>
+<file path=ppt/slides/slide19.xml><?xml version="1.0" encoding="utf-8"?>
 <p:sld xmlns:a="http://schemas.openxmlformats.org/drawingml/2006/main" xmlns:r="http://schemas.openxmlformats.org/officeDocument/2006/relationships" xmlns:p="http://schemas.openxmlformats.org/presentationml/2006/main">
   <p:cSld>
     <p:spTree>
@@ -10777,7 +11179,7 @@
             <a:fld id="{C503DA3A-0C6B-48FC-931E-2C786AAFD5C1}" type="slidenum">
               <a:rPr lang="en-US" altLang="nl-NL" smtClean="0"/>
               <a:pPr/>
-              <a:t>18</a:t>
+              <a:t>19</a:t>
             </a:fld>
             <a:endParaRPr lang="en-US" altLang="nl-NL" dirty="0"/>
           </a:p>
@@ -10880,7 +11282,226 @@
 </p:sld>
 </file>
 
-<file path=ppt/slides/slide19.xml><?xml version="1.0" encoding="utf-8"?>
+<file path=ppt/slides/slide2.xml><?xml version="1.0" encoding="utf-8"?>
+<p:sld xmlns:a="http://schemas.openxmlformats.org/drawingml/2006/main" xmlns:r="http://schemas.openxmlformats.org/officeDocument/2006/relationships" xmlns:p="http://schemas.openxmlformats.org/presentationml/2006/main">
+  <p:cSld>
+    <p:spTree>
+      <p:nvGrpSpPr>
+        <p:cNvPr id="1" name=""/>
+        <p:cNvGrpSpPr/>
+        <p:nvPr/>
+      </p:nvGrpSpPr>
+      <p:grpSpPr>
+        <a:xfrm>
+          <a:off x="0" y="0"/>
+          <a:ext cx="0" cy="0"/>
+          <a:chOff x="0" y="0"/>
+          <a:chExt cx="0" cy="0"/>
+        </a:xfrm>
+      </p:grpSpPr>
+      <p:sp>
+        <p:nvSpPr>
+          <p:cNvPr id="2" name="Titolo 1"/>
+          <p:cNvSpPr>
+            <a:spLocks noGrp="1"/>
+          </p:cNvSpPr>
+          <p:nvPr>
+            <p:ph type="title"/>
+          </p:nvPr>
+        </p:nvSpPr>
+        <p:spPr/>
+        <p:txBody>
+          <a:bodyPr/>
+          <a:lstStyle/>
+          <a:p>
+            <a:r>
+              <a:rPr lang="it-IT" dirty="0" smtClean="0"/>
+              <a:t>Indice</a:t>
+            </a:r>
+            <a:endParaRPr lang="it-IT" dirty="0"/>
+          </a:p>
+        </p:txBody>
+      </p:sp>
+      <p:sp>
+        <p:nvSpPr>
+          <p:cNvPr id="3" name="Segnaposto contenuto 2"/>
+          <p:cNvSpPr>
+            <a:spLocks noGrp="1"/>
+          </p:cNvSpPr>
+          <p:nvPr>
+            <p:ph idx="1"/>
+          </p:nvPr>
+        </p:nvSpPr>
+        <p:spPr>
+          <a:xfrm>
+            <a:off x="609600" y="891778"/>
+            <a:ext cx="7784892" cy="5531644"/>
+          </a:xfrm>
+        </p:spPr>
+        <p:txBody>
+          <a:bodyPr/>
+          <a:lstStyle/>
+          <a:p>
+            <a:r>
+              <a:rPr lang="it-IT" sz="2400" dirty="0"/>
+              <a:t>Interferometria</a:t>
+            </a:r>
+          </a:p>
+          <a:p>
+            <a:pPr lvl="1"/>
+            <a:r>
+              <a:rPr lang="it-IT" sz="2000" dirty="0"/>
+              <a:t>Interferometria a self-mixing</a:t>
+            </a:r>
+          </a:p>
+          <a:p>
+            <a:pPr lvl="1"/>
+            <a:r>
+              <a:rPr lang="it-IT" sz="2000" dirty="0"/>
+              <a:t>Misura della distanza</a:t>
+            </a:r>
+          </a:p>
+          <a:p>
+            <a:r>
+              <a:rPr lang="it-IT" sz="2400" dirty="0"/>
+              <a:t>Architettura hardware</a:t>
+            </a:r>
+          </a:p>
+          <a:p>
+            <a:pPr lvl="1"/>
+            <a:r>
+              <a:rPr lang="it-IT" sz="2000" dirty="0" smtClean="0"/>
+              <a:t>Sistema analogico</a:t>
+            </a:r>
+          </a:p>
+          <a:p>
+            <a:pPr lvl="1"/>
+            <a:r>
+              <a:rPr lang="it-IT" sz="2000" dirty="0"/>
+              <a:t>Sistema di </a:t>
+            </a:r>
+            <a:r>
+              <a:rPr lang="it-IT" sz="2000" dirty="0" smtClean="0"/>
+              <a:t>conversione</a:t>
+            </a:r>
+            <a:endParaRPr lang="it-IT" sz="2000" dirty="0"/>
+          </a:p>
+          <a:p>
+            <a:pPr lvl="1"/>
+            <a:r>
+              <a:rPr lang="it-IT" sz="2000" dirty="0" smtClean="0"/>
+              <a:t>Sistema digitale</a:t>
+            </a:r>
+            <a:endParaRPr lang="it-IT" sz="2000" dirty="0"/>
+          </a:p>
+          <a:p>
+            <a:r>
+              <a:rPr lang="it-IT" sz="2400" dirty="0" smtClean="0"/>
+              <a:t>Architettura </a:t>
+            </a:r>
+            <a:r>
+              <a:rPr lang="it-IT" sz="2400" dirty="0"/>
+              <a:t>software</a:t>
+            </a:r>
+          </a:p>
+          <a:p>
+            <a:pPr lvl="1"/>
+            <a:r>
+              <a:rPr lang="it-IT" sz="2000" dirty="0"/>
+              <a:t>Dettagli </a:t>
+            </a:r>
+            <a:r>
+              <a:rPr lang="it-IT" sz="2000" dirty="0" smtClean="0"/>
+              <a:t>implementativi</a:t>
+            </a:r>
+          </a:p>
+          <a:p>
+            <a:pPr lvl="1"/>
+            <a:r>
+              <a:rPr lang="it-IT" sz="2000" dirty="0" smtClean="0"/>
+              <a:t>FPGA</a:t>
+            </a:r>
+            <a:endParaRPr lang="it-IT" sz="2000" dirty="0"/>
+          </a:p>
+          <a:p>
+            <a:pPr lvl="1"/>
+            <a:r>
+              <a:rPr lang="it-IT" sz="2000" dirty="0" smtClean="0"/>
+              <a:t>Microcontrollore</a:t>
+            </a:r>
+          </a:p>
+          <a:p>
+            <a:pPr lvl="1"/>
+            <a:r>
+              <a:rPr lang="it-IT" sz="2000" dirty="0" smtClean="0"/>
+              <a:t>Ottimizzazioni</a:t>
+            </a:r>
+            <a:endParaRPr lang="it-IT" sz="2000" dirty="0"/>
+          </a:p>
+          <a:p>
+            <a:r>
+              <a:rPr lang="it-IT" sz="2400" dirty="0"/>
+              <a:t>Risultati </a:t>
+            </a:r>
+            <a:r>
+              <a:rPr lang="it-IT" sz="2400" dirty="0" smtClean="0"/>
+              <a:t>sperimentali</a:t>
+            </a:r>
+            <a:endParaRPr lang="it-IT" sz="2400" dirty="0"/>
+          </a:p>
+          <a:p>
+            <a:r>
+              <a:rPr lang="it-IT" sz="2400" dirty="0"/>
+              <a:t>Conclusioni e sviluppi futuri</a:t>
+            </a:r>
+          </a:p>
+        </p:txBody>
+      </p:sp>
+      <p:sp>
+        <p:nvSpPr>
+          <p:cNvPr id="4" name="Segnaposto numero diapositiva 3"/>
+          <p:cNvSpPr>
+            <a:spLocks noGrp="1"/>
+          </p:cNvSpPr>
+          <p:nvPr>
+            <p:ph type="sldNum" sz="quarter" idx="11"/>
+          </p:nvPr>
+        </p:nvSpPr>
+        <p:spPr/>
+        <p:txBody>
+          <a:bodyPr/>
+          <a:lstStyle/>
+          <a:p>
+            <a:fld id="{C503DA3A-0C6B-48FC-931E-2C786AAFD5C1}" type="slidenum">
+              <a:rPr lang="en-US" altLang="nl-NL" smtClean="0"/>
+              <a:pPr/>
+              <a:t>2</a:t>
+            </a:fld>
+            <a:endParaRPr lang="en-US" altLang="nl-NL"/>
+          </a:p>
+        </p:txBody>
+      </p:sp>
+    </p:spTree>
+    <p:extLst>
+      <p:ext uri="{BB962C8B-B14F-4D97-AF65-F5344CB8AC3E}">
+        <p14:creationId xmlns:p14="http://schemas.microsoft.com/office/powerpoint/2010/main" val="3953617699"/>
+      </p:ext>
+    </p:extLst>
+  </p:cSld>
+  <p:clrMapOvr>
+    <a:masterClrMapping/>
+  </p:clrMapOvr>
+  <p:timing>
+    <p:tnLst>
+      <p:par>
+        <p:cTn id="1" dur="indefinite" restart="never" nodeType="tmRoot"/>
+      </p:par>
+    </p:tnLst>
+  </p:timing>
+</p:sld>
+</file>
+
+<file path=ppt/slides/slide20.xml><?xml version="1.0" encoding="utf-8"?>
 <p:sld xmlns:a="http://schemas.openxmlformats.org/drawingml/2006/main" xmlns:r="http://schemas.openxmlformats.org/officeDocument/2006/relationships" xmlns:p="http://schemas.openxmlformats.org/presentationml/2006/main">
   <p:cSld>
     <p:spTree>
@@ -11024,7 +11645,13 @@
                       <a:rPr lang="it-IT" sz="1600" b="0" i="1" dirty="0" smtClean="0">
                         <a:latin typeface="Cambria Math" charset="0"/>
                       </a:rPr>
-                      <m:t>+1</m:t>
+                      <m:t>+</m:t>
+                    </m:r>
+                    <m:r>
+                      <a:rPr lang="it-IT" sz="1600" b="0" i="1" dirty="0" smtClean="0">
+                        <a:latin typeface="Cambria Math" charset="0"/>
+                      </a:rPr>
+                      <m:t>1</m:t>
                     </m:r>
                   </m:oMath>
                 </a14:m>
@@ -11047,7 +11674,7 @@
                         <m:endChr m:val="|"/>
                         <m:ctrlPr>
                           <a:rPr lang="it-IT" sz="1600" i="1">
-                            <a:latin typeface="Cambria Math" charset="0"/>
+                            <a:latin typeface="Cambria Math" panose="02040503050406030204" pitchFamily="18" charset="0"/>
                           </a:rPr>
                         </m:ctrlPr>
                       </m:dPr>
@@ -11056,7 +11683,7 @@
                           <m:sSubPr>
                             <m:ctrlPr>
                               <a:rPr lang="it-IT" sz="1600" i="1">
-                                <a:latin typeface="Cambria Math" charset="0"/>
+                                <a:latin typeface="Cambria Math" panose="02040503050406030204" pitchFamily="18" charset="0"/>
                               </a:rPr>
                             </m:ctrlPr>
                           </m:sSubPr>
@@ -11103,7 +11730,7 @@
                         <m:endChr m:val="|"/>
                         <m:ctrlPr>
                           <a:rPr lang="it-IT" sz="1600" i="1">
-                            <a:latin typeface="Cambria Math" charset="0"/>
+                            <a:latin typeface="Cambria Math" panose="02040503050406030204" pitchFamily="18" charset="0"/>
                           </a:rPr>
                         </m:ctrlPr>
                       </m:dPr>
@@ -11112,7 +11739,7 @@
                           <m:sSubPr>
                             <m:ctrlPr>
                               <a:rPr lang="it-IT" sz="1600" i="1">
-                                <a:latin typeface="Cambria Math" charset="0"/>
+                                <a:latin typeface="Cambria Math" panose="02040503050406030204" pitchFamily="18" charset="0"/>
                               </a:rPr>
                             </m:ctrlPr>
                           </m:sSubPr>
@@ -11135,7 +11762,13 @@
                               <a:rPr lang="it-IT" sz="1600" b="0" i="1" smtClean="0">
                                 <a:latin typeface="Cambria Math" charset="0"/>
                               </a:rPr>
-                              <m:t>+1</m:t>
+                              <m:t>+</m:t>
+                            </m:r>
+                            <m:r>
+                              <a:rPr lang="it-IT" sz="1600" b="0" i="1" smtClean="0">
+                                <a:latin typeface="Cambria Math" charset="0"/>
+                              </a:rPr>
+                              <m:t>1</m:t>
                             </m:r>
                           </m:sub>
                         </m:sSub>
@@ -11201,7 +11834,7 @@
                       <m:fPr>
                         <m:ctrlPr>
                           <a:rPr lang="it-IT" sz="1600" b="0" i="1" smtClean="0">
-                            <a:latin typeface="Cambria Math" charset="0"/>
+                            <a:latin typeface="Cambria Math" panose="02040503050406030204" pitchFamily="18" charset="0"/>
                           </a:rPr>
                         </m:ctrlPr>
                       </m:fPr>
@@ -11218,7 +11851,7 @@
                             <m:endChr m:val="|"/>
                             <m:ctrlPr>
                               <a:rPr lang="it-IT" sz="1600" b="0" i="1" smtClean="0">
-                                <a:latin typeface="Cambria Math" charset="0"/>
+                                <a:latin typeface="Cambria Math" panose="02040503050406030204" pitchFamily="18" charset="0"/>
                               </a:rPr>
                             </m:ctrlPr>
                           </m:dPr>
@@ -11227,7 +11860,7 @@
                               <m:sSubPr>
                                 <m:ctrlPr>
                                   <a:rPr lang="it-IT" sz="1600" b="0" i="1" smtClean="0">
-                                    <a:latin typeface="Cambria Math" charset="0"/>
+                                    <a:latin typeface="Cambria Math" panose="02040503050406030204" pitchFamily="18" charset="0"/>
                                   </a:rPr>
                                 </m:ctrlPr>
                               </m:sSubPr>
@@ -11250,7 +11883,13 @@
                                   <a:rPr lang="it-IT" sz="1600" b="0" i="1" smtClean="0">
                                     <a:latin typeface="Cambria Math" charset="0"/>
                                   </a:rPr>
-                                  <m:t>+1</m:t>
+                                  <m:t>+</m:t>
+                                </m:r>
+                                <m:r>
+                                  <a:rPr lang="it-IT" sz="1600" b="0" i="1" smtClean="0">
+                                    <a:latin typeface="Cambria Math" charset="0"/>
+                                  </a:rPr>
+                                  <m:t>1</m:t>
                                 </m:r>
                               </m:sub>
                             </m:sSub>
@@ -11268,7 +11907,7 @@
                             <m:endChr m:val="|"/>
                             <m:ctrlPr>
                               <a:rPr lang="it-IT" sz="1600" i="1">
-                                <a:latin typeface="Cambria Math" charset="0"/>
+                                <a:latin typeface="Cambria Math" panose="02040503050406030204" pitchFamily="18" charset="0"/>
                               </a:rPr>
                             </m:ctrlPr>
                           </m:dPr>
@@ -11277,7 +11916,7 @@
                               <m:sSubPr>
                                 <m:ctrlPr>
                                   <a:rPr lang="it-IT" sz="1600" i="1">
-                                    <a:latin typeface="Cambria Math" charset="0"/>
+                                    <a:latin typeface="Cambria Math" panose="02040503050406030204" pitchFamily="18" charset="0"/>
                                   </a:rPr>
                                 </m:ctrlPr>
                               </m:sSubPr>
@@ -11308,7 +11947,7 @@
                             <m:endChr m:val="|"/>
                             <m:ctrlPr>
                               <a:rPr lang="it-IT" sz="1600" i="1">
-                                <a:latin typeface="Cambria Math" charset="0"/>
+                                <a:latin typeface="Cambria Math" panose="02040503050406030204" pitchFamily="18" charset="0"/>
                               </a:rPr>
                             </m:ctrlPr>
                           </m:dPr>
@@ -11317,7 +11956,7 @@
                               <m:sSubPr>
                                 <m:ctrlPr>
                                   <a:rPr lang="it-IT" sz="1600" i="1">
-                                    <a:latin typeface="Cambria Math" charset="0"/>
+                                    <a:latin typeface="Cambria Math" panose="02040503050406030204" pitchFamily="18" charset="0"/>
                                   </a:rPr>
                                 </m:ctrlPr>
                               </m:sSubPr>
@@ -11340,7 +11979,13 @@
                                   <a:rPr lang="it-IT" sz="1600" i="1">
                                     <a:latin typeface="Cambria Math" charset="0"/>
                                   </a:rPr>
-                                  <m:t>+1</m:t>
+                                  <m:t>+</m:t>
+                                </m:r>
+                                <m:r>
+                                  <a:rPr lang="it-IT" sz="1600" i="1">
+                                    <a:latin typeface="Cambria Math" charset="0"/>
+                                  </a:rPr>
+                                  <m:t>1</m:t>
                                 </m:r>
                               </m:sub>
                             </m:sSub>
@@ -11358,7 +12003,7 @@
                             <m:endChr m:val="|"/>
                             <m:ctrlPr>
                               <a:rPr lang="it-IT" sz="1600" i="1">
-                                <a:latin typeface="Cambria Math" charset="0"/>
+                                <a:latin typeface="Cambria Math" panose="02040503050406030204" pitchFamily="18" charset="0"/>
                               </a:rPr>
                             </m:ctrlPr>
                           </m:dPr>
@@ -11367,7 +12012,7 @@
                               <m:sSubPr>
                                 <m:ctrlPr>
                                   <a:rPr lang="it-IT" sz="1600" i="1">
-                                    <a:latin typeface="Cambria Math" charset="0"/>
+                                    <a:latin typeface="Cambria Math" panose="02040503050406030204" pitchFamily="18" charset="0"/>
                                   </a:rPr>
                                 </m:ctrlPr>
                               </m:sSubPr>
@@ -11429,7 +12074,7 @@
                       <m:sSubPr>
                         <m:ctrlPr>
                           <a:rPr lang="it-IT" sz="1600" i="1" smtClean="0">
-                            <a:latin typeface="Cambria Math" charset="0"/>
+                            <a:latin typeface="Cambria Math" panose="02040503050406030204" pitchFamily="18" charset="0"/>
                           </a:rPr>
                         </m:ctrlPr>
                       </m:sSubPr>
@@ -11460,7 +12105,7 @@
                       <m:dPr>
                         <m:ctrlPr>
                           <a:rPr lang="it-IT" sz="1600" b="0" i="1" smtClean="0">
-                            <a:latin typeface="Cambria Math" charset="0"/>
+                            <a:latin typeface="Cambria Math" panose="02040503050406030204" pitchFamily="18" charset="0"/>
                           </a:rPr>
                         </m:ctrlPr>
                       </m:dPr>
@@ -11547,7 +12192,7 @@
                       <m:fPr>
                         <m:ctrlPr>
                           <a:rPr lang="it-IT" sz="1600" b="0" i="1" smtClean="0">
-                            <a:latin typeface="Cambria Math" charset="0"/>
+                            <a:latin typeface="Cambria Math" panose="02040503050406030204" pitchFamily="18" charset="0"/>
                           </a:rPr>
                         </m:ctrlPr>
                       </m:fPr>
@@ -11556,7 +12201,7 @@
                           <m:sSubPr>
                             <m:ctrlPr>
                               <a:rPr lang="it-IT" sz="1600" b="0" i="1" smtClean="0">
-                                <a:latin typeface="Cambria Math" charset="0"/>
+                                <a:latin typeface="Cambria Math" panose="02040503050406030204" pitchFamily="18" charset="0"/>
                               </a:rPr>
                             </m:ctrlPr>
                           </m:sSubPr>
@@ -11681,7 +12326,7 @@
             <a:fld id="{C503DA3A-0C6B-48FC-931E-2C786AAFD5C1}" type="slidenum">
               <a:rPr lang="en-US" altLang="nl-NL" smtClean="0"/>
               <a:pPr/>
-              <a:t>19</a:t>
+              <a:t>20</a:t>
             </a:fld>
             <a:endParaRPr lang="en-US" altLang="nl-NL"/>
           </a:p>
@@ -11746,7 +12391,7 @@
                         <m:fPr>
                           <m:ctrlPr>
                             <a:rPr lang="it-IT" i="1" smtClean="0">
-                              <a:latin typeface="Cambria Math" charset="0"/>
+                              <a:latin typeface="Cambria Math" panose="02040503050406030204" pitchFamily="18" charset="0"/>
                               <a:ea typeface="Cambria Math" charset="0"/>
                               <a:cs typeface="Cambria Math" charset="0"/>
                             </a:rPr>
@@ -11757,7 +12402,7 @@
                             <m:sSubPr>
                               <m:ctrlPr>
                                 <a:rPr lang="it-IT" i="1" smtClean="0">
-                                  <a:latin typeface="Cambria Math" charset="0"/>
+                                  <a:latin typeface="Cambria Math" panose="02040503050406030204" pitchFamily="18" charset="0"/>
                                   <a:ea typeface="Cambria Math" charset="0"/>
                                   <a:cs typeface="Cambria Math" charset="0"/>
                                 </a:rPr>
@@ -11796,7 +12441,7 @@
                             <m:sSubPr>
                               <m:ctrlPr>
                                 <a:rPr lang="it-IT" b="0" i="1" smtClean="0">
-                                  <a:latin typeface="Cambria Math" charset="0"/>
+                                  <a:latin typeface="Cambria Math" panose="02040503050406030204" pitchFamily="18" charset="0"/>
                                   <a:ea typeface="Cambria Math" charset="0"/>
                                   <a:cs typeface="Cambria Math" charset="0"/>
                                 </a:rPr>
@@ -11932,226 +12577,7 @@
 </p:sld>
 </file>
 
-<file path=ppt/slides/slide2.xml><?xml version="1.0" encoding="utf-8"?>
-<p:sld xmlns:a="http://schemas.openxmlformats.org/drawingml/2006/main" xmlns:r="http://schemas.openxmlformats.org/officeDocument/2006/relationships" xmlns:p="http://schemas.openxmlformats.org/presentationml/2006/main">
-  <p:cSld>
-    <p:spTree>
-      <p:nvGrpSpPr>
-        <p:cNvPr id="1" name=""/>
-        <p:cNvGrpSpPr/>
-        <p:nvPr/>
-      </p:nvGrpSpPr>
-      <p:grpSpPr>
-        <a:xfrm>
-          <a:off x="0" y="0"/>
-          <a:ext cx="0" cy="0"/>
-          <a:chOff x="0" y="0"/>
-          <a:chExt cx="0" cy="0"/>
-        </a:xfrm>
-      </p:grpSpPr>
-      <p:sp>
-        <p:nvSpPr>
-          <p:cNvPr id="2" name="Titolo 1"/>
-          <p:cNvSpPr>
-            <a:spLocks noGrp="1"/>
-          </p:cNvSpPr>
-          <p:nvPr>
-            <p:ph type="title"/>
-          </p:nvPr>
-        </p:nvSpPr>
-        <p:spPr/>
-        <p:txBody>
-          <a:bodyPr/>
-          <a:lstStyle/>
-          <a:p>
-            <a:r>
-              <a:rPr lang="it-IT" dirty="0" smtClean="0"/>
-              <a:t>Indice</a:t>
-            </a:r>
-            <a:endParaRPr lang="it-IT" dirty="0"/>
-          </a:p>
-        </p:txBody>
-      </p:sp>
-      <p:sp>
-        <p:nvSpPr>
-          <p:cNvPr id="3" name="Segnaposto contenuto 2"/>
-          <p:cNvSpPr>
-            <a:spLocks noGrp="1"/>
-          </p:cNvSpPr>
-          <p:nvPr>
-            <p:ph idx="1"/>
-          </p:nvPr>
-        </p:nvSpPr>
-        <p:spPr>
-          <a:xfrm>
-            <a:off x="609600" y="891778"/>
-            <a:ext cx="7784892" cy="5531644"/>
-          </a:xfrm>
-        </p:spPr>
-        <p:txBody>
-          <a:bodyPr/>
-          <a:lstStyle/>
-          <a:p>
-            <a:r>
-              <a:rPr lang="it-IT" sz="2400" dirty="0"/>
-              <a:t>Interferometria</a:t>
-            </a:r>
-          </a:p>
-          <a:p>
-            <a:pPr lvl="1"/>
-            <a:r>
-              <a:rPr lang="it-IT" sz="2000" dirty="0"/>
-              <a:t>Interferometria a self-mixing</a:t>
-            </a:r>
-          </a:p>
-          <a:p>
-            <a:pPr lvl="1"/>
-            <a:r>
-              <a:rPr lang="it-IT" sz="2000" dirty="0"/>
-              <a:t>Misura della distanza</a:t>
-            </a:r>
-          </a:p>
-          <a:p>
-            <a:r>
-              <a:rPr lang="it-IT" sz="2400" dirty="0"/>
-              <a:t>Architettura hardware</a:t>
-            </a:r>
-          </a:p>
-          <a:p>
-            <a:pPr lvl="1"/>
-            <a:r>
-              <a:rPr lang="it-IT" sz="2000" dirty="0" smtClean="0"/>
-              <a:t>Sistema analogico</a:t>
-            </a:r>
-          </a:p>
-          <a:p>
-            <a:pPr lvl="1"/>
-            <a:r>
-              <a:rPr lang="it-IT" sz="2000" dirty="0"/>
-              <a:t>Sistema di </a:t>
-            </a:r>
-            <a:r>
-              <a:rPr lang="it-IT" sz="2000" dirty="0" smtClean="0"/>
-              <a:t>conversione</a:t>
-            </a:r>
-            <a:endParaRPr lang="it-IT" sz="2000" dirty="0"/>
-          </a:p>
-          <a:p>
-            <a:pPr lvl="1"/>
-            <a:r>
-              <a:rPr lang="it-IT" sz="2000" dirty="0" smtClean="0"/>
-              <a:t>Sistema digitale</a:t>
-            </a:r>
-            <a:endParaRPr lang="it-IT" sz="2000" dirty="0"/>
-          </a:p>
-          <a:p>
-            <a:r>
-              <a:rPr lang="it-IT" sz="2400" dirty="0" smtClean="0"/>
-              <a:t>Architettura </a:t>
-            </a:r>
-            <a:r>
-              <a:rPr lang="it-IT" sz="2400" dirty="0"/>
-              <a:t>software</a:t>
-            </a:r>
-          </a:p>
-          <a:p>
-            <a:pPr lvl="1"/>
-            <a:r>
-              <a:rPr lang="it-IT" sz="2000" dirty="0"/>
-              <a:t>Dettagli </a:t>
-            </a:r>
-            <a:r>
-              <a:rPr lang="it-IT" sz="2000" dirty="0" smtClean="0"/>
-              <a:t>implementativi</a:t>
-            </a:r>
-          </a:p>
-          <a:p>
-            <a:pPr lvl="1"/>
-            <a:r>
-              <a:rPr lang="it-IT" sz="2000" dirty="0" smtClean="0"/>
-              <a:t>FPGA</a:t>
-            </a:r>
-            <a:endParaRPr lang="it-IT" sz="2000" dirty="0"/>
-          </a:p>
-          <a:p>
-            <a:pPr lvl="1"/>
-            <a:r>
-              <a:rPr lang="it-IT" sz="2000" dirty="0" smtClean="0"/>
-              <a:t>Microcontrollore</a:t>
-            </a:r>
-          </a:p>
-          <a:p>
-            <a:pPr lvl="1"/>
-            <a:r>
-              <a:rPr lang="it-IT" sz="2000" dirty="0" smtClean="0"/>
-              <a:t>Ottimizzazioni</a:t>
-            </a:r>
-            <a:endParaRPr lang="it-IT" sz="2000" dirty="0"/>
-          </a:p>
-          <a:p>
-            <a:r>
-              <a:rPr lang="it-IT" sz="2400" dirty="0"/>
-              <a:t>Risultati </a:t>
-            </a:r>
-            <a:r>
-              <a:rPr lang="it-IT" sz="2400" dirty="0" smtClean="0"/>
-              <a:t>sperimentali</a:t>
-            </a:r>
-            <a:endParaRPr lang="it-IT" sz="2400" dirty="0"/>
-          </a:p>
-          <a:p>
-            <a:r>
-              <a:rPr lang="it-IT" sz="2400" dirty="0"/>
-              <a:t>Conclusioni e sviluppi futuri</a:t>
-            </a:r>
-          </a:p>
-        </p:txBody>
-      </p:sp>
-      <p:sp>
-        <p:nvSpPr>
-          <p:cNvPr id="4" name="Segnaposto numero diapositiva 3"/>
-          <p:cNvSpPr>
-            <a:spLocks noGrp="1"/>
-          </p:cNvSpPr>
-          <p:nvPr>
-            <p:ph type="sldNum" sz="quarter" idx="11"/>
-          </p:nvPr>
-        </p:nvSpPr>
-        <p:spPr/>
-        <p:txBody>
-          <a:bodyPr/>
-          <a:lstStyle/>
-          <a:p>
-            <a:fld id="{C503DA3A-0C6B-48FC-931E-2C786AAFD5C1}" type="slidenum">
-              <a:rPr lang="en-US" altLang="nl-NL" smtClean="0"/>
-              <a:pPr/>
-              <a:t>2</a:t>
-            </a:fld>
-            <a:endParaRPr lang="en-US" altLang="nl-NL"/>
-          </a:p>
-        </p:txBody>
-      </p:sp>
-    </p:spTree>
-    <p:extLst>
-      <p:ext uri="{BB962C8B-B14F-4D97-AF65-F5344CB8AC3E}">
-        <p14:creationId xmlns:p14="http://schemas.microsoft.com/office/powerpoint/2010/main" val="3953617699"/>
-      </p:ext>
-    </p:extLst>
-  </p:cSld>
-  <p:clrMapOvr>
-    <a:masterClrMapping/>
-  </p:clrMapOvr>
-  <p:timing>
-    <p:tnLst>
-      <p:par>
-        <p:cTn id="1" dur="indefinite" restart="never" nodeType="tmRoot"/>
-      </p:par>
-    </p:tnLst>
-  </p:timing>
-</p:sld>
-</file>
-
-<file path=ppt/slides/slide20.xml><?xml version="1.0" encoding="utf-8"?>
+<file path=ppt/slides/slide21.xml><?xml version="1.0" encoding="utf-8"?>
 <p:sld xmlns:a="http://schemas.openxmlformats.org/drawingml/2006/main" xmlns:r="http://schemas.openxmlformats.org/officeDocument/2006/relationships" xmlns:p="http://schemas.openxmlformats.org/presentationml/2006/main">
   <p:cSld>
     <p:spTree>
@@ -12324,7 +12750,7 @@
             <a:fld id="{C503DA3A-0C6B-48FC-931E-2C786AAFD5C1}" type="slidenum">
               <a:rPr lang="en-US" altLang="nl-NL" smtClean="0"/>
               <a:pPr/>
-              <a:t>20</a:t>
+              <a:t>21</a:t>
             </a:fld>
             <a:endParaRPr lang="en-US" altLang="nl-NL"/>
           </a:p>
@@ -12522,7 +12948,7 @@
 </p:sld>
 </file>
 
-<file path=ppt/slides/slide21.xml><?xml version="1.0" encoding="utf-8"?>
+<file path=ppt/slides/slide22.xml><?xml version="1.0" encoding="utf-8"?>
 <p:sld xmlns:a="http://schemas.openxmlformats.org/drawingml/2006/main" xmlns:r="http://schemas.openxmlformats.org/officeDocument/2006/relationships" xmlns:p="http://schemas.openxmlformats.org/presentationml/2006/main">
   <p:cSld>
     <p:spTree>
@@ -12632,7 +13058,7 @@
             <a:fld id="{C503DA3A-0C6B-48FC-931E-2C786AAFD5C1}" type="slidenum">
               <a:rPr lang="en-US" altLang="nl-NL" smtClean="0"/>
               <a:pPr/>
-              <a:t>21</a:t>
+              <a:t>22</a:t>
             </a:fld>
             <a:endParaRPr lang="en-US" altLang="nl-NL"/>
           </a:p>
@@ -12809,7 +13235,7 @@
 </p:sld>
 </file>
 
-<file path=ppt/slides/slide22.xml><?xml version="1.0" encoding="utf-8"?>
+<file path=ppt/slides/slide23.xml><?xml version="1.0" encoding="utf-8"?>
 <p:sld xmlns:a="http://schemas.openxmlformats.org/drawingml/2006/main" xmlns:r="http://schemas.openxmlformats.org/officeDocument/2006/relationships" xmlns:p="http://schemas.openxmlformats.org/presentationml/2006/main">
   <p:cSld>
     <p:spTree>
@@ -13081,7 +13507,7 @@
             <a:fld id="{C503DA3A-0C6B-48FC-931E-2C786AAFD5C1}" type="slidenum">
               <a:rPr lang="en-US" altLang="nl-NL" smtClean="0"/>
               <a:pPr/>
-              <a:t>22</a:t>
+              <a:t>23</a:t>
             </a:fld>
             <a:endParaRPr lang="en-US" altLang="nl-NL"/>
           </a:p>
@@ -13107,7 +13533,7 @@
 </p:sld>
 </file>
 
-<file path=ppt/slides/slide23.xml><?xml version="1.0" encoding="utf-8"?>
+<file path=ppt/slides/slide24.xml><?xml version="1.0" encoding="utf-8"?>
 <p:sld xmlns:a="http://schemas.openxmlformats.org/drawingml/2006/main" xmlns:r="http://schemas.openxmlformats.org/officeDocument/2006/relationships" xmlns:p="http://schemas.openxmlformats.org/presentationml/2006/main">
   <p:cSld>
     <p:spTree>
@@ -13206,7 +13632,7 @@
             <a:fld id="{C503DA3A-0C6B-48FC-931E-2C786AAFD5C1}" type="slidenum">
               <a:rPr lang="en-US" altLang="nl-NL" smtClean="0"/>
               <a:pPr/>
-              <a:t>23</a:t>
+              <a:t>24</a:t>
             </a:fld>
             <a:endParaRPr lang="en-US" altLang="nl-NL"/>
           </a:p>
@@ -13262,7 +13688,7 @@
 </p:sld>
 </file>
 
-<file path=ppt/slides/slide24.xml><?xml version="1.0" encoding="utf-8"?>
+<file path=ppt/slides/slide25.xml><?xml version="1.0" encoding="utf-8"?>
 <p:sld xmlns:a="http://schemas.openxmlformats.org/drawingml/2006/main" xmlns:r="http://schemas.openxmlformats.org/officeDocument/2006/relationships" xmlns:p="http://schemas.openxmlformats.org/presentationml/2006/main">
   <p:cSld>
     <p:spTree>
@@ -13383,7 +13809,7 @@
                       <m:sSupPr>
                         <m:ctrlPr>
                           <a:rPr lang="it-IT" sz="2000" b="1" i="1">
-                            <a:latin typeface="Cambria Math" charset="0"/>
+                            <a:latin typeface="Cambria Math" panose="02040503050406030204" pitchFamily="18" charset="0"/>
                             <a:ea typeface="Lucida Grande" charset="0"/>
                             <a:cs typeface="Lucida Grande" charset="0"/>
                           </a:rPr>
@@ -13410,7 +13836,17 @@
                             <a:ea typeface="Lucida Grande" charset="0"/>
                             <a:cs typeface="Lucida Grande" charset="0"/>
                           </a:rPr>
-                          <m:t>−4</m:t>
+                          <m:t>−</m:t>
+                        </m:r>
+                        <m:r>
+                          <m:rPr>
+                            <m:nor/>
+                          </m:rPr>
+                          <a:rPr lang="it-IT" sz="2000" b="1">
+                            <a:ea typeface="Lucida Grande" charset="0"/>
+                            <a:cs typeface="Lucida Grande" charset="0"/>
+                          </a:rPr>
+                          <m:t>4</m:t>
                         </m:r>
                       </m:sup>
                     </m:sSup>
@@ -13434,7 +13870,7 @@
                       <m:sSupPr>
                         <m:ctrlPr>
                           <a:rPr lang="it-IT" sz="2000" b="1" i="1">
-                            <a:latin typeface="Cambria Math" charset="0"/>
+                            <a:latin typeface="Cambria Math" panose="02040503050406030204" pitchFamily="18" charset="0"/>
                             <a:ea typeface="Lucida Grande" charset="0"/>
                             <a:cs typeface="Lucida Grande" charset="0"/>
                           </a:rPr>
@@ -13461,7 +13897,17 @@
                             <a:ea typeface="Lucida Grande" charset="0"/>
                             <a:cs typeface="Lucida Grande" charset="0"/>
                           </a:rPr>
-                          <m:t>−4</m:t>
+                          <m:t>−</m:t>
+                        </m:r>
+                        <m:r>
+                          <m:rPr>
+                            <m:nor/>
+                          </m:rPr>
+                          <a:rPr lang="it-IT" sz="2000" b="1">
+                            <a:ea typeface="Lucida Grande" charset="0"/>
+                            <a:cs typeface="Lucida Grande" charset="0"/>
+                          </a:rPr>
+                          <m:t>4</m:t>
                         </m:r>
                       </m:sup>
                     </m:sSup>
@@ -13485,7 +13931,7 @@
                       <m:sSupPr>
                         <m:ctrlPr>
                           <a:rPr lang="it-IT" sz="2000" b="1" i="1">
-                            <a:latin typeface="Cambria Math" charset="0"/>
+                            <a:latin typeface="Cambria Math" panose="02040503050406030204" pitchFamily="18" charset="0"/>
                             <a:ea typeface="Lucida Grande" charset="0"/>
                             <a:cs typeface="Lucida Grande" charset="0"/>
                           </a:rPr>
@@ -13512,7 +13958,17 @@
                             <a:ea typeface="Lucida Grande" charset="0"/>
                             <a:cs typeface="Lucida Grande" charset="0"/>
                           </a:rPr>
-                          <m:t>−4</m:t>
+                          <m:t>−</m:t>
+                        </m:r>
+                        <m:r>
+                          <m:rPr>
+                            <m:nor/>
+                          </m:rPr>
+                          <a:rPr lang="it-IT" sz="2000" b="1">
+                            <a:ea typeface="Lucida Grande" charset="0"/>
+                            <a:cs typeface="Lucida Grande" charset="0"/>
+                          </a:rPr>
+                          <m:t>4</m:t>
                         </m:r>
                       </m:sup>
                     </m:sSup>
@@ -13579,7 +14035,7 @@
             <a:fld id="{C503DA3A-0C6B-48FC-931E-2C786AAFD5C1}" type="slidenum">
               <a:rPr lang="en-US" altLang="nl-NL" smtClean="0"/>
               <a:pPr/>
-              <a:t>24</a:t>
+              <a:t>25</a:t>
             </a:fld>
             <a:endParaRPr lang="en-US" altLang="nl-NL"/>
           </a:p>
@@ -13695,7 +14151,7 @@
 </p:sld>
 </file>
 
-<file path=ppt/slides/slide25.xml><?xml version="1.0" encoding="utf-8"?>
+<file path=ppt/slides/slide26.xml><?xml version="1.0" encoding="utf-8"?>
 <p:sld xmlns:a="http://schemas.openxmlformats.org/drawingml/2006/main" xmlns:r="http://schemas.openxmlformats.org/officeDocument/2006/relationships" xmlns:p="http://schemas.openxmlformats.org/presentationml/2006/main">
   <p:cSld>
     <p:spTree>
@@ -13828,7 +14284,7 @@
                       <m:sSupPr>
                         <m:ctrlPr>
                           <a:rPr lang="it-IT" sz="2000" b="1" i="1">
-                            <a:latin typeface="Cambria Math" charset="0"/>
+                            <a:latin typeface="Cambria Math" panose="02040503050406030204" pitchFamily="18" charset="0"/>
                             <a:ea typeface="Lucida Grande" charset="0"/>
                             <a:cs typeface="Lucida Grande" charset="0"/>
                           </a:rPr>
@@ -13891,7 +14347,7 @@
                       <m:sSupPr>
                         <m:ctrlPr>
                           <a:rPr lang="it-IT" sz="2000" b="1" i="1">
-                            <a:latin typeface="Cambria Math" charset="0"/>
+                            <a:latin typeface="Cambria Math" panose="02040503050406030204" pitchFamily="18" charset="0"/>
                             <a:ea typeface="Lucida Grande" charset="0"/>
                             <a:cs typeface="Lucida Grande" charset="0"/>
                           </a:rPr>
@@ -13954,7 +14410,7 @@
                       <m:sSupPr>
                         <m:ctrlPr>
                           <a:rPr lang="it-IT" sz="2000" b="1" i="1">
-                            <a:latin typeface="Cambria Math" charset="0"/>
+                            <a:latin typeface="Cambria Math" panose="02040503050406030204" pitchFamily="18" charset="0"/>
                             <a:ea typeface="Lucida Grande" charset="0"/>
                             <a:cs typeface="Lucida Grande" charset="0"/>
                           </a:rPr>
@@ -14060,7 +14516,7 @@
             <a:fld id="{C503DA3A-0C6B-48FC-931E-2C786AAFD5C1}" type="slidenum">
               <a:rPr lang="en-US" altLang="nl-NL" smtClean="0"/>
               <a:pPr/>
-              <a:t>25</a:t>
+              <a:t>26</a:t>
             </a:fld>
             <a:endParaRPr lang="en-US" altLang="nl-NL" dirty="0"/>
           </a:p>
@@ -14176,7 +14632,7 @@
 </p:sld>
 </file>
 
-<file path=ppt/slides/slide26.xml><?xml version="1.0" encoding="utf-8"?>
+<file path=ppt/slides/slide27.xml><?xml version="1.0" encoding="utf-8"?>
 <p:sld xmlns:a="http://schemas.openxmlformats.org/drawingml/2006/main" xmlns:r="http://schemas.openxmlformats.org/officeDocument/2006/relationships" xmlns:p="http://schemas.openxmlformats.org/presentationml/2006/main">
   <p:cSld>
     <p:spTree>
@@ -14277,7 +14733,7 @@
                       <m:sSupPr>
                         <m:ctrlPr>
                           <a:rPr lang="it-IT" sz="2400" b="1" i="1">
-                            <a:latin typeface="Cambria Math" charset="0"/>
+                            <a:latin typeface="Cambria Math" panose="02040503050406030204" pitchFamily="18" charset="0"/>
                           </a:rPr>
                         </m:ctrlPr>
                       </m:sSupPr>
@@ -14312,7 +14768,7 @@
                       <m:sSupPr>
                         <m:ctrlPr>
                           <a:rPr lang="it-IT" sz="2400" b="1" i="1">
-                            <a:latin typeface="Cambria Math" charset="0"/>
+                            <a:latin typeface="Cambria Math" panose="02040503050406030204" pitchFamily="18" charset="0"/>
                           </a:rPr>
                         </m:ctrlPr>
                       </m:sSupPr>
@@ -14588,7 +15044,7 @@
             <a:fld id="{C503DA3A-0C6B-48FC-931E-2C786AAFD5C1}" type="slidenum">
               <a:rPr lang="en-US" altLang="nl-NL" smtClean="0"/>
               <a:pPr/>
-              <a:t>26</a:t>
+              <a:t>27</a:t>
             </a:fld>
             <a:endParaRPr lang="en-US" altLang="nl-NL"/>
           </a:p>
@@ -14670,311 +15126,6 @@
 </p:sld>
 </file>
 
-<file path=ppt/slides/slide27.xml><?xml version="1.0" encoding="utf-8"?>
-<p:sld xmlns:a="http://schemas.openxmlformats.org/drawingml/2006/main" xmlns:r="http://schemas.openxmlformats.org/officeDocument/2006/relationships" xmlns:p="http://schemas.openxmlformats.org/presentationml/2006/main">
-  <p:cSld>
-    <p:spTree>
-      <p:nvGrpSpPr>
-        <p:cNvPr id="1" name=""/>
-        <p:cNvGrpSpPr/>
-        <p:nvPr/>
-      </p:nvGrpSpPr>
-      <p:grpSpPr>
-        <a:xfrm>
-          <a:off x="0" y="0"/>
-          <a:ext cx="0" cy="0"/>
-          <a:chOff x="0" y="0"/>
-          <a:chExt cx="0" cy="0"/>
-        </a:xfrm>
-      </p:grpSpPr>
-      <p:sp>
-        <p:nvSpPr>
-          <p:cNvPr id="2" name="Titolo 1"/>
-          <p:cNvSpPr>
-            <a:spLocks noGrp="1"/>
-          </p:cNvSpPr>
-          <p:nvPr>
-            <p:ph type="title"/>
-          </p:nvPr>
-        </p:nvSpPr>
-        <p:spPr/>
-        <p:txBody>
-          <a:bodyPr/>
-          <a:lstStyle/>
-          <a:p>
-            <a:r>
-              <a:rPr lang="it-IT" dirty="0" smtClean="0"/>
-              <a:t>Indice</a:t>
-            </a:r>
-            <a:endParaRPr lang="it-IT" dirty="0"/>
-          </a:p>
-        </p:txBody>
-      </p:sp>
-      <p:sp>
-        <p:nvSpPr>
-          <p:cNvPr id="3" name="Segnaposto contenuto 2"/>
-          <p:cNvSpPr>
-            <a:spLocks noGrp="1"/>
-          </p:cNvSpPr>
-          <p:nvPr>
-            <p:ph idx="1"/>
-          </p:nvPr>
-        </p:nvSpPr>
-        <p:spPr>
-          <a:xfrm>
-            <a:off x="685800" y="1042987"/>
-            <a:ext cx="7086600" cy="5510213"/>
-          </a:xfrm>
-        </p:spPr>
-        <p:txBody>
-          <a:bodyPr/>
-          <a:lstStyle/>
-          <a:p>
-            <a:r>
-              <a:rPr lang="it-IT" sz="2400" dirty="0">
-                <a:solidFill>
-                  <a:schemeClr val="bg2">
-                    <a:lumMod val="40000"/>
-                    <a:lumOff val="60000"/>
-                  </a:schemeClr>
-                </a:solidFill>
-              </a:rPr>
-              <a:t>Interferometria</a:t>
-            </a:r>
-          </a:p>
-          <a:p>
-            <a:pPr lvl="1"/>
-            <a:r>
-              <a:rPr lang="it-IT" sz="2000" dirty="0">
-                <a:solidFill>
-                  <a:schemeClr val="bg2">
-                    <a:lumMod val="40000"/>
-                    <a:lumOff val="60000"/>
-                  </a:schemeClr>
-                </a:solidFill>
-              </a:rPr>
-              <a:t>Interferometria a self-mixing</a:t>
-            </a:r>
-          </a:p>
-          <a:p>
-            <a:pPr lvl="1"/>
-            <a:r>
-              <a:rPr lang="it-IT" sz="2000" dirty="0">
-                <a:solidFill>
-                  <a:schemeClr val="bg2">
-                    <a:lumMod val="40000"/>
-                    <a:lumOff val="60000"/>
-                  </a:schemeClr>
-                </a:solidFill>
-              </a:rPr>
-              <a:t>Misura della distanza</a:t>
-            </a:r>
-          </a:p>
-          <a:p>
-            <a:r>
-              <a:rPr lang="it-IT" sz="2400" dirty="0">
-                <a:solidFill>
-                  <a:schemeClr val="bg2">
-                    <a:lumMod val="40000"/>
-                    <a:lumOff val="60000"/>
-                  </a:schemeClr>
-                </a:solidFill>
-              </a:rPr>
-              <a:t>Architettura hardware</a:t>
-            </a:r>
-          </a:p>
-          <a:p>
-            <a:pPr lvl="1"/>
-            <a:r>
-              <a:rPr lang="it-IT" sz="2000" dirty="0">
-                <a:solidFill>
-                  <a:schemeClr val="bg2">
-                    <a:lumMod val="40000"/>
-                    <a:lumOff val="60000"/>
-                  </a:schemeClr>
-                </a:solidFill>
-              </a:rPr>
-              <a:t>Sistema analogico</a:t>
-            </a:r>
-          </a:p>
-          <a:p>
-            <a:pPr lvl="1"/>
-            <a:r>
-              <a:rPr lang="it-IT" sz="2000" dirty="0">
-                <a:solidFill>
-                  <a:schemeClr val="bg2">
-                    <a:lumMod val="40000"/>
-                    <a:lumOff val="60000"/>
-                  </a:schemeClr>
-                </a:solidFill>
-              </a:rPr>
-              <a:t>Sistema di conversione</a:t>
-            </a:r>
-          </a:p>
-          <a:p>
-            <a:pPr lvl="1"/>
-            <a:r>
-              <a:rPr lang="it-IT" sz="2000" dirty="0">
-                <a:solidFill>
-                  <a:schemeClr val="bg2">
-                    <a:lumMod val="40000"/>
-                    <a:lumOff val="60000"/>
-                  </a:schemeClr>
-                </a:solidFill>
-              </a:rPr>
-              <a:t>Sistema digitale</a:t>
-            </a:r>
-          </a:p>
-          <a:p>
-            <a:r>
-              <a:rPr lang="it-IT" sz="2400" dirty="0">
-                <a:solidFill>
-                  <a:schemeClr val="bg2">
-                    <a:lumMod val="40000"/>
-                    <a:lumOff val="60000"/>
-                  </a:schemeClr>
-                </a:solidFill>
-              </a:rPr>
-              <a:t>Architettura software</a:t>
-            </a:r>
-          </a:p>
-          <a:p>
-            <a:pPr lvl="1"/>
-            <a:r>
-              <a:rPr lang="it-IT" sz="2000" dirty="0">
-                <a:solidFill>
-                  <a:schemeClr val="bg2">
-                    <a:lumMod val="40000"/>
-                    <a:lumOff val="60000"/>
-                  </a:schemeClr>
-                </a:solidFill>
-              </a:rPr>
-              <a:t>Dettagli implementativi</a:t>
-            </a:r>
-          </a:p>
-          <a:p>
-            <a:pPr lvl="1"/>
-            <a:r>
-              <a:rPr lang="it-IT" sz="2000" dirty="0" smtClean="0">
-                <a:solidFill>
-                  <a:schemeClr val="bg2">
-                    <a:lumMod val="40000"/>
-                    <a:lumOff val="60000"/>
-                  </a:schemeClr>
-                </a:solidFill>
-              </a:rPr>
-              <a:t>FPGA</a:t>
-            </a:r>
-          </a:p>
-          <a:p>
-            <a:pPr lvl="1"/>
-            <a:r>
-              <a:rPr lang="it-IT" sz="2000" dirty="0" smtClean="0">
-                <a:solidFill>
-                  <a:schemeClr val="bg2">
-                    <a:lumMod val="40000"/>
-                    <a:lumOff val="60000"/>
-                  </a:schemeClr>
-                </a:solidFill>
-              </a:rPr>
-              <a:t>Microcontrollore</a:t>
-            </a:r>
-            <a:endParaRPr lang="it-IT" sz="2000" dirty="0">
-              <a:solidFill>
-                <a:schemeClr val="bg2">
-                  <a:lumMod val="40000"/>
-                  <a:lumOff val="60000"/>
-                </a:schemeClr>
-              </a:solidFill>
-            </a:endParaRPr>
-          </a:p>
-          <a:p>
-            <a:pPr lvl="1"/>
-            <a:r>
-              <a:rPr lang="it-IT" sz="2000" dirty="0" smtClean="0">
-                <a:solidFill>
-                  <a:schemeClr val="bg2">
-                    <a:lumMod val="40000"/>
-                    <a:lumOff val="60000"/>
-                  </a:schemeClr>
-                </a:solidFill>
-              </a:rPr>
-              <a:t>Ottimizzazioni</a:t>
-            </a:r>
-            <a:endParaRPr lang="it-IT" sz="2000" dirty="0">
-              <a:solidFill>
-                <a:schemeClr val="bg2">
-                  <a:lumMod val="40000"/>
-                  <a:lumOff val="60000"/>
-                </a:schemeClr>
-              </a:solidFill>
-            </a:endParaRPr>
-          </a:p>
-          <a:p>
-            <a:r>
-              <a:rPr lang="it-IT" sz="2400" dirty="0">
-                <a:solidFill>
-                  <a:schemeClr val="bg2">
-                    <a:lumMod val="40000"/>
-                    <a:lumOff val="60000"/>
-                  </a:schemeClr>
-                </a:solidFill>
-              </a:rPr>
-              <a:t>Risultati sperimentali</a:t>
-            </a:r>
-          </a:p>
-          <a:p>
-            <a:r>
-              <a:rPr lang="it-IT" sz="2400" dirty="0"/>
-              <a:t>Conclusioni e sviluppi futuri</a:t>
-            </a:r>
-          </a:p>
-        </p:txBody>
-      </p:sp>
-      <p:sp>
-        <p:nvSpPr>
-          <p:cNvPr id="4" name="Segnaposto numero diapositiva 3"/>
-          <p:cNvSpPr>
-            <a:spLocks noGrp="1"/>
-          </p:cNvSpPr>
-          <p:nvPr>
-            <p:ph type="sldNum" sz="quarter" idx="11"/>
-          </p:nvPr>
-        </p:nvSpPr>
-        <p:spPr/>
-        <p:txBody>
-          <a:bodyPr/>
-          <a:lstStyle/>
-          <a:p>
-            <a:fld id="{C503DA3A-0C6B-48FC-931E-2C786AAFD5C1}" type="slidenum">
-              <a:rPr lang="en-US" altLang="nl-NL" smtClean="0"/>
-              <a:pPr/>
-              <a:t>27</a:t>
-            </a:fld>
-            <a:endParaRPr lang="en-US" altLang="nl-NL"/>
-          </a:p>
-        </p:txBody>
-      </p:sp>
-    </p:spTree>
-    <p:extLst>
-      <p:ext uri="{BB962C8B-B14F-4D97-AF65-F5344CB8AC3E}">
-        <p14:creationId xmlns:p14="http://schemas.microsoft.com/office/powerpoint/2010/main" val="2461533339"/>
-      </p:ext>
-    </p:extLst>
-  </p:cSld>
-  <p:clrMapOvr>
-    <a:masterClrMapping/>
-  </p:clrMapOvr>
-  <p:timing>
-    <p:tnLst>
-      <p:par>
-        <p:cTn id="1" dur="indefinite" restart="never" nodeType="tmRoot"/>
-      </p:par>
-    </p:tnLst>
-  </p:timing>
-</p:sld>
-</file>
-
 <file path=ppt/slides/slide28.xml><?xml version="1.0" encoding="utf-8"?>
 <p:sld xmlns:a="http://schemas.openxmlformats.org/drawingml/2006/main" xmlns:r="http://schemas.openxmlformats.org/officeDocument/2006/relationships" xmlns:p="http://schemas.openxmlformats.org/presentationml/2006/main">
   <p:cSld>
@@ -15009,7 +15160,7 @@
           <a:p>
             <a:r>
               <a:rPr lang="it-IT" dirty="0" smtClean="0"/>
-              <a:t>Conclusioni e sviluppi futuri</a:t>
+              <a:t>Indice</a:t>
             </a:r>
             <a:endParaRPr lang="it-IT" dirty="0"/>
           </a:p>
@@ -15027,8 +15178,8 @@
         </p:nvSpPr>
         <p:spPr>
           <a:xfrm>
-            <a:off x="609600" y="1219200"/>
-            <a:ext cx="7772400" cy="4876800"/>
+            <a:off x="685800" y="1042987"/>
+            <a:ext cx="7086600" cy="5510213"/>
           </a:xfrm>
         </p:spPr>
         <p:txBody>
@@ -15036,91 +15187,203 @@
           <a:lstStyle/>
           <a:p>
             <a:r>
-              <a:rPr lang="it-IT" sz="2400" dirty="0" smtClean="0"/>
-              <a:t>I risultati ottenuti hanno portato alla realizzazione di uno strumento di misura con buone prestazioni e a basso costo</a:t>
-            </a:r>
-          </a:p>
-          <a:p>
-            <a:r>
-              <a:rPr lang="it-IT" sz="2400" dirty="0" smtClean="0"/>
-              <a:t> Lo strumento mostra</a:t>
-            </a:r>
-            <a:br>
-              <a:rPr lang="it-IT" sz="2400" dirty="0" smtClean="0"/>
-            </a:br>
-            <a:r>
-              <a:rPr lang="it-IT" sz="2400" dirty="0" smtClean="0"/>
-              <a:t> ancora alcuni limiti:</a:t>
+              <a:rPr lang="it-IT" sz="2400" dirty="0">
+                <a:solidFill>
+                  <a:schemeClr val="bg2">
+                    <a:lumMod val="40000"/>
+                    <a:lumOff val="60000"/>
+                  </a:schemeClr>
+                </a:solidFill>
+              </a:rPr>
+              <a:t>Interferometria</a:t>
             </a:r>
           </a:p>
           <a:p>
             <a:pPr lvl="1"/>
             <a:r>
-              <a:rPr lang="it-IT" sz="2000" dirty="0" smtClean="0"/>
-              <a:t>Frequenza di misura reale</a:t>
-            </a:r>
-            <a:br>
-              <a:rPr lang="it-IT" sz="2000" dirty="0" smtClean="0"/>
-            </a:br>
-            <a:r>
-              <a:rPr lang="it-IT" sz="2000" dirty="0" smtClean="0"/>
-              <a:t>inferiore a quella teorica</a:t>
-            </a:r>
-            <a:endParaRPr lang="it-IT" sz="2000" dirty="0"/>
+              <a:rPr lang="it-IT" sz="2000" dirty="0">
+                <a:solidFill>
+                  <a:schemeClr val="bg2">
+                    <a:lumMod val="40000"/>
+                    <a:lumOff val="60000"/>
+                  </a:schemeClr>
+                </a:solidFill>
+              </a:rPr>
+              <a:t>Interferometria a self-mixing</a:t>
+            </a:r>
           </a:p>
           <a:p>
             <a:pPr lvl="1"/>
             <a:r>
-              <a:rPr lang="it-IT" sz="2000" dirty="0" smtClean="0"/>
-              <a:t>Deriva termica</a:t>
-            </a:r>
-            <a:endParaRPr lang="it-IT" sz="2400" dirty="0" smtClean="0"/>
-          </a:p>
-          <a:p>
-            <a:r>
-              <a:rPr lang="it-IT" sz="2400" dirty="0" smtClean="0"/>
-              <a:t>Sviluppi futuri:</a:t>
+              <a:rPr lang="it-IT" sz="2000" dirty="0">
+                <a:solidFill>
+                  <a:schemeClr val="bg2">
+                    <a:lumMod val="40000"/>
+                    <a:lumOff val="60000"/>
+                  </a:schemeClr>
+                </a:solidFill>
+              </a:rPr>
+              <a:t>Misura della distanza</a:t>
+            </a:r>
+          </a:p>
+          <a:p>
+            <a:r>
+              <a:rPr lang="it-IT" sz="2400" dirty="0">
+                <a:solidFill>
+                  <a:schemeClr val="bg2">
+                    <a:lumMod val="40000"/>
+                    <a:lumOff val="60000"/>
+                  </a:schemeClr>
+                </a:solidFill>
+              </a:rPr>
+              <a:t>Architettura hardware</a:t>
             </a:r>
           </a:p>
           <a:p>
             <a:pPr lvl="1"/>
             <a:r>
-              <a:rPr lang="it-IT" sz="2000" dirty="0" smtClean="0"/>
-              <a:t>Scheda di prototipazione </a:t>
-            </a:r>
-            <a:br>
-              <a:rPr lang="it-IT" sz="2000" dirty="0" smtClean="0"/>
-            </a:br>
-            <a:r>
-              <a:rPr lang="it-IT" sz="2000" dirty="0" smtClean="0"/>
-              <a:t>più performante</a:t>
+              <a:rPr lang="it-IT" sz="2000" dirty="0">
+                <a:solidFill>
+                  <a:schemeClr val="bg2">
+                    <a:lumMod val="40000"/>
+                    <a:lumOff val="60000"/>
+                  </a:schemeClr>
+                </a:solidFill>
+              </a:rPr>
+              <a:t>Sistema analogico</a:t>
             </a:r>
           </a:p>
           <a:p>
             <a:pPr lvl="1"/>
             <a:r>
-              <a:rPr lang="it-IT" sz="2000" dirty="0" smtClean="0"/>
-              <a:t>Controllore di temperatura</a:t>
+              <a:rPr lang="it-IT" sz="2000" dirty="0">
+                <a:solidFill>
+                  <a:schemeClr val="bg2">
+                    <a:lumMod val="40000"/>
+                    <a:lumOff val="60000"/>
+                  </a:schemeClr>
+                </a:solidFill>
+              </a:rPr>
+              <a:t>Sistema di conversione</a:t>
             </a:r>
           </a:p>
           <a:p>
             <a:pPr lvl="1"/>
             <a:r>
-              <a:rPr lang="it-IT" sz="2000" dirty="0" smtClean="0"/>
-              <a:t>Misura della velocità</a:t>
+              <a:rPr lang="it-IT" sz="2000" dirty="0">
+                <a:solidFill>
+                  <a:schemeClr val="bg2">
+                    <a:lumMod val="40000"/>
+                    <a:lumOff val="60000"/>
+                  </a:schemeClr>
+                </a:solidFill>
+              </a:rPr>
+              <a:t>Sistema digitale</a:t>
+            </a:r>
+          </a:p>
+          <a:p>
+            <a:r>
+              <a:rPr lang="it-IT" sz="2400" dirty="0">
+                <a:solidFill>
+                  <a:schemeClr val="bg2">
+                    <a:lumMod val="40000"/>
+                    <a:lumOff val="60000"/>
+                  </a:schemeClr>
+                </a:solidFill>
+              </a:rPr>
+              <a:t>Architettura software</a:t>
             </a:r>
           </a:p>
           <a:p>
             <a:pPr lvl="1"/>
-            <a:endParaRPr lang="it-IT" sz="2000" dirty="0" smtClean="0"/>
+            <a:r>
+              <a:rPr lang="it-IT" sz="2000" dirty="0">
+                <a:solidFill>
+                  <a:schemeClr val="bg2">
+                    <a:lumMod val="40000"/>
+                    <a:lumOff val="60000"/>
+                  </a:schemeClr>
+                </a:solidFill>
+              </a:rPr>
+              <a:t>Dettagli implementativi</a:t>
+            </a:r>
           </a:p>
           <a:p>
             <a:pPr lvl="1"/>
-            <a:endParaRPr lang="it-IT" sz="2000" dirty="0" smtClean="0"/>
+            <a:r>
+              <a:rPr lang="it-IT" sz="2000" dirty="0" smtClean="0">
+                <a:solidFill>
+                  <a:schemeClr val="bg2">
+                    <a:lumMod val="40000"/>
+                    <a:lumOff val="60000"/>
+                  </a:schemeClr>
+                </a:solidFill>
+              </a:rPr>
+              <a:t>FPGA</a:t>
+            </a:r>
           </a:p>
           <a:p>
             <a:pPr lvl="1"/>
-            <a:endParaRPr lang="it-IT" sz="2000" dirty="0" smtClean="0"/>
+            <a:r>
+              <a:rPr lang="it-IT" sz="2000" dirty="0" smtClean="0">
+                <a:solidFill>
+                  <a:schemeClr val="bg2">
+                    <a:lumMod val="40000"/>
+                    <a:lumOff val="60000"/>
+                  </a:schemeClr>
+                </a:solidFill>
+              </a:rPr>
+              <a:t>Microcontrollore</a:t>
+            </a:r>
+            <a:endParaRPr lang="it-IT" sz="2000" dirty="0">
+              <a:solidFill>
+                <a:schemeClr val="bg2">
+                  <a:lumMod val="40000"/>
+                  <a:lumOff val="60000"/>
+                </a:schemeClr>
+              </a:solidFill>
+            </a:endParaRPr>
+          </a:p>
+          <a:p>
+            <a:pPr lvl="1"/>
+            <a:r>
+              <a:rPr lang="it-IT" sz="2000" dirty="0" smtClean="0">
+                <a:solidFill>
+                  <a:schemeClr val="bg2">
+                    <a:lumMod val="40000"/>
+                    <a:lumOff val="60000"/>
+                  </a:schemeClr>
+                </a:solidFill>
+              </a:rPr>
+              <a:t>Ottimizzazioni</a:t>
+            </a:r>
+            <a:endParaRPr lang="it-IT" sz="2000" dirty="0">
+              <a:solidFill>
+                <a:schemeClr val="bg2">
+                  <a:lumMod val="40000"/>
+                  <a:lumOff val="60000"/>
+                </a:schemeClr>
+              </a:solidFill>
+            </a:endParaRPr>
+          </a:p>
+          <a:p>
+            <a:r>
+              <a:rPr lang="it-IT" sz="2400" dirty="0">
+                <a:solidFill>
+                  <a:schemeClr val="bg2">
+                    <a:lumMod val="40000"/>
+                    <a:lumOff val="60000"/>
+                  </a:schemeClr>
+                </a:solidFill>
+              </a:rPr>
+              <a:t>Risultati sperimentali</a:t>
+            </a:r>
+          </a:p>
+          <a:p>
+            <a:r>
+              <a:rPr lang="it-IT" sz="2400" dirty="0"/>
+              <a:t>Conclusioni e sviluppi futuri</a:t>
+            </a:r>
           </a:p>
         </p:txBody>
       </p:sp>
@@ -15148,86 +15411,10 @@
           </a:p>
         </p:txBody>
       </p:sp>
-      <p:pic>
-        <p:nvPicPr>
-          <p:cNvPr id="7" name="Immagine 6"/>
-          <p:cNvPicPr>
-            <a:picLocks noChangeAspect="1"/>
-          </p:cNvPicPr>
-          <p:nvPr/>
-        </p:nvPicPr>
-        <p:blipFill>
-          <a:blip r:embed="rId2">
-            <a:extLst>
-              <a:ext uri="{28A0092B-C50C-407E-A947-70E740481C1C}">
-                <a14:useLocalDpi xmlns:a14="http://schemas.microsoft.com/office/drawing/2010/main" val="0"/>
-              </a:ext>
-            </a:extLst>
-          </a:blip>
-          <a:stretch>
-            <a:fillRect/>
-          </a:stretch>
-        </p:blipFill>
-        <p:spPr>
-          <a:xfrm>
-            <a:off x="4777314" y="2471832"/>
-            <a:ext cx="4014653" cy="2727698"/>
-          </a:xfrm>
-          <a:prstGeom prst="rect">
-            <a:avLst/>
-          </a:prstGeom>
-        </p:spPr>
-      </p:pic>
-      <p:sp>
-        <p:nvSpPr>
-          <p:cNvPr id="6" name="Ovale 5"/>
-          <p:cNvSpPr/>
-          <p:nvPr/>
-        </p:nvSpPr>
-        <p:spPr>
-          <a:xfrm>
-            <a:off x="5978392" y="4163920"/>
-            <a:ext cx="824178" cy="823782"/>
-          </a:xfrm>
-          <a:prstGeom prst="ellipse">
-            <a:avLst/>
-          </a:prstGeom>
-          <a:noFill/>
-          <a:ln>
-            <a:solidFill>
-              <a:srgbClr val="FF0000"/>
-            </a:solidFill>
-          </a:ln>
-        </p:spPr>
-        <p:style>
-          <a:lnRef idx="2">
-            <a:schemeClr val="accent3">
-              <a:shade val="50000"/>
-            </a:schemeClr>
-          </a:lnRef>
-          <a:fillRef idx="1">
-            <a:schemeClr val="accent3"/>
-          </a:fillRef>
-          <a:effectRef idx="0">
-            <a:schemeClr val="accent3"/>
-          </a:effectRef>
-          <a:fontRef idx="minor">
-            <a:schemeClr val="lt1"/>
-          </a:fontRef>
-        </p:style>
-        <p:txBody>
-          <a:bodyPr rtlCol="0" anchor="ctr"/>
-          <a:lstStyle/>
-          <a:p>
-            <a:pPr algn="ctr"/>
-            <a:endParaRPr lang="it-IT"/>
-          </a:p>
-        </p:txBody>
-      </p:sp>
     </p:spTree>
     <p:extLst>
       <p:ext uri="{BB962C8B-B14F-4D97-AF65-F5344CB8AC3E}">
-        <p14:creationId xmlns:p14="http://schemas.microsoft.com/office/powerpoint/2010/main" val="781321479"/>
+        <p14:creationId xmlns:p14="http://schemas.microsoft.com/office/powerpoint/2010/main" val="2461533339"/>
       </p:ext>
     </p:extLst>
   </p:cSld>
@@ -15263,6 +15450,138 @@
       </p:grpSpPr>
       <p:sp>
         <p:nvSpPr>
+          <p:cNvPr id="2" name="Titolo 1"/>
+          <p:cNvSpPr>
+            <a:spLocks noGrp="1"/>
+          </p:cNvSpPr>
+          <p:nvPr>
+            <p:ph type="title"/>
+          </p:nvPr>
+        </p:nvSpPr>
+        <p:spPr/>
+        <p:txBody>
+          <a:bodyPr/>
+          <a:lstStyle/>
+          <a:p>
+            <a:r>
+              <a:rPr lang="it-IT" dirty="0" smtClean="0"/>
+              <a:t>Conclusioni e sviluppi futuri</a:t>
+            </a:r>
+            <a:endParaRPr lang="it-IT" dirty="0"/>
+          </a:p>
+        </p:txBody>
+      </p:sp>
+      <p:sp>
+        <p:nvSpPr>
+          <p:cNvPr id="3" name="Segnaposto contenuto 2"/>
+          <p:cNvSpPr>
+            <a:spLocks noGrp="1"/>
+          </p:cNvSpPr>
+          <p:nvPr>
+            <p:ph idx="1"/>
+          </p:nvPr>
+        </p:nvSpPr>
+        <p:spPr>
+          <a:xfrm>
+            <a:off x="609600" y="1219200"/>
+            <a:ext cx="7772400" cy="4876800"/>
+          </a:xfrm>
+        </p:spPr>
+        <p:txBody>
+          <a:bodyPr/>
+          <a:lstStyle/>
+          <a:p>
+            <a:r>
+              <a:rPr lang="it-IT" sz="2400" dirty="0" smtClean="0"/>
+              <a:t>I risultati ottenuti hanno portato alla realizzazione di uno strumento di misura con buone prestazioni e a basso costo</a:t>
+            </a:r>
+          </a:p>
+          <a:p>
+            <a:r>
+              <a:rPr lang="it-IT" sz="2400" dirty="0" smtClean="0"/>
+              <a:t> Lo strumento mostra</a:t>
+            </a:r>
+            <a:br>
+              <a:rPr lang="it-IT" sz="2400" dirty="0" smtClean="0"/>
+            </a:br>
+            <a:r>
+              <a:rPr lang="it-IT" sz="2400" dirty="0" smtClean="0"/>
+              <a:t> ancora alcuni limiti:</a:t>
+            </a:r>
+          </a:p>
+          <a:p>
+            <a:pPr lvl="1"/>
+            <a:r>
+              <a:rPr lang="it-IT" sz="2000" dirty="0" smtClean="0"/>
+              <a:t>Frequenza di misura reale</a:t>
+            </a:r>
+            <a:br>
+              <a:rPr lang="it-IT" sz="2000" dirty="0" smtClean="0"/>
+            </a:br>
+            <a:r>
+              <a:rPr lang="it-IT" sz="2000" dirty="0" smtClean="0"/>
+              <a:t>inferiore a quella teorica</a:t>
+            </a:r>
+            <a:endParaRPr lang="it-IT" sz="2000" dirty="0"/>
+          </a:p>
+          <a:p>
+            <a:pPr lvl="1"/>
+            <a:r>
+              <a:rPr lang="it-IT" sz="2000" dirty="0" smtClean="0"/>
+              <a:t>Deriva termica</a:t>
+            </a:r>
+            <a:endParaRPr lang="it-IT" sz="2400" dirty="0" smtClean="0"/>
+          </a:p>
+          <a:p>
+            <a:r>
+              <a:rPr lang="it-IT" sz="2400" dirty="0" smtClean="0"/>
+              <a:t>Sviluppi futuri:</a:t>
+            </a:r>
+          </a:p>
+          <a:p>
+            <a:pPr lvl="1"/>
+            <a:r>
+              <a:rPr lang="it-IT" sz="2000" dirty="0" smtClean="0"/>
+              <a:t>Scheda di prototipazione </a:t>
+            </a:r>
+            <a:br>
+              <a:rPr lang="it-IT" sz="2000" dirty="0" smtClean="0"/>
+            </a:br>
+            <a:r>
+              <a:rPr lang="it-IT" sz="2000" dirty="0" smtClean="0"/>
+              <a:t>più performante</a:t>
+            </a:r>
+          </a:p>
+          <a:p>
+            <a:pPr lvl="1"/>
+            <a:r>
+              <a:rPr lang="it-IT" sz="2000" dirty="0" smtClean="0"/>
+              <a:t>Controllore di temperatura</a:t>
+            </a:r>
+          </a:p>
+          <a:p>
+            <a:pPr lvl="1"/>
+            <a:r>
+              <a:rPr lang="it-IT" sz="2000" dirty="0" smtClean="0"/>
+              <a:t>Misura della velocità</a:t>
+            </a:r>
+          </a:p>
+          <a:p>
+            <a:pPr lvl="1"/>
+            <a:endParaRPr lang="it-IT" sz="2000" dirty="0" smtClean="0"/>
+          </a:p>
+          <a:p>
+            <a:pPr lvl="1"/>
+            <a:endParaRPr lang="it-IT" sz="2000" dirty="0" smtClean="0"/>
+          </a:p>
+          <a:p>
+            <a:pPr lvl="1"/>
+            <a:endParaRPr lang="it-IT" sz="2000" dirty="0" smtClean="0"/>
+          </a:p>
+        </p:txBody>
+      </p:sp>
+      <p:sp>
+        <p:nvSpPr>
           <p:cNvPr id="4" name="Segnaposto numero diapositiva 3"/>
           <p:cNvSpPr>
             <a:spLocks noGrp="1"/>
@@ -15285,41 +15604,86 @@
           </a:p>
         </p:txBody>
       </p:sp>
-      <p:sp>
-        <p:nvSpPr>
-          <p:cNvPr id="5" name="Segnaposto contenuto 4"/>
-          <p:cNvSpPr>
-            <a:spLocks noGrp="1"/>
-          </p:cNvSpPr>
-          <p:nvPr>
-            <p:ph idx="1"/>
-          </p:nvPr>
-        </p:nvSpPr>
+      <p:pic>
+        <p:nvPicPr>
+          <p:cNvPr id="7" name="Immagine 6"/>
+          <p:cNvPicPr>
+            <a:picLocks noChangeAspect="1"/>
+          </p:cNvPicPr>
+          <p:nvPr/>
+        </p:nvPicPr>
+        <p:blipFill>
+          <a:blip r:embed="rId2">
+            <a:extLst>
+              <a:ext uri="{28A0092B-C50C-407E-A947-70E740481C1C}">
+                <a14:useLocalDpi xmlns:a14="http://schemas.microsoft.com/office/drawing/2010/main" val="0"/>
+              </a:ext>
+            </a:extLst>
+          </a:blip>
+          <a:stretch>
+            <a:fillRect/>
+          </a:stretch>
+        </p:blipFill>
         <p:spPr>
           <a:xfrm>
-            <a:off x="761219" y="4514383"/>
-            <a:ext cx="7158038" cy="985837"/>
+            <a:off x="4777314" y="2471832"/>
+            <a:ext cx="4014653" cy="2727698"/>
           </a:xfrm>
+          <a:prstGeom prst="rect">
+            <a:avLst/>
+          </a:prstGeom>
         </p:spPr>
-        <p:txBody>
-          <a:bodyPr/>
+      </p:pic>
+      <p:sp>
+        <p:nvSpPr>
+          <p:cNvPr id="6" name="Ovale 5"/>
+          <p:cNvSpPr/>
+          <p:nvPr/>
+        </p:nvSpPr>
+        <p:spPr>
+          <a:xfrm>
+            <a:off x="5978392" y="4163920"/>
+            <a:ext cx="824178" cy="823782"/>
+          </a:xfrm>
+          <a:prstGeom prst="ellipse">
+            <a:avLst/>
+          </a:prstGeom>
+          <a:noFill/>
+          <a:ln>
+            <a:solidFill>
+              <a:srgbClr val="FF0000"/>
+            </a:solidFill>
+          </a:ln>
+        </p:spPr>
+        <p:style>
+          <a:lnRef idx="2">
+            <a:schemeClr val="accent3">
+              <a:shade val="50000"/>
+            </a:schemeClr>
+          </a:lnRef>
+          <a:fillRef idx="1">
+            <a:schemeClr val="accent3"/>
+          </a:fillRef>
+          <a:effectRef idx="0">
+            <a:schemeClr val="accent3"/>
+          </a:effectRef>
+          <a:fontRef idx="minor">
+            <a:schemeClr val="lt1"/>
+          </a:fontRef>
+        </p:style>
+        <p:txBody>
+          <a:bodyPr rtlCol="0" anchor="ctr"/>
           <a:lstStyle/>
           <a:p>
-            <a:pPr marL="0" indent="0">
-              <a:buNone/>
-            </a:pPr>
-            <a:r>
-              <a:rPr lang="it-IT" sz="4800" dirty="0" smtClean="0"/>
-              <a:t>Grazie per l’attenzione</a:t>
-            </a:r>
-            <a:endParaRPr lang="it-IT" sz="2400" dirty="0"/>
+            <a:pPr algn="ctr"/>
+            <a:endParaRPr lang="it-IT"/>
           </a:p>
         </p:txBody>
       </p:sp>
     </p:spTree>
     <p:extLst>
       <p:ext uri="{BB962C8B-B14F-4D97-AF65-F5344CB8AC3E}">
-        <p14:creationId xmlns:p14="http://schemas.microsoft.com/office/powerpoint/2010/main" val="1960709859"/>
+        <p14:creationId xmlns:p14="http://schemas.microsoft.com/office/powerpoint/2010/main" val="781321479"/>
       </p:ext>
     </p:extLst>
   </p:cSld>
@@ -16059,6 +16423,98 @@
 </p:sld>
 </file>
 
+<file path=ppt/slides/slide30.xml><?xml version="1.0" encoding="utf-8"?>
+<p:sld xmlns:a="http://schemas.openxmlformats.org/drawingml/2006/main" xmlns:r="http://schemas.openxmlformats.org/officeDocument/2006/relationships" xmlns:p="http://schemas.openxmlformats.org/presentationml/2006/main">
+  <p:cSld>
+    <p:spTree>
+      <p:nvGrpSpPr>
+        <p:cNvPr id="1" name=""/>
+        <p:cNvGrpSpPr/>
+        <p:nvPr/>
+      </p:nvGrpSpPr>
+      <p:grpSpPr>
+        <a:xfrm>
+          <a:off x="0" y="0"/>
+          <a:ext cx="0" cy="0"/>
+          <a:chOff x="0" y="0"/>
+          <a:chExt cx="0" cy="0"/>
+        </a:xfrm>
+      </p:grpSpPr>
+      <p:sp>
+        <p:nvSpPr>
+          <p:cNvPr id="4" name="Segnaposto numero diapositiva 3"/>
+          <p:cNvSpPr>
+            <a:spLocks noGrp="1"/>
+          </p:cNvSpPr>
+          <p:nvPr>
+            <p:ph type="sldNum" sz="quarter" idx="11"/>
+          </p:nvPr>
+        </p:nvSpPr>
+        <p:spPr/>
+        <p:txBody>
+          <a:bodyPr/>
+          <a:lstStyle/>
+          <a:p>
+            <a:fld id="{C503DA3A-0C6B-48FC-931E-2C786AAFD5C1}" type="slidenum">
+              <a:rPr lang="en-US" altLang="nl-NL" smtClean="0"/>
+              <a:pPr/>
+              <a:t>30</a:t>
+            </a:fld>
+            <a:endParaRPr lang="en-US" altLang="nl-NL"/>
+          </a:p>
+        </p:txBody>
+      </p:sp>
+      <p:sp>
+        <p:nvSpPr>
+          <p:cNvPr id="5" name="Segnaposto contenuto 4"/>
+          <p:cNvSpPr>
+            <a:spLocks noGrp="1"/>
+          </p:cNvSpPr>
+          <p:nvPr>
+            <p:ph idx="1"/>
+          </p:nvPr>
+        </p:nvSpPr>
+        <p:spPr>
+          <a:xfrm>
+            <a:off x="761219" y="4514383"/>
+            <a:ext cx="7158038" cy="985837"/>
+          </a:xfrm>
+        </p:spPr>
+        <p:txBody>
+          <a:bodyPr/>
+          <a:lstStyle/>
+          <a:p>
+            <a:pPr marL="0" indent="0">
+              <a:buNone/>
+            </a:pPr>
+            <a:r>
+              <a:rPr lang="it-IT" sz="4800" dirty="0" smtClean="0"/>
+              <a:t>Grazie per l’attenzione</a:t>
+            </a:r>
+            <a:endParaRPr lang="it-IT" sz="2400" dirty="0"/>
+          </a:p>
+        </p:txBody>
+      </p:sp>
+    </p:spTree>
+    <p:extLst>
+      <p:ext uri="{BB962C8B-B14F-4D97-AF65-F5344CB8AC3E}">
+        <p14:creationId xmlns:p14="http://schemas.microsoft.com/office/powerpoint/2010/main" val="1960709859"/>
+      </p:ext>
+    </p:extLst>
+  </p:cSld>
+  <p:clrMapOvr>
+    <a:masterClrMapping/>
+  </p:clrMapOvr>
+  <p:timing>
+    <p:tnLst>
+      <p:par>
+        <p:cTn id="1" dur="indefinite" restart="never" nodeType="tmRoot"/>
+      </p:par>
+    </p:tnLst>
+  </p:timing>
+</p:sld>
+</file>
+
 <file path=ppt/slides/slide4.xml><?xml version="1.0" encoding="utf-8"?>
 <p:sld xmlns:a="http://schemas.openxmlformats.org/drawingml/2006/main" xmlns:r="http://schemas.openxmlformats.org/officeDocument/2006/relationships" xmlns:p="http://schemas.openxmlformats.org/presentationml/2006/main">
   <p:cSld>
@@ -16330,8 +16786,8 @@
           <a:chExt cx="0" cy="0"/>
         </a:xfrm>
       </p:grpSpPr>
-      <mc:AlternateContent xmlns:mc="http://schemas.openxmlformats.org/markup-compatibility/2006">
-        <mc:Choice xmlns:a14="http://schemas.microsoft.com/office/drawing/2010/main" Requires="a14">
+      <mc:AlternateContent xmlns:mc="http://schemas.openxmlformats.org/markup-compatibility/2006" xmlns:a14="http://schemas.microsoft.com/office/drawing/2010/main">
+        <mc:Choice Requires="a14">
           <p:sp>
             <p:nvSpPr>
               <p:cNvPr id="3" name="Segnaposto contenuto 2"/>
@@ -16354,23 +16810,7 @@
               <a:p>
                 <a:r>
                   <a:rPr lang="it-IT" sz="2400" dirty="0"/>
-                  <a:t>L’informazione </a:t>
-                </a:r>
-                <a:r>
-                  <a:rPr lang="it-IT" sz="2400" dirty="0"/>
-                  <a:t>sullo </a:t>
-                </a:r>
-                <a:r>
-                  <a:rPr lang="it-IT" sz="2400" dirty="0"/>
-                  <a:t>spostamento del bersaglio è contenuta nel</a:t>
-                </a:r>
-                <a:r>
-                  <a:rPr lang="it-IT" sz="2400" dirty="0"/>
-                  <a:t>l</a:t>
-                </a:r>
-                <a:r>
-                  <a:rPr lang="it-IT" sz="2400" dirty="0"/>
-                  <a:t>a </a:t>
+                  <a:t>L’informazione sullo spostamento del bersaglio è contenuta nella </a:t>
                 </a:r>
                 <a:r>
                   <a:rPr lang="it-IT" sz="2400" b="1" dirty="0"/>
@@ -16397,13 +16837,19 @@
                         <a:rPr lang="it-IT" sz="2400" i="1">
                           <a:latin typeface="Cambria Math" charset="0"/>
                         </a:rPr>
-                        <m:t>=2</m:t>
+                        <m:t>=</m:t>
+                      </m:r>
+                      <m:r>
+                        <a:rPr lang="it-IT" sz="2400" i="1">
+                          <a:latin typeface="Cambria Math" charset="0"/>
+                        </a:rPr>
+                        <m:t>2</m:t>
                       </m:r>
                       <m:f>
                         <m:fPr>
                           <m:ctrlPr>
                             <a:rPr lang="it-IT" sz="2400" i="1">
-                              <a:latin typeface="Cambria Math" charset="0"/>
+                              <a:latin typeface="Cambria Math" panose="02040503050406030204" pitchFamily="18" charset="0"/>
                             </a:rPr>
                           </m:ctrlPr>
                         </m:fPr>
@@ -16444,11 +16890,7 @@
               <a:p>
                 <a:r>
                   <a:rPr lang="it-IT" sz="2400" dirty="0" smtClean="0"/>
-                  <a:t>Il </a:t>
-                </a:r>
-                <a:r>
-                  <a:rPr lang="it-IT" sz="2400" dirty="0" smtClean="0"/>
-                  <a:t>segnale di corrente generato dal fotodiodo è chiamato </a:t>
+                  <a:t>Il segnale di corrente generato dal fotodiodo è chiamato </a:t>
                 </a:r>
                 <a:r>
                   <a:rPr lang="it-IT" sz="2400" b="1" dirty="0" smtClean="0"/>
@@ -16458,11 +16900,7 @@
               <a:p>
                 <a:r>
                   <a:rPr lang="it-IT" sz="2400" dirty="0" smtClean="0"/>
-                  <a:t>Il </a:t>
-                </a:r>
-                <a:r>
-                  <a:rPr lang="it-IT" sz="2400" dirty="0" smtClean="0"/>
-                  <a:t>segnale è </a:t>
+                  <a:t>Il segnale è </a:t>
                 </a:r>
                 <a:r>
                   <a:rPr lang="it-IT" sz="2400" b="1" dirty="0" smtClean="0"/>
@@ -16543,7 +16981,7 @@
             </p:txBody>
           </p:sp>
         </mc:Choice>
-        <mc:Fallback>
+        <mc:Fallback xmlns="">
           <p:sp>
             <p:nvSpPr>
               <p:cNvPr id="3" name="Segnaposto contenuto 2"/>
@@ -17046,7 +17484,7 @@
                         <m:fPr>
                           <m:ctrlPr>
                             <a:rPr lang="it-IT" i="1" smtClean="0">
-                              <a:latin typeface="Cambria Math" charset="0"/>
+                              <a:latin typeface="Cambria Math" panose="02040503050406030204" pitchFamily="18" charset="0"/>
                               <a:ea typeface="Cambria Math" charset="0"/>
                               <a:cs typeface="Cambria Math" charset="0"/>
                             </a:rPr>
@@ -17057,7 +17495,7 @@
                             <m:sSubPr>
                               <m:ctrlPr>
                                 <a:rPr lang="it-IT" i="1" smtClean="0">
-                                  <a:latin typeface="Cambria Math" charset="0"/>
+                                  <a:latin typeface="Cambria Math" panose="02040503050406030204" pitchFamily="18" charset="0"/>
                                   <a:ea typeface="Cambria Math" charset="0"/>
                                   <a:cs typeface="Cambria Math" charset="0"/>
                                 </a:rPr>
@@ -17096,7 +17534,7 @@
                             <m:sSubPr>
                               <m:ctrlPr>
                                 <a:rPr lang="it-IT" b="0" i="1" smtClean="0">
-                                  <a:latin typeface="Cambria Math" charset="0"/>
+                                  <a:latin typeface="Cambria Math" panose="02040503050406030204" pitchFamily="18" charset="0"/>
                                   <a:ea typeface="Cambria Math" charset="0"/>
                                   <a:cs typeface="Cambria Math" charset="0"/>
                                 </a:rPr>
@@ -17555,7 +17993,7 @@
                         <m:fPr>
                           <m:ctrlPr>
                             <a:rPr lang="it-IT" b="0" i="1" smtClean="0">
-                              <a:latin typeface="Cambria Math" charset="0"/>
+                              <a:latin typeface="Cambria Math" panose="02040503050406030204" pitchFamily="18" charset="0"/>
                             </a:rPr>
                           </m:ctrlPr>
                         </m:fPr>
@@ -20055,15 +20493,6 @@
 </file>
 
 <file path=customXml/item1.xml><?xml version="1.0" encoding="utf-8"?>
-<?mso-contentType ?>
-<FormTemplates xmlns="http://schemas.microsoft.com/sharepoint/v3/contenttype/forms">
-  <Display>DocumentLibraryForm</Display>
-  <Edit>DocumentLibraryForm</Edit>
-  <New>DocumentLibraryForm</New>
-</FormTemplates>
-</file>
-
-<file path=customXml/item2.xml><?xml version="1.0" encoding="utf-8"?>
 <ct:contentTypeSchema xmlns:ct="http://schemas.microsoft.com/office/2006/metadata/contentType" xmlns:ma="http://schemas.microsoft.com/office/2006/metadata/properties/metaAttributes" ct:_="" ma:_="" ma:contentTypeName="Documento" ma:contentTypeID="0x010100DAC9E95AF84DC048A0D22167E412CEEC" ma:contentTypeVersion="0" ma:contentTypeDescription="Creare un nuovo documento." ma:contentTypeScope="" ma:versionID="77ab65c81d73c7b1811619c89623d2b9">
   <xsd:schema xmlns:xsd="http://www.w3.org/2001/XMLSchema" xmlns:xs="http://www.w3.org/2001/XMLSchema" xmlns:p="http://schemas.microsoft.com/office/2006/metadata/properties" targetNamespace="http://schemas.microsoft.com/office/2006/metadata/properties" ma:root="true" ma:fieldsID="8bf72f36140baa73d0623520154f6aaf">
     <xsd:element name="properties">
@@ -20177,6 +20606,15 @@
 </ct:contentTypeSchema>
 </file>
 
+<file path=customXml/item2.xml><?xml version="1.0" encoding="utf-8"?>
+<?mso-contentType ?>
+<FormTemplates xmlns="http://schemas.microsoft.com/sharepoint/v3/contenttype/forms">
+  <Display>DocumentLibraryForm</Display>
+  <Edit>DocumentLibraryForm</Edit>
+  <New>DocumentLibraryForm</New>
+</FormTemplates>
+</file>
+
 <file path=customXml/item3.xml><?xml version="1.0" encoding="utf-8"?>
 <p:properties xmlns:p="http://schemas.microsoft.com/office/2006/metadata/properties" xmlns:xsi="http://www.w3.org/2001/XMLSchema-instance" xmlns:pc="http://schemas.microsoft.com/office/infopath/2007/PartnerControls">
   <documentManagement/>
@@ -20184,14 +20622,6 @@
 </file>
 
 <file path=customXml/itemProps1.xml><?xml version="1.0" encoding="utf-8"?>
-<ds:datastoreItem xmlns:ds="http://schemas.openxmlformats.org/officeDocument/2006/customXml" ds:itemID="{642F071F-C090-42AB-8A40-E3A3A8F01244}">
-  <ds:schemaRefs>
-    <ds:schemaRef ds:uri="http://schemas.microsoft.com/sharepoint/v3/contenttype/forms"/>
-  </ds:schemaRefs>
-</ds:datastoreItem>
-</file>
-
-<file path=customXml/itemProps2.xml><?xml version="1.0" encoding="utf-8"?>
 <ds:datastoreItem xmlns:ds="http://schemas.openxmlformats.org/officeDocument/2006/customXml" ds:itemID="{B0C5135E-7452-41DD-A4B7-B217190CFF89}">
   <ds:schemaRefs>
     <ds:schemaRef ds:uri="http://schemas.microsoft.com/office/2006/metadata/contentType"/>
@@ -20203,6 +20633,14 @@
     <ds:schemaRef ds:uri="http://purl.org/dc/terms/"/>
     <ds:schemaRef ds:uri="http://schemas.microsoft.com/internal/obd"/>
     <ds:schemaRef ds:uri="http://schemas.microsoft.com/office/infopath/2007/PartnerControls"/>
+  </ds:schemaRefs>
+</ds:datastoreItem>
+</file>
+
+<file path=customXml/itemProps2.xml><?xml version="1.0" encoding="utf-8"?>
+<ds:datastoreItem xmlns:ds="http://schemas.openxmlformats.org/officeDocument/2006/customXml" ds:itemID="{642F071F-C090-42AB-8A40-E3A3A8F01244}">
+  <ds:schemaRefs>
+    <ds:schemaRef ds:uri="http://schemas.microsoft.com/sharepoint/v3/contenttype/forms"/>
   </ds:schemaRefs>
 </ds:datastoreItem>
 </file>

</xml_diff>

<commit_message>
fixed FPGA software architecture slides
</commit_message>
<xml_diff>
--- a/presentazione_discussione.pptx
+++ b/presentazione_discussione.pptx
@@ -25,8 +25,8 @@
     <p:sldId id="308" r:id="rId16"/>
     <p:sldId id="289" r:id="rId17"/>
     <p:sldId id="305" r:id="rId18"/>
-    <p:sldId id="318" r:id="rId19"/>
-    <p:sldId id="314" r:id="rId20"/>
+    <p:sldId id="314" r:id="rId19"/>
+    <p:sldId id="318" r:id="rId20"/>
     <p:sldId id="315" r:id="rId21"/>
     <p:sldId id="316" r:id="rId22"/>
     <p:sldId id="317" r:id="rId23"/>
@@ -3144,7 +3144,7 @@
     </p:spTree>
     <p:extLst>
       <p:ext uri="{BB962C8B-B14F-4D97-AF65-F5344CB8AC3E}">
-        <p14:creationId xmlns:p14="http://schemas.microsoft.com/office/powerpoint/2010/main" val="3969629172"/>
+        <p14:creationId xmlns:p14="http://schemas.microsoft.com/office/powerpoint/2010/main" val="94307398"/>
       </p:ext>
     </p:extLst>
   </p:cSld>
@@ -3298,7 +3298,7 @@
     </p:spTree>
     <p:extLst>
       <p:ext uri="{BB962C8B-B14F-4D97-AF65-F5344CB8AC3E}">
-        <p14:creationId xmlns:p14="http://schemas.microsoft.com/office/powerpoint/2010/main" val="94307398"/>
+        <p14:creationId xmlns:p14="http://schemas.microsoft.com/office/powerpoint/2010/main" val="3969629172"/>
       </p:ext>
     </p:extLst>
   </p:cSld>
@@ -10068,14 +10068,14 @@
           <a:p>
             <a:pPr lvl="1"/>
             <a:r>
-              <a:rPr lang="it-IT" sz="2000" b="1" dirty="0" smtClean="0"/>
+              <a:rPr lang="it-IT" sz="2000" dirty="0" smtClean="0"/>
               <a:t>Generazione del </a:t>
             </a:r>
             <a:br>
-              <a:rPr lang="it-IT" sz="2000" b="1" dirty="0" smtClean="0"/>
+              <a:rPr lang="it-IT" sz="2000" dirty="0" smtClean="0"/>
             </a:br>
             <a:r>
-              <a:rPr lang="it-IT" sz="2000" b="1" dirty="0" smtClean="0"/>
+              <a:rPr lang="it-IT" sz="2000" dirty="0" smtClean="0"/>
               <a:t>segnale di modulazione </a:t>
             </a:r>
             <a:r>
@@ -10188,253 +10188,6 @@
               <a:rPr lang="en-US" altLang="nl-NL" smtClean="0"/>
               <a:pPr/>
               <a:t>15</a:t>
-            </a:fld>
-            <a:endParaRPr lang="en-US" altLang="nl-NL" dirty="0"/>
-          </a:p>
-        </p:txBody>
-      </p:sp>
-      <p:pic>
-        <p:nvPicPr>
-          <p:cNvPr id="8" name="Immagine 7"/>
-          <p:cNvPicPr>
-            <a:picLocks noChangeAspect="1"/>
-          </p:cNvPicPr>
-          <p:nvPr/>
-        </p:nvPicPr>
-        <p:blipFill>
-          <a:blip r:embed="rId3">
-            <a:extLst>
-              <a:ext uri="{28A0092B-C50C-407E-A947-70E740481C1C}">
-                <a14:useLocalDpi xmlns:a14="http://schemas.microsoft.com/office/drawing/2010/main" val="0"/>
-              </a:ext>
-            </a:extLst>
-          </a:blip>
-          <a:stretch>
-            <a:fillRect/>
-          </a:stretch>
-        </p:blipFill>
-        <p:spPr>
-          <a:xfrm>
-            <a:off x="5483678" y="1447331"/>
-            <a:ext cx="3510643" cy="2508177"/>
-          </a:xfrm>
-          <a:prstGeom prst="rect">
-            <a:avLst/>
-          </a:prstGeom>
-        </p:spPr>
-      </p:pic>
-    </p:spTree>
-    <p:extLst>
-      <p:ext uri="{BB962C8B-B14F-4D97-AF65-F5344CB8AC3E}">
-        <p14:creationId xmlns:p14="http://schemas.microsoft.com/office/powerpoint/2010/main" val="3931982814"/>
-      </p:ext>
-    </p:extLst>
-  </p:cSld>
-  <p:clrMapOvr>
-    <a:masterClrMapping/>
-  </p:clrMapOvr>
-  <p:timing>
-    <p:tnLst>
-      <p:par>
-        <p:cTn id="1" dur="indefinite" restart="never" nodeType="tmRoot"/>
-      </p:par>
-    </p:tnLst>
-  </p:timing>
-</p:sld>
-</file>
-
-<file path=ppt/slides/slide16.xml><?xml version="1.0" encoding="utf-8"?>
-<p:sld xmlns:a="http://schemas.openxmlformats.org/drawingml/2006/main" xmlns:r="http://schemas.openxmlformats.org/officeDocument/2006/relationships" xmlns:p="http://schemas.openxmlformats.org/presentationml/2006/main">
-  <p:cSld>
-    <p:spTree>
-      <p:nvGrpSpPr>
-        <p:cNvPr id="1" name=""/>
-        <p:cNvGrpSpPr/>
-        <p:nvPr/>
-      </p:nvGrpSpPr>
-      <p:grpSpPr>
-        <a:xfrm>
-          <a:off x="0" y="0"/>
-          <a:ext cx="0" cy="0"/>
-          <a:chOff x="0" y="0"/>
-          <a:chExt cx="0" cy="0"/>
-        </a:xfrm>
-      </p:grpSpPr>
-      <p:sp>
-        <p:nvSpPr>
-          <p:cNvPr id="2" name="Titolo 1"/>
-          <p:cNvSpPr>
-            <a:spLocks noGrp="1"/>
-          </p:cNvSpPr>
-          <p:nvPr>
-            <p:ph type="title"/>
-          </p:nvPr>
-        </p:nvSpPr>
-        <p:spPr/>
-        <p:txBody>
-          <a:bodyPr/>
-          <a:lstStyle/>
-          <a:p>
-            <a:r>
-              <a:rPr lang="it-IT" dirty="0" smtClean="0"/>
-              <a:t>FPGA</a:t>
-            </a:r>
-            <a:endParaRPr lang="it-IT" dirty="0"/>
-          </a:p>
-        </p:txBody>
-      </p:sp>
-      <p:sp>
-        <p:nvSpPr>
-          <p:cNvPr id="3" name="Segnaposto contenuto 2"/>
-          <p:cNvSpPr>
-            <a:spLocks noGrp="1"/>
-          </p:cNvSpPr>
-          <p:nvPr>
-            <p:ph idx="1"/>
-          </p:nvPr>
-        </p:nvSpPr>
-        <p:spPr>
-          <a:xfrm>
-            <a:off x="609600" y="1024102"/>
-            <a:ext cx="8120063" cy="5093494"/>
-          </a:xfrm>
-        </p:spPr>
-        <p:txBody>
-          <a:bodyPr/>
-          <a:lstStyle/>
-          <a:p>
-            <a:r>
-              <a:rPr lang="it-IT" sz="2400" dirty="0" smtClean="0"/>
-              <a:t>Le funzionalità svolte in hardware dal FPGA sono:</a:t>
-            </a:r>
-            <a:br>
-              <a:rPr lang="it-IT" sz="2400" dirty="0" smtClean="0"/>
-            </a:br>
-            <a:endParaRPr lang="it-IT" sz="2400" dirty="0" smtClean="0"/>
-          </a:p>
-          <a:p>
-            <a:pPr lvl="1"/>
-            <a:r>
-              <a:rPr lang="it-IT" sz="2000" dirty="0" smtClean="0"/>
-              <a:t>Generazione del </a:t>
-            </a:r>
-            <a:br>
-              <a:rPr lang="it-IT" sz="2000" dirty="0" smtClean="0"/>
-            </a:br>
-            <a:r>
-              <a:rPr lang="it-IT" sz="2000" dirty="0" smtClean="0"/>
-              <a:t>segnale di modulazione </a:t>
-            </a:r>
-            <a:r>
-              <a:rPr lang="it-IT" sz="2000" i="1" dirty="0" smtClean="0"/>
-              <a:t/>
-            </a:r>
-            <a:br>
-              <a:rPr lang="it-IT" sz="2000" i="1" dirty="0" smtClean="0"/>
-            </a:br>
-            <a:endParaRPr lang="it-IT" sz="2000" i="1" dirty="0" smtClean="0"/>
-          </a:p>
-          <a:p>
-            <a:pPr lvl="1"/>
-            <a:r>
-              <a:rPr lang="it-IT" sz="2000" dirty="0" smtClean="0"/>
-              <a:t>Campionamento </a:t>
-            </a:r>
-            <a:br>
-              <a:rPr lang="it-IT" sz="2000" dirty="0" smtClean="0"/>
-            </a:br>
-            <a:r>
-              <a:rPr lang="it-IT" sz="2000" dirty="0" smtClean="0"/>
-              <a:t>del segnale interferometrico </a:t>
-            </a:r>
-            <a:br>
-              <a:rPr lang="it-IT" sz="2000" dirty="0" smtClean="0"/>
-            </a:br>
-            <a:r>
-              <a:rPr lang="it-IT" sz="2000" dirty="0" smtClean="0"/>
-              <a:t>a </a:t>
-            </a:r>
-            <a:r>
-              <a:rPr lang="it-IT" sz="2000" i="1" dirty="0" smtClean="0"/>
-              <a:t>30MHz</a:t>
-            </a:r>
-            <a:br>
-              <a:rPr lang="it-IT" sz="2000" i="1" dirty="0" smtClean="0"/>
-            </a:br>
-            <a:endParaRPr lang="it-IT" sz="2000" i="1" dirty="0" smtClean="0"/>
-          </a:p>
-          <a:p>
-            <a:pPr lvl="1"/>
-            <a:r>
-              <a:rPr lang="it-IT" sz="2000" dirty="0" smtClean="0"/>
-              <a:t>Calcolo </a:t>
-            </a:r>
-            <a:br>
-              <a:rPr lang="it-IT" sz="2000" dirty="0" smtClean="0"/>
-            </a:br>
-            <a:r>
-              <a:rPr lang="it-IT" sz="2000" dirty="0" smtClean="0"/>
-              <a:t>della Fast Fourier </a:t>
-            </a:r>
-            <a:r>
-              <a:rPr lang="it-IT" sz="2000" dirty="0" err="1" smtClean="0"/>
-              <a:t>Transform</a:t>
-            </a:r>
-            <a:r>
-              <a:rPr lang="it-IT" sz="2000" dirty="0" smtClean="0"/>
-              <a:t> </a:t>
-            </a:r>
-            <a:r>
-              <a:rPr lang="it-IT" sz="2000" b="1" dirty="0" smtClean="0"/>
-              <a:t/>
-            </a:r>
-            <a:br>
-              <a:rPr lang="it-IT" sz="2000" b="1" dirty="0" smtClean="0"/>
-            </a:br>
-            <a:r>
-              <a:rPr lang="it-IT" sz="2000" dirty="0" smtClean="0"/>
-              <a:t>(FFT)</a:t>
-            </a:r>
-            <a:br>
-              <a:rPr lang="it-IT" sz="2000" dirty="0" smtClean="0"/>
-            </a:br>
-            <a:endParaRPr lang="it-IT" sz="2000" dirty="0" smtClean="0"/>
-          </a:p>
-          <a:p>
-            <a:pPr lvl="1"/>
-            <a:r>
-              <a:rPr lang="it-IT" sz="2000" dirty="0" smtClean="0"/>
-              <a:t>Estrazione </a:t>
-            </a:r>
-            <a:br>
-              <a:rPr lang="it-IT" sz="2000" dirty="0" smtClean="0"/>
-            </a:br>
-            <a:r>
-              <a:rPr lang="it-IT" sz="2000" dirty="0" smtClean="0"/>
-              <a:t>del tono fondamentale dal FFT</a:t>
-            </a:r>
-          </a:p>
-        </p:txBody>
-      </p:sp>
-      <p:sp>
-        <p:nvSpPr>
-          <p:cNvPr id="4" name="Segnaposto numero diapositiva 3"/>
-          <p:cNvSpPr>
-            <a:spLocks noGrp="1"/>
-          </p:cNvSpPr>
-          <p:nvPr>
-            <p:ph type="sldNum" sz="quarter" idx="11"/>
-          </p:nvPr>
-        </p:nvSpPr>
-        <p:spPr/>
-        <p:txBody>
-          <a:bodyPr/>
-          <a:lstStyle/>
-          <a:p>
-            <a:fld id="{C503DA3A-0C6B-48FC-931E-2C786AAFD5C1}" type="slidenum">
-              <a:rPr lang="en-US" altLang="nl-NL" smtClean="0"/>
-              <a:pPr/>
-              <a:t>16</a:t>
             </a:fld>
             <a:endParaRPr lang="en-US" altLang="nl-NL" dirty="0"/>
           </a:p>
@@ -10490,6 +10243,257 @@
 </p:sld>
 </file>
 
+<file path=ppt/slides/slide16.xml><?xml version="1.0" encoding="utf-8"?>
+<p:sld xmlns:a="http://schemas.openxmlformats.org/drawingml/2006/main" xmlns:r="http://schemas.openxmlformats.org/officeDocument/2006/relationships" xmlns:p="http://schemas.openxmlformats.org/presentationml/2006/main">
+  <p:cSld>
+    <p:spTree>
+      <p:nvGrpSpPr>
+        <p:cNvPr id="1" name=""/>
+        <p:cNvGrpSpPr/>
+        <p:nvPr/>
+      </p:nvGrpSpPr>
+      <p:grpSpPr>
+        <a:xfrm>
+          <a:off x="0" y="0"/>
+          <a:ext cx="0" cy="0"/>
+          <a:chOff x="0" y="0"/>
+          <a:chExt cx="0" cy="0"/>
+        </a:xfrm>
+      </p:grpSpPr>
+      <p:sp>
+        <p:nvSpPr>
+          <p:cNvPr id="2" name="Titolo 1"/>
+          <p:cNvSpPr>
+            <a:spLocks noGrp="1"/>
+          </p:cNvSpPr>
+          <p:nvPr>
+            <p:ph type="title"/>
+          </p:nvPr>
+        </p:nvSpPr>
+        <p:spPr/>
+        <p:txBody>
+          <a:bodyPr/>
+          <a:lstStyle/>
+          <a:p>
+            <a:r>
+              <a:rPr lang="it-IT" dirty="0" smtClean="0"/>
+              <a:t>FPGA</a:t>
+            </a:r>
+            <a:endParaRPr lang="it-IT" dirty="0"/>
+          </a:p>
+        </p:txBody>
+      </p:sp>
+      <p:sp>
+        <p:nvSpPr>
+          <p:cNvPr id="3" name="Segnaposto contenuto 2"/>
+          <p:cNvSpPr>
+            <a:spLocks noGrp="1"/>
+          </p:cNvSpPr>
+          <p:nvPr>
+            <p:ph idx="1"/>
+          </p:nvPr>
+        </p:nvSpPr>
+        <p:spPr>
+          <a:xfrm>
+            <a:off x="609600" y="1024102"/>
+            <a:ext cx="8120063" cy="5093494"/>
+          </a:xfrm>
+        </p:spPr>
+        <p:txBody>
+          <a:bodyPr/>
+          <a:lstStyle/>
+          <a:p>
+            <a:r>
+              <a:rPr lang="it-IT" sz="2400" dirty="0" smtClean="0"/>
+              <a:t>Le funzionalità svolte in hardware dal FPGA sono:</a:t>
+            </a:r>
+            <a:br>
+              <a:rPr lang="it-IT" sz="2400" dirty="0" smtClean="0"/>
+            </a:br>
+            <a:endParaRPr lang="it-IT" sz="2400" dirty="0" smtClean="0"/>
+          </a:p>
+          <a:p>
+            <a:pPr lvl="1"/>
+            <a:r>
+              <a:rPr lang="it-IT" sz="2000" b="1" dirty="0" smtClean="0"/>
+              <a:t>Generazione del </a:t>
+            </a:r>
+            <a:br>
+              <a:rPr lang="it-IT" sz="2000" b="1" dirty="0" smtClean="0"/>
+            </a:br>
+            <a:r>
+              <a:rPr lang="it-IT" sz="2000" b="1" dirty="0" smtClean="0"/>
+              <a:t>segnale di modulazione </a:t>
+            </a:r>
+            <a:r>
+              <a:rPr lang="it-IT" sz="2000" i="1" dirty="0" smtClean="0"/>
+              <a:t/>
+            </a:r>
+            <a:br>
+              <a:rPr lang="it-IT" sz="2000" i="1" dirty="0" smtClean="0"/>
+            </a:br>
+            <a:endParaRPr lang="it-IT" sz="2000" i="1" dirty="0" smtClean="0"/>
+          </a:p>
+          <a:p>
+            <a:pPr lvl="1"/>
+            <a:r>
+              <a:rPr lang="it-IT" sz="2000" dirty="0" smtClean="0"/>
+              <a:t>Campionamento </a:t>
+            </a:r>
+            <a:br>
+              <a:rPr lang="it-IT" sz="2000" dirty="0" smtClean="0"/>
+            </a:br>
+            <a:r>
+              <a:rPr lang="it-IT" sz="2000" dirty="0" smtClean="0"/>
+              <a:t>del segnale interferometrico </a:t>
+            </a:r>
+            <a:br>
+              <a:rPr lang="it-IT" sz="2000" dirty="0" smtClean="0"/>
+            </a:br>
+            <a:r>
+              <a:rPr lang="it-IT" sz="2000" dirty="0" smtClean="0"/>
+              <a:t>a </a:t>
+            </a:r>
+            <a:r>
+              <a:rPr lang="it-IT" sz="2000" i="1" dirty="0" smtClean="0"/>
+              <a:t>30MHz</a:t>
+            </a:r>
+            <a:br>
+              <a:rPr lang="it-IT" sz="2000" i="1" dirty="0" smtClean="0"/>
+            </a:br>
+            <a:endParaRPr lang="it-IT" sz="2000" i="1" dirty="0" smtClean="0"/>
+          </a:p>
+          <a:p>
+            <a:pPr lvl="1"/>
+            <a:r>
+              <a:rPr lang="it-IT" sz="2000" dirty="0" smtClean="0"/>
+              <a:t>Calcolo </a:t>
+            </a:r>
+            <a:br>
+              <a:rPr lang="it-IT" sz="2000" dirty="0" smtClean="0"/>
+            </a:br>
+            <a:r>
+              <a:rPr lang="it-IT" sz="2000" dirty="0" smtClean="0"/>
+              <a:t>della Fast Fourier </a:t>
+            </a:r>
+            <a:r>
+              <a:rPr lang="it-IT" sz="2000" dirty="0" err="1" smtClean="0"/>
+              <a:t>Transform</a:t>
+            </a:r>
+            <a:r>
+              <a:rPr lang="it-IT" sz="2000" dirty="0" smtClean="0"/>
+              <a:t> </a:t>
+            </a:r>
+            <a:r>
+              <a:rPr lang="it-IT" sz="2000" b="1" dirty="0" smtClean="0"/>
+              <a:t/>
+            </a:r>
+            <a:br>
+              <a:rPr lang="it-IT" sz="2000" b="1" dirty="0" smtClean="0"/>
+            </a:br>
+            <a:r>
+              <a:rPr lang="it-IT" sz="2000" dirty="0" smtClean="0"/>
+              <a:t>a 512 campioni(FFT</a:t>
+            </a:r>
+            <a:r>
+              <a:rPr lang="it-IT" sz="2000" dirty="0" smtClean="0"/>
+              <a:t>)</a:t>
+            </a:r>
+            <a:br>
+              <a:rPr lang="it-IT" sz="2000" dirty="0" smtClean="0"/>
+            </a:br>
+            <a:endParaRPr lang="it-IT" sz="2000" dirty="0" smtClean="0"/>
+          </a:p>
+          <a:p>
+            <a:pPr lvl="1"/>
+            <a:r>
+              <a:rPr lang="it-IT" sz="2000" dirty="0" smtClean="0"/>
+              <a:t>Estrazione </a:t>
+            </a:r>
+            <a:br>
+              <a:rPr lang="it-IT" sz="2000" dirty="0" smtClean="0"/>
+            </a:br>
+            <a:r>
+              <a:rPr lang="it-IT" sz="2000" dirty="0" smtClean="0"/>
+              <a:t>del tono fondamentale dal FFT</a:t>
+            </a:r>
+          </a:p>
+        </p:txBody>
+      </p:sp>
+      <p:sp>
+        <p:nvSpPr>
+          <p:cNvPr id="4" name="Segnaposto numero diapositiva 3"/>
+          <p:cNvSpPr>
+            <a:spLocks noGrp="1"/>
+          </p:cNvSpPr>
+          <p:nvPr>
+            <p:ph type="sldNum" sz="quarter" idx="11"/>
+          </p:nvPr>
+        </p:nvSpPr>
+        <p:spPr/>
+        <p:txBody>
+          <a:bodyPr/>
+          <a:lstStyle/>
+          <a:p>
+            <a:fld id="{C503DA3A-0C6B-48FC-931E-2C786AAFD5C1}" type="slidenum">
+              <a:rPr lang="en-US" altLang="nl-NL" smtClean="0"/>
+              <a:pPr/>
+              <a:t>16</a:t>
+            </a:fld>
+            <a:endParaRPr lang="en-US" altLang="nl-NL" dirty="0"/>
+          </a:p>
+        </p:txBody>
+      </p:sp>
+      <p:pic>
+        <p:nvPicPr>
+          <p:cNvPr id="8" name="Immagine 7"/>
+          <p:cNvPicPr>
+            <a:picLocks noChangeAspect="1"/>
+          </p:cNvPicPr>
+          <p:nvPr/>
+        </p:nvPicPr>
+        <p:blipFill>
+          <a:blip r:embed="rId3">
+            <a:extLst>
+              <a:ext uri="{28A0092B-C50C-407E-A947-70E740481C1C}">
+                <a14:useLocalDpi xmlns:a14="http://schemas.microsoft.com/office/drawing/2010/main" val="0"/>
+              </a:ext>
+            </a:extLst>
+          </a:blip>
+          <a:stretch>
+            <a:fillRect/>
+          </a:stretch>
+        </p:blipFill>
+        <p:spPr>
+          <a:xfrm>
+            <a:off x="5219020" y="2316760"/>
+            <a:ext cx="3510643" cy="2508177"/>
+          </a:xfrm>
+          <a:prstGeom prst="rect">
+            <a:avLst/>
+          </a:prstGeom>
+        </p:spPr>
+      </p:pic>
+    </p:spTree>
+    <p:extLst>
+      <p:ext uri="{BB962C8B-B14F-4D97-AF65-F5344CB8AC3E}">
+        <p14:creationId xmlns:p14="http://schemas.microsoft.com/office/powerpoint/2010/main" val="3931982814"/>
+      </p:ext>
+    </p:extLst>
+  </p:cSld>
+  <p:clrMapOvr>
+    <a:masterClrMapping/>
+  </p:clrMapOvr>
+  <p:timing>
+    <p:tnLst>
+      <p:par>
+        <p:cTn id="1" dur="indefinite" restart="never" nodeType="tmRoot"/>
+      </p:par>
+    </p:tnLst>
+  </p:timing>
+</p:sld>
+</file>
+
 <file path=ppt/slides/slide17.xml><?xml version="1.0" encoding="utf-8"?>
 <p:sld xmlns:a="http://schemas.openxmlformats.org/drawingml/2006/main" xmlns:r="http://schemas.openxmlformats.org/officeDocument/2006/relationships" xmlns:p="http://schemas.openxmlformats.org/presentationml/2006/main">
   <p:cSld>
@@ -10713,7 +10717,7 @@
         </p:blipFill>
         <p:spPr>
           <a:xfrm>
-            <a:off x="5483678" y="2074475"/>
+            <a:off x="5219020" y="2254357"/>
             <a:ext cx="3510643" cy="2632983"/>
           </a:xfrm>
           <a:prstGeom prst="rect">
@@ -10783,139 +10787,6 @@
       </p:sp>
       <p:sp>
         <p:nvSpPr>
-          <p:cNvPr id="3" name="Segnaposto contenuto 2"/>
-          <p:cNvSpPr>
-            <a:spLocks noGrp="1"/>
-          </p:cNvSpPr>
-          <p:nvPr>
-            <p:ph idx="1"/>
-          </p:nvPr>
-        </p:nvSpPr>
-        <p:spPr>
-          <a:xfrm>
-            <a:off x="609600" y="1024102"/>
-            <a:ext cx="8120063" cy="5093494"/>
-          </a:xfrm>
-        </p:spPr>
-        <p:txBody>
-          <a:bodyPr/>
-          <a:lstStyle/>
-          <a:p>
-            <a:r>
-              <a:rPr lang="it-IT" sz="2400" dirty="0" smtClean="0"/>
-              <a:t>Le funzionalità svolte in hardware dal FPGA sono:</a:t>
-            </a:r>
-            <a:br>
-              <a:rPr lang="it-IT" sz="2400" dirty="0" smtClean="0"/>
-            </a:br>
-            <a:endParaRPr lang="it-IT" sz="2400" dirty="0" smtClean="0"/>
-          </a:p>
-          <a:p>
-            <a:pPr lvl="1"/>
-            <a:r>
-              <a:rPr lang="it-IT" sz="2000" dirty="0" smtClean="0"/>
-              <a:t>Generazione del </a:t>
-            </a:r>
-            <a:br>
-              <a:rPr lang="it-IT" sz="2000" dirty="0" smtClean="0"/>
-            </a:br>
-            <a:r>
-              <a:rPr lang="it-IT" sz="2000" dirty="0" smtClean="0"/>
-              <a:t>segnale di modulazione </a:t>
-            </a:r>
-            <a:r>
-              <a:rPr lang="it-IT" sz="2000" i="1" dirty="0" smtClean="0"/>
-              <a:t/>
-            </a:r>
-            <a:br>
-              <a:rPr lang="it-IT" sz="2000" i="1" dirty="0" smtClean="0"/>
-            </a:br>
-            <a:endParaRPr lang="it-IT" sz="2000" i="1" dirty="0" smtClean="0"/>
-          </a:p>
-          <a:p>
-            <a:pPr lvl="1"/>
-            <a:r>
-              <a:rPr lang="it-IT" sz="2000" dirty="0" smtClean="0"/>
-              <a:t>Campionamento </a:t>
-            </a:r>
-            <a:br>
-              <a:rPr lang="it-IT" sz="2000" dirty="0" smtClean="0"/>
-            </a:br>
-            <a:r>
-              <a:rPr lang="it-IT" sz="2000" dirty="0" smtClean="0"/>
-              <a:t>del segnale interferometrico </a:t>
-            </a:r>
-            <a:br>
-              <a:rPr lang="it-IT" sz="2000" dirty="0" smtClean="0"/>
-            </a:br>
-            <a:r>
-              <a:rPr lang="it-IT" sz="2000" dirty="0" smtClean="0"/>
-              <a:t>a </a:t>
-            </a:r>
-            <a:r>
-              <a:rPr lang="it-IT" sz="2000" i="1" dirty="0" smtClean="0"/>
-              <a:t>30MHz</a:t>
-            </a:r>
-            <a:br>
-              <a:rPr lang="it-IT" sz="2000" i="1" dirty="0" smtClean="0"/>
-            </a:br>
-            <a:endParaRPr lang="it-IT" sz="2000" i="1" dirty="0" smtClean="0"/>
-          </a:p>
-          <a:p>
-            <a:pPr lvl="1"/>
-            <a:r>
-              <a:rPr lang="it-IT" sz="2000" b="1" dirty="0" smtClean="0"/>
-              <a:t>Calcolo </a:t>
-            </a:r>
-            <a:br>
-              <a:rPr lang="it-IT" sz="2000" b="1" dirty="0" smtClean="0"/>
-            </a:br>
-            <a:r>
-              <a:rPr lang="it-IT" sz="2000" b="1" dirty="0" smtClean="0"/>
-              <a:t>della Fast Fourier </a:t>
-            </a:r>
-            <a:r>
-              <a:rPr lang="it-IT" sz="2000" b="1" dirty="0" err="1" smtClean="0"/>
-              <a:t>Transform</a:t>
-            </a:r>
-            <a:r>
-              <a:rPr lang="it-IT" sz="2000" b="1" dirty="0" smtClean="0"/>
-              <a:t> </a:t>
-            </a:r>
-            <a:br>
-              <a:rPr lang="it-IT" sz="2000" b="1" dirty="0" smtClean="0"/>
-            </a:br>
-            <a:r>
-              <a:rPr lang="it-IT" sz="2000" b="1" dirty="0" smtClean="0"/>
-              <a:t>(FFT)</a:t>
-            </a:r>
-            <a:r>
-              <a:rPr lang="it-IT" sz="2000" dirty="0" smtClean="0"/>
-              <a:t/>
-            </a:r>
-            <a:br>
-              <a:rPr lang="it-IT" sz="2000" dirty="0" smtClean="0"/>
-            </a:br>
-            <a:endParaRPr lang="it-IT" sz="2000" dirty="0" smtClean="0"/>
-          </a:p>
-          <a:p>
-            <a:pPr lvl="1"/>
-            <a:r>
-              <a:rPr lang="it-IT" sz="2000" dirty="0" smtClean="0"/>
-              <a:t>Estrazione </a:t>
-            </a:r>
-            <a:br>
-              <a:rPr lang="it-IT" sz="2000" dirty="0" smtClean="0"/>
-            </a:br>
-            <a:r>
-              <a:rPr lang="it-IT" sz="2000" dirty="0" smtClean="0"/>
-              <a:t>del tono fondamentale dal FFT</a:t>
-            </a:r>
-          </a:p>
-        </p:txBody>
-      </p:sp>
-      <p:sp>
-        <p:nvSpPr>
           <p:cNvPr id="4" name="Segnaposto numero diapositiva 3"/>
           <p:cNvSpPr>
             <a:spLocks noGrp="1"/>
@@ -10960,7 +10831,7 @@
         </p:blipFill>
         <p:spPr>
           <a:xfrm>
-            <a:off x="5515031" y="3808736"/>
+            <a:off x="5281726" y="2277873"/>
             <a:ext cx="3447937" cy="2585952"/>
           </a:xfrm>
           <a:prstGeom prst="rect">
@@ -10968,6 +10839,143 @@
           </a:prstGeom>
         </p:spPr>
       </p:pic>
+      <p:sp>
+        <p:nvSpPr>
+          <p:cNvPr id="9" name="Segnaposto contenuto 2"/>
+          <p:cNvSpPr>
+            <a:spLocks noGrp="1"/>
+          </p:cNvSpPr>
+          <p:nvPr>
+            <p:ph idx="1"/>
+          </p:nvPr>
+        </p:nvSpPr>
+        <p:spPr>
+          <a:xfrm>
+            <a:off x="609600" y="1024102"/>
+            <a:ext cx="8120063" cy="5093494"/>
+          </a:xfrm>
+        </p:spPr>
+        <p:txBody>
+          <a:bodyPr/>
+          <a:lstStyle/>
+          <a:p>
+            <a:r>
+              <a:rPr lang="it-IT" sz="2400" dirty="0" smtClean="0"/>
+              <a:t>Le funzionalità svolte in hardware dal FPGA sono:</a:t>
+            </a:r>
+            <a:br>
+              <a:rPr lang="it-IT" sz="2400" dirty="0" smtClean="0"/>
+            </a:br>
+            <a:endParaRPr lang="it-IT" sz="2400" dirty="0" smtClean="0"/>
+          </a:p>
+          <a:p>
+            <a:pPr lvl="1"/>
+            <a:r>
+              <a:rPr lang="it-IT" sz="2000" dirty="0" smtClean="0"/>
+              <a:t>Generazione del </a:t>
+            </a:r>
+            <a:br>
+              <a:rPr lang="it-IT" sz="2000" dirty="0" smtClean="0"/>
+            </a:br>
+            <a:r>
+              <a:rPr lang="it-IT" sz="2000" dirty="0" smtClean="0"/>
+              <a:t>segnale di modulazione </a:t>
+            </a:r>
+            <a:r>
+              <a:rPr lang="it-IT" sz="2000" i="1" dirty="0" smtClean="0"/>
+              <a:t/>
+            </a:r>
+            <a:br>
+              <a:rPr lang="it-IT" sz="2000" i="1" dirty="0" smtClean="0"/>
+            </a:br>
+            <a:endParaRPr lang="it-IT" sz="2000" i="1" dirty="0" smtClean="0"/>
+          </a:p>
+          <a:p>
+            <a:pPr lvl="1"/>
+            <a:r>
+              <a:rPr lang="it-IT" sz="2000" dirty="0" smtClean="0"/>
+              <a:t>Campionamento </a:t>
+            </a:r>
+            <a:br>
+              <a:rPr lang="it-IT" sz="2000" dirty="0" smtClean="0"/>
+            </a:br>
+            <a:r>
+              <a:rPr lang="it-IT" sz="2000" dirty="0" smtClean="0"/>
+              <a:t>del segnale interferometrico </a:t>
+            </a:r>
+            <a:br>
+              <a:rPr lang="it-IT" sz="2000" dirty="0" smtClean="0"/>
+            </a:br>
+            <a:r>
+              <a:rPr lang="it-IT" sz="2000" dirty="0" smtClean="0"/>
+              <a:t>a </a:t>
+            </a:r>
+            <a:r>
+              <a:rPr lang="it-IT" sz="2000" i="1" dirty="0" smtClean="0"/>
+              <a:t>30MHz</a:t>
+            </a:r>
+            <a:br>
+              <a:rPr lang="it-IT" sz="2000" i="1" dirty="0" smtClean="0"/>
+            </a:br>
+            <a:endParaRPr lang="it-IT" sz="2000" i="1" dirty="0" smtClean="0"/>
+          </a:p>
+          <a:p>
+            <a:pPr lvl="1"/>
+            <a:r>
+              <a:rPr lang="it-IT" sz="2000" b="1" dirty="0" smtClean="0"/>
+              <a:t>Calcolo </a:t>
+            </a:r>
+            <a:br>
+              <a:rPr lang="it-IT" sz="2000" b="1" dirty="0" smtClean="0"/>
+            </a:br>
+            <a:r>
+              <a:rPr lang="it-IT" sz="2000" b="1" dirty="0" smtClean="0"/>
+              <a:t>della Fast Fourier </a:t>
+            </a:r>
+            <a:r>
+              <a:rPr lang="it-IT" sz="2000" b="1" dirty="0" err="1" smtClean="0"/>
+              <a:t>Transform</a:t>
+            </a:r>
+            <a:r>
+              <a:rPr lang="it-IT" sz="2000" b="1" dirty="0" smtClean="0"/>
+              <a:t/>
+            </a:r>
+            <a:br>
+              <a:rPr lang="it-IT" sz="2000" b="1" dirty="0" smtClean="0"/>
+            </a:br>
+            <a:r>
+              <a:rPr lang="it-IT" sz="2000" b="1" dirty="0" smtClean="0"/>
+              <a:t>a 512 campioni (FFT</a:t>
+            </a:r>
+            <a:r>
+              <a:rPr lang="it-IT" sz="2000" b="1" dirty="0" smtClean="0"/>
+              <a:t>)</a:t>
+            </a:r>
+            <a:r>
+              <a:rPr lang="it-IT" sz="2000" dirty="0" smtClean="0"/>
+              <a:t/>
+            </a:r>
+            <a:br>
+              <a:rPr lang="it-IT" sz="2000" dirty="0" smtClean="0"/>
+            </a:br>
+            <a:endParaRPr lang="it-IT" sz="2000" dirty="0" smtClean="0"/>
+          </a:p>
+          <a:p>
+            <a:pPr lvl="1"/>
+            <a:r>
+              <a:rPr lang="it-IT" sz="2000" dirty="0" smtClean="0"/>
+              <a:t>Estrazione </a:t>
+            </a:r>
+            <a:br>
+              <a:rPr lang="it-IT" sz="2000" dirty="0" smtClean="0"/>
+            </a:br>
+            <a:r>
+              <a:rPr lang="it-IT" sz="2000" dirty="0" smtClean="0"/>
+              <a:t>del tono fondamentale dal FFT</a:t>
+            </a:r>
+          </a:p>
+        </p:txBody>
+      </p:sp>
     </p:spTree>
     <p:extLst>
       <p:ext uri="{BB962C8B-B14F-4D97-AF65-F5344CB8AC3E}">
@@ -11129,16 +11137,16 @@
               <a:rPr lang="it-IT" sz="2000" dirty="0" smtClean="0"/>
               <a:t> </a:t>
             </a:r>
-            <a:r>
-              <a:rPr lang="it-IT" sz="2000" b="1" dirty="0" smtClean="0"/>
-              <a:t/>
-            </a:r>
             <a:br>
-              <a:rPr lang="it-IT" sz="2000" b="1" dirty="0" smtClean="0"/>
+              <a:rPr lang="it-IT" sz="2000" dirty="0" smtClean="0"/>
             </a:br>
             <a:r>
               <a:rPr lang="it-IT" sz="2000" dirty="0" smtClean="0"/>
-              <a:t>(FFT)</a:t>
+              <a:t>a 512 campioni (</a:t>
+            </a:r>
+            <a:r>
+              <a:rPr lang="it-IT" sz="2000" dirty="0" smtClean="0"/>
+              <a:t>FFT)</a:t>
             </a:r>
             <a:br>
               <a:rPr lang="it-IT" sz="2000" dirty="0" smtClean="0"/>
@@ -11207,7 +11215,7 @@
         </p:blipFill>
         <p:spPr>
           <a:xfrm>
-            <a:off x="5515031" y="3793746"/>
+            <a:off x="5281726" y="2277873"/>
             <a:ext cx="3447937" cy="2585952"/>
           </a:xfrm>
           <a:prstGeom prst="rect">
@@ -11223,7 +11231,7 @@
         </p:nvSpPr>
         <p:spPr>
           <a:xfrm>
-            <a:off x="6385810" y="3823726"/>
+            <a:off x="6140277" y="2277873"/>
             <a:ext cx="539646" cy="508431"/>
           </a:xfrm>
           <a:prstGeom prst="donut">
@@ -11232,8 +11240,13 @@
             </a:avLst>
           </a:prstGeom>
           <a:solidFill>
-            <a:schemeClr val="tx1"/>
+            <a:schemeClr val="accent2"/>
           </a:solidFill>
+          <a:ln>
+            <a:solidFill>
+              <a:schemeClr val="tx1"/>
+            </a:solidFill>
+          </a:ln>
         </p:spPr>
         <p:style>
           <a:lnRef idx="2">
@@ -13836,17 +13849,7 @@
                             <a:ea typeface="Lucida Grande" charset="0"/>
                             <a:cs typeface="Lucida Grande" charset="0"/>
                           </a:rPr>
-                          <m:t>−</m:t>
-                        </m:r>
-                        <m:r>
-                          <m:rPr>
-                            <m:nor/>
-                          </m:rPr>
-                          <a:rPr lang="it-IT" sz="2000" b="1">
-                            <a:ea typeface="Lucida Grande" charset="0"/>
-                            <a:cs typeface="Lucida Grande" charset="0"/>
-                          </a:rPr>
-                          <m:t>4</m:t>
+                          <m:t>−4</m:t>
                         </m:r>
                       </m:sup>
                     </m:sSup>
@@ -13897,17 +13900,7 @@
                             <a:ea typeface="Lucida Grande" charset="0"/>
                             <a:cs typeface="Lucida Grande" charset="0"/>
                           </a:rPr>
-                          <m:t>−</m:t>
-                        </m:r>
-                        <m:r>
-                          <m:rPr>
-                            <m:nor/>
-                          </m:rPr>
-                          <a:rPr lang="it-IT" sz="2000" b="1">
-                            <a:ea typeface="Lucida Grande" charset="0"/>
-                            <a:cs typeface="Lucida Grande" charset="0"/>
-                          </a:rPr>
-                          <m:t>4</m:t>
+                          <m:t>−4</m:t>
                         </m:r>
                       </m:sup>
                     </m:sSup>
@@ -13958,17 +13951,7 @@
                             <a:ea typeface="Lucida Grande" charset="0"/>
                             <a:cs typeface="Lucida Grande" charset="0"/>
                           </a:rPr>
-                          <m:t>−</m:t>
-                        </m:r>
-                        <m:r>
-                          <m:rPr>
-                            <m:nor/>
-                          </m:rPr>
-                          <a:rPr lang="it-IT" sz="2000" b="1">
-                            <a:ea typeface="Lucida Grande" charset="0"/>
-                            <a:cs typeface="Lucida Grande" charset="0"/>
-                          </a:rPr>
-                          <m:t>4</m:t>
+                          <m:t>−4</m:t>
                         </m:r>
                       </m:sup>
                     </m:sSup>
@@ -14311,7 +14294,17 @@
                             <a:ea typeface="Lucida Grande" charset="0"/>
                             <a:cs typeface="Lucida Grande" charset="0"/>
                           </a:rPr>
-                          <m:t>−4</m:t>
+                          <m:t>−</m:t>
+                        </m:r>
+                        <m:r>
+                          <m:rPr>
+                            <m:nor/>
+                          </m:rPr>
+                          <a:rPr lang="it-IT" sz="2000" b="1">
+                            <a:ea typeface="Lucida Grande" charset="0"/>
+                            <a:cs typeface="Lucida Grande" charset="0"/>
+                          </a:rPr>
+                          <m:t>4</m:t>
                         </m:r>
                       </m:sup>
                     </m:sSup>
@@ -14374,7 +14367,17 @@
                             <a:ea typeface="Lucida Grande" charset="0"/>
                             <a:cs typeface="Lucida Grande" charset="0"/>
                           </a:rPr>
-                          <m:t>−4</m:t>
+                          <m:t>−</m:t>
+                        </m:r>
+                        <m:r>
+                          <m:rPr>
+                            <m:nor/>
+                          </m:rPr>
+                          <a:rPr lang="it-IT" sz="2000" b="1">
+                            <a:ea typeface="Lucida Grande" charset="0"/>
+                            <a:cs typeface="Lucida Grande" charset="0"/>
+                          </a:rPr>
+                          <m:t>4</m:t>
                         </m:r>
                       </m:sup>
                     </m:sSup>
@@ -14437,7 +14440,17 @@
                             <a:ea typeface="Lucida Grande" charset="0"/>
                             <a:cs typeface="Lucida Grande" charset="0"/>
                           </a:rPr>
-                          <m:t>−4</m:t>
+                          <m:t>−</m:t>
+                        </m:r>
+                        <m:r>
+                          <m:rPr>
+                            <m:nor/>
+                          </m:rPr>
+                          <a:rPr lang="it-IT" sz="2000" b="1">
+                            <a:ea typeface="Lucida Grande" charset="0"/>
+                            <a:cs typeface="Lucida Grande" charset="0"/>
+                          </a:rPr>
+                          <m:t>4</m:t>
                         </m:r>
                       </m:sup>
                     </m:sSup>
@@ -20607,18 +20620,18 @@
 </file>
 
 <file path=customXml/item2.xml><?xml version="1.0" encoding="utf-8"?>
+<p:properties xmlns:p="http://schemas.microsoft.com/office/2006/metadata/properties" xmlns:xsi="http://www.w3.org/2001/XMLSchema-instance" xmlns:pc="http://schemas.microsoft.com/office/infopath/2007/PartnerControls">
+  <documentManagement/>
+</p:properties>
+</file>
+
+<file path=customXml/item3.xml><?xml version="1.0" encoding="utf-8"?>
 <?mso-contentType ?>
 <FormTemplates xmlns="http://schemas.microsoft.com/sharepoint/v3/contenttype/forms">
   <Display>DocumentLibraryForm</Display>
   <Edit>DocumentLibraryForm</Edit>
   <New>DocumentLibraryForm</New>
 </FormTemplates>
-</file>
-
-<file path=customXml/item3.xml><?xml version="1.0" encoding="utf-8"?>
-<p:properties xmlns:p="http://schemas.microsoft.com/office/2006/metadata/properties" xmlns:xsi="http://www.w3.org/2001/XMLSchema-instance" xmlns:pc="http://schemas.microsoft.com/office/infopath/2007/PartnerControls">
-  <documentManagement/>
-</p:properties>
 </file>
 
 <file path=customXml/itemProps1.xml><?xml version="1.0" encoding="utf-8"?>
@@ -20638,14 +20651,6 @@
 </file>
 
 <file path=customXml/itemProps2.xml><?xml version="1.0" encoding="utf-8"?>
-<ds:datastoreItem xmlns:ds="http://schemas.openxmlformats.org/officeDocument/2006/customXml" ds:itemID="{642F071F-C090-42AB-8A40-E3A3A8F01244}">
-  <ds:schemaRefs>
-    <ds:schemaRef ds:uri="http://schemas.microsoft.com/sharepoint/v3/contenttype/forms"/>
-  </ds:schemaRefs>
-</ds:datastoreItem>
-</file>
-
-<file path=customXml/itemProps3.xml><?xml version="1.0" encoding="utf-8"?>
 <ds:datastoreItem xmlns:ds="http://schemas.openxmlformats.org/officeDocument/2006/customXml" ds:itemID="{D68A92BA-7E37-44ED-84AE-4BD8BD74DC1F}">
   <ds:schemaRefs>
     <ds:schemaRef ds:uri="http://purl.org/dc/terms/"/>
@@ -20658,4 +20663,12 @@
     <ds:schemaRef ds:uri="http://purl.org/dc/dcmitype/"/>
   </ds:schemaRefs>
 </ds:datastoreItem>
+</file>
+
+<file path=customXml/itemProps3.xml><?xml version="1.0" encoding="utf-8"?>
+<ds:datastoreItem xmlns:ds="http://schemas.openxmlformats.org/officeDocument/2006/customXml" ds:itemID="{642F071F-C090-42AB-8A40-E3A3A8F01244}">
+  <ds:schemaRefs>
+    <ds:schemaRef ds:uri="http://schemas.microsoft.com/sharepoint/v3/contenttype/forms"/>
+  </ds:schemaRefs>
+</ds:datastoreItem>
 </file>
</xml_diff>